<commit_message>
update Rezumat.doc, Proiecte diploma.doc, Prezentare licenta.pptx
</commit_message>
<xml_diff>
--- a/doc/Prezentare licenta.pptx
+++ b/doc/Prezentare licenta.pptx
@@ -5,13 +5,23 @@
     <p:sldMasterId id="2147484824" r:id="rId1"/>
   </p:sldMasterIdLst>
   <p:notesMasterIdLst>
-    <p:notesMasterId r:id="rId6"/>
+    <p:notesMasterId r:id="rId16"/>
   </p:notesMasterIdLst>
   <p:sldIdLst>
     <p:sldId id="256" r:id="rId2"/>
     <p:sldId id="257" r:id="rId3"/>
     <p:sldId id="259" r:id="rId4"/>
     <p:sldId id="258" r:id="rId5"/>
+    <p:sldId id="260" r:id="rId6"/>
+    <p:sldId id="261" r:id="rId7"/>
+    <p:sldId id="269" r:id="rId8"/>
+    <p:sldId id="262" r:id="rId9"/>
+    <p:sldId id="263" r:id="rId10"/>
+    <p:sldId id="266" r:id="rId11"/>
+    <p:sldId id="267" r:id="rId12"/>
+    <p:sldId id="264" r:id="rId13"/>
+    <p:sldId id="268" r:id="rId14"/>
+    <p:sldId id="265" r:id="rId15"/>
   </p:sldIdLst>
   <p:sldSz cx="10160000" cy="7620000"/>
   <p:notesSz cx="6858000" cy="9144000"/>
@@ -149,6 +159,16 @@
             <p14:sldId id="257"/>
             <p14:sldId id="259"/>
             <p14:sldId id="258"/>
+            <p14:sldId id="260"/>
+            <p14:sldId id="261"/>
+            <p14:sldId id="269"/>
+            <p14:sldId id="262"/>
+            <p14:sldId id="263"/>
+            <p14:sldId id="266"/>
+            <p14:sldId id="267"/>
+            <p14:sldId id="264"/>
+            <p14:sldId id="268"/>
+            <p14:sldId id="265"/>
           </p14:sldIdLst>
         </p14:section>
       </p14:sectionLst>
@@ -730,6 +750,518 @@
     </a:lvl9pPr>
   </p:notesStyle>
 </p:notesMaster>
+</file>
+
+<file path=ppt/notesSlides/notesSlide1.xml><?xml version="1.0" encoding="utf-8"?>
+<p:notes xmlns:a="http://schemas.openxmlformats.org/drawingml/2006/main" xmlns:r="http://schemas.openxmlformats.org/officeDocument/2006/relationships" xmlns:p="http://schemas.openxmlformats.org/presentationml/2006/main">
+  <p:cSld>
+    <p:spTree>
+      <p:nvGrpSpPr>
+        <p:cNvPr id="1" name=""/>
+        <p:cNvGrpSpPr/>
+        <p:nvPr/>
+      </p:nvGrpSpPr>
+      <p:grpSpPr>
+        <a:xfrm>
+          <a:off x="0" y="0"/>
+          <a:ext cx="0" cy="0"/>
+          <a:chOff x="0" y="0"/>
+          <a:chExt cx="0" cy="0"/>
+        </a:xfrm>
+      </p:grpSpPr>
+      <p:sp>
+        <p:nvSpPr>
+          <p:cNvPr id="2" name="Slide Image Placeholder 1"/>
+          <p:cNvSpPr>
+            <a:spLocks noGrp="1" noRot="1" noChangeAspect="1"/>
+          </p:cNvSpPr>
+          <p:nvPr>
+            <p:ph type="sldImg"/>
+          </p:nvPr>
+        </p:nvSpPr>
+        <p:spPr/>
+      </p:sp>
+      <p:sp>
+        <p:nvSpPr>
+          <p:cNvPr id="3" name="Notes Placeholder 2"/>
+          <p:cNvSpPr>
+            <a:spLocks noGrp="1"/>
+          </p:cNvSpPr>
+          <p:nvPr>
+            <p:ph type="body" idx="1"/>
+          </p:nvPr>
+        </p:nvSpPr>
+        <p:spPr/>
+        <p:txBody>
+          <a:bodyPr/>
+          <a:lstStyle/>
+          <a:p>
+            <a:r>
+              <a:rPr lang="en-US" dirty="0" err="1" smtClean="0"/>
+              <a:t>POVESTE</a:t>
+            </a:r>
+            <a:r>
+              <a:rPr lang="en-US" baseline="0" dirty="0" smtClean="0"/>
+              <a:t> !!! </a:t>
+            </a:r>
+            <a:r>
+              <a:rPr lang="en-US" baseline="0" dirty="0" err="1" smtClean="0"/>
+              <a:t>incerc</a:t>
+            </a:r>
+            <a:r>
+              <a:rPr lang="en-US" baseline="0" dirty="0" smtClean="0"/>
+              <a:t> </a:t>
+            </a:r>
+            <a:r>
+              <a:rPr lang="en-US" baseline="0" dirty="0" err="1" smtClean="0"/>
+              <a:t>sa</a:t>
+            </a:r>
+            <a:r>
+              <a:rPr lang="en-US" baseline="0" dirty="0" smtClean="0"/>
+              <a:t> </a:t>
+            </a:r>
+            <a:r>
+              <a:rPr lang="en-US" baseline="0" dirty="0" err="1" smtClean="0"/>
+              <a:t>fac</a:t>
+            </a:r>
+            <a:r>
+              <a:rPr lang="en-US" baseline="0" dirty="0" smtClean="0"/>
+              <a:t> </a:t>
+            </a:r>
+            <a:r>
+              <a:rPr lang="en-US" baseline="0" dirty="0" err="1" smtClean="0"/>
+              <a:t>sa</a:t>
+            </a:r>
+            <a:r>
+              <a:rPr lang="en-US" baseline="0" dirty="0" smtClean="0"/>
+              <a:t> </a:t>
+            </a:r>
+            <a:r>
+              <a:rPr lang="en-US" baseline="0" dirty="0" err="1" smtClean="0"/>
+              <a:t>para</a:t>
+            </a:r>
+            <a:r>
+              <a:rPr lang="en-US" baseline="0" dirty="0" smtClean="0"/>
+              <a:t> o </a:t>
+            </a:r>
+            <a:r>
+              <a:rPr lang="en-US" baseline="0" dirty="0" err="1" smtClean="0"/>
+              <a:t>gluma</a:t>
+            </a:r>
+            <a:endParaRPr lang="en-US" baseline="0" dirty="0" smtClean="0"/>
+          </a:p>
+          <a:p>
+            <a:r>
+              <a:rPr lang="en-US" dirty="0" err="1" smtClean="0"/>
+              <a:t>Colegi</a:t>
+            </a:r>
+            <a:r>
+              <a:rPr lang="en-US" baseline="0" dirty="0" err="1" smtClean="0"/>
+              <a:t>i</a:t>
+            </a:r>
+            <a:r>
+              <a:rPr lang="en-US" baseline="0" dirty="0" smtClean="0"/>
+              <a:t> nu </a:t>
+            </a:r>
+            <a:r>
+              <a:rPr lang="en-US" baseline="0" dirty="0" err="1" smtClean="0"/>
+              <a:t>erau</a:t>
+            </a:r>
+            <a:r>
+              <a:rPr lang="en-US" baseline="0" dirty="0" smtClean="0"/>
+              <a:t> </a:t>
+            </a:r>
+            <a:r>
+              <a:rPr lang="en-US" baseline="0" dirty="0" err="1" smtClean="0"/>
+              <a:t>bucurosi</a:t>
+            </a:r>
+            <a:r>
+              <a:rPr lang="en-US" baseline="0" dirty="0" smtClean="0"/>
+              <a:t> -&gt; </a:t>
+            </a:r>
+            <a:r>
+              <a:rPr lang="en-US" baseline="0" dirty="0" err="1" smtClean="0"/>
+              <a:t>linistita</a:t>
+            </a:r>
+            <a:r>
+              <a:rPr lang="en-US" baseline="0" dirty="0" smtClean="0"/>
+              <a:t> </a:t>
+            </a:r>
+            <a:r>
+              <a:rPr lang="en-US" baseline="0" dirty="0" err="1" smtClean="0"/>
+              <a:t>pentru</a:t>
+            </a:r>
+            <a:r>
+              <a:rPr lang="en-US" baseline="0" dirty="0" smtClean="0"/>
+              <a:t> nu </a:t>
+            </a:r>
+            <a:r>
+              <a:rPr lang="en-US" baseline="0" dirty="0" err="1" smtClean="0"/>
+              <a:t>credeau</a:t>
+            </a:r>
+            <a:r>
+              <a:rPr lang="en-US" baseline="0" dirty="0" smtClean="0"/>
+              <a:t> </a:t>
+            </a:r>
+            <a:r>
+              <a:rPr lang="en-US" baseline="0" dirty="0" err="1" smtClean="0"/>
+              <a:t>ca</a:t>
+            </a:r>
+            <a:r>
+              <a:rPr lang="en-US" baseline="0" dirty="0" smtClean="0"/>
+              <a:t> se </a:t>
+            </a:r>
+            <a:r>
+              <a:rPr lang="en-US" baseline="0" dirty="0" err="1" smtClean="0"/>
+              <a:t>poate</a:t>
+            </a:r>
+            <a:r>
+              <a:rPr lang="en-US" baseline="0" dirty="0" smtClean="0"/>
+              <a:t>? </a:t>
+            </a:r>
+          </a:p>
+          <a:p>
+            <a:r>
+              <a:rPr lang="en-US" baseline="0" dirty="0" smtClean="0"/>
+              <a:t> : </a:t>
+            </a:r>
+            <a:r>
+              <a:rPr lang="en-US" baseline="0" dirty="0" err="1" smtClean="0"/>
+              <a:t>daca</a:t>
+            </a:r>
+            <a:r>
+              <a:rPr lang="en-US" baseline="0" dirty="0" smtClean="0"/>
+              <a:t> </a:t>
+            </a:r>
+            <a:r>
+              <a:rPr lang="en-US" baseline="0" dirty="0" err="1" smtClean="0"/>
+              <a:t>redenumesc</a:t>
+            </a:r>
+            <a:r>
+              <a:rPr lang="en-US" baseline="0" dirty="0" smtClean="0"/>
+              <a:t>? </a:t>
+            </a:r>
+          </a:p>
+          <a:p>
+            <a:r>
+              <a:rPr lang="en-US" baseline="0" dirty="0" smtClean="0"/>
+              <a:t> : </a:t>
+            </a:r>
+            <a:r>
+              <a:rPr lang="en-US" baseline="0" dirty="0" err="1" smtClean="0"/>
+              <a:t>daca</a:t>
+            </a:r>
+            <a:r>
+              <a:rPr lang="en-US" baseline="0" dirty="0" smtClean="0"/>
+              <a:t> </a:t>
+            </a:r>
+            <a:r>
+              <a:rPr lang="en-US" baseline="0" dirty="0" err="1" smtClean="0"/>
+              <a:t>adaug</a:t>
+            </a:r>
+            <a:r>
+              <a:rPr lang="en-US" baseline="0" dirty="0" smtClean="0"/>
+              <a:t> o </a:t>
+            </a:r>
+            <a:r>
+              <a:rPr lang="en-US" baseline="0" dirty="0" err="1" smtClean="0"/>
+              <a:t>functie</a:t>
+            </a:r>
+            <a:r>
+              <a:rPr lang="en-US" baseline="0" dirty="0" smtClean="0"/>
+              <a:t> </a:t>
+            </a:r>
+            <a:r>
+              <a:rPr lang="en-US" baseline="0" dirty="0" err="1" smtClean="0"/>
+              <a:t>aiurea</a:t>
+            </a:r>
+            <a:endParaRPr lang="en-US" baseline="0" dirty="0" smtClean="0"/>
+          </a:p>
+          <a:p>
+            <a:r>
+              <a:rPr lang="en-US" baseline="0" dirty="0" smtClean="0"/>
+              <a:t> : </a:t>
+            </a:r>
+            <a:r>
+              <a:rPr lang="en-US" baseline="0" dirty="0" err="1" smtClean="0"/>
+              <a:t>daca</a:t>
+            </a:r>
+            <a:r>
+              <a:rPr lang="en-US" baseline="0" dirty="0" smtClean="0"/>
+              <a:t> </a:t>
+            </a:r>
+            <a:r>
+              <a:rPr lang="en-US" baseline="0" dirty="0" err="1" smtClean="0"/>
+              <a:t>sterg</a:t>
+            </a:r>
+            <a:r>
+              <a:rPr lang="en-US" baseline="0" dirty="0" smtClean="0"/>
+              <a:t> </a:t>
+            </a:r>
+            <a:r>
+              <a:rPr lang="en-US" baseline="0" dirty="0" err="1" smtClean="0"/>
+              <a:t>unele</a:t>
+            </a:r>
+            <a:r>
+              <a:rPr lang="en-US" baseline="0" dirty="0" smtClean="0"/>
+              <a:t> </a:t>
+            </a:r>
+            <a:r>
+              <a:rPr lang="en-US" baseline="0" dirty="0" err="1" smtClean="0"/>
+              <a:t>conditii</a:t>
+            </a:r>
+            <a:endParaRPr lang="en-US" baseline="0" dirty="0" smtClean="0"/>
+          </a:p>
+          <a:p>
+            <a:r>
+              <a:rPr lang="en-US" baseline="0" dirty="0" smtClean="0"/>
+              <a:t> ? Ma </a:t>
+            </a:r>
+            <a:r>
+              <a:rPr lang="en-US" baseline="0" dirty="0" err="1" smtClean="0"/>
+              <a:t>mai</a:t>
+            </a:r>
+            <a:r>
+              <a:rPr lang="en-US" baseline="0" dirty="0" smtClean="0"/>
+              <a:t> </a:t>
+            </a:r>
+            <a:r>
+              <a:rPr lang="en-US" baseline="0" dirty="0" err="1" smtClean="0"/>
+              <a:t>poti</a:t>
+            </a:r>
+            <a:r>
+              <a:rPr lang="en-US" baseline="0" dirty="0" smtClean="0"/>
+              <a:t> </a:t>
+            </a:r>
+            <a:r>
+              <a:rPr lang="en-US" baseline="0" dirty="0" err="1" smtClean="0"/>
+              <a:t>prinde</a:t>
+            </a:r>
+            <a:r>
+              <a:rPr lang="en-US" baseline="0" dirty="0" smtClean="0"/>
+              <a:t> ? </a:t>
+            </a:r>
+          </a:p>
+          <a:p>
+            <a:r>
+              <a:rPr lang="en-US" baseline="0" dirty="0" smtClean="0"/>
+              <a:t>DA…</a:t>
+            </a:r>
+          </a:p>
+          <a:p>
+            <a:r>
+              <a:rPr lang="en-US" baseline="0" dirty="0" smtClean="0"/>
+              <a:t>Cum ?</a:t>
+            </a:r>
+            <a:endParaRPr lang="en-US" dirty="0"/>
+          </a:p>
+        </p:txBody>
+      </p:sp>
+      <p:sp>
+        <p:nvSpPr>
+          <p:cNvPr id="4" name="Slide Number Placeholder 3"/>
+          <p:cNvSpPr>
+            <a:spLocks noGrp="1"/>
+          </p:cNvSpPr>
+          <p:nvPr>
+            <p:ph type="sldNum" sz="quarter" idx="10"/>
+          </p:nvPr>
+        </p:nvSpPr>
+        <p:spPr/>
+        <p:txBody>
+          <a:bodyPr/>
+          <a:lstStyle/>
+          <a:p>
+            <a:fld id="{54CEF8BC-56BE-4682-9BB0-C3BFCD6709AE}" type="slidenum">
+              <a:rPr lang="en-US" smtClean="0"/>
+              <a:pPr/>
+              <a:t>3</a:t>
+            </a:fld>
+            <a:endParaRPr lang="en-US"/>
+          </a:p>
+        </p:txBody>
+      </p:sp>
+    </p:spTree>
+    <p:extLst>
+      <p:ext uri="{BB962C8B-B14F-4D97-AF65-F5344CB8AC3E}">
+        <p14:creationId xmlns:p14="http://schemas.microsoft.com/office/powerpoint/2010/main" val="1949485455"/>
+      </p:ext>
+    </p:extLst>
+  </p:cSld>
+  <p:clrMapOvr>
+    <a:masterClrMapping/>
+  </p:clrMapOvr>
+</p:notes>
+</file>
+
+<file path=ppt/notesSlides/notesSlide2.xml><?xml version="1.0" encoding="utf-8"?>
+<p:notes xmlns:a="http://schemas.openxmlformats.org/drawingml/2006/main" xmlns:r="http://schemas.openxmlformats.org/officeDocument/2006/relationships" xmlns:p="http://schemas.openxmlformats.org/presentationml/2006/main">
+  <p:cSld>
+    <p:spTree>
+      <p:nvGrpSpPr>
+        <p:cNvPr id="1" name=""/>
+        <p:cNvGrpSpPr/>
+        <p:nvPr/>
+      </p:nvGrpSpPr>
+      <p:grpSpPr>
+        <a:xfrm>
+          <a:off x="0" y="0"/>
+          <a:ext cx="0" cy="0"/>
+          <a:chOff x="0" y="0"/>
+          <a:chExt cx="0" cy="0"/>
+        </a:xfrm>
+      </p:grpSpPr>
+      <p:sp>
+        <p:nvSpPr>
+          <p:cNvPr id="2" name="Slide Image Placeholder 1"/>
+          <p:cNvSpPr>
+            <a:spLocks noGrp="1" noRot="1" noChangeAspect="1"/>
+          </p:cNvSpPr>
+          <p:nvPr>
+            <p:ph type="sldImg"/>
+          </p:nvPr>
+        </p:nvSpPr>
+        <p:spPr/>
+      </p:sp>
+      <p:sp>
+        <p:nvSpPr>
+          <p:cNvPr id="3" name="Notes Placeholder 2"/>
+          <p:cNvSpPr>
+            <a:spLocks noGrp="1"/>
+          </p:cNvSpPr>
+          <p:nvPr>
+            <p:ph type="body" idx="1"/>
+          </p:nvPr>
+        </p:nvSpPr>
+        <p:spPr/>
+        <p:txBody>
+          <a:bodyPr/>
+          <a:lstStyle/>
+          <a:p>
+            <a:endParaRPr lang="en-US" dirty="0"/>
+          </a:p>
+        </p:txBody>
+      </p:sp>
+      <p:sp>
+        <p:nvSpPr>
+          <p:cNvPr id="4" name="Slide Number Placeholder 3"/>
+          <p:cNvSpPr>
+            <a:spLocks noGrp="1"/>
+          </p:cNvSpPr>
+          <p:nvPr>
+            <p:ph type="sldNum" sz="quarter" idx="10"/>
+          </p:nvPr>
+        </p:nvSpPr>
+        <p:spPr/>
+        <p:txBody>
+          <a:bodyPr/>
+          <a:lstStyle/>
+          <a:p>
+            <a:fld id="{54CEF8BC-56BE-4682-9BB0-C3BFCD6709AE}" type="slidenum">
+              <a:rPr lang="en-US" smtClean="0"/>
+              <a:pPr/>
+              <a:t>4</a:t>
+            </a:fld>
+            <a:endParaRPr lang="en-US"/>
+          </a:p>
+        </p:txBody>
+      </p:sp>
+    </p:spTree>
+    <p:extLst>
+      <p:ext uri="{BB962C8B-B14F-4D97-AF65-F5344CB8AC3E}">
+        <p14:creationId xmlns:p14="http://schemas.microsoft.com/office/powerpoint/2010/main" val="2341919135"/>
+      </p:ext>
+    </p:extLst>
+  </p:cSld>
+  <p:clrMapOvr>
+    <a:masterClrMapping/>
+  </p:clrMapOvr>
+</p:notes>
+</file>
+
+<file path=ppt/notesSlides/notesSlide3.xml><?xml version="1.0" encoding="utf-8"?>
+<p:notes xmlns:a="http://schemas.openxmlformats.org/drawingml/2006/main" xmlns:r="http://schemas.openxmlformats.org/officeDocument/2006/relationships" xmlns:p="http://schemas.openxmlformats.org/presentationml/2006/main">
+  <p:cSld>
+    <p:spTree>
+      <p:nvGrpSpPr>
+        <p:cNvPr id="1" name=""/>
+        <p:cNvGrpSpPr/>
+        <p:nvPr/>
+      </p:nvGrpSpPr>
+      <p:grpSpPr>
+        <a:xfrm>
+          <a:off x="0" y="0"/>
+          <a:ext cx="0" cy="0"/>
+          <a:chOff x="0" y="0"/>
+          <a:chExt cx="0" cy="0"/>
+        </a:xfrm>
+      </p:grpSpPr>
+      <p:sp>
+        <p:nvSpPr>
+          <p:cNvPr id="2" name="Slide Image Placeholder 1"/>
+          <p:cNvSpPr>
+            <a:spLocks noGrp="1" noRot="1" noChangeAspect="1"/>
+          </p:cNvSpPr>
+          <p:nvPr>
+            <p:ph type="sldImg"/>
+          </p:nvPr>
+        </p:nvSpPr>
+        <p:spPr/>
+      </p:sp>
+      <p:sp>
+        <p:nvSpPr>
+          <p:cNvPr id="3" name="Notes Placeholder 2"/>
+          <p:cNvSpPr>
+            <a:spLocks noGrp="1"/>
+          </p:cNvSpPr>
+          <p:nvPr>
+            <p:ph type="body" idx="1"/>
+          </p:nvPr>
+        </p:nvSpPr>
+        <p:spPr/>
+        <p:txBody>
+          <a:bodyPr/>
+          <a:lstStyle/>
+          <a:p>
+            <a:endParaRPr lang="en-US" dirty="0"/>
+          </a:p>
+        </p:txBody>
+      </p:sp>
+      <p:sp>
+        <p:nvSpPr>
+          <p:cNvPr id="4" name="Slide Number Placeholder 3"/>
+          <p:cNvSpPr>
+            <a:spLocks noGrp="1"/>
+          </p:cNvSpPr>
+          <p:nvPr>
+            <p:ph type="sldNum" sz="quarter" idx="10"/>
+          </p:nvPr>
+        </p:nvSpPr>
+        <p:spPr/>
+        <p:txBody>
+          <a:bodyPr/>
+          <a:lstStyle/>
+          <a:p>
+            <a:fld id="{54CEF8BC-56BE-4682-9BB0-C3BFCD6709AE}" type="slidenum">
+              <a:rPr lang="en-US" smtClean="0"/>
+              <a:pPr/>
+              <a:t>5</a:t>
+            </a:fld>
+            <a:endParaRPr lang="en-US"/>
+          </a:p>
+        </p:txBody>
+      </p:sp>
+    </p:spTree>
+    <p:extLst>
+      <p:ext uri="{BB962C8B-B14F-4D97-AF65-F5344CB8AC3E}">
+        <p14:creationId xmlns:p14="http://schemas.microsoft.com/office/powerpoint/2010/main" val="3837304984"/>
+      </p:ext>
+    </p:extLst>
+  </p:cSld>
+  <p:clrMapOvr>
+    <a:masterClrMapping/>
+  </p:clrMapOvr>
+</p:notes>
 </file>
 
 <file path=ppt/slideLayouts/slideLayout1.xml><?xml version="1.0" encoding="utf-8"?>
@@ -15364,16 +15896,7 @@
                 </a:solidFill>
                 <a:latin typeface="Arial" pitchFamily="34" charset="0"/>
               </a:rPr>
-              <a:t>Politeh</a:t>
-            </a:r>
-            <a:r>
-              <a:rPr lang="en-US" dirty="0" err="1" smtClean="0">
-                <a:solidFill>
-                  <a:srgbClr val="000000"/>
-                </a:solidFill>
-                <a:latin typeface="Arial" pitchFamily="34" charset="0"/>
-              </a:rPr>
-              <a:t>nica</a:t>
+              <a:t>Politehnica</a:t>
             </a:r>
             <a:r>
               <a:rPr lang="en-US" dirty="0" smtClean="0">
@@ -15999,6 +16522,1438 @@
 </p:sld>
 </file>
 
+<file path=ppt/slides/slide10.xml><?xml version="1.0" encoding="utf-8"?>
+<p:sld xmlns:a="http://schemas.openxmlformats.org/drawingml/2006/main" xmlns:r="http://schemas.openxmlformats.org/officeDocument/2006/relationships" xmlns:p="http://schemas.openxmlformats.org/presentationml/2006/main">
+  <p:cSld>
+    <p:spTree>
+      <p:nvGrpSpPr>
+        <p:cNvPr id="1" name=""/>
+        <p:cNvGrpSpPr/>
+        <p:nvPr/>
+      </p:nvGrpSpPr>
+      <p:grpSpPr>
+        <a:xfrm>
+          <a:off x="0" y="0"/>
+          <a:ext cx="0" cy="0"/>
+          <a:chOff x="0" y="0"/>
+          <a:chExt cx="0" cy="0"/>
+        </a:xfrm>
+      </p:grpSpPr>
+      <p:sp>
+        <p:nvSpPr>
+          <p:cNvPr id="3" name="Title 2"/>
+          <p:cNvSpPr>
+            <a:spLocks noGrp="1"/>
+          </p:cNvSpPr>
+          <p:nvPr>
+            <p:ph type="title"/>
+          </p:nvPr>
+        </p:nvSpPr>
+        <p:spPr/>
+        <p:txBody>
+          <a:bodyPr/>
+          <a:lstStyle/>
+          <a:p>
+            <a:r>
+              <a:rPr lang="en-US" dirty="0" err="1" smtClean="0"/>
+              <a:t>Rezultate</a:t>
+            </a:r>
+            <a:endParaRPr lang="en-US" dirty="0"/>
+          </a:p>
+        </p:txBody>
+      </p:sp>
+      <p:graphicFrame>
+        <p:nvGraphicFramePr>
+          <p:cNvPr id="4" name="Table 3"/>
+          <p:cNvGraphicFramePr>
+            <a:graphicFrameLocks noGrp="1"/>
+          </p:cNvGraphicFramePr>
+          <p:nvPr>
+            <p:extLst>
+              <p:ext uri="{D42A27DB-BD31-4B8C-83A1-F6EECF244321}">
+                <p14:modId xmlns:p14="http://schemas.microsoft.com/office/powerpoint/2010/main" val="1393218420"/>
+              </p:ext>
+            </p:extLst>
+          </p:nvPr>
+        </p:nvGraphicFramePr>
+        <p:xfrm>
+          <a:off x="660400" y="2514600"/>
+          <a:ext cx="4114800" cy="3733800"/>
+        </p:xfrm>
+        <a:graphic>
+          <a:graphicData uri="http://schemas.openxmlformats.org/drawingml/2006/table">
+            <a:tbl>
+              <a:tblPr firstRow="1" firstCol="1" bandRow="1">
+                <a:tableStyleId>{5C22544A-7EE6-4342-B048-85BDC9FD1C3A}</a:tableStyleId>
+              </a:tblPr>
+              <a:tblGrid>
+                <a:gridCol w="1616122"/>
+                <a:gridCol w="1458173"/>
+                <a:gridCol w="1040505"/>
+              </a:tblGrid>
+              <a:tr h="434937">
+                <a:tc>
+                  <a:txBody>
+                    <a:bodyPr/>
+                    <a:lstStyle/>
+                    <a:p>
+                      <a:pPr marL="0" marR="0" algn="ctr">
+                        <a:spcBef>
+                          <a:spcPts val="0"/>
+                        </a:spcBef>
+                        <a:spcAft>
+                          <a:spcPts val="0"/>
+                        </a:spcAft>
+                      </a:pPr>
+                      <a:r>
+                        <a:rPr lang="en-US" sz="1200">
+                          <a:effectLst/>
+                        </a:rPr>
+                        <a:t>Caz de test</a:t>
+                      </a:r>
+                      <a:endParaRPr lang="en-US" sz="1000">
+                        <a:effectLst/>
+                        <a:latin typeface="Times New Roman"/>
+                        <a:ea typeface="Times New Roman"/>
+                      </a:endParaRPr>
+                    </a:p>
+                  </a:txBody>
+                  <a:tcPr marL="68580" marR="68580" marT="0" marB="0"/>
+                </a:tc>
+                <a:tc>
+                  <a:txBody>
+                    <a:bodyPr/>
+                    <a:lstStyle/>
+                    <a:p>
+                      <a:pPr marL="0" marR="0" algn="ctr">
+                        <a:spcBef>
+                          <a:spcPts val="0"/>
+                        </a:spcBef>
+                        <a:spcAft>
+                          <a:spcPts val="0"/>
+                        </a:spcAft>
+                      </a:pPr>
+                      <a:r>
+                        <a:rPr lang="en-US" sz="1200">
+                          <a:effectLst/>
+                        </a:rPr>
+                        <a:t>CloneDetector</a:t>
+                      </a:r>
+                      <a:endParaRPr lang="en-US" sz="1000">
+                        <a:effectLst/>
+                        <a:latin typeface="Times New Roman"/>
+                        <a:ea typeface="Times New Roman"/>
+                      </a:endParaRPr>
+                    </a:p>
+                  </a:txBody>
+                  <a:tcPr marL="68580" marR="68580" marT="0" marB="0"/>
+                </a:tc>
+                <a:tc>
+                  <a:txBody>
+                    <a:bodyPr/>
+                    <a:lstStyle/>
+                    <a:p>
+                      <a:pPr marL="0" marR="0" algn="ctr">
+                        <a:spcBef>
+                          <a:spcPts val="0"/>
+                        </a:spcBef>
+                        <a:spcAft>
+                          <a:spcPts val="0"/>
+                        </a:spcAft>
+                      </a:pPr>
+                      <a:r>
+                        <a:rPr lang="en-US" sz="1200">
+                          <a:effectLst/>
+                        </a:rPr>
+                        <a:t>Dude</a:t>
+                      </a:r>
+                      <a:endParaRPr lang="en-US" sz="1000">
+                        <a:effectLst/>
+                        <a:latin typeface="Times New Roman"/>
+                        <a:ea typeface="Times New Roman"/>
+                      </a:endParaRPr>
+                    </a:p>
+                  </a:txBody>
+                  <a:tcPr marL="68580" marR="68580" marT="0" marB="0"/>
+                </a:tc>
+              </a:tr>
+              <a:tr h="306777">
+                <a:tc>
+                  <a:txBody>
+                    <a:bodyPr/>
+                    <a:lstStyle/>
+                    <a:p>
+                      <a:pPr marL="0" marR="0">
+                        <a:spcBef>
+                          <a:spcPts val="0"/>
+                        </a:spcBef>
+                        <a:spcAft>
+                          <a:spcPts val="0"/>
+                        </a:spcAft>
+                      </a:pPr>
+                      <a:r>
+                        <a:rPr lang="en-US" sz="1000">
+                          <a:effectLst/>
+                        </a:rPr>
+                        <a:t>Clona tipul 1</a:t>
+                      </a:r>
+                      <a:endParaRPr lang="en-US" sz="1000">
+                        <a:effectLst/>
+                        <a:latin typeface="Times New Roman"/>
+                        <a:ea typeface="Times New Roman"/>
+                      </a:endParaRPr>
+                    </a:p>
+                  </a:txBody>
+                  <a:tcPr marL="68580" marR="68580" marT="0" marB="0"/>
+                </a:tc>
+                <a:tc>
+                  <a:txBody>
+                    <a:bodyPr/>
+                    <a:lstStyle/>
+                    <a:p>
+                      <a:pPr marL="0" marR="0" algn="ctr">
+                        <a:spcBef>
+                          <a:spcPts val="0"/>
+                        </a:spcBef>
+                        <a:spcAft>
+                          <a:spcPts val="0"/>
+                        </a:spcAft>
+                      </a:pPr>
+                      <a:r>
+                        <a:rPr lang="en-US" sz="1000">
+                          <a:effectLst/>
+                        </a:rPr>
+                        <a:t>Detectată</a:t>
+                      </a:r>
+                      <a:endParaRPr lang="en-US" sz="1000">
+                        <a:effectLst/>
+                        <a:latin typeface="Times New Roman"/>
+                        <a:ea typeface="Times New Roman"/>
+                      </a:endParaRPr>
+                    </a:p>
+                  </a:txBody>
+                  <a:tcPr marL="68580" marR="68580" marT="0" marB="0"/>
+                </a:tc>
+                <a:tc>
+                  <a:txBody>
+                    <a:bodyPr/>
+                    <a:lstStyle/>
+                    <a:p>
+                      <a:pPr marL="0" marR="0">
+                        <a:spcBef>
+                          <a:spcPts val="0"/>
+                        </a:spcBef>
+                        <a:spcAft>
+                          <a:spcPts val="0"/>
+                        </a:spcAft>
+                      </a:pPr>
+                      <a:r>
+                        <a:rPr lang="en-US" sz="1000">
+                          <a:effectLst/>
+                        </a:rPr>
+                        <a:t>Detectată</a:t>
+                      </a:r>
+                      <a:endParaRPr lang="en-US" sz="1000">
+                        <a:effectLst/>
+                        <a:latin typeface="Times New Roman"/>
+                        <a:ea typeface="Times New Roman"/>
+                      </a:endParaRPr>
+                    </a:p>
+                  </a:txBody>
+                  <a:tcPr marL="68580" marR="68580" marT="0" marB="0"/>
+                </a:tc>
+              </a:tr>
+              <a:tr h="484385">
+                <a:tc>
+                  <a:txBody>
+                    <a:bodyPr/>
+                    <a:lstStyle/>
+                    <a:p>
+                      <a:pPr marL="0" marR="0">
+                        <a:spcBef>
+                          <a:spcPts val="0"/>
+                        </a:spcBef>
+                        <a:spcAft>
+                          <a:spcPts val="0"/>
+                        </a:spcAft>
+                      </a:pPr>
+                      <a:r>
+                        <a:rPr lang="en-US" sz="1000">
+                          <a:effectLst/>
+                        </a:rPr>
+                        <a:t>Clona tipul 2 cu porţiuni redenumite</a:t>
+                      </a:r>
+                      <a:endParaRPr lang="en-US" sz="1000">
+                        <a:effectLst/>
+                        <a:latin typeface="Times New Roman"/>
+                        <a:ea typeface="Times New Roman"/>
+                      </a:endParaRPr>
+                    </a:p>
+                  </a:txBody>
+                  <a:tcPr marL="68580" marR="68580" marT="0" marB="0"/>
+                </a:tc>
+                <a:tc>
+                  <a:txBody>
+                    <a:bodyPr/>
+                    <a:lstStyle/>
+                    <a:p>
+                      <a:pPr marL="0" marR="0" algn="ctr">
+                        <a:spcBef>
+                          <a:spcPts val="0"/>
+                        </a:spcBef>
+                        <a:spcAft>
+                          <a:spcPts val="0"/>
+                        </a:spcAft>
+                      </a:pPr>
+                      <a:r>
+                        <a:rPr lang="en-US" sz="1000">
+                          <a:effectLst/>
+                        </a:rPr>
+                        <a:t>Detectată</a:t>
+                      </a:r>
+                      <a:endParaRPr lang="en-US" sz="1000">
+                        <a:effectLst/>
+                        <a:latin typeface="Times New Roman"/>
+                        <a:ea typeface="Times New Roman"/>
+                      </a:endParaRPr>
+                    </a:p>
+                  </a:txBody>
+                  <a:tcPr marL="68580" marR="68580" marT="0" marB="0"/>
+                </a:tc>
+                <a:tc>
+                  <a:txBody>
+                    <a:bodyPr/>
+                    <a:lstStyle/>
+                    <a:p>
+                      <a:pPr marL="0" marR="0">
+                        <a:spcBef>
+                          <a:spcPts val="0"/>
+                        </a:spcBef>
+                        <a:spcAft>
+                          <a:spcPts val="0"/>
+                        </a:spcAft>
+                      </a:pPr>
+                      <a:r>
+                        <a:rPr lang="en-US" sz="1000">
+                          <a:effectLst/>
+                        </a:rPr>
+                        <a:t>Detectată</a:t>
+                      </a:r>
+                      <a:endParaRPr lang="en-US" sz="1000">
+                        <a:effectLst/>
+                        <a:latin typeface="Times New Roman"/>
+                        <a:ea typeface="Times New Roman"/>
+                      </a:endParaRPr>
+                    </a:p>
+                  </a:txBody>
+                  <a:tcPr marL="68580" marR="68580" marT="0" marB="0"/>
+                </a:tc>
+              </a:tr>
+              <a:tr h="484385">
+                <a:tc>
+                  <a:txBody>
+                    <a:bodyPr/>
+                    <a:lstStyle/>
+                    <a:p>
+                      <a:pPr marL="0" marR="0">
+                        <a:spcBef>
+                          <a:spcPts val="0"/>
+                        </a:spcBef>
+                        <a:spcAft>
+                          <a:spcPts val="0"/>
+                        </a:spcAft>
+                      </a:pPr>
+                      <a:r>
+                        <a:rPr lang="en-US" sz="1000">
+                          <a:effectLst/>
+                        </a:rPr>
+                        <a:t>Clona tipul 2 total redenumită</a:t>
+                      </a:r>
+                      <a:endParaRPr lang="en-US" sz="1000">
+                        <a:effectLst/>
+                        <a:latin typeface="Times New Roman"/>
+                        <a:ea typeface="Times New Roman"/>
+                      </a:endParaRPr>
+                    </a:p>
+                  </a:txBody>
+                  <a:tcPr marL="68580" marR="68580" marT="0" marB="0"/>
+                </a:tc>
+                <a:tc>
+                  <a:txBody>
+                    <a:bodyPr/>
+                    <a:lstStyle/>
+                    <a:p>
+                      <a:pPr marL="0" marR="0" algn="ctr">
+                        <a:spcBef>
+                          <a:spcPts val="0"/>
+                        </a:spcBef>
+                        <a:spcAft>
+                          <a:spcPts val="0"/>
+                        </a:spcAft>
+                      </a:pPr>
+                      <a:r>
+                        <a:rPr lang="en-US" sz="1000">
+                          <a:effectLst/>
+                        </a:rPr>
+                        <a:t>Detectată</a:t>
+                      </a:r>
+                      <a:endParaRPr lang="en-US" sz="1000">
+                        <a:effectLst/>
+                        <a:latin typeface="Times New Roman"/>
+                        <a:ea typeface="Times New Roman"/>
+                      </a:endParaRPr>
+                    </a:p>
+                  </a:txBody>
+                  <a:tcPr marL="68580" marR="68580" marT="0" marB="0"/>
+                </a:tc>
+                <a:tc>
+                  <a:txBody>
+                    <a:bodyPr/>
+                    <a:lstStyle/>
+                    <a:p>
+                      <a:pPr marL="0" marR="0">
+                        <a:spcBef>
+                          <a:spcPts val="0"/>
+                        </a:spcBef>
+                        <a:spcAft>
+                          <a:spcPts val="0"/>
+                        </a:spcAft>
+                      </a:pPr>
+                      <a:r>
+                        <a:rPr lang="en-US" sz="1000">
+                          <a:effectLst/>
+                        </a:rPr>
+                        <a:t>Nedetectată</a:t>
+                      </a:r>
+                      <a:endParaRPr lang="en-US" sz="1000">
+                        <a:effectLst/>
+                        <a:latin typeface="Times New Roman"/>
+                        <a:ea typeface="Times New Roman"/>
+                      </a:endParaRPr>
+                    </a:p>
+                  </a:txBody>
+                  <a:tcPr marL="68580" marR="68580" marT="0" marB="0"/>
+                </a:tc>
+              </a:tr>
+              <a:tr h="484385">
+                <a:tc>
+                  <a:txBody>
+                    <a:bodyPr/>
+                    <a:lstStyle/>
+                    <a:p>
+                      <a:pPr marL="0" marR="0">
+                        <a:spcBef>
+                          <a:spcPts val="0"/>
+                        </a:spcBef>
+                        <a:spcAft>
+                          <a:spcPts val="0"/>
+                        </a:spcAft>
+                      </a:pPr>
+                      <a:r>
+                        <a:rPr lang="en-US" sz="1000">
+                          <a:effectLst/>
+                        </a:rPr>
+                        <a:t>Clona tipul 3 partial redenumită</a:t>
+                      </a:r>
+                      <a:endParaRPr lang="en-US" sz="1000">
+                        <a:effectLst/>
+                        <a:latin typeface="Times New Roman"/>
+                        <a:ea typeface="Times New Roman"/>
+                      </a:endParaRPr>
+                    </a:p>
+                  </a:txBody>
+                  <a:tcPr marL="68580" marR="68580" marT="0" marB="0"/>
+                </a:tc>
+                <a:tc>
+                  <a:txBody>
+                    <a:bodyPr/>
+                    <a:lstStyle/>
+                    <a:p>
+                      <a:pPr marL="0" marR="0" algn="ctr">
+                        <a:spcBef>
+                          <a:spcPts val="0"/>
+                        </a:spcBef>
+                        <a:spcAft>
+                          <a:spcPts val="0"/>
+                        </a:spcAft>
+                      </a:pPr>
+                      <a:r>
+                        <a:rPr lang="en-US" sz="1000">
+                          <a:effectLst/>
+                        </a:rPr>
+                        <a:t>Detectată</a:t>
+                      </a:r>
+                      <a:endParaRPr lang="en-US" sz="1000">
+                        <a:effectLst/>
+                        <a:latin typeface="Times New Roman"/>
+                        <a:ea typeface="Times New Roman"/>
+                      </a:endParaRPr>
+                    </a:p>
+                  </a:txBody>
+                  <a:tcPr marL="68580" marR="68580" marT="0" marB="0"/>
+                </a:tc>
+                <a:tc>
+                  <a:txBody>
+                    <a:bodyPr/>
+                    <a:lstStyle/>
+                    <a:p>
+                      <a:pPr marL="0" marR="0">
+                        <a:spcBef>
+                          <a:spcPts val="0"/>
+                        </a:spcBef>
+                        <a:spcAft>
+                          <a:spcPts val="0"/>
+                        </a:spcAft>
+                      </a:pPr>
+                      <a:r>
+                        <a:rPr lang="en-US" sz="1000">
+                          <a:effectLst/>
+                        </a:rPr>
+                        <a:t>Detectată</a:t>
+                      </a:r>
+                      <a:endParaRPr lang="en-US" sz="1000">
+                        <a:effectLst/>
+                        <a:latin typeface="Times New Roman"/>
+                        <a:ea typeface="Times New Roman"/>
+                      </a:endParaRPr>
+                    </a:p>
+                  </a:txBody>
+                  <a:tcPr marL="68580" marR="68580" marT="0" marB="0"/>
+                </a:tc>
+              </a:tr>
+              <a:tr h="484385">
+                <a:tc>
+                  <a:txBody>
+                    <a:bodyPr/>
+                    <a:lstStyle/>
+                    <a:p>
+                      <a:pPr marL="0" marR="0">
+                        <a:spcBef>
+                          <a:spcPts val="0"/>
+                        </a:spcBef>
+                        <a:spcAft>
+                          <a:spcPts val="0"/>
+                        </a:spcAft>
+                      </a:pPr>
+                      <a:r>
+                        <a:rPr lang="en-US" sz="1000">
+                          <a:effectLst/>
+                        </a:rPr>
+                        <a:t>Clona tipul 3 total redenumită</a:t>
+                      </a:r>
+                      <a:endParaRPr lang="en-US" sz="1000">
+                        <a:effectLst/>
+                        <a:latin typeface="Times New Roman"/>
+                        <a:ea typeface="Times New Roman"/>
+                      </a:endParaRPr>
+                    </a:p>
+                  </a:txBody>
+                  <a:tcPr marL="68580" marR="68580" marT="0" marB="0"/>
+                </a:tc>
+                <a:tc>
+                  <a:txBody>
+                    <a:bodyPr/>
+                    <a:lstStyle/>
+                    <a:p>
+                      <a:pPr marL="0" marR="0" algn="ctr">
+                        <a:spcBef>
+                          <a:spcPts val="0"/>
+                        </a:spcBef>
+                        <a:spcAft>
+                          <a:spcPts val="0"/>
+                        </a:spcAft>
+                      </a:pPr>
+                      <a:r>
+                        <a:rPr lang="en-US" sz="1000">
+                          <a:effectLst/>
+                        </a:rPr>
+                        <a:t>Detectată</a:t>
+                      </a:r>
+                      <a:endParaRPr lang="en-US" sz="1000">
+                        <a:effectLst/>
+                        <a:latin typeface="Times New Roman"/>
+                        <a:ea typeface="Times New Roman"/>
+                      </a:endParaRPr>
+                    </a:p>
+                  </a:txBody>
+                  <a:tcPr marL="68580" marR="68580" marT="0" marB="0"/>
+                </a:tc>
+                <a:tc>
+                  <a:txBody>
+                    <a:bodyPr/>
+                    <a:lstStyle/>
+                    <a:p>
+                      <a:pPr marL="0" marR="0">
+                        <a:spcBef>
+                          <a:spcPts val="0"/>
+                        </a:spcBef>
+                        <a:spcAft>
+                          <a:spcPts val="0"/>
+                        </a:spcAft>
+                      </a:pPr>
+                      <a:r>
+                        <a:rPr lang="en-US" sz="1000">
+                          <a:effectLst/>
+                        </a:rPr>
+                        <a:t>Neraportată</a:t>
+                      </a:r>
+                      <a:endParaRPr lang="en-US" sz="1000">
+                        <a:effectLst/>
+                        <a:latin typeface="Times New Roman"/>
+                        <a:ea typeface="Times New Roman"/>
+                      </a:endParaRPr>
+                    </a:p>
+                  </a:txBody>
+                  <a:tcPr marL="68580" marR="68580" marT="0" marB="0"/>
+                </a:tc>
+              </a:tr>
+              <a:tr h="327969">
+                <a:tc>
+                  <a:txBody>
+                    <a:bodyPr/>
+                    <a:lstStyle/>
+                    <a:p>
+                      <a:pPr marL="0" marR="0">
+                        <a:spcBef>
+                          <a:spcPts val="0"/>
+                        </a:spcBef>
+                        <a:spcAft>
+                          <a:spcPts val="0"/>
+                        </a:spcAft>
+                      </a:pPr>
+                      <a:r>
+                        <a:rPr lang="en-US" sz="1000">
+                          <a:effectLst/>
+                        </a:rPr>
+                        <a:t>Proiecte diferite</a:t>
+                      </a:r>
+                      <a:endParaRPr lang="en-US" sz="1000">
+                        <a:effectLst/>
+                        <a:latin typeface="Times New Roman"/>
+                        <a:ea typeface="Times New Roman"/>
+                      </a:endParaRPr>
+                    </a:p>
+                  </a:txBody>
+                  <a:tcPr marL="68580" marR="68580" marT="0" marB="0"/>
+                </a:tc>
+                <a:tc>
+                  <a:txBody>
+                    <a:bodyPr/>
+                    <a:lstStyle/>
+                    <a:p>
+                      <a:pPr marL="0" marR="0" algn="ctr">
+                        <a:spcBef>
+                          <a:spcPts val="0"/>
+                        </a:spcBef>
+                        <a:spcAft>
+                          <a:spcPts val="0"/>
+                        </a:spcAft>
+                      </a:pPr>
+                      <a:r>
+                        <a:rPr lang="en-US" sz="1000">
+                          <a:effectLst/>
+                        </a:rPr>
+                        <a:t>Neraportată</a:t>
+                      </a:r>
+                      <a:endParaRPr lang="en-US" sz="1000">
+                        <a:effectLst/>
+                        <a:latin typeface="Times New Roman"/>
+                        <a:ea typeface="Times New Roman"/>
+                      </a:endParaRPr>
+                    </a:p>
+                  </a:txBody>
+                  <a:tcPr marL="68580" marR="68580" marT="0" marB="0"/>
+                </a:tc>
+                <a:tc>
+                  <a:txBody>
+                    <a:bodyPr/>
+                    <a:lstStyle/>
+                    <a:p>
+                      <a:pPr marL="0" marR="0">
+                        <a:spcBef>
+                          <a:spcPts val="0"/>
+                        </a:spcBef>
+                        <a:spcAft>
+                          <a:spcPts val="0"/>
+                        </a:spcAft>
+                      </a:pPr>
+                      <a:r>
+                        <a:rPr lang="en-US" sz="1000">
+                          <a:effectLst/>
+                        </a:rPr>
+                        <a:t>Neraportată</a:t>
+                      </a:r>
+                      <a:endParaRPr lang="en-US" sz="1000">
+                        <a:effectLst/>
+                        <a:latin typeface="Times New Roman"/>
+                        <a:ea typeface="Times New Roman"/>
+                      </a:endParaRPr>
+                    </a:p>
+                  </a:txBody>
+                  <a:tcPr marL="68580" marR="68580" marT="0" marB="0"/>
+                </a:tc>
+              </a:tr>
+              <a:tr h="726577">
+                <a:tc>
+                  <a:txBody>
+                    <a:bodyPr/>
+                    <a:lstStyle/>
+                    <a:p>
+                      <a:pPr marL="0" marR="0">
+                        <a:spcBef>
+                          <a:spcPts val="0"/>
+                        </a:spcBef>
+                        <a:spcAft>
+                          <a:spcPts val="0"/>
+                        </a:spcAft>
+                      </a:pPr>
+                      <a:r>
+                        <a:rPr lang="en-US" sz="1000">
+                          <a:effectLst/>
+                        </a:rPr>
+                        <a:t>Proiecte mari diferiţe</a:t>
+                      </a:r>
+                      <a:endParaRPr lang="en-US" sz="1000">
+                        <a:effectLst/>
+                        <a:latin typeface="Times New Roman"/>
+                        <a:ea typeface="Times New Roman"/>
+                      </a:endParaRPr>
+                    </a:p>
+                  </a:txBody>
+                  <a:tcPr marL="68580" marR="68580" marT="0" marB="0"/>
+                </a:tc>
+                <a:tc>
+                  <a:txBody>
+                    <a:bodyPr/>
+                    <a:lstStyle/>
+                    <a:p>
+                      <a:pPr marL="0" marR="0" algn="ctr">
+                        <a:spcBef>
+                          <a:spcPts val="0"/>
+                        </a:spcBef>
+                        <a:spcAft>
+                          <a:spcPts val="0"/>
+                        </a:spcAft>
+                      </a:pPr>
+                      <a:r>
+                        <a:rPr lang="en-US" sz="1000">
+                          <a:effectLst/>
+                        </a:rPr>
+                        <a:t>Neraportată + timp mare de executie</a:t>
+                      </a:r>
+                      <a:endParaRPr lang="en-US" sz="1000">
+                        <a:effectLst/>
+                        <a:latin typeface="Times New Roman"/>
+                        <a:ea typeface="Times New Roman"/>
+                      </a:endParaRPr>
+                    </a:p>
+                  </a:txBody>
+                  <a:tcPr marL="68580" marR="68580" marT="0" marB="0"/>
+                </a:tc>
+                <a:tc>
+                  <a:txBody>
+                    <a:bodyPr/>
+                    <a:lstStyle/>
+                    <a:p>
+                      <a:pPr marL="0" marR="0">
+                        <a:spcBef>
+                          <a:spcPts val="0"/>
+                        </a:spcBef>
+                        <a:spcAft>
+                          <a:spcPts val="0"/>
+                        </a:spcAft>
+                      </a:pPr>
+                      <a:r>
+                        <a:rPr lang="en-US" sz="1000" dirty="0" err="1">
+                          <a:effectLst/>
+                        </a:rPr>
+                        <a:t>Neraportată</a:t>
+                      </a:r>
+                      <a:endParaRPr lang="en-US" sz="1000" dirty="0">
+                        <a:effectLst/>
+                        <a:latin typeface="Times New Roman"/>
+                        <a:ea typeface="Times New Roman"/>
+                      </a:endParaRPr>
+                    </a:p>
+                  </a:txBody>
+                  <a:tcPr marL="68580" marR="68580" marT="0" marB="0"/>
+                </a:tc>
+              </a:tr>
+            </a:tbl>
+          </a:graphicData>
+        </a:graphic>
+      </p:graphicFrame>
+    </p:spTree>
+    <p:extLst>
+      <p:ext uri="{BB962C8B-B14F-4D97-AF65-F5344CB8AC3E}">
+        <p14:creationId xmlns:p14="http://schemas.microsoft.com/office/powerpoint/2010/main" val="3267582253"/>
+      </p:ext>
+    </p:extLst>
+  </p:cSld>
+  <p:clrMapOvr>
+    <a:masterClrMapping/>
+  </p:clrMapOvr>
+  <p:timing>
+    <p:tnLst>
+      <p:par>
+        <p:cTn id="1" dur="indefinite" restart="never" nodeType="tmRoot"/>
+      </p:par>
+    </p:tnLst>
+  </p:timing>
+</p:sld>
+</file>
+
+<file path=ppt/slides/slide11.xml><?xml version="1.0" encoding="utf-8"?>
+<p:sld xmlns:a="http://schemas.openxmlformats.org/drawingml/2006/main" xmlns:r="http://schemas.openxmlformats.org/officeDocument/2006/relationships" xmlns:p="http://schemas.openxmlformats.org/presentationml/2006/main">
+  <p:cSld>
+    <p:spTree>
+      <p:nvGrpSpPr>
+        <p:cNvPr id="1" name=""/>
+        <p:cNvGrpSpPr/>
+        <p:nvPr/>
+      </p:nvGrpSpPr>
+      <p:grpSpPr>
+        <a:xfrm>
+          <a:off x="0" y="0"/>
+          <a:ext cx="0" cy="0"/>
+          <a:chOff x="0" y="0"/>
+          <a:chExt cx="0" cy="0"/>
+        </a:xfrm>
+      </p:grpSpPr>
+      <p:sp>
+        <p:nvSpPr>
+          <p:cNvPr id="2" name="Content Placeholder 1"/>
+          <p:cNvSpPr>
+            <a:spLocks noGrp="1"/>
+          </p:cNvSpPr>
+          <p:nvPr>
+            <p:ph idx="1"/>
+          </p:nvPr>
+        </p:nvSpPr>
+        <p:spPr/>
+        <p:txBody>
+          <a:bodyPr/>
+          <a:lstStyle/>
+          <a:p>
+            <a:r>
+              <a:rPr lang="en-US" dirty="0" err="1" smtClean="0"/>
+              <a:t>Analizarea</a:t>
+            </a:r>
+            <a:r>
+              <a:rPr lang="en-US" dirty="0" smtClean="0"/>
+              <a:t> </a:t>
+            </a:r>
+            <a:r>
+              <a:rPr lang="en-US" dirty="0" err="1" smtClean="0"/>
+              <a:t>unui</a:t>
+            </a:r>
+            <a:r>
+              <a:rPr lang="en-US" dirty="0" smtClean="0"/>
+              <a:t> set de </a:t>
+            </a:r>
+            <a:r>
+              <a:rPr lang="en-US" dirty="0" err="1" smtClean="0"/>
+              <a:t>teme</a:t>
+            </a:r>
+            <a:r>
+              <a:rPr lang="en-US" dirty="0" smtClean="0"/>
+              <a:t> de la </a:t>
+            </a:r>
+            <a:r>
+              <a:rPr lang="en-US" dirty="0" err="1" smtClean="0"/>
+              <a:t>laboratorul</a:t>
+            </a:r>
+            <a:r>
+              <a:rPr lang="en-US" dirty="0" smtClean="0"/>
+              <a:t> de </a:t>
+            </a:r>
+            <a:r>
+              <a:rPr lang="en-US" dirty="0" err="1" smtClean="0"/>
+              <a:t>PASSC</a:t>
+            </a:r>
+            <a:endParaRPr lang="en-US" dirty="0" smtClean="0"/>
+          </a:p>
+          <a:p>
+            <a:r>
+              <a:rPr lang="en-US" dirty="0" smtClean="0"/>
+              <a:t>16 </a:t>
+            </a:r>
+            <a:r>
+              <a:rPr lang="en-US" dirty="0" err="1" smtClean="0"/>
+              <a:t>proiecte</a:t>
+            </a:r>
+            <a:r>
+              <a:rPr lang="en-US" dirty="0" smtClean="0"/>
+              <a:t> </a:t>
+            </a:r>
+            <a:r>
+              <a:rPr lang="en-US" dirty="0" err="1" smtClean="0"/>
+              <a:t>comparate</a:t>
+            </a:r>
+            <a:endParaRPr lang="en-US" dirty="0" smtClean="0"/>
+          </a:p>
+          <a:p>
+            <a:r>
+              <a:rPr lang="en-US" dirty="0"/>
+              <a:t>120 de </a:t>
+            </a:r>
+            <a:r>
+              <a:rPr lang="en-US" dirty="0" err="1" smtClean="0"/>
+              <a:t>parechi</a:t>
+            </a:r>
+            <a:r>
+              <a:rPr lang="en-US" dirty="0" smtClean="0"/>
+              <a:t> de </a:t>
+            </a:r>
+            <a:r>
+              <a:rPr lang="en-US" dirty="0" err="1" smtClean="0"/>
+              <a:t>cate</a:t>
+            </a:r>
+            <a:r>
+              <a:rPr lang="en-US" dirty="0" smtClean="0"/>
+              <a:t> 2 </a:t>
+            </a:r>
+            <a:r>
+              <a:rPr lang="en-US" dirty="0" err="1" smtClean="0"/>
+              <a:t>proiecte</a:t>
+            </a:r>
+            <a:r>
+              <a:rPr lang="en-US" dirty="0" smtClean="0"/>
+              <a:t> </a:t>
+            </a:r>
+            <a:r>
+              <a:rPr lang="en-US" dirty="0" err="1" smtClean="0"/>
+              <a:t>analizate</a:t>
+            </a:r>
+            <a:r>
+              <a:rPr lang="en-US" dirty="0" smtClean="0"/>
+              <a:t> in 21  de </a:t>
+            </a:r>
+            <a:r>
+              <a:rPr lang="en-US" dirty="0" err="1" smtClean="0"/>
+              <a:t>secunde</a:t>
+            </a:r>
+            <a:endParaRPr lang="en-US" dirty="0"/>
+          </a:p>
+          <a:p>
+            <a:r>
+              <a:rPr lang="en-US" dirty="0" err="1"/>
+              <a:t>d</a:t>
+            </a:r>
+            <a:r>
+              <a:rPr lang="en-US" dirty="0" err="1" smtClean="0"/>
+              <a:t>epistate</a:t>
+            </a:r>
+            <a:r>
+              <a:rPr lang="en-US" dirty="0" smtClean="0"/>
+              <a:t> 2 </a:t>
+            </a:r>
+            <a:r>
+              <a:rPr lang="en-US" dirty="0" err="1" smtClean="0"/>
+              <a:t>proiecte</a:t>
+            </a:r>
+            <a:r>
+              <a:rPr lang="en-US" dirty="0" smtClean="0"/>
+              <a:t> </a:t>
+            </a:r>
+            <a:r>
+              <a:rPr lang="en-US" dirty="0" err="1" smtClean="0"/>
+              <a:t>copiate</a:t>
+            </a:r>
+            <a:endParaRPr lang="en-US" dirty="0" smtClean="0"/>
+          </a:p>
+        </p:txBody>
+      </p:sp>
+      <p:sp>
+        <p:nvSpPr>
+          <p:cNvPr id="3" name="Title 2"/>
+          <p:cNvSpPr>
+            <a:spLocks noGrp="1"/>
+          </p:cNvSpPr>
+          <p:nvPr>
+            <p:ph type="title"/>
+          </p:nvPr>
+        </p:nvSpPr>
+        <p:spPr/>
+        <p:txBody>
+          <a:bodyPr/>
+          <a:lstStyle/>
+          <a:p>
+            <a:r>
+              <a:rPr lang="en-US" dirty="0" err="1" smtClean="0"/>
+              <a:t>Rezultate</a:t>
+            </a:r>
+            <a:endParaRPr lang="en-US" dirty="0"/>
+          </a:p>
+        </p:txBody>
+      </p:sp>
+    </p:spTree>
+    <p:extLst>
+      <p:ext uri="{BB962C8B-B14F-4D97-AF65-F5344CB8AC3E}">
+        <p14:creationId xmlns:p14="http://schemas.microsoft.com/office/powerpoint/2010/main" val="1527581008"/>
+      </p:ext>
+    </p:extLst>
+  </p:cSld>
+  <p:clrMapOvr>
+    <a:masterClrMapping/>
+  </p:clrMapOvr>
+</p:sld>
+</file>
+
+<file path=ppt/slides/slide12.xml><?xml version="1.0" encoding="utf-8"?>
+<p:sld xmlns:a="http://schemas.openxmlformats.org/drawingml/2006/main" xmlns:r="http://schemas.openxmlformats.org/officeDocument/2006/relationships" xmlns:p="http://schemas.openxmlformats.org/presentationml/2006/main">
+  <p:cSld>
+    <p:spTree>
+      <p:nvGrpSpPr>
+        <p:cNvPr id="1" name=""/>
+        <p:cNvGrpSpPr/>
+        <p:nvPr/>
+      </p:nvGrpSpPr>
+      <p:grpSpPr>
+        <a:xfrm>
+          <a:off x="0" y="0"/>
+          <a:ext cx="0" cy="0"/>
+          <a:chOff x="0" y="0"/>
+          <a:chExt cx="0" cy="0"/>
+        </a:xfrm>
+      </p:grpSpPr>
+      <p:sp>
+        <p:nvSpPr>
+          <p:cNvPr id="2" name="Content Placeholder 1"/>
+          <p:cNvSpPr>
+            <a:spLocks noGrp="1"/>
+          </p:cNvSpPr>
+          <p:nvPr>
+            <p:ph idx="1"/>
+          </p:nvPr>
+        </p:nvSpPr>
+        <p:spPr/>
+        <p:txBody>
+          <a:bodyPr/>
+          <a:lstStyle/>
+          <a:p>
+            <a:r>
+              <a:rPr lang="en-US" dirty="0" err="1" smtClean="0"/>
+              <a:t>Flexibilitate</a:t>
+            </a:r>
+            <a:r>
+              <a:rPr lang="en-US" dirty="0" smtClean="0"/>
+              <a:t> – </a:t>
+            </a:r>
+            <a:r>
+              <a:rPr lang="en-US" dirty="0" err="1" smtClean="0"/>
+              <a:t>prin</a:t>
+            </a:r>
+            <a:r>
+              <a:rPr lang="en-US" dirty="0" smtClean="0"/>
+              <a:t> </a:t>
+            </a:r>
+            <a:r>
+              <a:rPr lang="en-US" dirty="0" err="1" smtClean="0"/>
+              <a:t>alegerea</a:t>
+            </a:r>
+            <a:r>
+              <a:rPr lang="en-US" dirty="0" smtClean="0"/>
+              <a:t>/</a:t>
+            </a:r>
+            <a:r>
+              <a:rPr lang="en-US" dirty="0" err="1" smtClean="0"/>
+              <a:t>crearea</a:t>
+            </a:r>
+            <a:r>
+              <a:rPr lang="en-US" dirty="0" smtClean="0"/>
+              <a:t> profile</a:t>
+            </a:r>
+          </a:p>
+          <a:p>
+            <a:r>
+              <a:rPr lang="en-US" dirty="0" smtClean="0"/>
+              <a:t>Rapid</a:t>
+            </a:r>
+          </a:p>
+          <a:p>
+            <a:r>
+              <a:rPr lang="en-US" dirty="0" err="1" smtClean="0"/>
+              <a:t>SWI</a:t>
+            </a:r>
+            <a:r>
+              <a:rPr lang="en-US" dirty="0" smtClean="0"/>
+              <a:t>-Prolog e multi-threading</a:t>
+            </a:r>
+          </a:p>
+          <a:p>
+            <a:r>
+              <a:rPr lang="en-US" dirty="0" smtClean="0"/>
+              <a:t>Common classes</a:t>
+            </a:r>
+          </a:p>
+          <a:p>
+            <a:r>
+              <a:rPr lang="en-US" dirty="0" err="1" smtClean="0"/>
+              <a:t>Usor</a:t>
+            </a:r>
+            <a:r>
+              <a:rPr lang="en-US" dirty="0" smtClean="0"/>
+              <a:t> de </a:t>
+            </a:r>
+            <a:r>
+              <a:rPr lang="en-US" dirty="0" err="1" smtClean="0"/>
+              <a:t>dezvoltat</a:t>
+            </a:r>
+            <a:endParaRPr lang="en-US" dirty="0" smtClean="0"/>
+          </a:p>
+          <a:p>
+            <a:endParaRPr lang="en-US" dirty="0" smtClean="0"/>
+          </a:p>
+          <a:p>
+            <a:endParaRPr lang="en-US" dirty="0" smtClean="0"/>
+          </a:p>
+        </p:txBody>
+      </p:sp>
+      <p:sp>
+        <p:nvSpPr>
+          <p:cNvPr id="3" name="Title 2"/>
+          <p:cNvSpPr>
+            <a:spLocks noGrp="1"/>
+          </p:cNvSpPr>
+          <p:nvPr>
+            <p:ph type="title"/>
+          </p:nvPr>
+        </p:nvSpPr>
+        <p:spPr/>
+        <p:txBody>
+          <a:bodyPr/>
+          <a:lstStyle/>
+          <a:p>
+            <a:r>
+              <a:rPr lang="en-US" dirty="0" err="1" smtClean="0"/>
+              <a:t>Avataje</a:t>
+            </a:r>
+            <a:r>
+              <a:rPr lang="en-US" dirty="0" smtClean="0"/>
+              <a:t> </a:t>
+            </a:r>
+            <a:endParaRPr lang="en-US" dirty="0"/>
+          </a:p>
+        </p:txBody>
+      </p:sp>
+    </p:spTree>
+    <p:extLst>
+      <p:ext uri="{BB962C8B-B14F-4D97-AF65-F5344CB8AC3E}">
+        <p14:creationId xmlns:p14="http://schemas.microsoft.com/office/powerpoint/2010/main" val="2412675320"/>
+      </p:ext>
+    </p:extLst>
+  </p:cSld>
+  <p:clrMapOvr>
+    <a:masterClrMapping/>
+  </p:clrMapOvr>
+</p:sld>
+</file>
+
+<file path=ppt/slides/slide13.xml><?xml version="1.0" encoding="utf-8"?>
+<p:sld xmlns:a="http://schemas.openxmlformats.org/drawingml/2006/main" xmlns:r="http://schemas.openxmlformats.org/officeDocument/2006/relationships" xmlns:p="http://schemas.openxmlformats.org/presentationml/2006/main">
+  <p:cSld>
+    <p:spTree>
+      <p:nvGrpSpPr>
+        <p:cNvPr id="1" name=""/>
+        <p:cNvGrpSpPr/>
+        <p:nvPr/>
+      </p:nvGrpSpPr>
+      <p:grpSpPr>
+        <a:xfrm>
+          <a:off x="0" y="0"/>
+          <a:ext cx="0" cy="0"/>
+          <a:chOff x="0" y="0"/>
+          <a:chExt cx="0" cy="0"/>
+        </a:xfrm>
+      </p:grpSpPr>
+      <p:sp>
+        <p:nvSpPr>
+          <p:cNvPr id="2" name="Content Placeholder 1"/>
+          <p:cNvSpPr>
+            <a:spLocks noGrp="1"/>
+          </p:cNvSpPr>
+          <p:nvPr>
+            <p:ph idx="1"/>
+          </p:nvPr>
+        </p:nvSpPr>
+        <p:spPr>
+          <a:xfrm rot="567250">
+            <a:off x="995590" y="1945408"/>
+            <a:ext cx="8231481" cy="3834107"/>
+          </a:xfrm>
+        </p:spPr>
+        <p:txBody>
+          <a:bodyPr/>
+          <a:lstStyle/>
+          <a:p>
+            <a:r>
+              <a:rPr lang="en-US" dirty="0" err="1" smtClean="0"/>
+              <a:t>Obtinerea</a:t>
+            </a:r>
+            <a:r>
+              <a:rPr lang="en-US" dirty="0" smtClean="0"/>
+              <a:t> </a:t>
+            </a:r>
+            <a:r>
+              <a:rPr lang="en-US" dirty="0" err="1" smtClean="0"/>
+              <a:t>bazei</a:t>
+            </a:r>
+            <a:r>
+              <a:rPr lang="en-US" dirty="0" smtClean="0"/>
+              <a:t> de </a:t>
+            </a:r>
+            <a:r>
+              <a:rPr lang="en-US" dirty="0" err="1" smtClean="0"/>
+              <a:t>cunostinte</a:t>
+            </a:r>
+            <a:endParaRPr lang="en-US" dirty="0" smtClean="0"/>
+          </a:p>
+          <a:p>
+            <a:r>
+              <a:rPr lang="en-US" dirty="0" err="1" smtClean="0"/>
+              <a:t>Pentru</a:t>
+            </a:r>
+            <a:r>
+              <a:rPr lang="en-US" dirty="0" smtClean="0"/>
+              <a:t> </a:t>
+            </a:r>
+            <a:r>
+              <a:rPr lang="en-US" dirty="0" err="1" smtClean="0"/>
+              <a:t>viteze</a:t>
+            </a:r>
+            <a:r>
+              <a:rPr lang="en-US" dirty="0" smtClean="0"/>
+              <a:t> </a:t>
+            </a:r>
+            <a:r>
+              <a:rPr lang="en-US" dirty="0" err="1" smtClean="0"/>
+              <a:t>acceptabile</a:t>
+            </a:r>
+            <a:r>
+              <a:rPr lang="en-US" dirty="0" smtClean="0"/>
+              <a:t> </a:t>
+            </a:r>
+            <a:r>
+              <a:rPr lang="en-US" dirty="0" err="1" smtClean="0"/>
+              <a:t>este</a:t>
+            </a:r>
+            <a:r>
+              <a:rPr lang="en-US" dirty="0" smtClean="0"/>
+              <a:t> </a:t>
+            </a:r>
+            <a:r>
+              <a:rPr lang="en-US" dirty="0" err="1" smtClean="0"/>
+              <a:t>limitat</a:t>
+            </a:r>
+            <a:r>
+              <a:rPr lang="en-US" dirty="0" smtClean="0"/>
+              <a:t> la </a:t>
+            </a:r>
+            <a:r>
+              <a:rPr lang="en-US" dirty="0" err="1" smtClean="0"/>
+              <a:t>proiecte</a:t>
+            </a:r>
+            <a:r>
+              <a:rPr lang="en-US" dirty="0" smtClean="0"/>
+              <a:t> </a:t>
+            </a:r>
+            <a:r>
+              <a:rPr lang="en-US" dirty="0" err="1" smtClean="0"/>
+              <a:t>scolare</a:t>
+            </a:r>
+            <a:r>
+              <a:rPr lang="en-US" dirty="0" smtClean="0"/>
+              <a:t> de </a:t>
+            </a:r>
+            <a:r>
+              <a:rPr lang="en-US" dirty="0" err="1" smtClean="0"/>
+              <a:t>pana</a:t>
+            </a:r>
+            <a:r>
+              <a:rPr lang="en-US" dirty="0" smtClean="0"/>
+              <a:t> la 30 </a:t>
+            </a:r>
+            <a:r>
+              <a:rPr lang="en-US" dirty="0" err="1" smtClean="0"/>
+              <a:t>clase</a:t>
+            </a:r>
+            <a:r>
+              <a:rPr lang="en-US" dirty="0" smtClean="0"/>
+              <a:t>.</a:t>
+            </a:r>
+            <a:endParaRPr lang="en-US" dirty="0"/>
+          </a:p>
+        </p:txBody>
+      </p:sp>
+      <p:sp>
+        <p:nvSpPr>
+          <p:cNvPr id="3" name="Title 2"/>
+          <p:cNvSpPr>
+            <a:spLocks noGrp="1"/>
+          </p:cNvSpPr>
+          <p:nvPr>
+            <p:ph type="title"/>
+          </p:nvPr>
+        </p:nvSpPr>
+        <p:spPr/>
+        <p:txBody>
+          <a:bodyPr/>
+          <a:lstStyle/>
+          <a:p>
+            <a:r>
+              <a:rPr lang="en-US" dirty="0" err="1" smtClean="0"/>
+              <a:t>Limitari</a:t>
+            </a:r>
+            <a:endParaRPr lang="en-US" dirty="0"/>
+          </a:p>
+        </p:txBody>
+      </p:sp>
+    </p:spTree>
+    <p:extLst>
+      <p:ext uri="{BB962C8B-B14F-4D97-AF65-F5344CB8AC3E}">
+        <p14:creationId xmlns:p14="http://schemas.microsoft.com/office/powerpoint/2010/main" val="3900835936"/>
+      </p:ext>
+    </p:extLst>
+  </p:cSld>
+  <p:clrMapOvr>
+    <a:masterClrMapping/>
+  </p:clrMapOvr>
+</p:sld>
+</file>
+
+<file path=ppt/slides/slide14.xml><?xml version="1.0" encoding="utf-8"?>
+<p:sld xmlns:a="http://schemas.openxmlformats.org/drawingml/2006/main" xmlns:r="http://schemas.openxmlformats.org/officeDocument/2006/relationships" xmlns:p="http://schemas.openxmlformats.org/presentationml/2006/main">
+  <p:cSld>
+    <p:spTree>
+      <p:nvGrpSpPr>
+        <p:cNvPr id="1" name=""/>
+        <p:cNvGrpSpPr/>
+        <p:nvPr/>
+      </p:nvGrpSpPr>
+      <p:grpSpPr>
+        <a:xfrm>
+          <a:off x="0" y="0"/>
+          <a:ext cx="0" cy="0"/>
+          <a:chOff x="0" y="0"/>
+          <a:chExt cx="0" cy="0"/>
+        </a:xfrm>
+      </p:grpSpPr>
+      <p:sp>
+        <p:nvSpPr>
+          <p:cNvPr id="2" name="Content Placeholder 1"/>
+          <p:cNvSpPr>
+            <a:spLocks noGrp="1"/>
+          </p:cNvSpPr>
+          <p:nvPr>
+            <p:ph idx="1"/>
+          </p:nvPr>
+        </p:nvSpPr>
+        <p:spPr/>
+        <p:txBody>
+          <a:bodyPr/>
+          <a:lstStyle/>
+          <a:p>
+            <a:r>
+              <a:rPr lang="en-US" dirty="0" err="1" smtClean="0"/>
+              <a:t>Integrarea</a:t>
+            </a:r>
+            <a:r>
+              <a:rPr lang="en-US" dirty="0" smtClean="0"/>
+              <a:t> </a:t>
+            </a:r>
+            <a:r>
+              <a:rPr lang="en-US" dirty="0" err="1" smtClean="0"/>
+              <a:t>ca</a:t>
+            </a:r>
+            <a:r>
+              <a:rPr lang="en-US" dirty="0" smtClean="0"/>
+              <a:t> </a:t>
+            </a:r>
+            <a:r>
+              <a:rPr lang="en-US" dirty="0" err="1" smtClean="0"/>
+              <a:t>serviciu</a:t>
+            </a:r>
+            <a:r>
+              <a:rPr lang="en-US" dirty="0" smtClean="0"/>
+              <a:t> Web</a:t>
+            </a:r>
+          </a:p>
+          <a:p>
+            <a:r>
+              <a:rPr lang="en-US" dirty="0" err="1" smtClean="0"/>
+              <a:t>Posibila</a:t>
+            </a:r>
+            <a:r>
+              <a:rPr lang="en-US" dirty="0" smtClean="0"/>
+              <a:t> </a:t>
+            </a:r>
+            <a:r>
+              <a:rPr lang="en-US" dirty="0" err="1" smtClean="0"/>
+              <a:t>integrarea</a:t>
+            </a:r>
+            <a:r>
+              <a:rPr lang="en-US" dirty="0" smtClean="0"/>
+              <a:t> cu eclipse</a:t>
+            </a:r>
+          </a:p>
+          <a:p>
+            <a:endParaRPr lang="en-US" dirty="0"/>
+          </a:p>
+        </p:txBody>
+      </p:sp>
+      <p:sp>
+        <p:nvSpPr>
+          <p:cNvPr id="3" name="Title 2"/>
+          <p:cNvSpPr>
+            <a:spLocks noGrp="1"/>
+          </p:cNvSpPr>
+          <p:nvPr>
+            <p:ph type="title"/>
+          </p:nvPr>
+        </p:nvSpPr>
+        <p:spPr/>
+        <p:txBody>
+          <a:bodyPr/>
+          <a:lstStyle/>
+          <a:p>
+            <a:r>
+              <a:rPr lang="en-US" dirty="0" err="1" smtClean="0"/>
+              <a:t>Posibile</a:t>
+            </a:r>
+            <a:r>
+              <a:rPr lang="en-US" dirty="0" smtClean="0"/>
+              <a:t> </a:t>
+            </a:r>
+            <a:r>
+              <a:rPr lang="en-US" dirty="0" err="1" smtClean="0"/>
+              <a:t>directii</a:t>
+            </a:r>
+            <a:r>
+              <a:rPr lang="en-US" dirty="0" smtClean="0"/>
+              <a:t> de </a:t>
+            </a:r>
+            <a:r>
+              <a:rPr lang="en-US" dirty="0" err="1" smtClean="0"/>
+              <a:t>dezvolatare</a:t>
+            </a:r>
+            <a:endParaRPr lang="en-US" dirty="0"/>
+          </a:p>
+        </p:txBody>
+      </p:sp>
+    </p:spTree>
+    <p:extLst>
+      <p:ext uri="{BB962C8B-B14F-4D97-AF65-F5344CB8AC3E}">
+        <p14:creationId xmlns:p14="http://schemas.microsoft.com/office/powerpoint/2010/main" val="4196647707"/>
+      </p:ext>
+    </p:extLst>
+  </p:cSld>
+  <p:clrMapOvr>
+    <a:masterClrMapping/>
+  </p:clrMapOvr>
+</p:sld>
+</file>
+
 <file path=ppt/slides/slide2.xml><?xml version="1.0" encoding="utf-8"?>
 <p:sld xmlns:a="http://schemas.openxmlformats.org/drawingml/2006/main" xmlns:r="http://schemas.openxmlformats.org/officeDocument/2006/relationships" xmlns:p="http://schemas.openxmlformats.org/presentationml/2006/main">
   <p:cSld>
@@ -16287,7 +18242,2421 @@
       </p:grpSpPr>
       <p:sp>
         <p:nvSpPr>
-          <p:cNvPr id="4" name="Title 3"/>
+          <p:cNvPr id="22" name="Rounded Rectangle 21"/>
+          <p:cNvSpPr/>
+          <p:nvPr/>
+        </p:nvSpPr>
+        <p:spPr>
+          <a:xfrm>
+            <a:off x="279400" y="2057400"/>
+            <a:ext cx="4495800" cy="4953000"/>
+          </a:xfrm>
+          <a:prstGeom prst="roundRect">
+            <a:avLst/>
+          </a:prstGeom>
+          <a:solidFill>
+            <a:schemeClr val="accent1">
+              <a:alpha val="66000"/>
+            </a:schemeClr>
+          </a:solidFill>
+        </p:spPr>
+        <p:style>
+          <a:lnRef idx="2">
+            <a:schemeClr val="accent1">
+              <a:shade val="50000"/>
+            </a:schemeClr>
+          </a:lnRef>
+          <a:fillRef idx="1">
+            <a:schemeClr val="accent1"/>
+          </a:fillRef>
+          <a:effectRef idx="0">
+            <a:schemeClr val="accent1"/>
+          </a:effectRef>
+          <a:fontRef idx="minor">
+            <a:schemeClr val="lt1"/>
+          </a:fontRef>
+        </p:style>
+        <p:txBody>
+          <a:bodyPr rtlCol="0" anchor="ctr"/>
+          <a:lstStyle/>
+          <a:p>
+            <a:pPr algn="ctr"/>
+            <a:endParaRPr lang="en-US"/>
+          </a:p>
+        </p:txBody>
+      </p:sp>
+      <p:sp>
+        <p:nvSpPr>
+          <p:cNvPr id="2" name="Rectangle 1"/>
+          <p:cNvSpPr/>
+          <p:nvPr/>
+        </p:nvSpPr>
+        <p:spPr>
+          <a:xfrm>
+            <a:off x="508000" y="3352800"/>
+            <a:ext cx="1676400" cy="1905000"/>
+          </a:xfrm>
+          <a:prstGeom prst="rect">
+            <a:avLst/>
+          </a:prstGeom>
+        </p:spPr>
+        <p:style>
+          <a:lnRef idx="2">
+            <a:schemeClr val="accent1">
+              <a:shade val="50000"/>
+            </a:schemeClr>
+          </a:lnRef>
+          <a:fillRef idx="1">
+            <a:schemeClr val="accent1"/>
+          </a:fillRef>
+          <a:effectRef idx="0">
+            <a:schemeClr val="accent1"/>
+          </a:effectRef>
+          <a:fontRef idx="minor">
+            <a:schemeClr val="lt1"/>
+          </a:fontRef>
+        </p:style>
+        <p:txBody>
+          <a:bodyPr rtlCol="0" anchor="t"/>
+          <a:lstStyle/>
+          <a:p>
+            <a:pPr algn="ctr"/>
+            <a:r>
+              <a:rPr lang="en-US" dirty="0" err="1" smtClean="0"/>
+              <a:t>Clasa</a:t>
+            </a:r>
+            <a:r>
+              <a:rPr lang="en-US" dirty="0" smtClean="0"/>
+              <a:t> 1</a:t>
+            </a:r>
+          </a:p>
+          <a:p>
+            <a:pPr algn="ctr"/>
+            <a:endParaRPr lang="en-US" dirty="0"/>
+          </a:p>
+        </p:txBody>
+      </p:sp>
+      <p:sp>
+        <p:nvSpPr>
+          <p:cNvPr id="3" name="TextBox 2"/>
+          <p:cNvSpPr txBox="1"/>
+          <p:nvPr/>
+        </p:nvSpPr>
+        <p:spPr>
+          <a:xfrm>
+            <a:off x="431800" y="4105245"/>
+            <a:ext cx="1676400" cy="400110"/>
+          </a:xfrm>
+          <a:prstGeom prst="rect">
+            <a:avLst/>
+          </a:prstGeom>
+          <a:noFill/>
+        </p:spPr>
+        <p:txBody>
+          <a:bodyPr wrap="square" rtlCol="0">
+            <a:spAutoFit/>
+          </a:bodyPr>
+          <a:lstStyle/>
+          <a:p>
+            <a:pPr algn="ctr"/>
+            <a:r>
+              <a:rPr lang="en-US" sz="2000" dirty="0" err="1" smtClean="0"/>
+              <a:t>metoda</a:t>
+            </a:r>
+            <a:r>
+              <a:rPr lang="en-US" sz="2000" dirty="0" err="1"/>
+              <a:t>1</a:t>
+            </a:r>
+            <a:endParaRPr lang="en-US" dirty="0"/>
+          </a:p>
+        </p:txBody>
+      </p:sp>
+      <p:sp>
+        <p:nvSpPr>
+          <p:cNvPr id="8" name="TextBox 7"/>
+          <p:cNvSpPr txBox="1"/>
+          <p:nvPr/>
+        </p:nvSpPr>
+        <p:spPr>
+          <a:xfrm>
+            <a:off x="431800" y="4629090"/>
+            <a:ext cx="1676400" cy="400110"/>
+          </a:xfrm>
+          <a:prstGeom prst="rect">
+            <a:avLst/>
+          </a:prstGeom>
+          <a:noFill/>
+        </p:spPr>
+        <p:txBody>
+          <a:bodyPr wrap="square" rtlCol="0">
+            <a:spAutoFit/>
+          </a:bodyPr>
+          <a:lstStyle/>
+          <a:p>
+            <a:pPr algn="ctr"/>
+            <a:r>
+              <a:rPr lang="en-US" sz="2000" dirty="0" err="1" smtClean="0"/>
+              <a:t>metoda2</a:t>
+            </a:r>
+            <a:endParaRPr lang="en-US" dirty="0"/>
+          </a:p>
+        </p:txBody>
+      </p:sp>
+      <p:sp>
+        <p:nvSpPr>
+          <p:cNvPr id="10" name="Rectangle 9"/>
+          <p:cNvSpPr/>
+          <p:nvPr/>
+        </p:nvSpPr>
+        <p:spPr>
+          <a:xfrm>
+            <a:off x="3022600" y="3276600"/>
+            <a:ext cx="1219200" cy="762000"/>
+          </a:xfrm>
+          <a:prstGeom prst="rect">
+            <a:avLst/>
+          </a:prstGeom>
+        </p:spPr>
+        <p:style>
+          <a:lnRef idx="2">
+            <a:schemeClr val="accent1">
+              <a:shade val="50000"/>
+            </a:schemeClr>
+          </a:lnRef>
+          <a:fillRef idx="1">
+            <a:schemeClr val="accent1"/>
+          </a:fillRef>
+          <a:effectRef idx="0">
+            <a:schemeClr val="accent1"/>
+          </a:effectRef>
+          <a:fontRef idx="minor">
+            <a:schemeClr val="lt1"/>
+          </a:fontRef>
+        </p:style>
+        <p:txBody>
+          <a:bodyPr rtlCol="0" anchor="t"/>
+          <a:lstStyle/>
+          <a:p>
+            <a:pPr algn="ctr"/>
+            <a:r>
+              <a:rPr lang="en-US" dirty="0" smtClean="0"/>
+              <a:t>Class 2</a:t>
+            </a:r>
+            <a:endParaRPr lang="en-US" dirty="0"/>
+          </a:p>
+        </p:txBody>
+      </p:sp>
+      <p:sp>
+        <p:nvSpPr>
+          <p:cNvPr id="12" name="Rectangle 11"/>
+          <p:cNvSpPr/>
+          <p:nvPr/>
+        </p:nvSpPr>
+        <p:spPr>
+          <a:xfrm>
+            <a:off x="3022600" y="4191000"/>
+            <a:ext cx="1219200" cy="762000"/>
+          </a:xfrm>
+          <a:prstGeom prst="rect">
+            <a:avLst/>
+          </a:prstGeom>
+        </p:spPr>
+        <p:style>
+          <a:lnRef idx="2">
+            <a:schemeClr val="accent1">
+              <a:shade val="50000"/>
+            </a:schemeClr>
+          </a:lnRef>
+          <a:fillRef idx="1">
+            <a:schemeClr val="accent1"/>
+          </a:fillRef>
+          <a:effectRef idx="0">
+            <a:schemeClr val="accent1"/>
+          </a:effectRef>
+          <a:fontRef idx="minor">
+            <a:schemeClr val="lt1"/>
+          </a:fontRef>
+        </p:style>
+        <p:txBody>
+          <a:bodyPr rtlCol="0" anchor="t"/>
+          <a:lstStyle/>
+          <a:p>
+            <a:pPr algn="ctr"/>
+            <a:r>
+              <a:rPr lang="en-US" dirty="0" smtClean="0"/>
+              <a:t>Class 3</a:t>
+            </a:r>
+            <a:endParaRPr lang="en-US" dirty="0"/>
+          </a:p>
+        </p:txBody>
+      </p:sp>
+      <p:sp>
+        <p:nvSpPr>
+          <p:cNvPr id="13" name="TextBox 12"/>
+          <p:cNvSpPr txBox="1"/>
+          <p:nvPr/>
+        </p:nvSpPr>
+        <p:spPr>
+          <a:xfrm>
+            <a:off x="3033532" y="3657600"/>
+            <a:ext cx="1284468" cy="400110"/>
+          </a:xfrm>
+          <a:prstGeom prst="rect">
+            <a:avLst/>
+          </a:prstGeom>
+          <a:noFill/>
+        </p:spPr>
+        <p:txBody>
+          <a:bodyPr wrap="square" rtlCol="0">
+            <a:spAutoFit/>
+          </a:bodyPr>
+          <a:lstStyle/>
+          <a:p>
+            <a:r>
+              <a:rPr lang="en-US" sz="2000" dirty="0" err="1" smtClean="0"/>
+              <a:t>oMetoda</a:t>
+            </a:r>
+            <a:endParaRPr lang="en-US" dirty="0"/>
+          </a:p>
+        </p:txBody>
+      </p:sp>
+      <p:sp>
+        <p:nvSpPr>
+          <p:cNvPr id="25" name="TextBox 24"/>
+          <p:cNvSpPr txBox="1"/>
+          <p:nvPr/>
+        </p:nvSpPr>
+        <p:spPr>
+          <a:xfrm>
+            <a:off x="1226434" y="2286000"/>
+            <a:ext cx="2939166" cy="584775"/>
+          </a:xfrm>
+          <a:prstGeom prst="rect">
+            <a:avLst/>
+          </a:prstGeom>
+          <a:noFill/>
+        </p:spPr>
+        <p:txBody>
+          <a:bodyPr wrap="square" rtlCol="0">
+            <a:spAutoFit/>
+          </a:bodyPr>
+          <a:lstStyle/>
+          <a:p>
+            <a:pPr algn="ctr"/>
+            <a:r>
+              <a:rPr lang="en-US" sz="3200" dirty="0" err="1" smtClean="0">
+                <a:solidFill>
+                  <a:schemeClr val="bg1"/>
+                </a:solidFill>
+              </a:rPr>
+              <a:t>Proiectul</a:t>
+            </a:r>
+            <a:r>
+              <a:rPr lang="en-US" sz="3200" dirty="0" smtClean="0">
+                <a:solidFill>
+                  <a:schemeClr val="bg1"/>
+                </a:solidFill>
+              </a:rPr>
+              <a:t> 1</a:t>
+            </a:r>
+            <a:endParaRPr lang="en-US" sz="3200" dirty="0">
+              <a:solidFill>
+                <a:schemeClr val="bg1"/>
+              </a:solidFill>
+            </a:endParaRPr>
+          </a:p>
+        </p:txBody>
+      </p:sp>
+      <p:cxnSp>
+        <p:nvCxnSpPr>
+          <p:cNvPr id="62" name="Straight Arrow Connector 61"/>
+          <p:cNvCxnSpPr/>
+          <p:nvPr/>
+        </p:nvCxnSpPr>
+        <p:spPr>
+          <a:xfrm flipV="1">
+            <a:off x="1803400" y="3962401"/>
+            <a:ext cx="1230132" cy="371564"/>
+          </a:xfrm>
+          <a:prstGeom prst="straightConnector1">
+            <a:avLst/>
+          </a:prstGeom>
+          <a:ln w="28575">
+            <a:solidFill>
+              <a:schemeClr val="bg1"/>
+            </a:solidFill>
+            <a:headEnd w="lg" len="lg"/>
+            <a:tailEnd type="arrow"/>
+          </a:ln>
+        </p:spPr>
+        <p:style>
+          <a:lnRef idx="1">
+            <a:schemeClr val="accent1"/>
+          </a:lnRef>
+          <a:fillRef idx="0">
+            <a:schemeClr val="accent1"/>
+          </a:fillRef>
+          <a:effectRef idx="0">
+            <a:schemeClr val="accent1"/>
+          </a:effectRef>
+          <a:fontRef idx="minor">
+            <a:schemeClr val="tx1"/>
+          </a:fontRef>
+        </p:style>
+      </p:cxnSp>
+      <p:cxnSp>
+        <p:nvCxnSpPr>
+          <p:cNvPr id="66" name="Straight Arrow Connector 65"/>
+          <p:cNvCxnSpPr/>
+          <p:nvPr/>
+        </p:nvCxnSpPr>
+        <p:spPr>
+          <a:xfrm>
+            <a:off x="1803400" y="4419600"/>
+            <a:ext cx="1507683" cy="347618"/>
+          </a:xfrm>
+          <a:prstGeom prst="straightConnector1">
+            <a:avLst/>
+          </a:prstGeom>
+          <a:ln w="28575">
+            <a:solidFill>
+              <a:schemeClr val="bg1"/>
+            </a:solidFill>
+            <a:headEnd w="lg" len="lg"/>
+            <a:tailEnd type="arrow"/>
+          </a:ln>
+        </p:spPr>
+        <p:style>
+          <a:lnRef idx="1">
+            <a:schemeClr val="accent1"/>
+          </a:lnRef>
+          <a:fillRef idx="0">
+            <a:schemeClr val="accent1"/>
+          </a:fillRef>
+          <a:effectRef idx="0">
+            <a:schemeClr val="accent1"/>
+          </a:effectRef>
+          <a:fontRef idx="minor">
+            <a:schemeClr val="tx1"/>
+          </a:fontRef>
+        </p:style>
+      </p:cxnSp>
+      <p:sp>
+        <p:nvSpPr>
+          <p:cNvPr id="69" name="Rounded Rectangle 68"/>
+          <p:cNvSpPr/>
+          <p:nvPr/>
+        </p:nvSpPr>
+        <p:spPr>
+          <a:xfrm>
+            <a:off x="5461000" y="2151993"/>
+            <a:ext cx="4495800" cy="4858407"/>
+          </a:xfrm>
+          <a:prstGeom prst="roundRect">
+            <a:avLst/>
+          </a:prstGeom>
+          <a:solidFill>
+            <a:schemeClr val="accent1">
+              <a:alpha val="66000"/>
+            </a:schemeClr>
+          </a:solidFill>
+        </p:spPr>
+        <p:style>
+          <a:lnRef idx="2">
+            <a:schemeClr val="accent1">
+              <a:shade val="50000"/>
+            </a:schemeClr>
+          </a:lnRef>
+          <a:fillRef idx="1">
+            <a:schemeClr val="accent1"/>
+          </a:fillRef>
+          <a:effectRef idx="0">
+            <a:schemeClr val="accent1"/>
+          </a:effectRef>
+          <a:fontRef idx="minor">
+            <a:schemeClr val="lt1"/>
+          </a:fontRef>
+        </p:style>
+        <p:txBody>
+          <a:bodyPr rtlCol="0" anchor="ctr"/>
+          <a:lstStyle/>
+          <a:p>
+            <a:pPr algn="ctr"/>
+            <a:endParaRPr lang="en-US"/>
+          </a:p>
+        </p:txBody>
+      </p:sp>
+      <p:sp>
+        <p:nvSpPr>
+          <p:cNvPr id="70" name="Rectangle 69"/>
+          <p:cNvSpPr/>
+          <p:nvPr/>
+        </p:nvSpPr>
+        <p:spPr>
+          <a:xfrm>
+            <a:off x="5689600" y="3447393"/>
+            <a:ext cx="1676400" cy="1905000"/>
+          </a:xfrm>
+          <a:prstGeom prst="rect">
+            <a:avLst/>
+          </a:prstGeom>
+        </p:spPr>
+        <p:style>
+          <a:lnRef idx="2">
+            <a:schemeClr val="accent1">
+              <a:shade val="50000"/>
+            </a:schemeClr>
+          </a:lnRef>
+          <a:fillRef idx="1">
+            <a:schemeClr val="accent1"/>
+          </a:fillRef>
+          <a:effectRef idx="0">
+            <a:schemeClr val="accent1"/>
+          </a:effectRef>
+          <a:fontRef idx="minor">
+            <a:schemeClr val="lt1"/>
+          </a:fontRef>
+        </p:style>
+        <p:txBody>
+          <a:bodyPr rtlCol="0" anchor="t"/>
+          <a:lstStyle/>
+          <a:p>
+            <a:pPr algn="ctr"/>
+            <a:r>
+              <a:rPr lang="en-US" dirty="0" err="1" smtClean="0"/>
+              <a:t>Clasa</a:t>
+            </a:r>
+            <a:r>
+              <a:rPr lang="en-US" dirty="0" smtClean="0"/>
+              <a:t> A</a:t>
+            </a:r>
+          </a:p>
+          <a:p>
+            <a:pPr algn="ctr"/>
+            <a:endParaRPr lang="en-US" dirty="0"/>
+          </a:p>
+        </p:txBody>
+      </p:sp>
+      <p:sp>
+        <p:nvSpPr>
+          <p:cNvPr id="71" name="TextBox 70"/>
+          <p:cNvSpPr txBox="1"/>
+          <p:nvPr/>
+        </p:nvSpPr>
+        <p:spPr>
+          <a:xfrm>
+            <a:off x="5689600" y="4199838"/>
+            <a:ext cx="1676400" cy="400110"/>
+          </a:xfrm>
+          <a:prstGeom prst="rect">
+            <a:avLst/>
+          </a:prstGeom>
+          <a:noFill/>
+        </p:spPr>
+        <p:txBody>
+          <a:bodyPr wrap="square" rtlCol="0">
+            <a:spAutoFit/>
+          </a:bodyPr>
+          <a:lstStyle/>
+          <a:p>
+            <a:pPr algn="ctr"/>
+            <a:r>
+              <a:rPr lang="en-US" sz="2000" dirty="0" err="1" smtClean="0"/>
+              <a:t>metodaA</a:t>
+            </a:r>
+            <a:endParaRPr lang="en-US" dirty="0"/>
+          </a:p>
+        </p:txBody>
+      </p:sp>
+      <p:sp>
+        <p:nvSpPr>
+          <p:cNvPr id="72" name="TextBox 71"/>
+          <p:cNvSpPr txBox="1"/>
+          <p:nvPr/>
+        </p:nvSpPr>
+        <p:spPr>
+          <a:xfrm>
+            <a:off x="5689600" y="4724400"/>
+            <a:ext cx="1676400" cy="400110"/>
+          </a:xfrm>
+          <a:prstGeom prst="rect">
+            <a:avLst/>
+          </a:prstGeom>
+          <a:noFill/>
+        </p:spPr>
+        <p:txBody>
+          <a:bodyPr wrap="square" rtlCol="0">
+            <a:spAutoFit/>
+          </a:bodyPr>
+          <a:lstStyle/>
+          <a:p>
+            <a:pPr algn="ctr"/>
+            <a:r>
+              <a:rPr lang="en-US" sz="2000" dirty="0" err="1" smtClean="0"/>
+              <a:t>metodaB</a:t>
+            </a:r>
+            <a:endParaRPr lang="en-US" dirty="0"/>
+          </a:p>
+        </p:txBody>
+      </p:sp>
+      <p:sp>
+        <p:nvSpPr>
+          <p:cNvPr id="73" name="Rectangle 72"/>
+          <p:cNvSpPr/>
+          <p:nvPr/>
+        </p:nvSpPr>
+        <p:spPr>
+          <a:xfrm>
+            <a:off x="8204200" y="3371193"/>
+            <a:ext cx="1219200" cy="762000"/>
+          </a:xfrm>
+          <a:prstGeom prst="rect">
+            <a:avLst/>
+          </a:prstGeom>
+        </p:spPr>
+        <p:style>
+          <a:lnRef idx="2">
+            <a:schemeClr val="accent1">
+              <a:shade val="50000"/>
+            </a:schemeClr>
+          </a:lnRef>
+          <a:fillRef idx="1">
+            <a:schemeClr val="accent1"/>
+          </a:fillRef>
+          <a:effectRef idx="0">
+            <a:schemeClr val="accent1"/>
+          </a:effectRef>
+          <a:fontRef idx="minor">
+            <a:schemeClr val="lt1"/>
+          </a:fontRef>
+        </p:style>
+        <p:txBody>
+          <a:bodyPr rtlCol="0" anchor="t"/>
+          <a:lstStyle/>
+          <a:p>
+            <a:pPr algn="ctr"/>
+            <a:r>
+              <a:rPr lang="en-US" dirty="0" smtClean="0"/>
+              <a:t>Class B</a:t>
+            </a:r>
+            <a:endParaRPr lang="en-US" dirty="0"/>
+          </a:p>
+        </p:txBody>
+      </p:sp>
+      <p:sp>
+        <p:nvSpPr>
+          <p:cNvPr id="74" name="Rectangle 73"/>
+          <p:cNvSpPr/>
+          <p:nvPr/>
+        </p:nvSpPr>
+        <p:spPr>
+          <a:xfrm>
+            <a:off x="8204200" y="4285593"/>
+            <a:ext cx="1219200" cy="762000"/>
+          </a:xfrm>
+          <a:prstGeom prst="rect">
+            <a:avLst/>
+          </a:prstGeom>
+        </p:spPr>
+        <p:style>
+          <a:lnRef idx="2">
+            <a:schemeClr val="accent1">
+              <a:shade val="50000"/>
+            </a:schemeClr>
+          </a:lnRef>
+          <a:fillRef idx="1">
+            <a:schemeClr val="accent1"/>
+          </a:fillRef>
+          <a:effectRef idx="0">
+            <a:schemeClr val="accent1"/>
+          </a:effectRef>
+          <a:fontRef idx="minor">
+            <a:schemeClr val="lt1"/>
+          </a:fontRef>
+        </p:style>
+        <p:txBody>
+          <a:bodyPr rtlCol="0" anchor="t"/>
+          <a:lstStyle/>
+          <a:p>
+            <a:pPr algn="ctr"/>
+            <a:r>
+              <a:rPr lang="en-US" dirty="0" smtClean="0"/>
+              <a:t>Class C</a:t>
+            </a:r>
+            <a:endParaRPr lang="en-US" dirty="0"/>
+          </a:p>
+        </p:txBody>
+      </p:sp>
+      <p:sp>
+        <p:nvSpPr>
+          <p:cNvPr id="75" name="TextBox 74"/>
+          <p:cNvSpPr txBox="1"/>
+          <p:nvPr/>
+        </p:nvSpPr>
+        <p:spPr>
+          <a:xfrm>
+            <a:off x="8215132" y="3752193"/>
+            <a:ext cx="1284468" cy="400110"/>
+          </a:xfrm>
+          <a:prstGeom prst="rect">
+            <a:avLst/>
+          </a:prstGeom>
+          <a:noFill/>
+        </p:spPr>
+        <p:txBody>
+          <a:bodyPr wrap="square" rtlCol="0">
+            <a:spAutoFit/>
+          </a:bodyPr>
+          <a:lstStyle/>
+          <a:p>
+            <a:r>
+              <a:rPr lang="en-US" sz="2000" dirty="0" err="1" smtClean="0"/>
+              <a:t>oMetoda</a:t>
+            </a:r>
+            <a:endParaRPr lang="en-US" dirty="0"/>
+          </a:p>
+        </p:txBody>
+      </p:sp>
+      <p:sp>
+        <p:nvSpPr>
+          <p:cNvPr id="76" name="TextBox 75"/>
+          <p:cNvSpPr txBox="1"/>
+          <p:nvPr/>
+        </p:nvSpPr>
+        <p:spPr>
+          <a:xfrm>
+            <a:off x="6408034" y="2380593"/>
+            <a:ext cx="2939166" cy="584775"/>
+          </a:xfrm>
+          <a:prstGeom prst="rect">
+            <a:avLst/>
+          </a:prstGeom>
+          <a:noFill/>
+        </p:spPr>
+        <p:txBody>
+          <a:bodyPr wrap="square" rtlCol="0">
+            <a:spAutoFit/>
+          </a:bodyPr>
+          <a:lstStyle/>
+          <a:p>
+            <a:pPr algn="ctr"/>
+            <a:r>
+              <a:rPr lang="en-US" sz="3200" dirty="0" err="1" smtClean="0">
+                <a:solidFill>
+                  <a:schemeClr val="bg1"/>
+                </a:solidFill>
+              </a:rPr>
+              <a:t>Proiectul</a:t>
+            </a:r>
+            <a:r>
+              <a:rPr lang="en-US" sz="3200" dirty="0" smtClean="0">
+                <a:solidFill>
+                  <a:schemeClr val="bg1"/>
+                </a:solidFill>
+              </a:rPr>
+              <a:t> 2</a:t>
+            </a:r>
+            <a:endParaRPr lang="en-US" sz="3200" dirty="0">
+              <a:solidFill>
+                <a:schemeClr val="bg1"/>
+              </a:solidFill>
+            </a:endParaRPr>
+          </a:p>
+        </p:txBody>
+      </p:sp>
+      <p:cxnSp>
+        <p:nvCxnSpPr>
+          <p:cNvPr id="77" name="Straight Arrow Connector 76"/>
+          <p:cNvCxnSpPr/>
+          <p:nvPr/>
+        </p:nvCxnSpPr>
+        <p:spPr>
+          <a:xfrm flipV="1">
+            <a:off x="6985000" y="4056994"/>
+            <a:ext cx="1230132" cy="371564"/>
+          </a:xfrm>
+          <a:prstGeom prst="straightConnector1">
+            <a:avLst/>
+          </a:prstGeom>
+          <a:ln w="28575">
+            <a:solidFill>
+              <a:schemeClr val="bg1"/>
+            </a:solidFill>
+            <a:headEnd w="lg" len="lg"/>
+            <a:tailEnd type="arrow"/>
+          </a:ln>
+        </p:spPr>
+        <p:style>
+          <a:lnRef idx="1">
+            <a:schemeClr val="accent1"/>
+          </a:lnRef>
+          <a:fillRef idx="0">
+            <a:schemeClr val="accent1"/>
+          </a:fillRef>
+          <a:effectRef idx="0">
+            <a:schemeClr val="accent1"/>
+          </a:effectRef>
+          <a:fontRef idx="minor">
+            <a:schemeClr val="tx1"/>
+          </a:fontRef>
+        </p:style>
+      </p:cxnSp>
+      <p:cxnSp>
+        <p:nvCxnSpPr>
+          <p:cNvPr id="78" name="Straight Arrow Connector 77"/>
+          <p:cNvCxnSpPr/>
+          <p:nvPr/>
+        </p:nvCxnSpPr>
+        <p:spPr>
+          <a:xfrm>
+            <a:off x="6985000" y="4514193"/>
+            <a:ext cx="1507683" cy="347618"/>
+          </a:xfrm>
+          <a:prstGeom prst="straightConnector1">
+            <a:avLst/>
+          </a:prstGeom>
+          <a:ln w="28575">
+            <a:solidFill>
+              <a:schemeClr val="bg1"/>
+            </a:solidFill>
+            <a:headEnd w="lg" len="lg"/>
+            <a:tailEnd type="arrow"/>
+          </a:ln>
+        </p:spPr>
+        <p:style>
+          <a:lnRef idx="1">
+            <a:schemeClr val="accent1"/>
+          </a:lnRef>
+          <a:fillRef idx="0">
+            <a:schemeClr val="accent1"/>
+          </a:fillRef>
+          <a:effectRef idx="0">
+            <a:schemeClr val="accent1"/>
+          </a:effectRef>
+          <a:fontRef idx="minor">
+            <a:schemeClr val="tx1"/>
+          </a:fontRef>
+        </p:style>
+      </p:cxnSp>
+      <p:sp>
+        <p:nvSpPr>
+          <p:cNvPr id="80" name="Oval 79"/>
+          <p:cNvSpPr/>
+          <p:nvPr/>
+        </p:nvSpPr>
+        <p:spPr>
+          <a:xfrm>
+            <a:off x="5918200" y="4249428"/>
+            <a:ext cx="1143000" cy="379662"/>
+          </a:xfrm>
+          <a:prstGeom prst="ellipse">
+            <a:avLst/>
+          </a:prstGeom>
+          <a:solidFill>
+            <a:schemeClr val="bg1">
+              <a:alpha val="0"/>
+            </a:schemeClr>
+          </a:solidFill>
+          <a:ln>
+            <a:solidFill>
+              <a:srgbClr val="FF0000"/>
+            </a:solidFill>
+          </a:ln>
+        </p:spPr>
+        <p:style>
+          <a:lnRef idx="2">
+            <a:schemeClr val="accent1">
+              <a:shade val="50000"/>
+            </a:schemeClr>
+          </a:lnRef>
+          <a:fillRef idx="1">
+            <a:schemeClr val="accent1"/>
+          </a:fillRef>
+          <a:effectRef idx="0">
+            <a:schemeClr val="accent1"/>
+          </a:effectRef>
+          <a:fontRef idx="minor">
+            <a:schemeClr val="lt1"/>
+          </a:fontRef>
+        </p:style>
+        <p:txBody>
+          <a:bodyPr rtlCol="0" anchor="ctr"/>
+          <a:lstStyle/>
+          <a:p>
+            <a:pPr algn="ctr"/>
+            <a:endParaRPr lang="en-US"/>
+          </a:p>
+        </p:txBody>
+      </p:sp>
+      <p:sp>
+        <p:nvSpPr>
+          <p:cNvPr id="81" name="Oval 80"/>
+          <p:cNvSpPr/>
+          <p:nvPr/>
+        </p:nvSpPr>
+        <p:spPr>
+          <a:xfrm>
+            <a:off x="654934" y="4156053"/>
+            <a:ext cx="1143000" cy="379662"/>
+          </a:xfrm>
+          <a:prstGeom prst="ellipse">
+            <a:avLst/>
+          </a:prstGeom>
+          <a:solidFill>
+            <a:schemeClr val="bg1">
+              <a:alpha val="0"/>
+            </a:schemeClr>
+          </a:solidFill>
+          <a:ln>
+            <a:solidFill>
+              <a:srgbClr val="FF0000"/>
+            </a:solidFill>
+          </a:ln>
+        </p:spPr>
+        <p:style>
+          <a:lnRef idx="2">
+            <a:schemeClr val="accent1">
+              <a:shade val="50000"/>
+            </a:schemeClr>
+          </a:lnRef>
+          <a:fillRef idx="1">
+            <a:schemeClr val="accent1"/>
+          </a:fillRef>
+          <a:effectRef idx="0">
+            <a:schemeClr val="accent1"/>
+          </a:effectRef>
+          <a:fontRef idx="minor">
+            <a:schemeClr val="lt1"/>
+          </a:fontRef>
+        </p:style>
+        <p:txBody>
+          <a:bodyPr rtlCol="0" anchor="ctr"/>
+          <a:lstStyle/>
+          <a:p>
+            <a:pPr algn="ctr"/>
+            <a:endParaRPr lang="en-US"/>
+          </a:p>
+        </p:txBody>
+      </p:sp>
+      <p:sp>
+        <p:nvSpPr>
+          <p:cNvPr id="82" name="Title 4"/>
+          <p:cNvSpPr txBox="1">
+            <a:spLocks/>
+          </p:cNvSpPr>
+          <p:nvPr/>
+        </p:nvSpPr>
+        <p:spPr>
+          <a:xfrm>
+            <a:off x="660400" y="304801"/>
+            <a:ext cx="8458200" cy="1143000"/>
+          </a:xfrm>
+          <a:prstGeom prst="rect">
+            <a:avLst/>
+          </a:prstGeom>
+        </p:spPr>
+        <p:txBody>
+          <a:bodyPr/>
+          <a:lstStyle>
+            <a:lvl1pPr algn="ctr" defTabSz="1015990" rtl="0" eaLnBrk="1" latinLnBrk="0" hangingPunct="1">
+              <a:spcBef>
+                <a:spcPct val="0"/>
+              </a:spcBef>
+              <a:buNone/>
+              <a:defRPr sz="4900" kern="1200">
+                <a:solidFill>
+                  <a:srgbClr val="FFFFFF"/>
+                </a:solidFill>
+                <a:latin typeface="+mj-lt"/>
+                <a:ea typeface="+mj-ea"/>
+                <a:cs typeface="+mj-cs"/>
+              </a:defRPr>
+            </a:lvl1pPr>
+            <a:lvl2pPr eaLnBrk="1" hangingPunct="1">
+              <a:defRPr>
+                <a:solidFill>
+                  <a:schemeClr val="tx2"/>
+                </a:solidFill>
+              </a:defRPr>
+            </a:lvl2pPr>
+            <a:lvl3pPr eaLnBrk="1" hangingPunct="1">
+              <a:defRPr>
+                <a:solidFill>
+                  <a:schemeClr val="tx2"/>
+                </a:solidFill>
+              </a:defRPr>
+            </a:lvl3pPr>
+            <a:lvl4pPr eaLnBrk="1" hangingPunct="1">
+              <a:defRPr>
+                <a:solidFill>
+                  <a:schemeClr val="tx2"/>
+                </a:solidFill>
+              </a:defRPr>
+            </a:lvl4pPr>
+            <a:lvl5pPr eaLnBrk="1" hangingPunct="1">
+              <a:defRPr>
+                <a:solidFill>
+                  <a:schemeClr val="tx2"/>
+                </a:solidFill>
+              </a:defRPr>
+            </a:lvl5pPr>
+            <a:lvl6pPr eaLnBrk="1" hangingPunct="1">
+              <a:defRPr>
+                <a:solidFill>
+                  <a:schemeClr val="tx2"/>
+                </a:solidFill>
+              </a:defRPr>
+            </a:lvl6pPr>
+            <a:lvl7pPr eaLnBrk="1" hangingPunct="1">
+              <a:defRPr>
+                <a:solidFill>
+                  <a:schemeClr val="tx2"/>
+                </a:solidFill>
+              </a:defRPr>
+            </a:lvl7pPr>
+            <a:lvl8pPr eaLnBrk="1" hangingPunct="1">
+              <a:defRPr>
+                <a:solidFill>
+                  <a:schemeClr val="tx2"/>
+                </a:solidFill>
+              </a:defRPr>
+            </a:lvl8pPr>
+            <a:lvl9pPr eaLnBrk="1" hangingPunct="1">
+              <a:defRPr>
+                <a:solidFill>
+                  <a:schemeClr val="tx2"/>
+                </a:solidFill>
+              </a:defRPr>
+            </a:lvl9pPr>
+          </a:lstStyle>
+          <a:p>
+            <a:r>
+              <a:rPr lang="en-US" dirty="0" err="1" smtClean="0">
+                <a:solidFill>
+                  <a:schemeClr val="tx1"/>
+                </a:solidFill>
+              </a:rPr>
+              <a:t>Descrierea</a:t>
+            </a:r>
+            <a:r>
+              <a:rPr lang="en-US" dirty="0" smtClean="0">
+                <a:solidFill>
+                  <a:schemeClr val="tx1"/>
+                </a:solidFill>
+              </a:rPr>
+              <a:t> </a:t>
+            </a:r>
+            <a:r>
+              <a:rPr lang="en-US" dirty="0" err="1" smtClean="0">
+                <a:solidFill>
+                  <a:schemeClr val="tx1"/>
+                </a:solidFill>
+              </a:rPr>
+              <a:t>Algoritmului</a:t>
+            </a:r>
+            <a:endParaRPr lang="en-US" dirty="0">
+              <a:solidFill>
+                <a:schemeClr val="tx1"/>
+              </a:solidFill>
+            </a:endParaRPr>
+          </a:p>
+        </p:txBody>
+      </p:sp>
+    </p:spTree>
+    <p:extLst>
+      <p:ext uri="{BB962C8B-B14F-4D97-AF65-F5344CB8AC3E}">
+        <p14:creationId xmlns:p14="http://schemas.microsoft.com/office/powerpoint/2010/main" val="3855558671"/>
+      </p:ext>
+    </p:extLst>
+  </p:cSld>
+  <p:clrMapOvr>
+    <a:masterClrMapping/>
+  </p:clrMapOvr>
+  <p:timing>
+    <p:tnLst>
+      <p:par>
+        <p:cTn id="1" dur="indefinite" restart="never" nodeType="tmRoot">
+          <p:childTnLst>
+            <p:seq concurrent="1" nextAc="seek">
+              <p:cTn id="2" dur="indefinite" nodeType="mainSeq">
+                <p:childTnLst>
+                  <p:par>
+                    <p:cTn id="3" fill="hold">
+                      <p:stCondLst>
+                        <p:cond delay="indefinite"/>
+                      </p:stCondLst>
+                      <p:childTnLst>
+                        <p:par>
+                          <p:cTn id="4" fill="hold">
+                            <p:stCondLst>
+                              <p:cond delay="0"/>
+                            </p:stCondLst>
+                            <p:childTnLst>
+                              <p:par>
+                                <p:cTn id="5" presetID="1" presetClass="entr" presetSubtype="0" fill="hold" grpId="0" nodeType="clickEffect">
+                                  <p:stCondLst>
+                                    <p:cond delay="0"/>
+                                  </p:stCondLst>
+                                  <p:childTnLst>
+                                    <p:set>
+                                      <p:cBhvr>
+                                        <p:cTn id="6" dur="1" fill="hold">
+                                          <p:stCondLst>
+                                            <p:cond delay="0"/>
+                                          </p:stCondLst>
+                                        </p:cTn>
+                                        <p:tgtEl>
+                                          <p:spTgt spid="2"/>
+                                        </p:tgtEl>
+                                        <p:attrNameLst>
+                                          <p:attrName>style.visibility</p:attrName>
+                                        </p:attrNameLst>
+                                      </p:cBhvr>
+                                      <p:to>
+                                        <p:strVal val="visible"/>
+                                      </p:to>
+                                    </p:set>
+                                  </p:childTnLst>
+                                </p:cTn>
+                              </p:par>
+                              <p:par>
+                                <p:cTn id="7" presetID="1" presetClass="entr" presetSubtype="0" fill="hold" grpId="0" nodeType="withEffect">
+                                  <p:stCondLst>
+                                    <p:cond delay="0"/>
+                                  </p:stCondLst>
+                                  <p:childTnLst>
+                                    <p:set>
+                                      <p:cBhvr>
+                                        <p:cTn id="8" dur="1" fill="hold">
+                                          <p:stCondLst>
+                                            <p:cond delay="0"/>
+                                          </p:stCondLst>
+                                        </p:cTn>
+                                        <p:tgtEl>
+                                          <p:spTgt spid="70"/>
+                                        </p:tgtEl>
+                                        <p:attrNameLst>
+                                          <p:attrName>style.visibility</p:attrName>
+                                        </p:attrNameLst>
+                                      </p:cBhvr>
+                                      <p:to>
+                                        <p:strVal val="visible"/>
+                                      </p:to>
+                                    </p:set>
+                                  </p:childTnLst>
+                                </p:cTn>
+                              </p:par>
+                            </p:childTnLst>
+                          </p:cTn>
+                        </p:par>
+                      </p:childTnLst>
+                    </p:cTn>
+                  </p:par>
+                  <p:par>
+                    <p:cTn id="9" fill="hold">
+                      <p:stCondLst>
+                        <p:cond delay="indefinite"/>
+                      </p:stCondLst>
+                      <p:childTnLst>
+                        <p:par>
+                          <p:cTn id="10" fill="hold">
+                            <p:stCondLst>
+                              <p:cond delay="0"/>
+                            </p:stCondLst>
+                            <p:childTnLst>
+                              <p:par>
+                                <p:cTn id="11" presetID="1" presetClass="entr" presetSubtype="0" fill="hold" grpId="0" nodeType="clickEffect">
+                                  <p:stCondLst>
+                                    <p:cond delay="0"/>
+                                  </p:stCondLst>
+                                  <p:childTnLst>
+                                    <p:set>
+                                      <p:cBhvr>
+                                        <p:cTn id="12" dur="1" fill="hold">
+                                          <p:stCondLst>
+                                            <p:cond delay="0"/>
+                                          </p:stCondLst>
+                                        </p:cTn>
+                                        <p:tgtEl>
+                                          <p:spTgt spid="3"/>
+                                        </p:tgtEl>
+                                        <p:attrNameLst>
+                                          <p:attrName>style.visibility</p:attrName>
+                                        </p:attrNameLst>
+                                      </p:cBhvr>
+                                      <p:to>
+                                        <p:strVal val="visible"/>
+                                      </p:to>
+                                    </p:set>
+                                  </p:childTnLst>
+                                </p:cTn>
+                              </p:par>
+                              <p:par>
+                                <p:cTn id="13" presetID="1" presetClass="entr" presetSubtype="0" fill="hold" grpId="0" nodeType="withEffect">
+                                  <p:stCondLst>
+                                    <p:cond delay="0"/>
+                                  </p:stCondLst>
+                                  <p:childTnLst>
+                                    <p:set>
+                                      <p:cBhvr>
+                                        <p:cTn id="14" dur="1" fill="hold">
+                                          <p:stCondLst>
+                                            <p:cond delay="0"/>
+                                          </p:stCondLst>
+                                        </p:cTn>
+                                        <p:tgtEl>
+                                          <p:spTgt spid="71"/>
+                                        </p:tgtEl>
+                                        <p:attrNameLst>
+                                          <p:attrName>style.visibility</p:attrName>
+                                        </p:attrNameLst>
+                                      </p:cBhvr>
+                                      <p:to>
+                                        <p:strVal val="visible"/>
+                                      </p:to>
+                                    </p:set>
+                                  </p:childTnLst>
+                                </p:cTn>
+                              </p:par>
+                            </p:childTnLst>
+                          </p:cTn>
+                        </p:par>
+                      </p:childTnLst>
+                    </p:cTn>
+                  </p:par>
+                  <p:par>
+                    <p:cTn id="15" fill="hold">
+                      <p:stCondLst>
+                        <p:cond delay="indefinite"/>
+                      </p:stCondLst>
+                      <p:childTnLst>
+                        <p:par>
+                          <p:cTn id="16" fill="hold">
+                            <p:stCondLst>
+                              <p:cond delay="0"/>
+                            </p:stCondLst>
+                            <p:childTnLst>
+                              <p:par>
+                                <p:cTn id="17" presetID="1" presetClass="entr" presetSubtype="0" fill="hold" grpId="0" nodeType="clickEffect">
+                                  <p:stCondLst>
+                                    <p:cond delay="0"/>
+                                  </p:stCondLst>
+                                  <p:childTnLst>
+                                    <p:set>
+                                      <p:cBhvr>
+                                        <p:cTn id="18" dur="1" fill="hold">
+                                          <p:stCondLst>
+                                            <p:cond delay="0"/>
+                                          </p:stCondLst>
+                                        </p:cTn>
+                                        <p:tgtEl>
+                                          <p:spTgt spid="8"/>
+                                        </p:tgtEl>
+                                        <p:attrNameLst>
+                                          <p:attrName>style.visibility</p:attrName>
+                                        </p:attrNameLst>
+                                      </p:cBhvr>
+                                      <p:to>
+                                        <p:strVal val="visible"/>
+                                      </p:to>
+                                    </p:set>
+                                  </p:childTnLst>
+                                </p:cTn>
+                              </p:par>
+                              <p:par>
+                                <p:cTn id="19" presetID="1" presetClass="entr" presetSubtype="0" fill="hold" grpId="0" nodeType="withEffect">
+                                  <p:stCondLst>
+                                    <p:cond delay="0"/>
+                                  </p:stCondLst>
+                                  <p:childTnLst>
+                                    <p:set>
+                                      <p:cBhvr>
+                                        <p:cTn id="20" dur="1" fill="hold">
+                                          <p:stCondLst>
+                                            <p:cond delay="0"/>
+                                          </p:stCondLst>
+                                        </p:cTn>
+                                        <p:tgtEl>
+                                          <p:spTgt spid="72"/>
+                                        </p:tgtEl>
+                                        <p:attrNameLst>
+                                          <p:attrName>style.visibility</p:attrName>
+                                        </p:attrNameLst>
+                                      </p:cBhvr>
+                                      <p:to>
+                                        <p:strVal val="visible"/>
+                                      </p:to>
+                                    </p:set>
+                                  </p:childTnLst>
+                                </p:cTn>
+                              </p:par>
+                            </p:childTnLst>
+                          </p:cTn>
+                        </p:par>
+                      </p:childTnLst>
+                    </p:cTn>
+                  </p:par>
+                  <p:par>
+                    <p:cTn id="21" fill="hold">
+                      <p:stCondLst>
+                        <p:cond delay="indefinite"/>
+                      </p:stCondLst>
+                      <p:childTnLst>
+                        <p:par>
+                          <p:cTn id="22" fill="hold">
+                            <p:stCondLst>
+                              <p:cond delay="0"/>
+                            </p:stCondLst>
+                            <p:childTnLst>
+                              <p:par>
+                                <p:cTn id="23" presetID="1" presetClass="entr" presetSubtype="0" fill="hold" grpId="0" nodeType="clickEffect">
+                                  <p:stCondLst>
+                                    <p:cond delay="0"/>
+                                  </p:stCondLst>
+                                  <p:childTnLst>
+                                    <p:set>
+                                      <p:cBhvr>
+                                        <p:cTn id="24" dur="1" fill="hold">
+                                          <p:stCondLst>
+                                            <p:cond delay="0"/>
+                                          </p:stCondLst>
+                                        </p:cTn>
+                                        <p:tgtEl>
+                                          <p:spTgt spid="10"/>
+                                        </p:tgtEl>
+                                        <p:attrNameLst>
+                                          <p:attrName>style.visibility</p:attrName>
+                                        </p:attrNameLst>
+                                      </p:cBhvr>
+                                      <p:to>
+                                        <p:strVal val="visible"/>
+                                      </p:to>
+                                    </p:set>
+                                  </p:childTnLst>
+                                </p:cTn>
+                              </p:par>
+                              <p:par>
+                                <p:cTn id="25" presetID="1" presetClass="entr" presetSubtype="0" fill="hold" grpId="0" nodeType="withEffect">
+                                  <p:stCondLst>
+                                    <p:cond delay="0"/>
+                                  </p:stCondLst>
+                                  <p:childTnLst>
+                                    <p:set>
+                                      <p:cBhvr>
+                                        <p:cTn id="26" dur="1" fill="hold">
+                                          <p:stCondLst>
+                                            <p:cond delay="0"/>
+                                          </p:stCondLst>
+                                        </p:cTn>
+                                        <p:tgtEl>
+                                          <p:spTgt spid="13"/>
+                                        </p:tgtEl>
+                                        <p:attrNameLst>
+                                          <p:attrName>style.visibility</p:attrName>
+                                        </p:attrNameLst>
+                                      </p:cBhvr>
+                                      <p:to>
+                                        <p:strVal val="visible"/>
+                                      </p:to>
+                                    </p:set>
+                                  </p:childTnLst>
+                                </p:cTn>
+                              </p:par>
+                              <p:par>
+                                <p:cTn id="27" presetID="1" presetClass="entr" presetSubtype="0" fill="hold" grpId="0" nodeType="withEffect">
+                                  <p:stCondLst>
+                                    <p:cond delay="0"/>
+                                  </p:stCondLst>
+                                  <p:childTnLst>
+                                    <p:set>
+                                      <p:cBhvr>
+                                        <p:cTn id="28" dur="1" fill="hold">
+                                          <p:stCondLst>
+                                            <p:cond delay="0"/>
+                                          </p:stCondLst>
+                                        </p:cTn>
+                                        <p:tgtEl>
+                                          <p:spTgt spid="75"/>
+                                        </p:tgtEl>
+                                        <p:attrNameLst>
+                                          <p:attrName>style.visibility</p:attrName>
+                                        </p:attrNameLst>
+                                      </p:cBhvr>
+                                      <p:to>
+                                        <p:strVal val="visible"/>
+                                      </p:to>
+                                    </p:set>
+                                  </p:childTnLst>
+                                </p:cTn>
+                              </p:par>
+                              <p:par>
+                                <p:cTn id="29" presetID="1" presetClass="entr" presetSubtype="0" fill="hold" grpId="0" nodeType="withEffect">
+                                  <p:stCondLst>
+                                    <p:cond delay="0"/>
+                                  </p:stCondLst>
+                                  <p:childTnLst>
+                                    <p:set>
+                                      <p:cBhvr>
+                                        <p:cTn id="30" dur="1" fill="hold">
+                                          <p:stCondLst>
+                                            <p:cond delay="0"/>
+                                          </p:stCondLst>
+                                        </p:cTn>
+                                        <p:tgtEl>
+                                          <p:spTgt spid="73"/>
+                                        </p:tgtEl>
+                                        <p:attrNameLst>
+                                          <p:attrName>style.visibility</p:attrName>
+                                        </p:attrNameLst>
+                                      </p:cBhvr>
+                                      <p:to>
+                                        <p:strVal val="visible"/>
+                                      </p:to>
+                                    </p:set>
+                                  </p:childTnLst>
+                                </p:cTn>
+                              </p:par>
+                            </p:childTnLst>
+                          </p:cTn>
+                        </p:par>
+                      </p:childTnLst>
+                    </p:cTn>
+                  </p:par>
+                  <p:par>
+                    <p:cTn id="31" fill="hold">
+                      <p:stCondLst>
+                        <p:cond delay="indefinite"/>
+                      </p:stCondLst>
+                      <p:childTnLst>
+                        <p:par>
+                          <p:cTn id="32" fill="hold">
+                            <p:stCondLst>
+                              <p:cond delay="0"/>
+                            </p:stCondLst>
+                            <p:childTnLst>
+                              <p:par>
+                                <p:cTn id="33" presetID="16" presetClass="entr" presetSubtype="21" fill="hold" nodeType="clickEffect">
+                                  <p:stCondLst>
+                                    <p:cond delay="0"/>
+                                  </p:stCondLst>
+                                  <p:childTnLst>
+                                    <p:set>
+                                      <p:cBhvr>
+                                        <p:cTn id="34" dur="1" fill="hold">
+                                          <p:stCondLst>
+                                            <p:cond delay="0"/>
+                                          </p:stCondLst>
+                                        </p:cTn>
+                                        <p:tgtEl>
+                                          <p:spTgt spid="62"/>
+                                        </p:tgtEl>
+                                        <p:attrNameLst>
+                                          <p:attrName>style.visibility</p:attrName>
+                                        </p:attrNameLst>
+                                      </p:cBhvr>
+                                      <p:to>
+                                        <p:strVal val="visible"/>
+                                      </p:to>
+                                    </p:set>
+                                    <p:animEffect transition="in" filter="barn(inVertical)">
+                                      <p:cBhvr>
+                                        <p:cTn id="35" dur="500"/>
+                                        <p:tgtEl>
+                                          <p:spTgt spid="62"/>
+                                        </p:tgtEl>
+                                      </p:cBhvr>
+                                    </p:animEffect>
+                                  </p:childTnLst>
+                                </p:cTn>
+                              </p:par>
+                              <p:par>
+                                <p:cTn id="36" presetID="16" presetClass="entr" presetSubtype="21" fill="hold" nodeType="withEffect">
+                                  <p:stCondLst>
+                                    <p:cond delay="0"/>
+                                  </p:stCondLst>
+                                  <p:childTnLst>
+                                    <p:set>
+                                      <p:cBhvr>
+                                        <p:cTn id="37" dur="1" fill="hold">
+                                          <p:stCondLst>
+                                            <p:cond delay="0"/>
+                                          </p:stCondLst>
+                                        </p:cTn>
+                                        <p:tgtEl>
+                                          <p:spTgt spid="77"/>
+                                        </p:tgtEl>
+                                        <p:attrNameLst>
+                                          <p:attrName>style.visibility</p:attrName>
+                                        </p:attrNameLst>
+                                      </p:cBhvr>
+                                      <p:to>
+                                        <p:strVal val="visible"/>
+                                      </p:to>
+                                    </p:set>
+                                    <p:animEffect transition="in" filter="barn(inVertical)">
+                                      <p:cBhvr>
+                                        <p:cTn id="38" dur="500"/>
+                                        <p:tgtEl>
+                                          <p:spTgt spid="77"/>
+                                        </p:tgtEl>
+                                      </p:cBhvr>
+                                    </p:animEffect>
+                                  </p:childTnLst>
+                                </p:cTn>
+                              </p:par>
+                            </p:childTnLst>
+                          </p:cTn>
+                        </p:par>
+                      </p:childTnLst>
+                    </p:cTn>
+                  </p:par>
+                  <p:par>
+                    <p:cTn id="39" fill="hold">
+                      <p:stCondLst>
+                        <p:cond delay="indefinite"/>
+                      </p:stCondLst>
+                      <p:childTnLst>
+                        <p:par>
+                          <p:cTn id="40" fill="hold">
+                            <p:stCondLst>
+                              <p:cond delay="0"/>
+                            </p:stCondLst>
+                            <p:childTnLst>
+                              <p:par>
+                                <p:cTn id="41" presetID="16" presetClass="entr" presetSubtype="21" fill="hold" grpId="0" nodeType="clickEffect">
+                                  <p:stCondLst>
+                                    <p:cond delay="0"/>
+                                  </p:stCondLst>
+                                  <p:childTnLst>
+                                    <p:set>
+                                      <p:cBhvr>
+                                        <p:cTn id="42" dur="1" fill="hold">
+                                          <p:stCondLst>
+                                            <p:cond delay="0"/>
+                                          </p:stCondLst>
+                                        </p:cTn>
+                                        <p:tgtEl>
+                                          <p:spTgt spid="12"/>
+                                        </p:tgtEl>
+                                        <p:attrNameLst>
+                                          <p:attrName>style.visibility</p:attrName>
+                                        </p:attrNameLst>
+                                      </p:cBhvr>
+                                      <p:to>
+                                        <p:strVal val="visible"/>
+                                      </p:to>
+                                    </p:set>
+                                    <p:animEffect transition="in" filter="barn(inVertical)">
+                                      <p:cBhvr>
+                                        <p:cTn id="43" dur="500"/>
+                                        <p:tgtEl>
+                                          <p:spTgt spid="12"/>
+                                        </p:tgtEl>
+                                      </p:cBhvr>
+                                    </p:animEffect>
+                                  </p:childTnLst>
+                                  <p:subTnLst>
+                                    <p:animClr clrSpc="rgb" dir="cw">
+                                      <p:cBhvr override="childStyle">
+                                        <p:cTn dur="1" fill="hold" display="0" masterRel="nextClick" afterEffect="1"/>
+                                        <p:tgtEl>
+                                          <p:spTgt spid="12"/>
+                                        </p:tgtEl>
+                                        <p:attrNameLst>
+                                          <p:attrName>ppt_c</p:attrName>
+                                        </p:attrNameLst>
+                                      </p:cBhvr>
+                                      <p:to>
+                                        <a:srgbClr val="FFCC66"/>
+                                      </p:to>
+                                    </p:animClr>
+                                  </p:subTnLst>
+                                </p:cTn>
+                              </p:par>
+                              <p:par>
+                                <p:cTn id="44" presetID="16" presetClass="entr" presetSubtype="21" fill="hold" nodeType="withEffect">
+                                  <p:stCondLst>
+                                    <p:cond delay="0"/>
+                                  </p:stCondLst>
+                                  <p:childTnLst>
+                                    <p:set>
+                                      <p:cBhvr>
+                                        <p:cTn id="45" dur="1" fill="hold">
+                                          <p:stCondLst>
+                                            <p:cond delay="0"/>
+                                          </p:stCondLst>
+                                        </p:cTn>
+                                        <p:tgtEl>
+                                          <p:spTgt spid="66"/>
+                                        </p:tgtEl>
+                                        <p:attrNameLst>
+                                          <p:attrName>style.visibility</p:attrName>
+                                        </p:attrNameLst>
+                                      </p:cBhvr>
+                                      <p:to>
+                                        <p:strVal val="visible"/>
+                                      </p:to>
+                                    </p:set>
+                                    <p:animEffect transition="in" filter="barn(inVertical)">
+                                      <p:cBhvr>
+                                        <p:cTn id="46" dur="500"/>
+                                        <p:tgtEl>
+                                          <p:spTgt spid="66"/>
+                                        </p:tgtEl>
+                                      </p:cBhvr>
+                                    </p:animEffect>
+                                  </p:childTnLst>
+                                </p:cTn>
+                              </p:par>
+                              <p:par>
+                                <p:cTn id="47" presetID="16" presetClass="entr" presetSubtype="21" fill="hold" grpId="0" nodeType="withEffect">
+                                  <p:stCondLst>
+                                    <p:cond delay="0"/>
+                                  </p:stCondLst>
+                                  <p:childTnLst>
+                                    <p:set>
+                                      <p:cBhvr>
+                                        <p:cTn id="48" dur="1" fill="hold">
+                                          <p:stCondLst>
+                                            <p:cond delay="0"/>
+                                          </p:stCondLst>
+                                        </p:cTn>
+                                        <p:tgtEl>
+                                          <p:spTgt spid="74"/>
+                                        </p:tgtEl>
+                                        <p:attrNameLst>
+                                          <p:attrName>style.visibility</p:attrName>
+                                        </p:attrNameLst>
+                                      </p:cBhvr>
+                                      <p:to>
+                                        <p:strVal val="visible"/>
+                                      </p:to>
+                                    </p:set>
+                                    <p:animEffect transition="in" filter="barn(inVertical)">
+                                      <p:cBhvr>
+                                        <p:cTn id="49" dur="500"/>
+                                        <p:tgtEl>
+                                          <p:spTgt spid="74"/>
+                                        </p:tgtEl>
+                                      </p:cBhvr>
+                                    </p:animEffect>
+                                  </p:childTnLst>
+                                  <p:subTnLst>
+                                    <p:animClr clrSpc="rgb" dir="cw">
+                                      <p:cBhvr override="childStyle">
+                                        <p:cTn dur="1" fill="hold" display="0" masterRel="nextClick" afterEffect="1"/>
+                                        <p:tgtEl>
+                                          <p:spTgt spid="74"/>
+                                        </p:tgtEl>
+                                        <p:attrNameLst>
+                                          <p:attrName>ppt_c</p:attrName>
+                                        </p:attrNameLst>
+                                      </p:cBhvr>
+                                      <p:to>
+                                        <a:srgbClr val="FFCC66"/>
+                                      </p:to>
+                                    </p:animClr>
+                                  </p:subTnLst>
+                                </p:cTn>
+                              </p:par>
+                              <p:par>
+                                <p:cTn id="50" presetID="16" presetClass="entr" presetSubtype="21" fill="hold" nodeType="withEffect">
+                                  <p:stCondLst>
+                                    <p:cond delay="0"/>
+                                  </p:stCondLst>
+                                  <p:childTnLst>
+                                    <p:set>
+                                      <p:cBhvr>
+                                        <p:cTn id="51" dur="1" fill="hold">
+                                          <p:stCondLst>
+                                            <p:cond delay="0"/>
+                                          </p:stCondLst>
+                                        </p:cTn>
+                                        <p:tgtEl>
+                                          <p:spTgt spid="78"/>
+                                        </p:tgtEl>
+                                        <p:attrNameLst>
+                                          <p:attrName>style.visibility</p:attrName>
+                                        </p:attrNameLst>
+                                      </p:cBhvr>
+                                      <p:to>
+                                        <p:strVal val="visible"/>
+                                      </p:to>
+                                    </p:set>
+                                    <p:animEffect transition="in" filter="barn(inVertical)">
+                                      <p:cBhvr>
+                                        <p:cTn id="52" dur="500"/>
+                                        <p:tgtEl>
+                                          <p:spTgt spid="78"/>
+                                        </p:tgtEl>
+                                      </p:cBhvr>
+                                    </p:animEffect>
+                                  </p:childTnLst>
+                                </p:cTn>
+                              </p:par>
+                            </p:childTnLst>
+                          </p:cTn>
+                        </p:par>
+                      </p:childTnLst>
+                    </p:cTn>
+                  </p:par>
+                  <p:par>
+                    <p:cTn id="53" fill="hold">
+                      <p:stCondLst>
+                        <p:cond delay="indefinite"/>
+                      </p:stCondLst>
+                      <p:childTnLst>
+                        <p:par>
+                          <p:cTn id="54" fill="hold">
+                            <p:stCondLst>
+                              <p:cond delay="0"/>
+                            </p:stCondLst>
+                            <p:childTnLst>
+                              <p:par>
+                                <p:cTn id="55" presetID="21" presetClass="entr" presetSubtype="1" fill="hold" grpId="0" nodeType="clickEffect">
+                                  <p:stCondLst>
+                                    <p:cond delay="0"/>
+                                  </p:stCondLst>
+                                  <p:childTnLst>
+                                    <p:set>
+                                      <p:cBhvr>
+                                        <p:cTn id="56" dur="1" fill="hold">
+                                          <p:stCondLst>
+                                            <p:cond delay="0"/>
+                                          </p:stCondLst>
+                                        </p:cTn>
+                                        <p:tgtEl>
+                                          <p:spTgt spid="81"/>
+                                        </p:tgtEl>
+                                        <p:attrNameLst>
+                                          <p:attrName>style.visibility</p:attrName>
+                                        </p:attrNameLst>
+                                      </p:cBhvr>
+                                      <p:to>
+                                        <p:strVal val="visible"/>
+                                      </p:to>
+                                    </p:set>
+                                    <p:animEffect transition="in" filter="wheel(1)">
+                                      <p:cBhvr>
+                                        <p:cTn id="57" dur="2000"/>
+                                        <p:tgtEl>
+                                          <p:spTgt spid="81"/>
+                                        </p:tgtEl>
+                                      </p:cBhvr>
+                                    </p:animEffect>
+                                  </p:childTnLst>
+                                </p:cTn>
+                              </p:par>
+                              <p:par>
+                                <p:cTn id="58" presetID="21" presetClass="entr" presetSubtype="1" fill="hold" grpId="0" nodeType="withEffect">
+                                  <p:stCondLst>
+                                    <p:cond delay="0"/>
+                                  </p:stCondLst>
+                                  <p:childTnLst>
+                                    <p:set>
+                                      <p:cBhvr>
+                                        <p:cTn id="59" dur="1" fill="hold">
+                                          <p:stCondLst>
+                                            <p:cond delay="0"/>
+                                          </p:stCondLst>
+                                        </p:cTn>
+                                        <p:tgtEl>
+                                          <p:spTgt spid="80"/>
+                                        </p:tgtEl>
+                                        <p:attrNameLst>
+                                          <p:attrName>style.visibility</p:attrName>
+                                        </p:attrNameLst>
+                                      </p:cBhvr>
+                                      <p:to>
+                                        <p:strVal val="visible"/>
+                                      </p:to>
+                                    </p:set>
+                                    <p:animEffect transition="in" filter="wheel(1)">
+                                      <p:cBhvr>
+                                        <p:cTn id="60" dur="2000"/>
+                                        <p:tgtEl>
+                                          <p:spTgt spid="80"/>
+                                        </p:tgtEl>
+                                      </p:cBhvr>
+                                    </p:animEffect>
+                                  </p:childTnLst>
+                                </p:cTn>
+                              </p:par>
+                            </p:childTnLst>
+                          </p:cTn>
+                        </p:par>
+                      </p:childTnLst>
+                    </p:cTn>
+                  </p:par>
+                </p:childTnLst>
+              </p:cTn>
+              <p:prevCondLst>
+                <p:cond evt="onPrev" delay="0">
+                  <p:tgtEl>
+                    <p:sldTgt/>
+                  </p:tgtEl>
+                </p:cond>
+              </p:prevCondLst>
+              <p:nextCondLst>
+                <p:cond evt="onNext" delay="0">
+                  <p:tgtEl>
+                    <p:sldTgt/>
+                  </p:tgtEl>
+                </p:cond>
+              </p:nextCondLst>
+            </p:seq>
+          </p:childTnLst>
+        </p:cTn>
+      </p:par>
+    </p:tnLst>
+    <p:bldLst>
+      <p:bldP spid="2" grpId="0" animBg="1"/>
+      <p:bldP spid="3" grpId="0"/>
+      <p:bldP spid="8" grpId="0"/>
+      <p:bldP spid="10" grpId="0" animBg="1"/>
+      <p:bldP spid="12" grpId="0" animBg="1"/>
+      <p:bldP spid="13" grpId="0"/>
+      <p:bldP spid="70" grpId="0" animBg="1"/>
+      <p:bldP spid="71" grpId="0"/>
+      <p:bldP spid="72" grpId="0"/>
+      <p:bldP spid="73" grpId="0" animBg="1"/>
+      <p:bldP spid="74" grpId="0" animBg="1"/>
+      <p:bldP spid="75" grpId="0"/>
+      <p:bldP spid="80" grpId="0" animBg="1"/>
+      <p:bldP spid="81" grpId="0" animBg="1"/>
+    </p:bldLst>
+  </p:timing>
+</p:sld>
+</file>
+
+<file path=ppt/slides/slide5.xml><?xml version="1.0" encoding="utf-8"?>
+<p:sld xmlns:a="http://schemas.openxmlformats.org/drawingml/2006/main" xmlns:r="http://schemas.openxmlformats.org/officeDocument/2006/relationships" xmlns:p="http://schemas.openxmlformats.org/presentationml/2006/main">
+  <p:cSld>
+    <p:spTree>
+      <p:nvGrpSpPr>
+        <p:cNvPr id="1" name=""/>
+        <p:cNvGrpSpPr/>
+        <p:nvPr/>
+      </p:nvGrpSpPr>
+      <p:grpSpPr>
+        <a:xfrm>
+          <a:off x="0" y="0"/>
+          <a:ext cx="0" cy="0"/>
+          <a:chOff x="0" y="0"/>
+          <a:chExt cx="0" cy="0"/>
+        </a:xfrm>
+      </p:grpSpPr>
+      <p:sp>
+        <p:nvSpPr>
+          <p:cNvPr id="13" name="Title 12"/>
+          <p:cNvSpPr>
+            <a:spLocks noGrp="1"/>
+          </p:cNvSpPr>
+          <p:nvPr>
+            <p:ph type="title"/>
+          </p:nvPr>
+        </p:nvSpPr>
+        <p:spPr>
+          <a:xfrm>
+            <a:off x="4241800" y="838200"/>
+            <a:ext cx="5638800" cy="1905000"/>
+          </a:xfrm>
+        </p:spPr>
+        <p:txBody>
+          <a:bodyPr anchor="ctr">
+            <a:normAutofit/>
+          </a:bodyPr>
+          <a:lstStyle/>
+          <a:p>
+            <a:r>
+              <a:rPr lang="en-US" sz="4000" dirty="0" err="1" smtClean="0"/>
+              <a:t>Urmatoarele</a:t>
+            </a:r>
+            <a:r>
+              <a:rPr lang="en-US" sz="4000" dirty="0" smtClean="0"/>
+              <a:t> </a:t>
+            </a:r>
+            <a:r>
+              <a:rPr lang="en-US" sz="4000" dirty="0" err="1" smtClean="0"/>
+              <a:t>Subiecte</a:t>
+            </a:r>
+            <a:r>
+              <a:rPr lang="en-US" sz="4000" dirty="0" smtClean="0"/>
+              <a:t> :</a:t>
+            </a:r>
+            <a:endParaRPr lang="en-US" sz="4000" dirty="0"/>
+          </a:p>
+        </p:txBody>
+      </p:sp>
+      <p:sp>
+        <p:nvSpPr>
+          <p:cNvPr id="15" name="Text Placeholder 14"/>
+          <p:cNvSpPr>
+            <a:spLocks noGrp="1"/>
+          </p:cNvSpPr>
+          <p:nvPr>
+            <p:ph type="body" sz="half" idx="2"/>
+          </p:nvPr>
+        </p:nvSpPr>
+        <p:spPr>
+          <a:xfrm>
+            <a:off x="3937000" y="3048000"/>
+            <a:ext cx="5791200" cy="2590800"/>
+          </a:xfrm>
+        </p:spPr>
+        <p:txBody>
+          <a:bodyPr>
+            <a:normAutofit/>
+          </a:bodyPr>
+          <a:lstStyle/>
+          <a:p>
+            <a:pPr marL="514350" indent="-514350">
+              <a:buClr>
+                <a:schemeClr val="bg1"/>
+              </a:buClr>
+              <a:buFont typeface="+mj-lt"/>
+              <a:buAutoNum type="arabicPeriod"/>
+            </a:pPr>
+            <a:r>
+              <a:rPr lang="en-US" sz="3200" b="1" dirty="0" err="1"/>
+              <a:t>Infrastructura</a:t>
+            </a:r>
+            <a:r>
+              <a:rPr lang="en-US" sz="3200" b="1" dirty="0"/>
+              <a:t> </a:t>
+            </a:r>
+            <a:r>
+              <a:rPr lang="en-US" sz="3200" b="1" dirty="0" err="1"/>
+              <a:t>folosita</a:t>
+            </a:r>
+            <a:endParaRPr lang="en-US" sz="3200" b="1" dirty="0"/>
+          </a:p>
+          <a:p>
+            <a:pPr marL="514350" indent="-514350">
+              <a:buClr>
+                <a:schemeClr val="bg1"/>
+              </a:buClr>
+              <a:buFont typeface="+mj-lt"/>
+              <a:buAutoNum type="arabicPeriod"/>
+            </a:pPr>
+            <a:r>
+              <a:rPr lang="en-US" sz="3200" b="1" dirty="0" err="1"/>
+              <a:t>Implementarea</a:t>
+            </a:r>
+            <a:r>
+              <a:rPr lang="en-US" sz="3200" b="1" dirty="0"/>
+              <a:t> </a:t>
+            </a:r>
+            <a:r>
+              <a:rPr lang="en-US" sz="3200" b="1" dirty="0" err="1"/>
+              <a:t>algoritmului</a:t>
+            </a:r>
+            <a:endParaRPr lang="en-US" sz="3200" b="1" dirty="0"/>
+          </a:p>
+          <a:p>
+            <a:pPr marL="514350" indent="-514350">
+              <a:buClr>
+                <a:schemeClr val="bg1"/>
+              </a:buClr>
+              <a:buFont typeface="+mj-lt"/>
+              <a:buAutoNum type="arabicPeriod"/>
+            </a:pPr>
+            <a:r>
+              <a:rPr lang="en-US" sz="3200" b="1" dirty="0" err="1"/>
+              <a:t>Resultatele</a:t>
+            </a:r>
+            <a:r>
+              <a:rPr lang="en-US" sz="3200" b="1" dirty="0"/>
+              <a:t> </a:t>
+            </a:r>
+            <a:r>
+              <a:rPr lang="en-US" sz="3200" b="1" dirty="0" err="1"/>
+              <a:t>obtinute</a:t>
+            </a:r>
+            <a:endParaRPr lang="en-US" sz="3200" b="1" dirty="0"/>
+          </a:p>
+        </p:txBody>
+      </p:sp>
+      <p:pic>
+        <p:nvPicPr>
+          <p:cNvPr id="16" name="Picture Placeholder 15"/>
+          <p:cNvPicPr>
+            <a:picLocks noGrp="1" noChangeAspect="1"/>
+          </p:cNvPicPr>
+          <p:nvPr>
+            <p:ph type="pic" idx="1"/>
+          </p:nvPr>
+        </p:nvPicPr>
+        <p:blipFill>
+          <a:blip r:embed="rId3">
+            <a:extLst>
+              <a:ext uri="{28A0092B-C50C-407E-A947-70E740481C1C}">
+                <a14:useLocalDpi xmlns:a14="http://schemas.microsoft.com/office/drawing/2010/main" val="0"/>
+              </a:ext>
+            </a:extLst>
+          </a:blip>
+          <a:srcRect t="8974" b="8974"/>
+          <a:stretch>
+            <a:fillRect/>
+          </a:stretch>
+        </p:blipFill>
+        <p:spPr>
+          <a:xfrm>
+            <a:off x="431800" y="1363785"/>
+            <a:ext cx="3352800" cy="2751015"/>
+          </a:xfrm>
+        </p:spPr>
+      </p:pic>
+    </p:spTree>
+    <p:extLst>
+      <p:ext uri="{BB962C8B-B14F-4D97-AF65-F5344CB8AC3E}">
+        <p14:creationId xmlns:p14="http://schemas.microsoft.com/office/powerpoint/2010/main" val="2066542854"/>
+      </p:ext>
+    </p:extLst>
+  </p:cSld>
+  <p:clrMapOvr>
+    <a:masterClrMapping/>
+  </p:clrMapOvr>
+  <p:timing>
+    <p:tnLst>
+      <p:par>
+        <p:cTn id="1" dur="indefinite" restart="never" nodeType="tmRoot"/>
+      </p:par>
+    </p:tnLst>
+  </p:timing>
+</p:sld>
+</file>
+
+<file path=ppt/slides/slide6.xml><?xml version="1.0" encoding="utf-8"?>
+<p:sld xmlns:a="http://schemas.openxmlformats.org/drawingml/2006/main" xmlns:r="http://schemas.openxmlformats.org/officeDocument/2006/relationships" xmlns:p="http://schemas.openxmlformats.org/presentationml/2006/main">
+  <p:cSld>
+    <p:spTree>
+      <p:nvGrpSpPr>
+        <p:cNvPr id="1" name=""/>
+        <p:cNvGrpSpPr/>
+        <p:nvPr/>
+      </p:nvGrpSpPr>
+      <p:grpSpPr>
+        <a:xfrm>
+          <a:off x="0" y="0"/>
+          <a:ext cx="0" cy="0"/>
+          <a:chOff x="0" y="0"/>
+          <a:chExt cx="0" cy="0"/>
+        </a:xfrm>
+      </p:grpSpPr>
+      <p:sp>
+        <p:nvSpPr>
+          <p:cNvPr id="5" name="Title 4"/>
+          <p:cNvSpPr>
+            <a:spLocks noGrp="1"/>
+          </p:cNvSpPr>
+          <p:nvPr>
+            <p:ph type="ctrTitle"/>
+          </p:nvPr>
+        </p:nvSpPr>
+        <p:spPr>
+          <a:xfrm>
+            <a:off x="736600" y="152400"/>
+            <a:ext cx="8636000" cy="1977898"/>
+          </a:xfrm>
+        </p:spPr>
+        <p:txBody>
+          <a:bodyPr>
+            <a:normAutofit/>
+          </a:bodyPr>
+          <a:lstStyle/>
+          <a:p>
+            <a:r>
+              <a:rPr lang="en-US" sz="5400" b="1" dirty="0" err="1"/>
+              <a:t>Infrastructura</a:t>
+            </a:r>
+            <a:r>
+              <a:rPr lang="en-US" sz="5400" b="1" dirty="0"/>
+              <a:t> </a:t>
+            </a:r>
+            <a:r>
+              <a:rPr lang="en-US" sz="5400" b="1" dirty="0" err="1" smtClean="0"/>
+              <a:t>folosita</a:t>
+            </a:r>
+            <a:r>
+              <a:rPr lang="en-US" sz="5400" b="1" dirty="0" smtClean="0"/>
+              <a:t/>
+            </a:r>
+            <a:br>
+              <a:rPr lang="en-US" sz="5400" b="1" dirty="0" smtClean="0"/>
+            </a:br>
+            <a:endParaRPr lang="en-US" dirty="0"/>
+          </a:p>
+        </p:txBody>
+      </p:sp>
+      <p:sp>
+        <p:nvSpPr>
+          <p:cNvPr id="2" name="Subtitle 1"/>
+          <p:cNvSpPr>
+            <a:spLocks noGrp="1"/>
+          </p:cNvSpPr>
+          <p:nvPr>
+            <p:ph type="subTitle" idx="1"/>
+          </p:nvPr>
+        </p:nvSpPr>
+        <p:spPr>
+          <a:xfrm>
+            <a:off x="508000" y="1905000"/>
+            <a:ext cx="9067800" cy="1828800"/>
+          </a:xfrm>
+        </p:spPr>
+        <p:txBody>
+          <a:bodyPr>
+            <a:normAutofit/>
+          </a:bodyPr>
+          <a:lstStyle/>
+          <a:p>
+            <a:r>
+              <a:rPr lang="en-US" sz="3200" b="1" dirty="0" err="1"/>
+              <a:t>JTransformer</a:t>
+            </a:r>
+            <a:r>
+              <a:rPr lang="en-US" sz="2400" b="1" dirty="0"/>
+              <a:t> </a:t>
+            </a:r>
+            <a:r>
+              <a:rPr lang="en-US" sz="2400" b="1" dirty="0" smtClean="0"/>
+              <a:t>: plugin eclipse care </a:t>
+            </a:r>
+            <a:r>
+              <a:rPr lang="en-US" sz="2400" b="1" dirty="0" err="1" smtClean="0"/>
+              <a:t>transforma</a:t>
+            </a:r>
+            <a:r>
+              <a:rPr lang="en-US" sz="2400" b="1" dirty="0" smtClean="0"/>
+              <a:t> </a:t>
+            </a:r>
+            <a:r>
+              <a:rPr lang="en-US" sz="2400" b="1" dirty="0" err="1"/>
+              <a:t>codul</a:t>
+            </a:r>
+            <a:r>
+              <a:rPr lang="en-US" sz="2400" b="1" dirty="0"/>
+              <a:t> </a:t>
+            </a:r>
+            <a:r>
+              <a:rPr lang="en-US" sz="2400" b="1" dirty="0" err="1"/>
+              <a:t>sursa</a:t>
+            </a:r>
+            <a:r>
+              <a:rPr lang="en-US" sz="2400" b="1" dirty="0"/>
+              <a:t> </a:t>
+            </a:r>
+            <a:r>
+              <a:rPr lang="en-US" sz="2400" b="1" dirty="0" smtClean="0"/>
+              <a:t>Java </a:t>
+            </a:r>
+            <a:r>
+              <a:rPr lang="en-US" sz="2400" b="1" dirty="0" err="1" smtClean="0"/>
+              <a:t>intr</a:t>
+            </a:r>
+            <a:r>
+              <a:rPr lang="en-US" sz="2400" b="1" dirty="0" smtClean="0"/>
+              <a:t>-un arbore </a:t>
+            </a:r>
+            <a:r>
+              <a:rPr lang="en-US" sz="2400" b="1" dirty="0" err="1" smtClean="0"/>
+              <a:t>sintactic</a:t>
+            </a:r>
+            <a:r>
+              <a:rPr lang="en-US" sz="2400" b="1" dirty="0" smtClean="0"/>
+              <a:t> abstract(AST) </a:t>
+            </a:r>
+            <a:r>
+              <a:rPr lang="en-US" sz="2400" b="1" dirty="0" err="1" smtClean="0"/>
+              <a:t>memorat</a:t>
+            </a:r>
+            <a:r>
+              <a:rPr lang="en-US" sz="2400" b="1" dirty="0" smtClean="0"/>
+              <a:t> sub forma de  </a:t>
+            </a:r>
+            <a:r>
+              <a:rPr lang="en-US" sz="2400" b="1" dirty="0" err="1"/>
+              <a:t>clauze</a:t>
+            </a:r>
+            <a:r>
+              <a:rPr lang="en-US" sz="2400" b="1" dirty="0"/>
+              <a:t> Prolog. </a:t>
+            </a:r>
+            <a:br>
+              <a:rPr lang="en-US" sz="2400" b="1" dirty="0"/>
+            </a:br>
+            <a:endParaRPr lang="en-US" sz="2400" b="1" dirty="0"/>
+          </a:p>
+          <a:p>
+            <a:endParaRPr lang="en-US" dirty="0"/>
+          </a:p>
+        </p:txBody>
+      </p:sp>
+      <p:pic>
+        <p:nvPicPr>
+          <p:cNvPr id="2050" name="Picture 2"/>
+          <p:cNvPicPr>
+            <a:picLocks noGrp="1" noChangeAspect="1" noChangeArrowheads="1"/>
+          </p:cNvPicPr>
+          <p:nvPr>
+            <p:ph idx="4294967295"/>
+          </p:nvPr>
+        </p:nvPicPr>
+        <p:blipFill>
+          <a:blip r:embed="rId2">
+            <a:extLst>
+              <a:ext uri="{28A0092B-C50C-407E-A947-70E740481C1C}">
+                <a14:useLocalDpi xmlns:a14="http://schemas.microsoft.com/office/drawing/2010/main" val="0"/>
+              </a:ext>
+            </a:extLst>
+          </a:blip>
+          <a:srcRect/>
+          <a:stretch>
+            <a:fillRect/>
+          </a:stretch>
+        </p:blipFill>
+        <p:spPr bwMode="auto">
+          <a:xfrm>
+            <a:off x="507999" y="3429000"/>
+            <a:ext cx="9220201" cy="3733800"/>
+          </a:xfrm>
+          <a:prstGeom prst="rect">
+            <a:avLst/>
+          </a:prstGeom>
+          <a:noFill/>
+          <a:ln>
+            <a:noFill/>
+          </a:ln>
+          <a:effectLst/>
+          <a:extLst>
+            <a:ext uri="{909E8E84-426E-40DD-AFC4-6F175D3DCCD1}">
+              <a14:hiddenFill xmlns:a14="http://schemas.microsoft.com/office/drawing/2010/main">
+                <a:solidFill>
+                  <a:schemeClr val="accent1"/>
+                </a:solidFill>
+              </a14:hiddenFill>
+            </a:ext>
+            <a:ext uri="{91240B29-F687-4F45-9708-019B960494DF}">
+              <a14:hiddenLine xmlns:a14="http://schemas.microsoft.com/office/drawing/2010/main" w="9525">
+                <a:solidFill>
+                  <a:schemeClr val="tx1"/>
+                </a:solidFill>
+                <a:miter lim="800000"/>
+                <a:headEnd/>
+                <a:tailEnd/>
+              </a14:hiddenLine>
+            </a:ext>
+            <a:ext uri="{AF507438-7753-43E0-B8FC-AC1667EBCBE1}">
+              <a14:hiddenEffects xmlns:a14="http://schemas.microsoft.com/office/drawing/2010/main">
+                <a:effectLst>
+                  <a:outerShdw dist="35921" dir="2700000" algn="ctr" rotWithShape="0">
+                    <a:schemeClr val="bg2"/>
+                  </a:outerShdw>
+                </a:effectLst>
+              </a14:hiddenEffects>
+            </a:ext>
+          </a:extLst>
+        </p:spPr>
+      </p:pic>
+    </p:spTree>
+    <p:extLst>
+      <p:ext uri="{BB962C8B-B14F-4D97-AF65-F5344CB8AC3E}">
+        <p14:creationId xmlns:p14="http://schemas.microsoft.com/office/powerpoint/2010/main" val="2222133860"/>
+      </p:ext>
+    </p:extLst>
+  </p:cSld>
+  <p:clrMapOvr>
+    <a:masterClrMapping/>
+  </p:clrMapOvr>
+  <p:timing>
+    <p:tnLst>
+      <p:par>
+        <p:cTn id="1" dur="indefinite" restart="never" nodeType="tmRoot"/>
+      </p:par>
+    </p:tnLst>
+  </p:timing>
+</p:sld>
+</file>
+
+<file path=ppt/slides/slide7.xml><?xml version="1.0" encoding="utf-8"?>
+<p:sld xmlns:a="http://schemas.openxmlformats.org/drawingml/2006/main" xmlns:r="http://schemas.openxmlformats.org/officeDocument/2006/relationships" xmlns:p="http://schemas.openxmlformats.org/presentationml/2006/main">
+  <p:cSld>
+    <p:spTree>
+      <p:nvGrpSpPr>
+        <p:cNvPr id="1" name=""/>
+        <p:cNvGrpSpPr/>
+        <p:nvPr/>
+      </p:nvGrpSpPr>
+      <p:grpSpPr>
+        <a:xfrm>
+          <a:off x="0" y="0"/>
+          <a:ext cx="0" cy="0"/>
+          <a:chOff x="0" y="0"/>
+          <a:chExt cx="0" cy="0"/>
+        </a:xfrm>
+      </p:grpSpPr>
+      <p:sp>
+        <p:nvSpPr>
+          <p:cNvPr id="2" name="Content Placeholder 1"/>
+          <p:cNvSpPr>
+            <a:spLocks noGrp="1"/>
+          </p:cNvSpPr>
+          <p:nvPr>
+            <p:ph idx="1"/>
+          </p:nvPr>
+        </p:nvSpPr>
+        <p:spPr/>
+        <p:txBody>
+          <a:bodyPr/>
+          <a:lstStyle/>
+          <a:p>
+            <a:endParaRPr lang="en-US"/>
+          </a:p>
+        </p:txBody>
+      </p:sp>
+      <p:sp>
+        <p:nvSpPr>
+          <p:cNvPr id="3" name="Title 2"/>
+          <p:cNvSpPr>
+            <a:spLocks noGrp="1"/>
+          </p:cNvSpPr>
+          <p:nvPr>
+            <p:ph type="title"/>
+          </p:nvPr>
+        </p:nvSpPr>
+        <p:spPr/>
+        <p:txBody>
+          <a:bodyPr/>
+          <a:lstStyle/>
+          <a:p>
+            <a:r>
+              <a:rPr lang="en-US" dirty="0" err="1" smtClean="0"/>
+              <a:t>Arhitectura</a:t>
+            </a:r>
+            <a:r>
+              <a:rPr lang="en-US" dirty="0" smtClean="0"/>
+              <a:t> </a:t>
+            </a:r>
+            <a:r>
+              <a:rPr lang="en-US" dirty="0" err="1" smtClean="0"/>
+              <a:t>generala</a:t>
+            </a:r>
+            <a:r>
+              <a:rPr lang="en-US" dirty="0" smtClean="0"/>
+              <a:t> a </a:t>
+            </a:r>
+            <a:r>
+              <a:rPr lang="en-US" smtClean="0"/>
+              <a:t>sistemului</a:t>
+            </a:r>
+            <a:endParaRPr lang="en-US"/>
+          </a:p>
+        </p:txBody>
+      </p:sp>
+    </p:spTree>
+    <p:extLst>
+      <p:ext uri="{BB962C8B-B14F-4D97-AF65-F5344CB8AC3E}">
+        <p14:creationId xmlns:p14="http://schemas.microsoft.com/office/powerpoint/2010/main" val="1050971327"/>
+      </p:ext>
+    </p:extLst>
+  </p:cSld>
+  <p:clrMapOvr>
+    <a:masterClrMapping/>
+  </p:clrMapOvr>
+</p:sld>
+</file>
+
+<file path=ppt/slides/slide8.xml><?xml version="1.0" encoding="utf-8"?>
+<p:sld xmlns:a="http://schemas.openxmlformats.org/drawingml/2006/main" xmlns:r="http://schemas.openxmlformats.org/officeDocument/2006/relationships" xmlns:p="http://schemas.openxmlformats.org/presentationml/2006/main">
+  <p:cSld>
+    <p:spTree>
+      <p:nvGrpSpPr>
+        <p:cNvPr id="1" name=""/>
+        <p:cNvGrpSpPr/>
+        <p:nvPr/>
+      </p:nvGrpSpPr>
+      <p:grpSpPr>
+        <a:xfrm>
+          <a:off x="0" y="0"/>
+          <a:ext cx="0" cy="0"/>
+          <a:chOff x="0" y="0"/>
+          <a:chExt cx="0" cy="0"/>
+        </a:xfrm>
+      </p:grpSpPr>
+      <p:sp>
+        <p:nvSpPr>
+          <p:cNvPr id="3" name="Title 2"/>
+          <p:cNvSpPr>
+            <a:spLocks noGrp="1"/>
+          </p:cNvSpPr>
+          <p:nvPr>
+            <p:ph type="title"/>
+          </p:nvPr>
+        </p:nvSpPr>
+        <p:spPr/>
+        <p:txBody>
+          <a:bodyPr>
+            <a:normAutofit/>
+          </a:bodyPr>
+          <a:lstStyle/>
+          <a:p>
+            <a:r>
+              <a:rPr lang="en-US" dirty="0" err="1" smtClean="0"/>
+              <a:t>Metrici</a:t>
+            </a:r>
+            <a:r>
+              <a:rPr lang="en-US" dirty="0" smtClean="0"/>
+              <a:t> </a:t>
+            </a:r>
+            <a:r>
+              <a:rPr lang="en-US" dirty="0" err="1" smtClean="0"/>
+              <a:t>folosite</a:t>
+            </a:r>
+            <a:endParaRPr lang="en-US" dirty="0"/>
+          </a:p>
+        </p:txBody>
+      </p:sp>
+    </p:spTree>
+    <p:extLst>
+      <p:ext uri="{BB962C8B-B14F-4D97-AF65-F5344CB8AC3E}">
+        <p14:creationId xmlns:p14="http://schemas.microsoft.com/office/powerpoint/2010/main" val="4042004580"/>
+      </p:ext>
+    </p:extLst>
+  </p:cSld>
+  <p:clrMapOvr>
+    <a:masterClrMapping/>
+  </p:clrMapOvr>
+  <p:timing>
+    <p:tnLst>
+      <p:par>
+        <p:cTn id="1" dur="indefinite" restart="never" nodeType="tmRoot"/>
+      </p:par>
+    </p:tnLst>
+  </p:timing>
+</p:sld>
+</file>
+
+<file path=ppt/slides/slide9.xml><?xml version="1.0" encoding="utf-8"?>
+<p:sld xmlns:a="http://schemas.openxmlformats.org/drawingml/2006/main" xmlns:r="http://schemas.openxmlformats.org/officeDocument/2006/relationships" xmlns:p="http://schemas.openxmlformats.org/presentationml/2006/main">
+  <p:cSld>
+    <p:spTree>
+      <p:nvGrpSpPr>
+        <p:cNvPr id="1" name=""/>
+        <p:cNvGrpSpPr/>
+        <p:nvPr/>
+      </p:nvGrpSpPr>
+      <p:grpSpPr>
+        <a:xfrm>
+          <a:off x="0" y="0"/>
+          <a:ext cx="0" cy="0"/>
+          <a:chOff x="0" y="0"/>
+          <a:chExt cx="0" cy="0"/>
+        </a:xfrm>
+      </p:grpSpPr>
+      <p:sp>
+        <p:nvSpPr>
+          <p:cNvPr id="3" name="Title 2"/>
           <p:cNvSpPr>
             <a:spLocks noGrp="1"/>
           </p:cNvSpPr>
@@ -16306,32 +20675,202 @@
       </p:sp>
       <p:sp>
         <p:nvSpPr>
-          <p:cNvPr id="5" name="Text Placeholder 4"/>
-          <p:cNvSpPr>
-            <a:spLocks noGrp="1"/>
-          </p:cNvSpPr>
-          <p:nvPr>
-            <p:ph type="body" idx="1"/>
-          </p:nvPr>
+          <p:cNvPr id="4" name="Rectangle 3"/>
+          <p:cNvSpPr/>
+          <p:nvPr/>
         </p:nvSpPr>
         <p:spPr>
           <a:xfrm>
-            <a:off x="660400" y="1676400"/>
-            <a:ext cx="7130816" cy="1044223"/>
+            <a:off x="629138" y="2895600"/>
+            <a:ext cx="5365262" cy="3276600"/>
           </a:xfrm>
+          <a:prstGeom prst="rect">
+            <a:avLst/>
+          </a:prstGeom>
         </p:spPr>
+        <p:style>
+          <a:lnRef idx="2">
+            <a:schemeClr val="accent1">
+              <a:shade val="50000"/>
+            </a:schemeClr>
+          </a:lnRef>
+          <a:fillRef idx="1">
+            <a:schemeClr val="accent1"/>
+          </a:fillRef>
+          <a:effectRef idx="0">
+            <a:schemeClr val="accent1"/>
+          </a:effectRef>
+          <a:fontRef idx="minor">
+            <a:schemeClr val="lt1"/>
+          </a:fontRef>
+        </p:style>
         <p:txBody>
-          <a:bodyPr/>
+          <a:bodyPr rtlCol="0" anchor="ctr"/>
           <a:lstStyle/>
           <a:p>
+            <a:pPr algn="ctr"/>
+            <a:r>
+              <a:rPr lang="en-US" sz="3200" b="1" dirty="0" err="1" smtClean="0"/>
+              <a:t>Metrici</a:t>
+            </a:r>
+            <a:r>
+              <a:rPr lang="en-US" sz="3200" b="1" dirty="0" smtClean="0"/>
+              <a:t> la </a:t>
+            </a:r>
+            <a:r>
+              <a:rPr lang="en-US" sz="3200" b="1" dirty="0" err="1" smtClean="0"/>
+              <a:t>nivel</a:t>
+            </a:r>
+            <a:r>
+              <a:rPr lang="en-US" sz="3200" b="1" dirty="0" smtClean="0"/>
+              <a:t> de </a:t>
+            </a:r>
+            <a:r>
+              <a:rPr lang="en-US" sz="3200" b="1" dirty="0" err="1" smtClean="0"/>
+              <a:t>clasa</a:t>
+            </a:r>
+            <a:endParaRPr lang="en-US" sz="3200" b="1" dirty="0" smtClean="0"/>
+          </a:p>
+          <a:p>
+            <a:pPr marL="342900" indent="-342900">
+              <a:buFontTx/>
+              <a:buChar char="-"/>
+            </a:pPr>
+            <a:r>
+              <a:rPr lang="en-US" dirty="0" err="1" smtClean="0"/>
+              <a:t>Numar</a:t>
+            </a:r>
+            <a:r>
+              <a:rPr lang="en-US" dirty="0" smtClean="0"/>
+              <a:t> </a:t>
+            </a:r>
+            <a:r>
+              <a:rPr lang="en-US" dirty="0" err="1" smtClean="0"/>
+              <a:t>metode</a:t>
+            </a:r>
+            <a:endParaRPr lang="en-US" dirty="0" smtClean="0"/>
+          </a:p>
+          <a:p>
+            <a:pPr marL="342900" indent="-342900">
+              <a:buFontTx/>
+              <a:buChar char="-"/>
+            </a:pPr>
+            <a:r>
+              <a:rPr lang="en-US" dirty="0" err="1" smtClean="0"/>
+              <a:t>Numar</a:t>
+            </a:r>
+            <a:r>
+              <a:rPr lang="en-US" dirty="0" smtClean="0"/>
+              <a:t> </a:t>
+            </a:r>
+            <a:r>
+              <a:rPr lang="en-US" dirty="0" err="1" smtClean="0"/>
+              <a:t>atribute</a:t>
+            </a:r>
+            <a:endParaRPr lang="en-US" dirty="0" smtClean="0"/>
+          </a:p>
+          <a:p>
+            <a:pPr marL="342900" indent="-342900">
+              <a:buFontTx/>
+              <a:buChar char="-"/>
+            </a:pPr>
+            <a:r>
+              <a:rPr lang="en-US" dirty="0" err="1" smtClean="0"/>
+              <a:t>Numar</a:t>
+            </a:r>
+            <a:r>
+              <a:rPr lang="en-US" dirty="0" smtClean="0"/>
+              <a:t> </a:t>
+            </a:r>
+            <a:r>
+              <a:rPr lang="en-US" dirty="0" err="1" smtClean="0"/>
+              <a:t>intefere</a:t>
+            </a:r>
+            <a:endParaRPr lang="en-US" dirty="0" smtClean="0"/>
+          </a:p>
+          <a:p>
+            <a:pPr marL="342900" indent="-342900">
+              <a:buFontTx/>
+              <a:buChar char="-"/>
+            </a:pPr>
+            <a:r>
+              <a:rPr lang="en-US" dirty="0" err="1" smtClean="0"/>
+              <a:t>Exista</a:t>
+            </a:r>
+            <a:r>
+              <a:rPr lang="en-US" dirty="0" smtClean="0"/>
+              <a:t> </a:t>
+            </a:r>
+            <a:r>
+              <a:rPr lang="en-US" dirty="0" err="1" smtClean="0"/>
+              <a:t>superclasa</a:t>
+            </a:r>
+            <a:endParaRPr lang="en-US" dirty="0" smtClean="0"/>
+          </a:p>
+          <a:p>
+            <a:pPr marL="342900" indent="-342900">
+              <a:buFontTx/>
+              <a:buChar char="-"/>
+            </a:pPr>
+            <a:r>
+              <a:rPr lang="en-US" dirty="0" err="1" smtClean="0"/>
+              <a:t>Interfata</a:t>
+            </a:r>
+            <a:endParaRPr lang="en-US" dirty="0" smtClean="0"/>
+          </a:p>
+          <a:p>
+            <a:pPr marL="342900" indent="-342900">
+              <a:buFontTx/>
+              <a:buChar char="-"/>
+            </a:pPr>
             <a:endParaRPr lang="en-US" dirty="0"/>
+          </a:p>
+        </p:txBody>
+      </p:sp>
+      <p:sp>
+        <p:nvSpPr>
+          <p:cNvPr id="5" name="Rectangle 4"/>
+          <p:cNvSpPr/>
+          <p:nvPr/>
+        </p:nvSpPr>
+        <p:spPr>
+          <a:xfrm>
+            <a:off x="7213600" y="3352800"/>
+            <a:ext cx="1981200" cy="1066800"/>
+          </a:xfrm>
+          <a:prstGeom prst="rect">
+            <a:avLst/>
+          </a:prstGeom>
+        </p:spPr>
+        <p:style>
+          <a:lnRef idx="2">
+            <a:schemeClr val="accent1">
+              <a:shade val="50000"/>
+            </a:schemeClr>
+          </a:lnRef>
+          <a:fillRef idx="1">
+            <a:schemeClr val="accent1"/>
+          </a:fillRef>
+          <a:effectRef idx="0">
+            <a:schemeClr val="accent1"/>
+          </a:effectRef>
+          <a:fontRef idx="minor">
+            <a:schemeClr val="lt1"/>
+          </a:fontRef>
+        </p:style>
+        <p:txBody>
+          <a:bodyPr rtlCol="0" anchor="ctr"/>
+          <a:lstStyle/>
+          <a:p>
+            <a:pPr algn="ctr"/>
+            <a:endParaRPr lang="en-US"/>
           </a:p>
         </p:txBody>
       </p:sp>
     </p:spTree>
     <p:extLst>
       <p:ext uri="{BB962C8B-B14F-4D97-AF65-F5344CB8AC3E}">
-        <p14:creationId xmlns:p14="http://schemas.microsoft.com/office/powerpoint/2010/main" val="3855558671"/>
+        <p14:creationId xmlns:p14="http://schemas.microsoft.com/office/powerpoint/2010/main" val="3766395362"/>
       </p:ext>
     </p:extLst>
   </p:cSld>

</xml_diff>

<commit_message>
Prezentare licenta.pptx inainte de feedback sora
</commit_message>
<xml_diff>
--- a/doc/Prezentare licenta.pptx
+++ b/doc/Prezentare licenta.pptx
@@ -5,7 +5,7 @@
     <p:sldMasterId id="2147484824" r:id="rId1"/>
   </p:sldMasterIdLst>
   <p:notesMasterIdLst>
-    <p:notesMasterId r:id="rId16"/>
+    <p:notesMasterId r:id="rId15"/>
   </p:notesMasterIdLst>
   <p:sldIdLst>
     <p:sldId id="256" r:id="rId2"/>
@@ -16,12 +16,11 @@
     <p:sldId id="261" r:id="rId7"/>
     <p:sldId id="269" r:id="rId8"/>
     <p:sldId id="262" r:id="rId9"/>
-    <p:sldId id="263" r:id="rId10"/>
-    <p:sldId id="266" r:id="rId11"/>
-    <p:sldId id="267" r:id="rId12"/>
-    <p:sldId id="264" r:id="rId13"/>
-    <p:sldId id="268" r:id="rId14"/>
-    <p:sldId id="265" r:id="rId15"/>
+    <p:sldId id="266" r:id="rId10"/>
+    <p:sldId id="267" r:id="rId11"/>
+    <p:sldId id="264" r:id="rId12"/>
+    <p:sldId id="268" r:id="rId13"/>
+    <p:sldId id="265" r:id="rId14"/>
   </p:sldIdLst>
   <p:sldSz cx="10160000" cy="7620000"/>
   <p:notesSz cx="6858000" cy="9144000"/>
@@ -163,7 +162,6 @@
             <p14:sldId id="261"/>
             <p14:sldId id="269"/>
             <p14:sldId id="262"/>
-            <p14:sldId id="263"/>
             <p14:sldId id="266"/>
             <p14:sldId id="267"/>
             <p14:sldId id="264"/>
@@ -16541,6 +16539,187 @@
       </p:grpSpPr>
       <p:sp>
         <p:nvSpPr>
+          <p:cNvPr id="2" name="Content Placeholder 1"/>
+          <p:cNvSpPr>
+            <a:spLocks noGrp="1"/>
+          </p:cNvSpPr>
+          <p:nvPr>
+            <p:ph idx="1"/>
+          </p:nvPr>
+        </p:nvSpPr>
+        <p:spPr>
+          <a:xfrm>
+            <a:off x="431800" y="2972741"/>
+            <a:ext cx="9067800" cy="2970859"/>
+          </a:xfrm>
+        </p:spPr>
+        <p:txBody>
+          <a:bodyPr>
+            <a:normAutofit fontScale="92500" lnSpcReduction="20000"/>
+          </a:bodyPr>
+          <a:lstStyle/>
+          <a:p>
+            <a:pPr>
+              <a:lnSpc>
+                <a:spcPct val="150000"/>
+              </a:lnSpc>
+            </a:pPr>
+            <a:r>
+              <a:rPr lang="en-US" sz="2800" dirty="0" err="1" smtClean="0"/>
+              <a:t>Analizarea</a:t>
+            </a:r>
+            <a:r>
+              <a:rPr lang="en-US" sz="2800" dirty="0" smtClean="0"/>
+              <a:t> </a:t>
+            </a:r>
+            <a:r>
+              <a:rPr lang="en-US" sz="2800" dirty="0" err="1" smtClean="0"/>
+              <a:t>unui</a:t>
+            </a:r>
+            <a:r>
+              <a:rPr lang="en-US" sz="2800" dirty="0" smtClean="0"/>
+              <a:t> set de </a:t>
+            </a:r>
+            <a:r>
+              <a:rPr lang="en-US" sz="2800" dirty="0" err="1" smtClean="0"/>
+              <a:t>teme</a:t>
+            </a:r>
+            <a:r>
+              <a:rPr lang="en-US" sz="2800" dirty="0" smtClean="0"/>
+              <a:t> de la </a:t>
+            </a:r>
+            <a:r>
+              <a:rPr lang="en-US" sz="2800" dirty="0" err="1" smtClean="0"/>
+              <a:t>laboratorul</a:t>
+            </a:r>
+            <a:r>
+              <a:rPr lang="en-US" sz="2800" dirty="0" smtClean="0"/>
+              <a:t> de </a:t>
+            </a:r>
+            <a:r>
+              <a:rPr lang="en-US" sz="2800" dirty="0" err="1" smtClean="0"/>
+              <a:t>PASSC</a:t>
+            </a:r>
+            <a:r>
+              <a:rPr lang="en-US" sz="2800" dirty="0"/>
+              <a:t>:</a:t>
+            </a:r>
+            <a:endParaRPr lang="en-US" sz="2800" dirty="0" smtClean="0"/>
+          </a:p>
+          <a:p>
+            <a:pPr lvl="1">
+              <a:lnSpc>
+                <a:spcPct val="150000"/>
+              </a:lnSpc>
+              <a:buFont typeface="Wingdings" pitchFamily="2" charset="2"/>
+              <a:buChar char="§"/>
+            </a:pPr>
+            <a:r>
+              <a:rPr lang="en-US" sz="2800" dirty="0" smtClean="0"/>
+              <a:t>16 </a:t>
+            </a:r>
+            <a:r>
+              <a:rPr lang="en-US" sz="2800" dirty="0" err="1" smtClean="0"/>
+              <a:t>proiecte</a:t>
+            </a:r>
+            <a:r>
+              <a:rPr lang="en-US" sz="2800" dirty="0" smtClean="0"/>
+              <a:t> </a:t>
+            </a:r>
+            <a:r>
+              <a:rPr lang="en-US" sz="2800" dirty="0" err="1" smtClean="0"/>
+              <a:t>comparate</a:t>
+            </a:r>
+            <a:endParaRPr lang="en-US" sz="2800" dirty="0" smtClean="0"/>
+          </a:p>
+          <a:p>
+            <a:pPr lvl="1">
+              <a:lnSpc>
+                <a:spcPct val="150000"/>
+              </a:lnSpc>
+              <a:buFont typeface="Wingdings" pitchFamily="2" charset="2"/>
+              <a:buChar char="§"/>
+            </a:pPr>
+            <a:r>
+              <a:rPr lang="en-US" sz="2800" dirty="0"/>
+              <a:t>120 de </a:t>
+            </a:r>
+            <a:r>
+              <a:rPr lang="en-US" sz="2800" dirty="0" err="1" smtClean="0"/>
+              <a:t>parechi</a:t>
+            </a:r>
+            <a:r>
+              <a:rPr lang="en-US" sz="2800" dirty="0" smtClean="0"/>
+              <a:t> de </a:t>
+            </a:r>
+            <a:r>
+              <a:rPr lang="en-US" sz="2800" dirty="0" err="1" smtClean="0"/>
+              <a:t>cate</a:t>
+            </a:r>
+            <a:r>
+              <a:rPr lang="en-US" sz="2800" dirty="0" smtClean="0"/>
+              <a:t> 2 </a:t>
+            </a:r>
+            <a:r>
+              <a:rPr lang="en-US" sz="2800" dirty="0" err="1" smtClean="0"/>
+              <a:t>proiecte</a:t>
+            </a:r>
+            <a:r>
+              <a:rPr lang="en-US" sz="2800" dirty="0" smtClean="0"/>
+              <a:t> </a:t>
+            </a:r>
+            <a:r>
+              <a:rPr lang="en-US" sz="2800" dirty="0" err="1" smtClean="0"/>
+              <a:t>analizate</a:t>
+            </a:r>
+            <a:r>
+              <a:rPr lang="en-US" sz="2800" dirty="0" smtClean="0"/>
+              <a:t> in 21  de </a:t>
+            </a:r>
+            <a:r>
+              <a:rPr lang="en-US" sz="2800" dirty="0" err="1" smtClean="0"/>
+              <a:t>secunde</a:t>
+            </a:r>
+            <a:endParaRPr lang="en-US" sz="2800" dirty="0"/>
+          </a:p>
+          <a:p>
+            <a:pPr lvl="1">
+              <a:lnSpc>
+                <a:spcPct val="150000"/>
+              </a:lnSpc>
+              <a:buFont typeface="Wingdings" pitchFamily="2" charset="2"/>
+              <a:buChar char="§"/>
+            </a:pPr>
+            <a:r>
+              <a:rPr lang="en-US" sz="2800" dirty="0" err="1"/>
+              <a:t>d</a:t>
+            </a:r>
+            <a:r>
+              <a:rPr lang="en-US" sz="2800" dirty="0" err="1" smtClean="0"/>
+              <a:t>epistate</a:t>
+            </a:r>
+            <a:r>
+              <a:rPr lang="en-US" sz="2800" dirty="0" smtClean="0"/>
+              <a:t> 2 </a:t>
+            </a:r>
+            <a:r>
+              <a:rPr lang="en-US" sz="2800" dirty="0" err="1" smtClean="0"/>
+              <a:t>proiecte</a:t>
+            </a:r>
+            <a:r>
+              <a:rPr lang="en-US" sz="2800" dirty="0" smtClean="0"/>
+              <a:t> </a:t>
+            </a:r>
+            <a:r>
+              <a:rPr lang="en-US" sz="2800" dirty="0" err="1" smtClean="0"/>
+              <a:t>copiate</a:t>
+            </a:r>
+            <a:endParaRPr lang="en-US" sz="2800" dirty="0" smtClean="0"/>
+          </a:p>
+        </p:txBody>
+      </p:sp>
+      <p:sp>
+        <p:nvSpPr>
           <p:cNvPr id="3" name="Title 2"/>
           <p:cNvSpPr>
             <a:spLocks noGrp="1"/>
@@ -16562,731 +16741,10 @@
           </a:p>
         </p:txBody>
       </p:sp>
-      <p:graphicFrame>
-        <p:nvGraphicFramePr>
-          <p:cNvPr id="4" name="Table 3"/>
-          <p:cNvGraphicFramePr>
-            <a:graphicFrameLocks noGrp="1"/>
-          </p:cNvGraphicFramePr>
-          <p:nvPr>
-            <p:extLst>
-              <p:ext uri="{D42A27DB-BD31-4B8C-83A1-F6EECF244321}">
-                <p14:modId xmlns:p14="http://schemas.microsoft.com/office/powerpoint/2010/main" val="1393218420"/>
-              </p:ext>
-            </p:extLst>
-          </p:nvPr>
-        </p:nvGraphicFramePr>
-        <p:xfrm>
-          <a:off x="660400" y="2514600"/>
-          <a:ext cx="4114800" cy="3733800"/>
-        </p:xfrm>
-        <a:graphic>
-          <a:graphicData uri="http://schemas.openxmlformats.org/drawingml/2006/table">
-            <a:tbl>
-              <a:tblPr firstRow="1" firstCol="1" bandRow="1">
-                <a:tableStyleId>{5C22544A-7EE6-4342-B048-85BDC9FD1C3A}</a:tableStyleId>
-              </a:tblPr>
-              <a:tblGrid>
-                <a:gridCol w="1616122"/>
-                <a:gridCol w="1458173"/>
-                <a:gridCol w="1040505"/>
-              </a:tblGrid>
-              <a:tr h="434937">
-                <a:tc>
-                  <a:txBody>
-                    <a:bodyPr/>
-                    <a:lstStyle/>
-                    <a:p>
-                      <a:pPr marL="0" marR="0" algn="ctr">
-                        <a:spcBef>
-                          <a:spcPts val="0"/>
-                        </a:spcBef>
-                        <a:spcAft>
-                          <a:spcPts val="0"/>
-                        </a:spcAft>
-                      </a:pPr>
-                      <a:r>
-                        <a:rPr lang="en-US" sz="1200">
-                          <a:effectLst/>
-                        </a:rPr>
-                        <a:t>Caz de test</a:t>
-                      </a:r>
-                      <a:endParaRPr lang="en-US" sz="1000">
-                        <a:effectLst/>
-                        <a:latin typeface="Times New Roman"/>
-                        <a:ea typeface="Times New Roman"/>
-                      </a:endParaRPr>
-                    </a:p>
-                  </a:txBody>
-                  <a:tcPr marL="68580" marR="68580" marT="0" marB="0"/>
-                </a:tc>
-                <a:tc>
-                  <a:txBody>
-                    <a:bodyPr/>
-                    <a:lstStyle/>
-                    <a:p>
-                      <a:pPr marL="0" marR="0" algn="ctr">
-                        <a:spcBef>
-                          <a:spcPts val="0"/>
-                        </a:spcBef>
-                        <a:spcAft>
-                          <a:spcPts val="0"/>
-                        </a:spcAft>
-                      </a:pPr>
-                      <a:r>
-                        <a:rPr lang="en-US" sz="1200">
-                          <a:effectLst/>
-                        </a:rPr>
-                        <a:t>CloneDetector</a:t>
-                      </a:r>
-                      <a:endParaRPr lang="en-US" sz="1000">
-                        <a:effectLst/>
-                        <a:latin typeface="Times New Roman"/>
-                        <a:ea typeface="Times New Roman"/>
-                      </a:endParaRPr>
-                    </a:p>
-                  </a:txBody>
-                  <a:tcPr marL="68580" marR="68580" marT="0" marB="0"/>
-                </a:tc>
-                <a:tc>
-                  <a:txBody>
-                    <a:bodyPr/>
-                    <a:lstStyle/>
-                    <a:p>
-                      <a:pPr marL="0" marR="0" algn="ctr">
-                        <a:spcBef>
-                          <a:spcPts val="0"/>
-                        </a:spcBef>
-                        <a:spcAft>
-                          <a:spcPts val="0"/>
-                        </a:spcAft>
-                      </a:pPr>
-                      <a:r>
-                        <a:rPr lang="en-US" sz="1200">
-                          <a:effectLst/>
-                        </a:rPr>
-                        <a:t>Dude</a:t>
-                      </a:r>
-                      <a:endParaRPr lang="en-US" sz="1000">
-                        <a:effectLst/>
-                        <a:latin typeface="Times New Roman"/>
-                        <a:ea typeface="Times New Roman"/>
-                      </a:endParaRPr>
-                    </a:p>
-                  </a:txBody>
-                  <a:tcPr marL="68580" marR="68580" marT="0" marB="0"/>
-                </a:tc>
-              </a:tr>
-              <a:tr h="306777">
-                <a:tc>
-                  <a:txBody>
-                    <a:bodyPr/>
-                    <a:lstStyle/>
-                    <a:p>
-                      <a:pPr marL="0" marR="0">
-                        <a:spcBef>
-                          <a:spcPts val="0"/>
-                        </a:spcBef>
-                        <a:spcAft>
-                          <a:spcPts val="0"/>
-                        </a:spcAft>
-                      </a:pPr>
-                      <a:r>
-                        <a:rPr lang="en-US" sz="1000">
-                          <a:effectLst/>
-                        </a:rPr>
-                        <a:t>Clona tipul 1</a:t>
-                      </a:r>
-                      <a:endParaRPr lang="en-US" sz="1000">
-                        <a:effectLst/>
-                        <a:latin typeface="Times New Roman"/>
-                        <a:ea typeface="Times New Roman"/>
-                      </a:endParaRPr>
-                    </a:p>
-                  </a:txBody>
-                  <a:tcPr marL="68580" marR="68580" marT="0" marB="0"/>
-                </a:tc>
-                <a:tc>
-                  <a:txBody>
-                    <a:bodyPr/>
-                    <a:lstStyle/>
-                    <a:p>
-                      <a:pPr marL="0" marR="0" algn="ctr">
-                        <a:spcBef>
-                          <a:spcPts val="0"/>
-                        </a:spcBef>
-                        <a:spcAft>
-                          <a:spcPts val="0"/>
-                        </a:spcAft>
-                      </a:pPr>
-                      <a:r>
-                        <a:rPr lang="en-US" sz="1000">
-                          <a:effectLst/>
-                        </a:rPr>
-                        <a:t>Detectată</a:t>
-                      </a:r>
-                      <a:endParaRPr lang="en-US" sz="1000">
-                        <a:effectLst/>
-                        <a:latin typeface="Times New Roman"/>
-                        <a:ea typeface="Times New Roman"/>
-                      </a:endParaRPr>
-                    </a:p>
-                  </a:txBody>
-                  <a:tcPr marL="68580" marR="68580" marT="0" marB="0"/>
-                </a:tc>
-                <a:tc>
-                  <a:txBody>
-                    <a:bodyPr/>
-                    <a:lstStyle/>
-                    <a:p>
-                      <a:pPr marL="0" marR="0">
-                        <a:spcBef>
-                          <a:spcPts val="0"/>
-                        </a:spcBef>
-                        <a:spcAft>
-                          <a:spcPts val="0"/>
-                        </a:spcAft>
-                      </a:pPr>
-                      <a:r>
-                        <a:rPr lang="en-US" sz="1000">
-                          <a:effectLst/>
-                        </a:rPr>
-                        <a:t>Detectată</a:t>
-                      </a:r>
-                      <a:endParaRPr lang="en-US" sz="1000">
-                        <a:effectLst/>
-                        <a:latin typeface="Times New Roman"/>
-                        <a:ea typeface="Times New Roman"/>
-                      </a:endParaRPr>
-                    </a:p>
-                  </a:txBody>
-                  <a:tcPr marL="68580" marR="68580" marT="0" marB="0"/>
-                </a:tc>
-              </a:tr>
-              <a:tr h="484385">
-                <a:tc>
-                  <a:txBody>
-                    <a:bodyPr/>
-                    <a:lstStyle/>
-                    <a:p>
-                      <a:pPr marL="0" marR="0">
-                        <a:spcBef>
-                          <a:spcPts val="0"/>
-                        </a:spcBef>
-                        <a:spcAft>
-                          <a:spcPts val="0"/>
-                        </a:spcAft>
-                      </a:pPr>
-                      <a:r>
-                        <a:rPr lang="en-US" sz="1000">
-                          <a:effectLst/>
-                        </a:rPr>
-                        <a:t>Clona tipul 2 cu porţiuni redenumite</a:t>
-                      </a:r>
-                      <a:endParaRPr lang="en-US" sz="1000">
-                        <a:effectLst/>
-                        <a:latin typeface="Times New Roman"/>
-                        <a:ea typeface="Times New Roman"/>
-                      </a:endParaRPr>
-                    </a:p>
-                  </a:txBody>
-                  <a:tcPr marL="68580" marR="68580" marT="0" marB="0"/>
-                </a:tc>
-                <a:tc>
-                  <a:txBody>
-                    <a:bodyPr/>
-                    <a:lstStyle/>
-                    <a:p>
-                      <a:pPr marL="0" marR="0" algn="ctr">
-                        <a:spcBef>
-                          <a:spcPts val="0"/>
-                        </a:spcBef>
-                        <a:spcAft>
-                          <a:spcPts val="0"/>
-                        </a:spcAft>
-                      </a:pPr>
-                      <a:r>
-                        <a:rPr lang="en-US" sz="1000">
-                          <a:effectLst/>
-                        </a:rPr>
-                        <a:t>Detectată</a:t>
-                      </a:r>
-                      <a:endParaRPr lang="en-US" sz="1000">
-                        <a:effectLst/>
-                        <a:latin typeface="Times New Roman"/>
-                        <a:ea typeface="Times New Roman"/>
-                      </a:endParaRPr>
-                    </a:p>
-                  </a:txBody>
-                  <a:tcPr marL="68580" marR="68580" marT="0" marB="0"/>
-                </a:tc>
-                <a:tc>
-                  <a:txBody>
-                    <a:bodyPr/>
-                    <a:lstStyle/>
-                    <a:p>
-                      <a:pPr marL="0" marR="0">
-                        <a:spcBef>
-                          <a:spcPts val="0"/>
-                        </a:spcBef>
-                        <a:spcAft>
-                          <a:spcPts val="0"/>
-                        </a:spcAft>
-                      </a:pPr>
-                      <a:r>
-                        <a:rPr lang="en-US" sz="1000">
-                          <a:effectLst/>
-                        </a:rPr>
-                        <a:t>Detectată</a:t>
-                      </a:r>
-                      <a:endParaRPr lang="en-US" sz="1000">
-                        <a:effectLst/>
-                        <a:latin typeface="Times New Roman"/>
-                        <a:ea typeface="Times New Roman"/>
-                      </a:endParaRPr>
-                    </a:p>
-                  </a:txBody>
-                  <a:tcPr marL="68580" marR="68580" marT="0" marB="0"/>
-                </a:tc>
-              </a:tr>
-              <a:tr h="484385">
-                <a:tc>
-                  <a:txBody>
-                    <a:bodyPr/>
-                    <a:lstStyle/>
-                    <a:p>
-                      <a:pPr marL="0" marR="0">
-                        <a:spcBef>
-                          <a:spcPts val="0"/>
-                        </a:spcBef>
-                        <a:spcAft>
-                          <a:spcPts val="0"/>
-                        </a:spcAft>
-                      </a:pPr>
-                      <a:r>
-                        <a:rPr lang="en-US" sz="1000">
-                          <a:effectLst/>
-                        </a:rPr>
-                        <a:t>Clona tipul 2 total redenumită</a:t>
-                      </a:r>
-                      <a:endParaRPr lang="en-US" sz="1000">
-                        <a:effectLst/>
-                        <a:latin typeface="Times New Roman"/>
-                        <a:ea typeface="Times New Roman"/>
-                      </a:endParaRPr>
-                    </a:p>
-                  </a:txBody>
-                  <a:tcPr marL="68580" marR="68580" marT="0" marB="0"/>
-                </a:tc>
-                <a:tc>
-                  <a:txBody>
-                    <a:bodyPr/>
-                    <a:lstStyle/>
-                    <a:p>
-                      <a:pPr marL="0" marR="0" algn="ctr">
-                        <a:spcBef>
-                          <a:spcPts val="0"/>
-                        </a:spcBef>
-                        <a:spcAft>
-                          <a:spcPts val="0"/>
-                        </a:spcAft>
-                      </a:pPr>
-                      <a:r>
-                        <a:rPr lang="en-US" sz="1000">
-                          <a:effectLst/>
-                        </a:rPr>
-                        <a:t>Detectată</a:t>
-                      </a:r>
-                      <a:endParaRPr lang="en-US" sz="1000">
-                        <a:effectLst/>
-                        <a:latin typeface="Times New Roman"/>
-                        <a:ea typeface="Times New Roman"/>
-                      </a:endParaRPr>
-                    </a:p>
-                  </a:txBody>
-                  <a:tcPr marL="68580" marR="68580" marT="0" marB="0"/>
-                </a:tc>
-                <a:tc>
-                  <a:txBody>
-                    <a:bodyPr/>
-                    <a:lstStyle/>
-                    <a:p>
-                      <a:pPr marL="0" marR="0">
-                        <a:spcBef>
-                          <a:spcPts val="0"/>
-                        </a:spcBef>
-                        <a:spcAft>
-                          <a:spcPts val="0"/>
-                        </a:spcAft>
-                      </a:pPr>
-                      <a:r>
-                        <a:rPr lang="en-US" sz="1000">
-                          <a:effectLst/>
-                        </a:rPr>
-                        <a:t>Nedetectată</a:t>
-                      </a:r>
-                      <a:endParaRPr lang="en-US" sz="1000">
-                        <a:effectLst/>
-                        <a:latin typeface="Times New Roman"/>
-                        <a:ea typeface="Times New Roman"/>
-                      </a:endParaRPr>
-                    </a:p>
-                  </a:txBody>
-                  <a:tcPr marL="68580" marR="68580" marT="0" marB="0"/>
-                </a:tc>
-              </a:tr>
-              <a:tr h="484385">
-                <a:tc>
-                  <a:txBody>
-                    <a:bodyPr/>
-                    <a:lstStyle/>
-                    <a:p>
-                      <a:pPr marL="0" marR="0">
-                        <a:spcBef>
-                          <a:spcPts val="0"/>
-                        </a:spcBef>
-                        <a:spcAft>
-                          <a:spcPts val="0"/>
-                        </a:spcAft>
-                      </a:pPr>
-                      <a:r>
-                        <a:rPr lang="en-US" sz="1000">
-                          <a:effectLst/>
-                        </a:rPr>
-                        <a:t>Clona tipul 3 partial redenumită</a:t>
-                      </a:r>
-                      <a:endParaRPr lang="en-US" sz="1000">
-                        <a:effectLst/>
-                        <a:latin typeface="Times New Roman"/>
-                        <a:ea typeface="Times New Roman"/>
-                      </a:endParaRPr>
-                    </a:p>
-                  </a:txBody>
-                  <a:tcPr marL="68580" marR="68580" marT="0" marB="0"/>
-                </a:tc>
-                <a:tc>
-                  <a:txBody>
-                    <a:bodyPr/>
-                    <a:lstStyle/>
-                    <a:p>
-                      <a:pPr marL="0" marR="0" algn="ctr">
-                        <a:spcBef>
-                          <a:spcPts val="0"/>
-                        </a:spcBef>
-                        <a:spcAft>
-                          <a:spcPts val="0"/>
-                        </a:spcAft>
-                      </a:pPr>
-                      <a:r>
-                        <a:rPr lang="en-US" sz="1000">
-                          <a:effectLst/>
-                        </a:rPr>
-                        <a:t>Detectată</a:t>
-                      </a:r>
-                      <a:endParaRPr lang="en-US" sz="1000">
-                        <a:effectLst/>
-                        <a:latin typeface="Times New Roman"/>
-                        <a:ea typeface="Times New Roman"/>
-                      </a:endParaRPr>
-                    </a:p>
-                  </a:txBody>
-                  <a:tcPr marL="68580" marR="68580" marT="0" marB="0"/>
-                </a:tc>
-                <a:tc>
-                  <a:txBody>
-                    <a:bodyPr/>
-                    <a:lstStyle/>
-                    <a:p>
-                      <a:pPr marL="0" marR="0">
-                        <a:spcBef>
-                          <a:spcPts val="0"/>
-                        </a:spcBef>
-                        <a:spcAft>
-                          <a:spcPts val="0"/>
-                        </a:spcAft>
-                      </a:pPr>
-                      <a:r>
-                        <a:rPr lang="en-US" sz="1000">
-                          <a:effectLst/>
-                        </a:rPr>
-                        <a:t>Detectată</a:t>
-                      </a:r>
-                      <a:endParaRPr lang="en-US" sz="1000">
-                        <a:effectLst/>
-                        <a:latin typeface="Times New Roman"/>
-                        <a:ea typeface="Times New Roman"/>
-                      </a:endParaRPr>
-                    </a:p>
-                  </a:txBody>
-                  <a:tcPr marL="68580" marR="68580" marT="0" marB="0"/>
-                </a:tc>
-              </a:tr>
-              <a:tr h="484385">
-                <a:tc>
-                  <a:txBody>
-                    <a:bodyPr/>
-                    <a:lstStyle/>
-                    <a:p>
-                      <a:pPr marL="0" marR="0">
-                        <a:spcBef>
-                          <a:spcPts val="0"/>
-                        </a:spcBef>
-                        <a:spcAft>
-                          <a:spcPts val="0"/>
-                        </a:spcAft>
-                      </a:pPr>
-                      <a:r>
-                        <a:rPr lang="en-US" sz="1000">
-                          <a:effectLst/>
-                        </a:rPr>
-                        <a:t>Clona tipul 3 total redenumită</a:t>
-                      </a:r>
-                      <a:endParaRPr lang="en-US" sz="1000">
-                        <a:effectLst/>
-                        <a:latin typeface="Times New Roman"/>
-                        <a:ea typeface="Times New Roman"/>
-                      </a:endParaRPr>
-                    </a:p>
-                  </a:txBody>
-                  <a:tcPr marL="68580" marR="68580" marT="0" marB="0"/>
-                </a:tc>
-                <a:tc>
-                  <a:txBody>
-                    <a:bodyPr/>
-                    <a:lstStyle/>
-                    <a:p>
-                      <a:pPr marL="0" marR="0" algn="ctr">
-                        <a:spcBef>
-                          <a:spcPts val="0"/>
-                        </a:spcBef>
-                        <a:spcAft>
-                          <a:spcPts val="0"/>
-                        </a:spcAft>
-                      </a:pPr>
-                      <a:r>
-                        <a:rPr lang="en-US" sz="1000">
-                          <a:effectLst/>
-                        </a:rPr>
-                        <a:t>Detectată</a:t>
-                      </a:r>
-                      <a:endParaRPr lang="en-US" sz="1000">
-                        <a:effectLst/>
-                        <a:latin typeface="Times New Roman"/>
-                        <a:ea typeface="Times New Roman"/>
-                      </a:endParaRPr>
-                    </a:p>
-                  </a:txBody>
-                  <a:tcPr marL="68580" marR="68580" marT="0" marB="0"/>
-                </a:tc>
-                <a:tc>
-                  <a:txBody>
-                    <a:bodyPr/>
-                    <a:lstStyle/>
-                    <a:p>
-                      <a:pPr marL="0" marR="0">
-                        <a:spcBef>
-                          <a:spcPts val="0"/>
-                        </a:spcBef>
-                        <a:spcAft>
-                          <a:spcPts val="0"/>
-                        </a:spcAft>
-                      </a:pPr>
-                      <a:r>
-                        <a:rPr lang="en-US" sz="1000">
-                          <a:effectLst/>
-                        </a:rPr>
-                        <a:t>Neraportată</a:t>
-                      </a:r>
-                      <a:endParaRPr lang="en-US" sz="1000">
-                        <a:effectLst/>
-                        <a:latin typeface="Times New Roman"/>
-                        <a:ea typeface="Times New Roman"/>
-                      </a:endParaRPr>
-                    </a:p>
-                  </a:txBody>
-                  <a:tcPr marL="68580" marR="68580" marT="0" marB="0"/>
-                </a:tc>
-              </a:tr>
-              <a:tr h="327969">
-                <a:tc>
-                  <a:txBody>
-                    <a:bodyPr/>
-                    <a:lstStyle/>
-                    <a:p>
-                      <a:pPr marL="0" marR="0">
-                        <a:spcBef>
-                          <a:spcPts val="0"/>
-                        </a:spcBef>
-                        <a:spcAft>
-                          <a:spcPts val="0"/>
-                        </a:spcAft>
-                      </a:pPr>
-                      <a:r>
-                        <a:rPr lang="en-US" sz="1000">
-                          <a:effectLst/>
-                        </a:rPr>
-                        <a:t>Proiecte diferite</a:t>
-                      </a:r>
-                      <a:endParaRPr lang="en-US" sz="1000">
-                        <a:effectLst/>
-                        <a:latin typeface="Times New Roman"/>
-                        <a:ea typeface="Times New Roman"/>
-                      </a:endParaRPr>
-                    </a:p>
-                  </a:txBody>
-                  <a:tcPr marL="68580" marR="68580" marT="0" marB="0"/>
-                </a:tc>
-                <a:tc>
-                  <a:txBody>
-                    <a:bodyPr/>
-                    <a:lstStyle/>
-                    <a:p>
-                      <a:pPr marL="0" marR="0" algn="ctr">
-                        <a:spcBef>
-                          <a:spcPts val="0"/>
-                        </a:spcBef>
-                        <a:spcAft>
-                          <a:spcPts val="0"/>
-                        </a:spcAft>
-                      </a:pPr>
-                      <a:r>
-                        <a:rPr lang="en-US" sz="1000">
-                          <a:effectLst/>
-                        </a:rPr>
-                        <a:t>Neraportată</a:t>
-                      </a:r>
-                      <a:endParaRPr lang="en-US" sz="1000">
-                        <a:effectLst/>
-                        <a:latin typeface="Times New Roman"/>
-                        <a:ea typeface="Times New Roman"/>
-                      </a:endParaRPr>
-                    </a:p>
-                  </a:txBody>
-                  <a:tcPr marL="68580" marR="68580" marT="0" marB="0"/>
-                </a:tc>
-                <a:tc>
-                  <a:txBody>
-                    <a:bodyPr/>
-                    <a:lstStyle/>
-                    <a:p>
-                      <a:pPr marL="0" marR="0">
-                        <a:spcBef>
-                          <a:spcPts val="0"/>
-                        </a:spcBef>
-                        <a:spcAft>
-                          <a:spcPts val="0"/>
-                        </a:spcAft>
-                      </a:pPr>
-                      <a:r>
-                        <a:rPr lang="en-US" sz="1000">
-                          <a:effectLst/>
-                        </a:rPr>
-                        <a:t>Neraportată</a:t>
-                      </a:r>
-                      <a:endParaRPr lang="en-US" sz="1000">
-                        <a:effectLst/>
-                        <a:latin typeface="Times New Roman"/>
-                        <a:ea typeface="Times New Roman"/>
-                      </a:endParaRPr>
-                    </a:p>
-                  </a:txBody>
-                  <a:tcPr marL="68580" marR="68580" marT="0" marB="0"/>
-                </a:tc>
-              </a:tr>
-              <a:tr h="726577">
-                <a:tc>
-                  <a:txBody>
-                    <a:bodyPr/>
-                    <a:lstStyle/>
-                    <a:p>
-                      <a:pPr marL="0" marR="0">
-                        <a:spcBef>
-                          <a:spcPts val="0"/>
-                        </a:spcBef>
-                        <a:spcAft>
-                          <a:spcPts val="0"/>
-                        </a:spcAft>
-                      </a:pPr>
-                      <a:r>
-                        <a:rPr lang="en-US" sz="1000">
-                          <a:effectLst/>
-                        </a:rPr>
-                        <a:t>Proiecte mari diferiţe</a:t>
-                      </a:r>
-                      <a:endParaRPr lang="en-US" sz="1000">
-                        <a:effectLst/>
-                        <a:latin typeface="Times New Roman"/>
-                        <a:ea typeface="Times New Roman"/>
-                      </a:endParaRPr>
-                    </a:p>
-                  </a:txBody>
-                  <a:tcPr marL="68580" marR="68580" marT="0" marB="0"/>
-                </a:tc>
-                <a:tc>
-                  <a:txBody>
-                    <a:bodyPr/>
-                    <a:lstStyle/>
-                    <a:p>
-                      <a:pPr marL="0" marR="0" algn="ctr">
-                        <a:spcBef>
-                          <a:spcPts val="0"/>
-                        </a:spcBef>
-                        <a:spcAft>
-                          <a:spcPts val="0"/>
-                        </a:spcAft>
-                      </a:pPr>
-                      <a:r>
-                        <a:rPr lang="en-US" sz="1000">
-                          <a:effectLst/>
-                        </a:rPr>
-                        <a:t>Neraportată + timp mare de executie</a:t>
-                      </a:r>
-                      <a:endParaRPr lang="en-US" sz="1000">
-                        <a:effectLst/>
-                        <a:latin typeface="Times New Roman"/>
-                        <a:ea typeface="Times New Roman"/>
-                      </a:endParaRPr>
-                    </a:p>
-                  </a:txBody>
-                  <a:tcPr marL="68580" marR="68580" marT="0" marB="0"/>
-                </a:tc>
-                <a:tc>
-                  <a:txBody>
-                    <a:bodyPr/>
-                    <a:lstStyle/>
-                    <a:p>
-                      <a:pPr marL="0" marR="0">
-                        <a:spcBef>
-                          <a:spcPts val="0"/>
-                        </a:spcBef>
-                        <a:spcAft>
-                          <a:spcPts val="0"/>
-                        </a:spcAft>
-                      </a:pPr>
-                      <a:r>
-                        <a:rPr lang="en-US" sz="1000" dirty="0" err="1">
-                          <a:effectLst/>
-                        </a:rPr>
-                        <a:t>Neraportată</a:t>
-                      </a:r>
-                      <a:endParaRPr lang="en-US" sz="1000" dirty="0">
-                        <a:effectLst/>
-                        <a:latin typeface="Times New Roman"/>
-                        <a:ea typeface="Times New Roman"/>
-                      </a:endParaRPr>
-                    </a:p>
-                  </a:txBody>
-                  <a:tcPr marL="68580" marR="68580" marT="0" marB="0"/>
-                </a:tc>
-              </a:tr>
-            </a:tbl>
-          </a:graphicData>
-        </a:graphic>
-      </p:graphicFrame>
     </p:spTree>
     <p:extLst>
       <p:ext uri="{BB962C8B-B14F-4D97-AF65-F5344CB8AC3E}">
-        <p14:creationId xmlns:p14="http://schemas.microsoft.com/office/powerpoint/2010/main" val="3267582253"/>
+        <p14:creationId xmlns:p14="http://schemas.microsoft.com/office/powerpoint/2010/main" val="1527581008"/>
       </p:ext>
     </p:extLst>
   </p:cSld>
@@ -17335,52 +16793,117 @@
           <a:bodyPr/>
           <a:lstStyle/>
           <a:p>
+            <a:pPr>
+              <a:lnSpc>
+                <a:spcPct val="150000"/>
+              </a:lnSpc>
+            </a:pPr>
+            <a:r>
+              <a:rPr lang="en-US" dirty="0" smtClean="0"/>
+              <a:t>Rapid  : </a:t>
+            </a:r>
             <a:r>
               <a:rPr lang="en-US" dirty="0" err="1" smtClean="0"/>
-              <a:t>Analizarea</a:t>
+              <a:t>SWI</a:t>
             </a:r>
             <a:r>
               <a:rPr lang="en-US" dirty="0" smtClean="0"/>
-              <a:t> </a:t>
+              <a:t>-Prolog </a:t>
+            </a:r>
+            <a:r>
+              <a:rPr lang="en-US" dirty="0"/>
+              <a:t>e </a:t>
+            </a:r>
+            <a:r>
+              <a:rPr lang="en-US" dirty="0" smtClean="0"/>
+              <a:t>multi-threading</a:t>
+            </a:r>
+          </a:p>
+          <a:p>
+            <a:pPr>
+              <a:lnSpc>
+                <a:spcPct val="150000"/>
+              </a:lnSpc>
+            </a:pPr>
+            <a:r>
+              <a:rPr lang="en-US" dirty="0" smtClean="0"/>
+              <a:t>Se pot exclude </a:t>
             </a:r>
             <a:r>
               <a:rPr lang="en-US" dirty="0" err="1" smtClean="0"/>
-              <a:t>unui</a:t>
+              <a:t>clase</a:t>
             </a:r>
             <a:r>
               <a:rPr lang="en-US" dirty="0" smtClean="0"/>
-              <a:t> set de </a:t>
+              <a:t> din </a:t>
             </a:r>
             <a:r>
               <a:rPr lang="en-US" dirty="0" err="1" smtClean="0"/>
-              <a:t>teme</a:t>
-            </a:r>
-            <a:r>
-              <a:rPr lang="en-US" dirty="0" smtClean="0"/>
-              <a:t> de la </a:t>
-            </a:r>
-            <a:r>
-              <a:rPr lang="en-US" dirty="0" err="1" smtClean="0"/>
-              <a:t>laboratorul</a:t>
-            </a:r>
-            <a:r>
-              <a:rPr lang="en-US" dirty="0" smtClean="0"/>
-              <a:t> de </a:t>
-            </a:r>
-            <a:r>
-              <a:rPr lang="en-US" dirty="0" err="1" smtClean="0"/>
-              <a:t>PASSC</a:t>
+              <a:t>analiza</a:t>
             </a:r>
             <a:endParaRPr lang="en-US" dirty="0" smtClean="0"/>
           </a:p>
           <a:p>
+            <a:pPr>
+              <a:lnSpc>
+                <a:spcPct val="150000"/>
+              </a:lnSpc>
+            </a:pPr>
+            <a:r>
+              <a:rPr lang="en-US" dirty="0" err="1"/>
+              <a:t>Flexibilitate</a:t>
+            </a:r>
+            <a:r>
+              <a:rPr lang="en-US" dirty="0"/>
+              <a:t> – </a:t>
+            </a:r>
+            <a:r>
+              <a:rPr lang="en-US" dirty="0" err="1"/>
+              <a:t>prin</a:t>
+            </a:r>
+            <a:r>
+              <a:rPr lang="en-US" dirty="0"/>
+              <a:t> </a:t>
+            </a:r>
+            <a:r>
+              <a:rPr lang="en-US" dirty="0" err="1"/>
+              <a:t>alegerea</a:t>
+            </a:r>
+            <a:r>
+              <a:rPr lang="en-US" dirty="0"/>
+              <a:t>/</a:t>
+            </a:r>
+            <a:r>
+              <a:rPr lang="en-US" dirty="0" err="1"/>
+              <a:t>crearea</a:t>
+            </a:r>
+            <a:r>
+              <a:rPr lang="en-US" dirty="0"/>
+              <a:t> </a:t>
+            </a:r>
+            <a:r>
+              <a:rPr lang="en-US" dirty="0" err="1"/>
+              <a:t>profilelor</a:t>
+            </a:r>
+            <a:endParaRPr lang="en-US" dirty="0"/>
+          </a:p>
+          <a:p>
+            <a:pPr>
+              <a:lnSpc>
+                <a:spcPct val="150000"/>
+              </a:lnSpc>
+            </a:pPr>
+            <a:r>
+              <a:rPr lang="en-US" dirty="0" err="1" smtClean="0"/>
+              <a:t>Usor</a:t>
+            </a:r>
             <a:r>
               <a:rPr lang="en-US" dirty="0" smtClean="0"/>
-              <a:t>16 </a:t>
+              <a:t> de </a:t>
             </a:r>
             <a:r>
               <a:rPr lang="en-US" dirty="0" err="1" smtClean="0"/>
-              <a:t>proiecte</a:t>
+              <a:t>adaugat</a:t>
             </a:r>
             <a:r>
               <a:rPr lang="en-US" dirty="0" smtClean="0"/>
@@ -17388,78 +16911,32 @@
             </a:r>
             <a:r>
               <a:rPr lang="en-US" dirty="0" err="1" smtClean="0"/>
-              <a:t>comparate</a:t>
+              <a:t>noi</a:t>
+            </a:r>
+            <a:r>
+              <a:rPr lang="en-US" dirty="0" smtClean="0"/>
+              <a:t> </a:t>
+            </a:r>
+            <a:r>
+              <a:rPr lang="en-US" dirty="0" err="1" smtClean="0"/>
+              <a:t>filtre</a:t>
             </a:r>
             <a:endParaRPr lang="en-US" dirty="0" smtClean="0"/>
           </a:p>
           <a:p>
-            <a:r>
-              <a:rPr lang="en-US" dirty="0"/>
-              <a:t>120 de </a:t>
-            </a:r>
-            <a:r>
-              <a:rPr lang="en-US" dirty="0" err="1" smtClean="0"/>
-              <a:t>parechi</a:t>
-            </a:r>
-            <a:r>
-              <a:rPr lang="en-US" dirty="0" smtClean="0"/>
-              <a:t> de </a:t>
-            </a:r>
-            <a:r>
-              <a:rPr lang="en-US" dirty="0" err="1" smtClean="0"/>
-              <a:t>cate</a:t>
-            </a:r>
-            <a:r>
-              <a:rPr lang="en-US" dirty="0" smtClean="0"/>
-              <a:t> 2 </a:t>
-            </a:r>
-            <a:r>
-              <a:rPr lang="en-US" dirty="0" err="1" smtClean="0"/>
-              <a:t>proiecte</a:t>
-            </a:r>
-            <a:r>
-              <a:rPr lang="en-US" dirty="0" smtClean="0"/>
-              <a:t> </a:t>
-            </a:r>
-            <a:r>
-              <a:rPr lang="en-US" dirty="0" err="1" smtClean="0"/>
-              <a:t>analizate</a:t>
-            </a:r>
-            <a:r>
-              <a:rPr lang="en-US" dirty="0" smtClean="0"/>
-              <a:t> in 21  de </a:t>
-            </a:r>
-            <a:r>
-              <a:rPr lang="en-US" dirty="0" err="1" smtClean="0"/>
-              <a:t>secunde</a:t>
-            </a:r>
-            <a:endParaRPr lang="en-US" dirty="0"/>
+            <a:pPr>
+              <a:lnSpc>
+                <a:spcPct val="150000"/>
+              </a:lnSpc>
+            </a:pPr>
+            <a:endParaRPr lang="en-US" dirty="0" smtClean="0"/>
           </a:p>
           <a:p>
-            <a:r>
-              <a:rPr lang="en-US" dirty="0" err="1"/>
-              <a:t>d</a:t>
-            </a:r>
-            <a:r>
-              <a:rPr lang="en-US" dirty="0" err="1" smtClean="0"/>
-              <a:t>epistate</a:t>
-            </a:r>
-            <a:r>
-              <a:rPr lang="en-US" dirty="0" smtClean="0"/>
-              <a:t> 2 </a:t>
-            </a:r>
-            <a:r>
-              <a:rPr lang="en-US" dirty="0" err="1" smtClean="0"/>
-              <a:t>proiecte</a:t>
-            </a:r>
-            <a:r>
-              <a:rPr lang="en-US" dirty="0" smtClean="0"/>
-              <a:t> </a:t>
-            </a:r>
-            <a:r>
-              <a:rPr lang="en-US" dirty="0" err="1" smtClean="0"/>
-              <a:t>copiate</a:t>
-            </a:r>
+            <a:pPr>
+              <a:lnSpc>
+                <a:spcPct val="150000"/>
+              </a:lnSpc>
+            </a:pPr>
             <a:endParaRPr lang="en-US" dirty="0" smtClean="0"/>
           </a:p>
         </p:txBody>
@@ -17481,7 +16958,11 @@
           <a:p>
             <a:r>
               <a:rPr lang="en-US" dirty="0" err="1" smtClean="0"/>
-              <a:t>Rezultate</a:t>
+              <a:t>Avantaje</a:t>
+            </a:r>
+            <a:r>
+              <a:rPr lang="en-US" dirty="0" smtClean="0"/>
+              <a:t> </a:t>
             </a:r>
             <a:endParaRPr lang="en-US" dirty="0"/>
           </a:p>
@@ -17490,13 +16971,20 @@
     </p:spTree>
     <p:extLst>
       <p:ext uri="{BB962C8B-B14F-4D97-AF65-F5344CB8AC3E}">
-        <p14:creationId xmlns:p14="http://schemas.microsoft.com/office/powerpoint/2010/main" val="1527581008"/>
+        <p14:creationId xmlns:p14="http://schemas.microsoft.com/office/powerpoint/2010/main" val="2412675320"/>
       </p:ext>
     </p:extLst>
   </p:cSld>
   <p:clrMapOvr>
     <a:masterClrMapping/>
   </p:clrMapOvr>
+  <p:timing>
+    <p:tnLst>
+      <p:par>
+        <p:cTn id="1" dur="indefinite" restart="never" nodeType="tmRoot"/>
+      </p:par>
+    </p:tnLst>
+  </p:timing>
 </p:sld>
 </file>
 
@@ -17527,22 +17015,24 @@
             <p:ph idx="1"/>
           </p:nvPr>
         </p:nvSpPr>
-        <p:spPr/>
+        <p:spPr>
+          <a:xfrm>
+            <a:off x="1041400" y="3200400"/>
+            <a:ext cx="8231481" cy="3035825"/>
+          </a:xfrm>
+        </p:spPr>
         <p:txBody>
           <a:bodyPr/>
           <a:lstStyle/>
           <a:p>
+            <a:pPr>
+              <a:lnSpc>
+                <a:spcPct val="150000"/>
+              </a:lnSpc>
+            </a:pPr>
             <a:r>
               <a:rPr lang="en-US" dirty="0" err="1" smtClean="0"/>
-              <a:t>Flexibilitate</a:t>
-            </a:r>
-            <a:r>
-              <a:rPr lang="en-US" dirty="0" smtClean="0"/>
-              <a:t> – </a:t>
-            </a:r>
-            <a:r>
-              <a:rPr lang="en-US" dirty="0" err="1" smtClean="0"/>
-              <a:t>prin</a:t>
+              <a:t>Obtinerea</a:t>
             </a:r>
             <a:r>
               <a:rPr lang="en-US" dirty="0" smtClean="0"/>
@@ -17550,47 +17040,7 @@
             </a:r>
             <a:r>
               <a:rPr lang="en-US" dirty="0" err="1" smtClean="0"/>
-              <a:t>alegerea</a:t>
-            </a:r>
-            <a:r>
-              <a:rPr lang="en-US" dirty="0" smtClean="0"/>
-              <a:t>/</a:t>
-            </a:r>
-            <a:r>
-              <a:rPr lang="en-US" dirty="0" err="1" smtClean="0"/>
-              <a:t>crearea</a:t>
-            </a:r>
-            <a:r>
-              <a:rPr lang="en-US" dirty="0" smtClean="0"/>
-              <a:t> profile</a:t>
-            </a:r>
-          </a:p>
-          <a:p>
-            <a:r>
-              <a:rPr lang="en-US" dirty="0" smtClean="0"/>
-              <a:t>Rapid</a:t>
-            </a:r>
-          </a:p>
-          <a:p>
-            <a:r>
-              <a:rPr lang="en-US" dirty="0" err="1" smtClean="0"/>
-              <a:t>SWI</a:t>
-            </a:r>
-            <a:r>
-              <a:rPr lang="en-US" dirty="0" smtClean="0"/>
-              <a:t>-Prolog e multi-threading</a:t>
-            </a:r>
-          </a:p>
-          <a:p>
-            <a:r>
-              <a:rPr lang="en-US" dirty="0" smtClean="0"/>
-              <a:t>Common classes</a:t>
-            </a:r>
-          </a:p>
-          <a:p>
-            <a:r>
-              <a:rPr lang="en-US" dirty="0" err="1" smtClean="0"/>
-              <a:t>Usor</a:t>
+              <a:t>bazei</a:t>
             </a:r>
             <a:r>
               <a:rPr lang="en-US" dirty="0" smtClean="0"/>
@@ -17598,15 +17048,105 @@
             </a:r>
             <a:r>
               <a:rPr lang="en-US" dirty="0" err="1" smtClean="0"/>
-              <a:t>dezvoltat</a:t>
+              <a:t>cunostinte</a:t>
+            </a:r>
+            <a:r>
+              <a:rPr lang="en-US" dirty="0" smtClean="0"/>
+              <a:t> </a:t>
+            </a:r>
+            <a:r>
+              <a:rPr lang="en-US" dirty="0" err="1" smtClean="0"/>
+              <a:t>depinde</a:t>
+            </a:r>
+            <a:r>
+              <a:rPr lang="en-US" dirty="0" smtClean="0"/>
+              <a:t> de </a:t>
+            </a:r>
+            <a:r>
+              <a:rPr lang="en-US" dirty="0" err="1" smtClean="0"/>
+              <a:t>JTransformer</a:t>
             </a:r>
             <a:endParaRPr lang="en-US" dirty="0" smtClean="0"/>
           </a:p>
           <a:p>
-            <a:endParaRPr lang="en-US" dirty="0" smtClean="0"/>
-          </a:p>
-          <a:p>
-            <a:endParaRPr lang="en-US" dirty="0" smtClean="0"/>
+            <a:pPr>
+              <a:lnSpc>
+                <a:spcPct val="150000"/>
+              </a:lnSpc>
+            </a:pPr>
+            <a:r>
+              <a:rPr lang="en-US" dirty="0" err="1" smtClean="0"/>
+              <a:t>Pentru</a:t>
+            </a:r>
+            <a:r>
+              <a:rPr lang="en-US" dirty="0" smtClean="0"/>
+              <a:t> </a:t>
+            </a:r>
+            <a:r>
+              <a:rPr lang="en-US" dirty="0" err="1" smtClean="0"/>
+              <a:t>viteze</a:t>
+            </a:r>
+            <a:r>
+              <a:rPr lang="en-US" dirty="0" smtClean="0"/>
+              <a:t> </a:t>
+            </a:r>
+            <a:r>
+              <a:rPr lang="en-US" dirty="0" err="1" smtClean="0"/>
+              <a:t>acceptabile</a:t>
+            </a:r>
+            <a:r>
+              <a:rPr lang="en-US" dirty="0" smtClean="0"/>
+              <a:t> </a:t>
+            </a:r>
+            <a:r>
+              <a:rPr lang="en-US" dirty="0" err="1" smtClean="0"/>
+              <a:t>este</a:t>
+            </a:r>
+            <a:r>
+              <a:rPr lang="en-US" dirty="0" smtClean="0"/>
+              <a:t> </a:t>
+            </a:r>
+            <a:r>
+              <a:rPr lang="en-US" dirty="0" err="1" smtClean="0"/>
+              <a:t>limitat</a:t>
+            </a:r>
+            <a:r>
+              <a:rPr lang="en-US" dirty="0" smtClean="0"/>
+              <a:t> la </a:t>
+            </a:r>
+            <a:r>
+              <a:rPr lang="en-US" dirty="0" err="1" smtClean="0"/>
+              <a:t>proiecte</a:t>
+            </a:r>
+            <a:r>
+              <a:rPr lang="en-US" dirty="0" smtClean="0"/>
+              <a:t> </a:t>
+            </a:r>
+            <a:r>
+              <a:rPr lang="en-US" dirty="0" err="1" smtClean="0"/>
+              <a:t>scolare</a:t>
+            </a:r>
+            <a:r>
+              <a:rPr lang="en-US" dirty="0" smtClean="0"/>
+              <a:t> de </a:t>
+            </a:r>
+            <a:r>
+              <a:rPr lang="en-US" dirty="0" err="1" smtClean="0"/>
+              <a:t>pana</a:t>
+            </a:r>
+            <a:r>
+              <a:rPr lang="en-US" dirty="0" smtClean="0"/>
+              <a:t> la 30 </a:t>
+            </a:r>
+            <a:r>
+              <a:rPr lang="en-US" dirty="0" err="1" smtClean="0"/>
+              <a:t>clase</a:t>
+            </a:r>
+            <a:r>
+              <a:rPr lang="en-US" dirty="0" smtClean="0"/>
+              <a:t>.</a:t>
+            </a:r>
+            <a:endParaRPr lang="en-US" dirty="0"/>
           </a:p>
         </p:txBody>
       </p:sp>
@@ -17627,11 +17167,7 @@
           <a:p>
             <a:r>
               <a:rPr lang="en-US" dirty="0" err="1" smtClean="0"/>
-              <a:t>Avataje</a:t>
-            </a:r>
-            <a:r>
-              <a:rPr lang="en-US" dirty="0" smtClean="0"/>
-              <a:t> </a:t>
+              <a:t>Limitari</a:t>
             </a:r>
             <a:endParaRPr lang="en-US" dirty="0"/>
           </a:p>
@@ -17640,13 +17176,20 @@
     </p:spTree>
     <p:extLst>
       <p:ext uri="{BB962C8B-B14F-4D97-AF65-F5344CB8AC3E}">
-        <p14:creationId xmlns:p14="http://schemas.microsoft.com/office/powerpoint/2010/main" val="2412675320"/>
+        <p14:creationId xmlns:p14="http://schemas.microsoft.com/office/powerpoint/2010/main" val="3900835936"/>
       </p:ext>
     </p:extLst>
   </p:cSld>
   <p:clrMapOvr>
     <a:masterClrMapping/>
   </p:clrMapOvr>
+  <p:timing>
+    <p:tnLst>
+      <p:par>
+        <p:cTn id="1" dur="indefinite" restart="never" nodeType="tmRoot"/>
+      </p:par>
+    </p:tnLst>
+  </p:timing>
 </p:sld>
 </file>
 
@@ -17677,19 +17220,14 @@
             <p:ph idx="1"/>
           </p:nvPr>
         </p:nvSpPr>
-        <p:spPr>
-          <a:xfrm rot="567250">
-            <a:off x="995590" y="1945408"/>
-            <a:ext cx="8231481" cy="3834107"/>
-          </a:xfrm>
-        </p:spPr>
+        <p:spPr/>
         <p:txBody>
-          <a:bodyPr/>
+          <a:bodyPr anchor="ctr"/>
           <a:lstStyle/>
           <a:p>
             <a:r>
               <a:rPr lang="en-US" dirty="0" err="1" smtClean="0"/>
-              <a:t>Obtinerea</a:t>
+              <a:t>Integrarea</a:t>
             </a:r>
             <a:r>
               <a:rPr lang="en-US" dirty="0" smtClean="0"/>
@@ -17697,189 +17235,27 @@
             </a:r>
             <a:r>
               <a:rPr lang="en-US" dirty="0" err="1" smtClean="0"/>
-              <a:t>bazei</a:t>
+              <a:t>ca</a:t>
             </a:r>
             <a:r>
               <a:rPr lang="en-US" dirty="0" smtClean="0"/>
-              <a:t> de </a:t>
+              <a:t> </a:t>
             </a:r>
             <a:r>
               <a:rPr lang="en-US" dirty="0" err="1" smtClean="0"/>
-              <a:t>cunostinte</a:t>
-            </a:r>
-            <a:endParaRPr lang="en-US" dirty="0" smtClean="0"/>
+              <a:t>serviciu</a:t>
+            </a:r>
+            <a:r>
+              <a:rPr lang="en-US" dirty="0" smtClean="0"/>
+              <a:t> Web</a:t>
+            </a:r>
           </a:p>
           <a:p>
-            <a:r>
-              <a:rPr lang="en-US" dirty="0" err="1" smtClean="0"/>
-              <a:t>Pentru</a:t>
-            </a:r>
-            <a:r>
-              <a:rPr lang="en-US" dirty="0" smtClean="0"/>
-              <a:t> </a:t>
-            </a:r>
-            <a:r>
-              <a:rPr lang="en-US" dirty="0" err="1" smtClean="0"/>
-              <a:t>viteze</a:t>
-            </a:r>
-            <a:r>
-              <a:rPr lang="en-US" dirty="0" smtClean="0"/>
-              <a:t> </a:t>
-            </a:r>
-            <a:r>
-              <a:rPr lang="en-US" dirty="0" err="1" smtClean="0"/>
-              <a:t>acceptabile</a:t>
-            </a:r>
-            <a:r>
-              <a:rPr lang="en-US" dirty="0" smtClean="0"/>
-              <a:t> </a:t>
-            </a:r>
-            <a:r>
-              <a:rPr lang="en-US" dirty="0" err="1" smtClean="0"/>
-              <a:t>este</a:t>
-            </a:r>
-            <a:r>
-              <a:rPr lang="en-US" dirty="0" smtClean="0"/>
-              <a:t> </a:t>
-            </a:r>
-            <a:r>
-              <a:rPr lang="en-US" dirty="0" err="1" smtClean="0"/>
-              <a:t>limitat</a:t>
-            </a:r>
-            <a:r>
-              <a:rPr lang="en-US" dirty="0" smtClean="0"/>
-              <a:t> la </a:t>
-            </a:r>
-            <a:r>
-              <a:rPr lang="en-US" dirty="0" err="1" smtClean="0"/>
-              <a:t>proiecte</a:t>
-            </a:r>
-            <a:r>
-              <a:rPr lang="en-US" dirty="0" smtClean="0"/>
-              <a:t> </a:t>
-            </a:r>
-            <a:r>
-              <a:rPr lang="en-US" dirty="0" err="1" smtClean="0"/>
-              <a:t>scolare</a:t>
-            </a:r>
-            <a:r>
-              <a:rPr lang="en-US" dirty="0" smtClean="0"/>
-              <a:t> de </a:t>
-            </a:r>
-            <a:r>
-              <a:rPr lang="en-US" dirty="0" err="1" smtClean="0"/>
-              <a:t>pana</a:t>
-            </a:r>
-            <a:r>
-              <a:rPr lang="en-US" dirty="0" smtClean="0"/>
-              <a:t> la 30 </a:t>
-            </a:r>
-            <a:r>
-              <a:rPr lang="en-US" dirty="0" err="1" smtClean="0"/>
-              <a:t>clase</a:t>
-            </a:r>
-            <a:r>
-              <a:rPr lang="en-US" dirty="0" smtClean="0"/>
-              <a:t>.</a:t>
-            </a:r>
-            <a:endParaRPr lang="en-US" dirty="0"/>
-          </a:p>
-        </p:txBody>
-      </p:sp>
-      <p:sp>
-        <p:nvSpPr>
-          <p:cNvPr id="3" name="Title 2"/>
-          <p:cNvSpPr>
-            <a:spLocks noGrp="1"/>
-          </p:cNvSpPr>
-          <p:nvPr>
-            <p:ph type="title"/>
-          </p:nvPr>
-        </p:nvSpPr>
-        <p:spPr/>
-        <p:txBody>
-          <a:bodyPr/>
-          <a:lstStyle/>
-          <a:p>
-            <a:r>
-              <a:rPr lang="en-US" dirty="0" err="1" smtClean="0"/>
-              <a:t>Limitari</a:t>
-            </a:r>
-            <a:endParaRPr lang="en-US" dirty="0"/>
-          </a:p>
-        </p:txBody>
-      </p:sp>
-    </p:spTree>
-    <p:extLst>
-      <p:ext uri="{BB962C8B-B14F-4D97-AF65-F5344CB8AC3E}">
-        <p14:creationId xmlns:p14="http://schemas.microsoft.com/office/powerpoint/2010/main" val="3900835936"/>
-      </p:ext>
-    </p:extLst>
-  </p:cSld>
-  <p:clrMapOvr>
-    <a:masterClrMapping/>
-  </p:clrMapOvr>
-</p:sld>
-</file>
-
-<file path=ppt/slides/slide14.xml><?xml version="1.0" encoding="utf-8"?>
-<p:sld xmlns:a="http://schemas.openxmlformats.org/drawingml/2006/main" xmlns:r="http://schemas.openxmlformats.org/officeDocument/2006/relationships" xmlns:p="http://schemas.openxmlformats.org/presentationml/2006/main">
-  <p:cSld>
-    <p:spTree>
-      <p:nvGrpSpPr>
-        <p:cNvPr id="1" name=""/>
-        <p:cNvGrpSpPr/>
-        <p:nvPr/>
-      </p:nvGrpSpPr>
-      <p:grpSpPr>
-        <a:xfrm>
-          <a:off x="0" y="0"/>
-          <a:ext cx="0" cy="0"/>
-          <a:chOff x="0" y="0"/>
-          <a:chExt cx="0" cy="0"/>
-        </a:xfrm>
-      </p:grpSpPr>
-      <p:sp>
-        <p:nvSpPr>
-          <p:cNvPr id="2" name="Content Placeholder 1"/>
-          <p:cNvSpPr>
-            <a:spLocks noGrp="1"/>
-          </p:cNvSpPr>
-          <p:nvPr>
-            <p:ph idx="1"/>
-          </p:nvPr>
-        </p:nvSpPr>
-        <p:spPr/>
-        <p:txBody>
-          <a:bodyPr/>
-          <a:lstStyle/>
-          <a:p>
-            <a:r>
-              <a:rPr lang="en-US" dirty="0" err="1" smtClean="0"/>
-              <a:t>Integrarea</a:t>
-            </a:r>
-            <a:r>
-              <a:rPr lang="en-US" dirty="0" smtClean="0"/>
-              <a:t> </a:t>
-            </a:r>
-            <a:r>
-              <a:rPr lang="en-US" dirty="0" err="1" smtClean="0"/>
-              <a:t>ca</a:t>
-            </a:r>
-            <a:r>
-              <a:rPr lang="en-US" dirty="0" smtClean="0"/>
-              <a:t> </a:t>
-            </a:r>
-            <a:r>
-              <a:rPr lang="en-US" dirty="0" err="1" smtClean="0"/>
-              <a:t>serviciu</a:t>
-            </a:r>
-            <a:r>
-              <a:rPr lang="en-US" dirty="0" smtClean="0"/>
-              <a:t> Web</a:t>
-            </a:r>
-          </a:p>
-          <a:p>
+            <a:pPr>
+              <a:lnSpc>
+                <a:spcPct val="150000"/>
+              </a:lnSpc>
+            </a:pPr>
             <a:r>
               <a:rPr lang="en-US" dirty="0" err="1" smtClean="0"/>
               <a:t>Posibila</a:t>
@@ -17951,6 +17327,13 @@
   <p:clrMapOvr>
     <a:masterClrMapping/>
   </p:clrMapOvr>
+  <p:timing>
+    <p:tnLst>
+      <p:par>
+        <p:cTn id="1" dur="indefinite" restart="never" nodeType="tmRoot"/>
+      </p:par>
+    </p:tnLst>
+  </p:timing>
 </p:sld>
 </file>
 
@@ -18036,27 +17419,29 @@
           </a:xfrm>
         </p:spPr>
         <p:txBody>
-          <a:bodyPr anchor="ctr"/>
+          <a:bodyPr anchor="ctr">
+            <a:normAutofit/>
+          </a:bodyPr>
           <a:lstStyle/>
           <a:p>
             <a:r>
+              <a:rPr lang="en-US" sz="3600" dirty="0" smtClean="0"/>
+              <a:t>un program </a:t>
+            </a:r>
+            <a:r>
+              <a:rPr lang="en-US" sz="3600" dirty="0" err="1" smtClean="0"/>
+              <a:t>scris</a:t>
+            </a:r>
+            <a:r>
+              <a:rPr lang="en-US" sz="3600" dirty="0" smtClean="0"/>
+              <a:t> in </a:t>
+            </a:r>
+            <a:r>
+              <a:rPr lang="en-US" sz="4800" dirty="0" smtClean="0"/>
+              <a:t>Prolog</a:t>
+            </a:r>
+            <a:r>
               <a:rPr lang="en-US" sz="2800" dirty="0" smtClean="0"/>
-              <a:t>un program </a:t>
-            </a:r>
-            <a:r>
-              <a:rPr lang="en-US" sz="2800" dirty="0" err="1" smtClean="0"/>
-              <a:t>scris</a:t>
-            </a:r>
-            <a:r>
-              <a:rPr lang="en-US" sz="2800" dirty="0" smtClean="0"/>
-              <a:t> in </a:t>
-            </a:r>
-            <a:r>
-              <a:rPr lang="en-US" sz="4000" dirty="0" smtClean="0"/>
-              <a:t>Prolog</a:t>
-            </a:r>
-            <a:r>
-              <a:rPr lang="en-US" dirty="0" smtClean="0"/>
               <a:t> </a:t>
             </a:r>
           </a:p>
@@ -18156,48 +17541,50 @@
           </a:xfrm>
         </p:spPr>
         <p:txBody>
-          <a:bodyPr anchor="ctr"/>
+          <a:bodyPr anchor="ctr">
+            <a:normAutofit/>
+          </a:bodyPr>
           <a:lstStyle/>
           <a:p>
             <a:pPr algn="l"/>
             <a:r>
-              <a:rPr lang="en-US" sz="2800" dirty="0" err="1" smtClean="0"/>
+              <a:rPr lang="en-US" sz="3200" dirty="0" err="1" smtClean="0"/>
               <a:t>depisteaza</a:t>
             </a:r>
             <a:r>
-              <a:rPr lang="en-US" dirty="0" smtClean="0"/>
+              <a:rPr lang="en-US" sz="2400" dirty="0" smtClean="0"/>
               <a:t> </a:t>
             </a:r>
             <a:r>
-              <a:rPr lang="en-US" sz="4000" dirty="0" err="1" smtClean="0"/>
+              <a:rPr lang="en-US" sz="4400" dirty="0" err="1" smtClean="0"/>
               <a:t>proiecte</a:t>
             </a:r>
             <a:r>
-              <a:rPr lang="en-US" sz="4000" dirty="0" smtClean="0"/>
+              <a:rPr lang="en-US" sz="4400" dirty="0" smtClean="0"/>
               <a:t> </a:t>
             </a:r>
             <a:r>
-              <a:rPr lang="en-US" sz="2800" dirty="0" err="1" smtClean="0"/>
+              <a:rPr lang="en-US" sz="3200" dirty="0" err="1" smtClean="0"/>
               <a:t>scolare</a:t>
             </a:r>
             <a:r>
-              <a:rPr lang="en-US" sz="4800" dirty="0" smtClean="0"/>
+              <a:rPr lang="en-US" sz="5400" dirty="0" smtClean="0"/>
               <a:t> </a:t>
             </a:r>
             <a:r>
-              <a:rPr lang="en-US" sz="2800" dirty="0" smtClean="0"/>
+              <a:rPr lang="en-US" sz="3200" dirty="0" smtClean="0"/>
               <a:t>Java</a:t>
             </a:r>
             <a:r>
-              <a:rPr lang="en-US" sz="4800" dirty="0" smtClean="0"/>
+              <a:rPr lang="en-US" sz="5400" dirty="0" smtClean="0"/>
               <a:t> </a:t>
             </a:r>
             <a:r>
-              <a:rPr lang="en-US" sz="4000" dirty="0" err="1" smtClean="0"/>
+              <a:rPr lang="en-US" sz="4400" dirty="0" err="1" smtClean="0"/>
               <a:t>copiate</a:t>
             </a:r>
             <a:r>
-              <a:rPr lang="en-US" dirty="0" smtClean="0"/>
+              <a:rPr lang="en-US" sz="2400" dirty="0" smtClean="0"/>
               <a:t>.</a:t>
             </a:r>
           </a:p>
@@ -19755,22 +19142,6 @@
                                       </p:cBhvr>
                                     </p:animEffect>
                                   </p:childTnLst>
-                                  <p:subTnLst>
-                                    <p:animClr clrSpc="rgb" dir="cw">
-                                      <p:cBhvr override="childStyle">
-                                        <p:cTn dur="1" fill="hold" display="0" masterRel="nextClick" afterEffect="1"/>
-                                        <p:tgtEl>
-                                          <p:spTgt spid="12"/>
-                                        </p:tgtEl>
-                                        <p:attrNameLst>
-                                          <p:attrName>ppt_c</p:attrName>
-                                        </p:attrNameLst>
-                                      </p:cBhvr>
-                                      <p:to>
-                                        <a:srgbClr val="FFCC66"/>
-                                      </p:to>
-                                    </p:animClr>
-                                  </p:subTnLst>
                                 </p:cTn>
                               </p:par>
                               <p:par>
@@ -19841,22 +19212,6 @@
                                       </p:cBhvr>
                                     </p:animEffect>
                                   </p:childTnLst>
-                                  <p:subTnLst>
-                                    <p:animClr clrSpc="rgb" dir="cw">
-                                      <p:cBhvr override="childStyle">
-                                        <p:cTn dur="1" fill="hold" display="0" masterRel="nextClick" afterEffect="1"/>
-                                        <p:tgtEl>
-                                          <p:spTgt spid="74"/>
-                                        </p:tgtEl>
-                                        <p:attrNameLst>
-                                          <p:attrName>ppt_c</p:attrName>
-                                        </p:attrNameLst>
-                                      </p:cBhvr>
-                                      <p:to>
-                                        <a:srgbClr val="FFCC66"/>
-                                      </p:to>
-                                    </p:animClr>
-                                  </p:subTnLst>
                                 </p:cTn>
                               </p:par>
                               <p:par>
@@ -20498,25 +19853,6 @@
       </p:grpSpPr>
       <p:sp>
         <p:nvSpPr>
-          <p:cNvPr id="2" name="Content Placeholder 1"/>
-          <p:cNvSpPr>
-            <a:spLocks noGrp="1"/>
-          </p:cNvSpPr>
-          <p:nvPr>
-            <p:ph idx="1"/>
-          </p:nvPr>
-        </p:nvSpPr>
-        <p:spPr/>
-        <p:txBody>
-          <a:bodyPr/>
-          <a:lstStyle/>
-          <a:p>
-            <a:endParaRPr lang="en-US"/>
-          </a:p>
-        </p:txBody>
-      </p:sp>
-      <p:sp>
-        <p:nvSpPr>
           <p:cNvPr id="3" name="Title 2"/>
           <p:cNvSpPr>
             <a:spLocks noGrp="1"/>
@@ -20527,33 +19863,68 @@
         </p:nvSpPr>
         <p:spPr/>
         <p:txBody>
-          <a:bodyPr/>
+          <a:bodyPr>
+            <a:normAutofit/>
+          </a:bodyPr>
           <a:lstStyle/>
           <a:p>
             <a:r>
-              <a:rPr lang="en-US" dirty="0" err="1" smtClean="0"/>
-              <a:t>Arhitectura</a:t>
-            </a:r>
-            <a:r>
-              <a:rPr lang="en-US" dirty="0" smtClean="0"/>
+              <a:rPr lang="en-US" sz="4800" dirty="0" err="1" smtClean="0"/>
+              <a:t>Implementarea</a:t>
+            </a:r>
+            <a:r>
+              <a:rPr lang="en-US" sz="4800" dirty="0" smtClean="0"/>
               <a:t> </a:t>
             </a:r>
             <a:r>
-              <a:rPr lang="en-US" dirty="0" err="1" smtClean="0"/>
-              <a:t>generala</a:t>
-            </a:r>
-            <a:r>
-              <a:rPr lang="en-US" dirty="0" smtClean="0"/>
-              <a:t> a </a:t>
-            </a:r>
-            <a:r>
-              <a:rPr lang="en-US" smtClean="0"/>
-              <a:t>sistemului</a:t>
-            </a:r>
-            <a:endParaRPr lang="en-US"/>
+              <a:rPr lang="en-US" sz="4800" dirty="0" err="1" smtClean="0"/>
+              <a:t>algoritmului</a:t>
+            </a:r>
+            <a:endParaRPr lang="en-US" sz="4800" dirty="0"/>
           </a:p>
         </p:txBody>
       </p:sp>
+      <p:pic>
+        <p:nvPicPr>
+          <p:cNvPr id="3075" name="Picture 3" descr="D:\vlad\proiect licenta\licenta\doc\CloneDetector.jpg"/>
+          <p:cNvPicPr>
+            <a:picLocks noChangeAspect="1" noChangeArrowheads="1"/>
+          </p:cNvPicPr>
+          <p:nvPr/>
+        </p:nvPicPr>
+        <p:blipFill>
+          <a:blip r:embed="rId2">
+            <a:extLst>
+              <a:ext uri="{28A0092B-C50C-407E-A947-70E740481C1C}">
+                <a14:useLocalDpi xmlns:a14="http://schemas.microsoft.com/office/drawing/2010/main" val="0"/>
+              </a:ext>
+            </a:extLst>
+          </a:blip>
+          <a:srcRect/>
+          <a:stretch>
+            <a:fillRect/>
+          </a:stretch>
+        </p:blipFill>
+        <p:spPr bwMode="auto">
+          <a:xfrm>
+            <a:off x="203200" y="228600"/>
+            <a:ext cx="4972050" cy="6737350"/>
+          </a:xfrm>
+          <a:prstGeom prst="rect">
+            <a:avLst/>
+          </a:prstGeom>
+          <a:noFill/>
+          <a:extLst>
+            <a:ext uri="{909E8E84-426E-40DD-AFC4-6F175D3DCCD1}">
+              <a14:hiddenFill xmlns:a14="http://schemas.microsoft.com/office/drawing/2010/main">
+                <a:solidFill>
+                  <a:srgbClr val="FFFFFF"/>
+                </a:solidFill>
+              </a14:hiddenFill>
+            </a:ext>
+          </a:extLst>
+        </p:spPr>
+      </p:pic>
     </p:spTree>
     <p:extLst>
       <p:ext uri="{BB962C8B-B14F-4D97-AF65-F5344CB8AC3E}">
@@ -20564,6 +19935,13 @@
   <p:clrMapOvr>
     <a:masterClrMapping/>
   </p:clrMapOvr>
+  <p:timing>
+    <p:tnLst>
+      <p:par>
+        <p:cTn id="1" dur="indefinite" restart="never" nodeType="tmRoot"/>
+      </p:par>
+    </p:tnLst>
+  </p:timing>
 </p:sld>
 </file>
 
@@ -20603,7 +19981,15 @@
           <a:p>
             <a:r>
               <a:rPr lang="en-US" dirty="0" err="1" smtClean="0"/>
-              <a:t>Metrici</a:t>
+              <a:t>Metricile</a:t>
+            </a:r>
+            <a:r>
+              <a:rPr lang="en-US" dirty="0" smtClean="0"/>
+              <a:t> de </a:t>
+            </a:r>
+            <a:r>
+              <a:rPr lang="en-US" dirty="0" err="1" smtClean="0"/>
+              <a:t>baza</a:t>
             </a:r>
             <a:r>
               <a:rPr lang="en-US" dirty="0" smtClean="0"/>
@@ -20614,6 +20000,249 @@
               <a:t>folosite</a:t>
             </a:r>
             <a:endParaRPr lang="en-US" dirty="0"/>
+          </a:p>
+        </p:txBody>
+      </p:sp>
+      <p:sp>
+        <p:nvSpPr>
+          <p:cNvPr id="4" name="Content Placeholder 3"/>
+          <p:cNvSpPr>
+            <a:spLocks noGrp="1"/>
+          </p:cNvSpPr>
+          <p:nvPr>
+            <p:ph sz="quarter" idx="13"/>
+          </p:nvPr>
+        </p:nvSpPr>
+        <p:spPr/>
+        <p:txBody>
+          <a:bodyPr/>
+          <a:lstStyle/>
+          <a:p>
+            <a:r>
+              <a:rPr lang="en-US" b="1" dirty="0" err="1" smtClean="0"/>
+              <a:t>Metrici</a:t>
+            </a:r>
+            <a:r>
+              <a:rPr lang="en-US" b="1" dirty="0" smtClean="0"/>
+              <a:t> la </a:t>
+            </a:r>
+            <a:r>
+              <a:rPr lang="en-US" b="1" dirty="0" err="1" smtClean="0"/>
+              <a:t>nivel</a:t>
+            </a:r>
+            <a:r>
+              <a:rPr lang="en-US" b="1" dirty="0" smtClean="0"/>
+              <a:t> de </a:t>
+            </a:r>
+            <a:r>
+              <a:rPr lang="en-US" b="1" dirty="0" err="1" smtClean="0"/>
+              <a:t>clasa</a:t>
+            </a:r>
+            <a:endParaRPr lang="en-US" b="1" dirty="0" smtClean="0"/>
+          </a:p>
+          <a:p>
+            <a:pPr marL="0" indent="0">
+              <a:buNone/>
+            </a:pPr>
+            <a:r>
+              <a:rPr lang="en-US" dirty="0" smtClean="0"/>
+              <a:t>-   </a:t>
+            </a:r>
+            <a:r>
+              <a:rPr lang="en-US" dirty="0" err="1" smtClean="0"/>
+              <a:t>Numar</a:t>
+            </a:r>
+            <a:r>
+              <a:rPr lang="en-US" dirty="0" smtClean="0"/>
+              <a:t> </a:t>
+            </a:r>
+            <a:r>
+              <a:rPr lang="en-US" dirty="0" err="1" smtClean="0"/>
+              <a:t>atribute</a:t>
+            </a:r>
+            <a:endParaRPr lang="en-US" dirty="0" smtClean="0"/>
+          </a:p>
+          <a:p>
+            <a:pPr>
+              <a:buFontTx/>
+              <a:buChar char="-"/>
+            </a:pPr>
+            <a:r>
+              <a:rPr lang="en-US" dirty="0" err="1" smtClean="0"/>
+              <a:t>Numar</a:t>
+            </a:r>
+            <a:r>
+              <a:rPr lang="en-US" dirty="0" smtClean="0"/>
+              <a:t> </a:t>
+            </a:r>
+            <a:r>
+              <a:rPr lang="en-US" dirty="0" err="1" smtClean="0"/>
+              <a:t>metode</a:t>
+            </a:r>
+            <a:r>
+              <a:rPr lang="en-US" dirty="0" smtClean="0"/>
+              <a:t> </a:t>
+            </a:r>
+          </a:p>
+          <a:p>
+            <a:pPr>
+              <a:buFontTx/>
+              <a:buChar char="-"/>
+            </a:pPr>
+            <a:r>
+              <a:rPr lang="en-US" dirty="0" err="1" smtClean="0"/>
+              <a:t>Numar</a:t>
+            </a:r>
+            <a:r>
+              <a:rPr lang="en-US" dirty="0" smtClean="0"/>
+              <a:t> </a:t>
+            </a:r>
+            <a:r>
+              <a:rPr lang="en-US" dirty="0" err="1" smtClean="0"/>
+              <a:t>interfete</a:t>
+            </a:r>
+            <a:endParaRPr lang="en-US" dirty="0" smtClean="0"/>
+          </a:p>
+          <a:p>
+            <a:pPr>
+              <a:buFontTx/>
+              <a:buChar char="-"/>
+            </a:pPr>
+            <a:r>
+              <a:rPr lang="en-US" dirty="0" smtClean="0"/>
+              <a:t>Are </a:t>
+            </a:r>
+            <a:r>
+              <a:rPr lang="en-US" dirty="0" err="1" smtClean="0"/>
+              <a:t>superclasa</a:t>
+            </a:r>
+            <a:r>
+              <a:rPr lang="en-US" dirty="0" smtClean="0"/>
+              <a:t> ?</a:t>
+            </a:r>
+          </a:p>
+          <a:p>
+            <a:pPr>
+              <a:buFontTx/>
+              <a:buChar char="-"/>
+            </a:pPr>
+            <a:endParaRPr lang="en-US" dirty="0"/>
+          </a:p>
+          <a:p>
+            <a:pPr marL="0" indent="0">
+              <a:buNone/>
+            </a:pPr>
+            <a:endParaRPr lang="en-US" dirty="0"/>
+          </a:p>
+        </p:txBody>
+      </p:sp>
+      <p:sp>
+        <p:nvSpPr>
+          <p:cNvPr id="5" name="Content Placeholder 4"/>
+          <p:cNvSpPr>
+            <a:spLocks noGrp="1"/>
+          </p:cNvSpPr>
+          <p:nvPr>
+            <p:ph sz="quarter" idx="14"/>
+          </p:nvPr>
+        </p:nvSpPr>
+        <p:spPr>
+          <a:xfrm>
+            <a:off x="5161280" y="2976880"/>
+            <a:ext cx="4414520" cy="3881120"/>
+          </a:xfrm>
+        </p:spPr>
+        <p:txBody>
+          <a:bodyPr/>
+          <a:lstStyle/>
+          <a:p>
+            <a:r>
+              <a:rPr lang="en-US" b="1" dirty="0" err="1" smtClean="0"/>
+              <a:t>Metrici</a:t>
+            </a:r>
+            <a:r>
+              <a:rPr lang="en-US" b="1" dirty="0" smtClean="0"/>
+              <a:t> la </a:t>
+            </a:r>
+            <a:r>
+              <a:rPr lang="en-US" b="1" dirty="0" err="1" smtClean="0"/>
+              <a:t>nivel</a:t>
+            </a:r>
+            <a:r>
+              <a:rPr lang="en-US" b="1" dirty="0" smtClean="0"/>
+              <a:t> de </a:t>
+            </a:r>
+            <a:r>
+              <a:rPr lang="en-US" b="1" dirty="0" err="1" smtClean="0"/>
+              <a:t>metoda</a:t>
+            </a:r>
+            <a:endParaRPr lang="en-US" b="1" dirty="0" smtClean="0"/>
+          </a:p>
+          <a:p>
+            <a:pPr>
+              <a:buFontTx/>
+              <a:buChar char="-"/>
+            </a:pPr>
+            <a:r>
+              <a:rPr lang="en-US" dirty="0" err="1" smtClean="0"/>
+              <a:t>Semnatura</a:t>
+            </a:r>
+            <a:r>
+              <a:rPr lang="en-US" dirty="0" smtClean="0"/>
+              <a:t> </a:t>
+            </a:r>
+            <a:r>
+              <a:rPr lang="en-US" dirty="0" err="1" smtClean="0"/>
+              <a:t>metodei</a:t>
+            </a:r>
+            <a:endParaRPr lang="en-US" dirty="0" smtClean="0"/>
+          </a:p>
+          <a:p>
+            <a:pPr>
+              <a:buFontTx/>
+              <a:buChar char="-"/>
+            </a:pPr>
+            <a:r>
+              <a:rPr lang="en-US" dirty="0" err="1" smtClean="0"/>
+              <a:t>Numar</a:t>
+            </a:r>
+            <a:r>
+              <a:rPr lang="en-US" dirty="0" smtClean="0"/>
+              <a:t> While</a:t>
+            </a:r>
+          </a:p>
+          <a:p>
+            <a:pPr>
+              <a:buFontTx/>
+              <a:buChar char="-"/>
+            </a:pPr>
+            <a:r>
+              <a:rPr lang="en-US" dirty="0" err="1" smtClean="0"/>
+              <a:t>Numar</a:t>
+            </a:r>
+            <a:r>
+              <a:rPr lang="en-US" dirty="0" smtClean="0"/>
+              <a:t> If</a:t>
+            </a:r>
+          </a:p>
+          <a:p>
+            <a:pPr>
+              <a:buFontTx/>
+              <a:buChar char="-"/>
+            </a:pPr>
+            <a:r>
+              <a:rPr lang="en-US" dirty="0" err="1" smtClean="0"/>
+              <a:t>Numar</a:t>
+            </a:r>
+            <a:r>
+              <a:rPr lang="en-US" dirty="0" smtClean="0"/>
+              <a:t> </a:t>
+            </a:r>
+            <a:r>
+              <a:rPr lang="en-US" dirty="0" err="1" smtClean="0"/>
+              <a:t>operatori</a:t>
+            </a:r>
+            <a:endParaRPr lang="en-US" dirty="0" smtClean="0"/>
           </a:p>
         </p:txBody>
       </p:sp>
@@ -20664,213 +20293,775 @@
             <p:ph type="title"/>
           </p:nvPr>
         </p:nvSpPr>
-        <p:spPr/>
+        <p:spPr>
+          <a:xfrm>
+            <a:off x="6299200" y="1524000"/>
+            <a:ext cx="3245672" cy="2747903"/>
+          </a:xfrm>
+        </p:spPr>
         <p:txBody>
-          <a:bodyPr/>
+          <a:bodyPr anchor="ctr">
+            <a:normAutofit/>
+          </a:bodyPr>
           <a:lstStyle/>
           <a:p>
-            <a:endParaRPr lang="en-US"/>
+            <a:r>
+              <a:rPr lang="en-US" sz="4800" dirty="0" err="1" smtClean="0"/>
+              <a:t>Rezultate</a:t>
+            </a:r>
+            <a:endParaRPr lang="en-US" sz="4800" dirty="0"/>
           </a:p>
         </p:txBody>
       </p:sp>
-      <p:sp>
-        <p:nvSpPr>
-          <p:cNvPr id="4" name="Rectangle 3"/>
-          <p:cNvSpPr/>
-          <p:nvPr/>
-        </p:nvSpPr>
-        <p:spPr>
-          <a:xfrm>
-            <a:off x="629138" y="2895600"/>
-            <a:ext cx="5365262" cy="3276600"/>
-          </a:xfrm>
-          <a:prstGeom prst="rect">
-            <a:avLst/>
-          </a:prstGeom>
-        </p:spPr>
-        <p:style>
-          <a:lnRef idx="2">
-            <a:schemeClr val="accent1">
-              <a:shade val="50000"/>
-            </a:schemeClr>
-          </a:lnRef>
-          <a:fillRef idx="1">
-            <a:schemeClr val="accent1"/>
-          </a:fillRef>
-          <a:effectRef idx="0">
-            <a:schemeClr val="accent1"/>
-          </a:effectRef>
-          <a:fontRef idx="minor">
-            <a:schemeClr val="lt1"/>
-          </a:fontRef>
-        </p:style>
-        <p:txBody>
-          <a:bodyPr rtlCol="0" anchor="ctr"/>
-          <a:lstStyle/>
-          <a:p>
-            <a:pPr algn="ctr"/>
-            <a:r>
-              <a:rPr lang="en-US" sz="3200" b="1" dirty="0" err="1" smtClean="0"/>
-              <a:t>Metrici</a:t>
-            </a:r>
-            <a:r>
-              <a:rPr lang="en-US" sz="3200" b="1" dirty="0" smtClean="0"/>
-              <a:t> la </a:t>
-            </a:r>
-            <a:r>
-              <a:rPr lang="en-US" sz="3200" b="1" dirty="0" err="1" smtClean="0"/>
-              <a:t>nivel</a:t>
-            </a:r>
-            <a:r>
-              <a:rPr lang="en-US" sz="3200" b="1" dirty="0" smtClean="0"/>
-              <a:t> de </a:t>
-            </a:r>
-            <a:r>
-              <a:rPr lang="en-US" sz="3200" b="1" dirty="0" err="1" smtClean="0"/>
-              <a:t>clasa</a:t>
-            </a:r>
-            <a:endParaRPr lang="en-US" sz="3200" b="1" dirty="0" smtClean="0"/>
-          </a:p>
-          <a:p>
-            <a:pPr marL="342900" indent="-342900">
-              <a:buFontTx/>
-              <a:buChar char="-"/>
-            </a:pPr>
-            <a:r>
-              <a:rPr lang="en-US" dirty="0" err="1" smtClean="0"/>
-              <a:t>Numar</a:t>
-            </a:r>
-            <a:r>
-              <a:rPr lang="en-US" dirty="0" smtClean="0"/>
-              <a:t> </a:t>
-            </a:r>
-            <a:r>
-              <a:rPr lang="en-US" dirty="0" err="1" smtClean="0"/>
-              <a:t>metode</a:t>
-            </a:r>
-            <a:endParaRPr lang="en-US" dirty="0" smtClean="0"/>
-          </a:p>
-          <a:p>
-            <a:pPr marL="342900" indent="-342900">
-              <a:buFontTx/>
-              <a:buChar char="-"/>
-            </a:pPr>
-            <a:r>
-              <a:rPr lang="en-US" dirty="0" err="1" smtClean="0"/>
-              <a:t>Numar</a:t>
-            </a:r>
-            <a:r>
-              <a:rPr lang="en-US" dirty="0" smtClean="0"/>
-              <a:t> </a:t>
-            </a:r>
-            <a:r>
-              <a:rPr lang="en-US" dirty="0" err="1" smtClean="0"/>
-              <a:t>atribute</a:t>
-            </a:r>
-            <a:endParaRPr lang="en-US" dirty="0" smtClean="0"/>
-          </a:p>
-          <a:p>
-            <a:pPr marL="342900" indent="-342900">
-              <a:buFontTx/>
-              <a:buChar char="-"/>
-            </a:pPr>
-            <a:r>
-              <a:rPr lang="en-US" dirty="0" err="1" smtClean="0"/>
-              <a:t>Numar</a:t>
-            </a:r>
-            <a:r>
-              <a:rPr lang="en-US" dirty="0" smtClean="0"/>
-              <a:t> </a:t>
-            </a:r>
-            <a:r>
-              <a:rPr lang="en-US" dirty="0" err="1" smtClean="0"/>
-              <a:t>intefere</a:t>
-            </a:r>
-            <a:endParaRPr lang="en-US" dirty="0" smtClean="0"/>
-          </a:p>
-          <a:p>
-            <a:pPr marL="342900" indent="-342900">
-              <a:buFontTx/>
-              <a:buChar char="-"/>
-            </a:pPr>
-            <a:r>
-              <a:rPr lang="en-US" dirty="0" err="1" smtClean="0"/>
-              <a:t>Exista</a:t>
-            </a:r>
-            <a:r>
-              <a:rPr lang="en-US" dirty="0" smtClean="0"/>
-              <a:t> </a:t>
-            </a:r>
-            <a:r>
-              <a:rPr lang="en-US" dirty="0" err="1" smtClean="0"/>
-              <a:t>superclasa</a:t>
-            </a:r>
-            <a:endParaRPr lang="en-US" dirty="0" smtClean="0"/>
-          </a:p>
-          <a:p>
-            <a:pPr marL="342900" indent="-342900">
-              <a:buFontTx/>
-              <a:buChar char="-"/>
-            </a:pPr>
-            <a:r>
-              <a:rPr lang="en-US" dirty="0" err="1" smtClean="0"/>
-              <a:t>Interfata</a:t>
-            </a:r>
-            <a:endParaRPr lang="en-US" dirty="0" smtClean="0"/>
-          </a:p>
-          <a:p>
-            <a:pPr marL="342900" indent="-342900">
-              <a:buFontTx/>
-              <a:buChar char="-"/>
-            </a:pPr>
-            <a:endParaRPr lang="en-US" dirty="0"/>
-          </a:p>
-        </p:txBody>
-      </p:sp>
-      <p:sp>
-        <p:nvSpPr>
-          <p:cNvPr id="5" name="Rectangle 4"/>
-          <p:cNvSpPr/>
-          <p:nvPr/>
-        </p:nvSpPr>
-        <p:spPr>
-          <a:xfrm>
-            <a:off x="7213600" y="3352800"/>
-            <a:ext cx="1981200" cy="1066800"/>
-          </a:xfrm>
-          <a:prstGeom prst="rect">
-            <a:avLst/>
-          </a:prstGeom>
-        </p:spPr>
-        <p:style>
-          <a:lnRef idx="2">
-            <a:schemeClr val="accent1">
-              <a:shade val="50000"/>
-            </a:schemeClr>
-          </a:lnRef>
-          <a:fillRef idx="1">
-            <a:schemeClr val="accent1"/>
-          </a:fillRef>
-          <a:effectRef idx="0">
-            <a:schemeClr val="accent1"/>
-          </a:effectRef>
-          <a:fontRef idx="minor">
-            <a:schemeClr val="lt1"/>
-          </a:fontRef>
-        </p:style>
-        <p:txBody>
-          <a:bodyPr rtlCol="0" anchor="ctr"/>
-          <a:lstStyle/>
-          <a:p>
-            <a:pPr algn="ctr"/>
-            <a:endParaRPr lang="en-US"/>
-          </a:p>
-        </p:txBody>
-      </p:sp>
+      <p:graphicFrame>
+        <p:nvGraphicFramePr>
+          <p:cNvPr id="4" name="Table 3"/>
+          <p:cNvGraphicFramePr>
+            <a:graphicFrameLocks noGrp="1"/>
+          </p:cNvGraphicFramePr>
+          <p:nvPr>
+            <p:extLst>
+              <p:ext uri="{D42A27DB-BD31-4B8C-83A1-F6EECF244321}">
+                <p14:modId xmlns:p14="http://schemas.microsoft.com/office/powerpoint/2010/main" val="785940782"/>
+              </p:ext>
+            </p:extLst>
+          </p:nvPr>
+        </p:nvGraphicFramePr>
+        <p:xfrm>
+          <a:off x="279400" y="304801"/>
+          <a:ext cx="5638799" cy="6553199"/>
+        </p:xfrm>
+        <a:graphic>
+          <a:graphicData uri="http://schemas.openxmlformats.org/drawingml/2006/table">
+            <a:tbl>
+              <a:tblPr firstRow="1" firstCol="1" bandRow="1">
+                <a:tableStyleId>{5C22544A-7EE6-4342-B048-85BDC9FD1C3A}</a:tableStyleId>
+              </a:tblPr>
+              <a:tblGrid>
+                <a:gridCol w="2214685"/>
+                <a:gridCol w="1998237"/>
+                <a:gridCol w="1425877"/>
+              </a:tblGrid>
+              <a:tr h="746610">
+                <a:tc>
+                  <a:txBody>
+                    <a:bodyPr/>
+                    <a:lstStyle/>
+                    <a:p>
+                      <a:pPr marL="0" marR="0" algn="ctr">
+                        <a:spcBef>
+                          <a:spcPts val="0"/>
+                        </a:spcBef>
+                        <a:spcAft>
+                          <a:spcPts val="0"/>
+                        </a:spcAft>
+                      </a:pPr>
+                      <a:r>
+                        <a:rPr lang="en-US" sz="2000" dirty="0" err="1">
+                          <a:effectLst/>
+                        </a:rPr>
+                        <a:t>Caz</a:t>
+                      </a:r>
+                      <a:r>
+                        <a:rPr lang="en-US" sz="2000" dirty="0">
+                          <a:effectLst/>
+                        </a:rPr>
+                        <a:t> de test</a:t>
+                      </a:r>
+                      <a:endParaRPr lang="en-US" sz="2000" dirty="0">
+                        <a:effectLst/>
+                        <a:latin typeface="Times New Roman"/>
+                        <a:ea typeface="Times New Roman"/>
+                      </a:endParaRPr>
+                    </a:p>
+                  </a:txBody>
+                  <a:tcPr marL="68580" marR="68580" marT="0" marB="0"/>
+                </a:tc>
+                <a:tc>
+                  <a:txBody>
+                    <a:bodyPr/>
+                    <a:lstStyle/>
+                    <a:p>
+                      <a:pPr marL="0" marR="0" algn="ctr">
+                        <a:spcBef>
+                          <a:spcPts val="0"/>
+                        </a:spcBef>
+                        <a:spcAft>
+                          <a:spcPts val="0"/>
+                        </a:spcAft>
+                      </a:pPr>
+                      <a:r>
+                        <a:rPr lang="en-US" sz="2000" dirty="0" err="1">
+                          <a:effectLst/>
+                        </a:rPr>
+                        <a:t>CloneDetector</a:t>
+                      </a:r>
+                      <a:endParaRPr lang="en-US" sz="2000" dirty="0">
+                        <a:effectLst/>
+                        <a:latin typeface="Times New Roman"/>
+                        <a:ea typeface="Times New Roman"/>
+                      </a:endParaRPr>
+                    </a:p>
+                  </a:txBody>
+                  <a:tcPr marL="68580" marR="68580" marT="0" marB="0"/>
+                </a:tc>
+                <a:tc>
+                  <a:txBody>
+                    <a:bodyPr/>
+                    <a:lstStyle/>
+                    <a:p>
+                      <a:pPr marL="0" marR="0" algn="ctr">
+                        <a:spcBef>
+                          <a:spcPts val="0"/>
+                        </a:spcBef>
+                        <a:spcAft>
+                          <a:spcPts val="0"/>
+                        </a:spcAft>
+                      </a:pPr>
+                      <a:r>
+                        <a:rPr lang="en-US" sz="2000" dirty="0">
+                          <a:effectLst/>
+                        </a:rPr>
+                        <a:t>Dude</a:t>
+                      </a:r>
+                      <a:endParaRPr lang="en-US" sz="2000" dirty="0">
+                        <a:effectLst/>
+                        <a:latin typeface="Times New Roman"/>
+                        <a:ea typeface="Times New Roman"/>
+                      </a:endParaRPr>
+                    </a:p>
+                  </a:txBody>
+                  <a:tcPr marL="68580" marR="68580" marT="0" marB="0"/>
+                </a:tc>
+              </a:tr>
+              <a:tr h="526612">
+                <a:tc>
+                  <a:txBody>
+                    <a:bodyPr/>
+                    <a:lstStyle/>
+                    <a:p>
+                      <a:pPr marL="0" marR="0">
+                        <a:spcBef>
+                          <a:spcPts val="0"/>
+                        </a:spcBef>
+                        <a:spcAft>
+                          <a:spcPts val="0"/>
+                        </a:spcAft>
+                      </a:pPr>
+                      <a:r>
+                        <a:rPr lang="en-US" sz="1800" dirty="0" err="1">
+                          <a:effectLst/>
+                        </a:rPr>
+                        <a:t>Clona</a:t>
+                      </a:r>
+                      <a:r>
+                        <a:rPr lang="en-US" sz="1800" dirty="0">
+                          <a:effectLst/>
+                        </a:rPr>
+                        <a:t> </a:t>
+                      </a:r>
+                      <a:r>
+                        <a:rPr lang="en-US" sz="1800" dirty="0" err="1">
+                          <a:effectLst/>
+                        </a:rPr>
+                        <a:t>tipul</a:t>
+                      </a:r>
+                      <a:r>
+                        <a:rPr lang="en-US" sz="1800" dirty="0">
+                          <a:effectLst/>
+                        </a:rPr>
+                        <a:t> 1</a:t>
+                      </a:r>
+                      <a:endParaRPr lang="en-US" sz="1800" dirty="0">
+                        <a:effectLst/>
+                        <a:latin typeface="Times New Roman"/>
+                        <a:ea typeface="Times New Roman"/>
+                      </a:endParaRPr>
+                    </a:p>
+                  </a:txBody>
+                  <a:tcPr marL="68580" marR="68580" marT="0" marB="0"/>
+                </a:tc>
+                <a:tc>
+                  <a:txBody>
+                    <a:bodyPr/>
+                    <a:lstStyle/>
+                    <a:p>
+                      <a:pPr marL="0" marR="0" algn="ctr">
+                        <a:spcBef>
+                          <a:spcPts val="0"/>
+                        </a:spcBef>
+                        <a:spcAft>
+                          <a:spcPts val="0"/>
+                        </a:spcAft>
+                      </a:pPr>
+                      <a:r>
+                        <a:rPr lang="en-US" sz="1800" dirty="0" err="1">
+                          <a:effectLst/>
+                        </a:rPr>
+                        <a:t>Detectată</a:t>
+                      </a:r>
+                      <a:endParaRPr lang="en-US" sz="1800" dirty="0">
+                        <a:effectLst/>
+                        <a:latin typeface="Times New Roman"/>
+                        <a:ea typeface="Times New Roman"/>
+                      </a:endParaRPr>
+                    </a:p>
+                  </a:txBody>
+                  <a:tcPr marL="68580" marR="68580" marT="0" marB="0"/>
+                </a:tc>
+                <a:tc>
+                  <a:txBody>
+                    <a:bodyPr/>
+                    <a:lstStyle/>
+                    <a:p>
+                      <a:pPr marL="0" marR="0">
+                        <a:spcBef>
+                          <a:spcPts val="0"/>
+                        </a:spcBef>
+                        <a:spcAft>
+                          <a:spcPts val="0"/>
+                        </a:spcAft>
+                      </a:pPr>
+                      <a:r>
+                        <a:rPr lang="en-US" sz="1800">
+                          <a:effectLst/>
+                        </a:rPr>
+                        <a:t>Detectată</a:t>
+                      </a:r>
+                      <a:endParaRPr lang="en-US" sz="1800">
+                        <a:effectLst/>
+                        <a:latin typeface="Times New Roman"/>
+                        <a:ea typeface="Times New Roman"/>
+                      </a:endParaRPr>
+                    </a:p>
+                  </a:txBody>
+                  <a:tcPr marL="68580" marR="68580" marT="0" marB="0"/>
+                </a:tc>
+              </a:tr>
+              <a:tr h="922956">
+                <a:tc>
+                  <a:txBody>
+                    <a:bodyPr/>
+                    <a:lstStyle/>
+                    <a:p>
+                      <a:pPr marL="0" marR="0">
+                        <a:spcBef>
+                          <a:spcPts val="0"/>
+                        </a:spcBef>
+                        <a:spcAft>
+                          <a:spcPts val="0"/>
+                        </a:spcAft>
+                      </a:pPr>
+                      <a:r>
+                        <a:rPr lang="en-US" sz="1800">
+                          <a:effectLst/>
+                        </a:rPr>
+                        <a:t>Clona tipul 2 cu porţiuni redenumite</a:t>
+                      </a:r>
+                      <a:endParaRPr lang="en-US" sz="1800">
+                        <a:effectLst/>
+                        <a:latin typeface="Times New Roman"/>
+                        <a:ea typeface="Times New Roman"/>
+                      </a:endParaRPr>
+                    </a:p>
+                  </a:txBody>
+                  <a:tcPr marL="68580" marR="68580" marT="0" marB="0"/>
+                </a:tc>
+                <a:tc>
+                  <a:txBody>
+                    <a:bodyPr/>
+                    <a:lstStyle/>
+                    <a:p>
+                      <a:pPr marL="0" marR="0" algn="ctr">
+                        <a:spcBef>
+                          <a:spcPts val="0"/>
+                        </a:spcBef>
+                        <a:spcAft>
+                          <a:spcPts val="0"/>
+                        </a:spcAft>
+                      </a:pPr>
+                      <a:r>
+                        <a:rPr lang="en-US" sz="1800" dirty="0" err="1">
+                          <a:effectLst/>
+                        </a:rPr>
+                        <a:t>Detectată</a:t>
+                      </a:r>
+                      <a:endParaRPr lang="en-US" sz="1800" dirty="0">
+                        <a:effectLst/>
+                        <a:latin typeface="Times New Roman"/>
+                        <a:ea typeface="Times New Roman"/>
+                      </a:endParaRPr>
+                    </a:p>
+                  </a:txBody>
+                  <a:tcPr marL="68580" marR="68580" marT="0" marB="0"/>
+                </a:tc>
+                <a:tc>
+                  <a:txBody>
+                    <a:bodyPr/>
+                    <a:lstStyle/>
+                    <a:p>
+                      <a:pPr marL="0" marR="0">
+                        <a:spcBef>
+                          <a:spcPts val="0"/>
+                        </a:spcBef>
+                        <a:spcAft>
+                          <a:spcPts val="0"/>
+                        </a:spcAft>
+                      </a:pPr>
+                      <a:r>
+                        <a:rPr lang="en-US" sz="1800" dirty="0" err="1">
+                          <a:effectLst/>
+                        </a:rPr>
+                        <a:t>Detectată</a:t>
+                      </a:r>
+                      <a:endParaRPr lang="en-US" sz="1800" dirty="0">
+                        <a:effectLst/>
+                        <a:latin typeface="Times New Roman"/>
+                        <a:ea typeface="Times New Roman"/>
+                      </a:endParaRPr>
+                    </a:p>
+                  </a:txBody>
+                  <a:tcPr marL="68580" marR="68580" marT="0" marB="0"/>
+                </a:tc>
+              </a:tr>
+              <a:tr h="831493">
+                <a:tc>
+                  <a:txBody>
+                    <a:bodyPr/>
+                    <a:lstStyle/>
+                    <a:p>
+                      <a:pPr marL="0" marR="0">
+                        <a:spcBef>
+                          <a:spcPts val="0"/>
+                        </a:spcBef>
+                        <a:spcAft>
+                          <a:spcPts val="0"/>
+                        </a:spcAft>
+                      </a:pPr>
+                      <a:r>
+                        <a:rPr lang="en-US" sz="1800">
+                          <a:effectLst/>
+                        </a:rPr>
+                        <a:t>Clona tipul 2 total redenumită</a:t>
+                      </a:r>
+                      <a:endParaRPr lang="en-US" sz="1800">
+                        <a:effectLst/>
+                        <a:latin typeface="Times New Roman"/>
+                        <a:ea typeface="Times New Roman"/>
+                      </a:endParaRPr>
+                    </a:p>
+                  </a:txBody>
+                  <a:tcPr marL="68580" marR="68580" marT="0" marB="0"/>
+                </a:tc>
+                <a:tc>
+                  <a:txBody>
+                    <a:bodyPr/>
+                    <a:lstStyle/>
+                    <a:p>
+                      <a:pPr marL="0" marR="0" algn="ctr">
+                        <a:spcBef>
+                          <a:spcPts val="0"/>
+                        </a:spcBef>
+                        <a:spcAft>
+                          <a:spcPts val="0"/>
+                        </a:spcAft>
+                      </a:pPr>
+                      <a:r>
+                        <a:rPr lang="en-US" sz="1800" dirty="0" err="1">
+                          <a:effectLst/>
+                        </a:rPr>
+                        <a:t>Detectată</a:t>
+                      </a:r>
+                      <a:endParaRPr lang="en-US" sz="1800" dirty="0">
+                        <a:effectLst/>
+                        <a:latin typeface="Times New Roman"/>
+                        <a:ea typeface="Times New Roman"/>
+                      </a:endParaRPr>
+                    </a:p>
+                  </a:txBody>
+                  <a:tcPr marL="68580" marR="68580" marT="0" marB="0"/>
+                </a:tc>
+                <a:tc>
+                  <a:txBody>
+                    <a:bodyPr/>
+                    <a:lstStyle/>
+                    <a:p>
+                      <a:pPr marL="0" marR="0">
+                        <a:spcBef>
+                          <a:spcPts val="0"/>
+                        </a:spcBef>
+                        <a:spcAft>
+                          <a:spcPts val="0"/>
+                        </a:spcAft>
+                      </a:pPr>
+                      <a:r>
+                        <a:rPr lang="en-US" sz="1800" dirty="0" err="1">
+                          <a:effectLst/>
+                        </a:rPr>
+                        <a:t>Nedetectată</a:t>
+                      </a:r>
+                      <a:endParaRPr lang="en-US" sz="1800" dirty="0">
+                        <a:effectLst/>
+                        <a:latin typeface="Times New Roman"/>
+                        <a:ea typeface="Times New Roman"/>
+                      </a:endParaRPr>
+                    </a:p>
+                  </a:txBody>
+                  <a:tcPr marL="68580" marR="68580" marT="0" marB="0"/>
+                </a:tc>
+              </a:tr>
+              <a:tr h="831493">
+                <a:tc>
+                  <a:txBody>
+                    <a:bodyPr/>
+                    <a:lstStyle/>
+                    <a:p>
+                      <a:pPr marL="0" marR="0">
+                        <a:spcBef>
+                          <a:spcPts val="0"/>
+                        </a:spcBef>
+                        <a:spcAft>
+                          <a:spcPts val="0"/>
+                        </a:spcAft>
+                      </a:pPr>
+                      <a:r>
+                        <a:rPr lang="en-US" sz="1800">
+                          <a:effectLst/>
+                        </a:rPr>
+                        <a:t>Clona tipul 3 partial redenumită</a:t>
+                      </a:r>
+                      <a:endParaRPr lang="en-US" sz="1800">
+                        <a:effectLst/>
+                        <a:latin typeface="Times New Roman"/>
+                        <a:ea typeface="Times New Roman"/>
+                      </a:endParaRPr>
+                    </a:p>
+                  </a:txBody>
+                  <a:tcPr marL="68580" marR="68580" marT="0" marB="0"/>
+                </a:tc>
+                <a:tc>
+                  <a:txBody>
+                    <a:bodyPr/>
+                    <a:lstStyle/>
+                    <a:p>
+                      <a:pPr marL="0" marR="0" algn="ctr">
+                        <a:spcBef>
+                          <a:spcPts val="0"/>
+                        </a:spcBef>
+                        <a:spcAft>
+                          <a:spcPts val="0"/>
+                        </a:spcAft>
+                      </a:pPr>
+                      <a:r>
+                        <a:rPr lang="en-US" sz="1800" dirty="0" err="1">
+                          <a:effectLst/>
+                        </a:rPr>
+                        <a:t>Detectată</a:t>
+                      </a:r>
+                      <a:endParaRPr lang="en-US" sz="1800" dirty="0">
+                        <a:effectLst/>
+                        <a:latin typeface="Times New Roman"/>
+                        <a:ea typeface="Times New Roman"/>
+                      </a:endParaRPr>
+                    </a:p>
+                  </a:txBody>
+                  <a:tcPr marL="68580" marR="68580" marT="0" marB="0"/>
+                </a:tc>
+                <a:tc>
+                  <a:txBody>
+                    <a:bodyPr/>
+                    <a:lstStyle/>
+                    <a:p>
+                      <a:pPr marL="0" marR="0">
+                        <a:spcBef>
+                          <a:spcPts val="0"/>
+                        </a:spcBef>
+                        <a:spcAft>
+                          <a:spcPts val="0"/>
+                        </a:spcAft>
+                      </a:pPr>
+                      <a:r>
+                        <a:rPr lang="en-US" sz="1800">
+                          <a:effectLst/>
+                        </a:rPr>
+                        <a:t>Detectată</a:t>
+                      </a:r>
+                      <a:endParaRPr lang="en-US" sz="1800">
+                        <a:effectLst/>
+                        <a:latin typeface="Times New Roman"/>
+                        <a:ea typeface="Times New Roman"/>
+                      </a:endParaRPr>
+                    </a:p>
+                  </a:txBody>
+                  <a:tcPr marL="68580" marR="68580" marT="0" marB="0"/>
+                </a:tc>
+              </a:tr>
+              <a:tr h="831493">
+                <a:tc>
+                  <a:txBody>
+                    <a:bodyPr/>
+                    <a:lstStyle/>
+                    <a:p>
+                      <a:pPr marL="0" marR="0">
+                        <a:spcBef>
+                          <a:spcPts val="0"/>
+                        </a:spcBef>
+                        <a:spcAft>
+                          <a:spcPts val="0"/>
+                        </a:spcAft>
+                      </a:pPr>
+                      <a:r>
+                        <a:rPr lang="en-US" sz="1800">
+                          <a:effectLst/>
+                        </a:rPr>
+                        <a:t>Clona tipul 3 total redenumită</a:t>
+                      </a:r>
+                      <a:endParaRPr lang="en-US" sz="1800">
+                        <a:effectLst/>
+                        <a:latin typeface="Times New Roman"/>
+                        <a:ea typeface="Times New Roman"/>
+                      </a:endParaRPr>
+                    </a:p>
+                  </a:txBody>
+                  <a:tcPr marL="68580" marR="68580" marT="0" marB="0"/>
+                </a:tc>
+                <a:tc>
+                  <a:txBody>
+                    <a:bodyPr/>
+                    <a:lstStyle/>
+                    <a:p>
+                      <a:pPr marL="0" marR="0" algn="ctr">
+                        <a:spcBef>
+                          <a:spcPts val="0"/>
+                        </a:spcBef>
+                        <a:spcAft>
+                          <a:spcPts val="0"/>
+                        </a:spcAft>
+                      </a:pPr>
+                      <a:r>
+                        <a:rPr lang="en-US" sz="1800">
+                          <a:effectLst/>
+                        </a:rPr>
+                        <a:t>Detectată</a:t>
+                      </a:r>
+                      <a:endParaRPr lang="en-US" sz="1800">
+                        <a:effectLst/>
+                        <a:latin typeface="Times New Roman"/>
+                        <a:ea typeface="Times New Roman"/>
+                      </a:endParaRPr>
+                    </a:p>
+                  </a:txBody>
+                  <a:tcPr marL="68580" marR="68580" marT="0" marB="0"/>
+                </a:tc>
+                <a:tc>
+                  <a:txBody>
+                    <a:bodyPr/>
+                    <a:lstStyle/>
+                    <a:p>
+                      <a:pPr marL="0" marR="0">
+                        <a:spcBef>
+                          <a:spcPts val="0"/>
+                        </a:spcBef>
+                        <a:spcAft>
+                          <a:spcPts val="0"/>
+                        </a:spcAft>
+                      </a:pPr>
+                      <a:r>
+                        <a:rPr lang="en-US" sz="1800" dirty="0" err="1">
+                          <a:effectLst/>
+                        </a:rPr>
+                        <a:t>Neraportată</a:t>
+                      </a:r>
+                      <a:endParaRPr lang="en-US" sz="1800" dirty="0">
+                        <a:effectLst/>
+                        <a:latin typeface="Times New Roman"/>
+                        <a:ea typeface="Times New Roman"/>
+                      </a:endParaRPr>
+                    </a:p>
+                  </a:txBody>
+                  <a:tcPr marL="68580" marR="68580" marT="0" marB="0"/>
+                </a:tc>
+              </a:tr>
+              <a:tr h="615304">
+                <a:tc>
+                  <a:txBody>
+                    <a:bodyPr/>
+                    <a:lstStyle/>
+                    <a:p>
+                      <a:pPr marL="0" marR="0">
+                        <a:spcBef>
+                          <a:spcPts val="0"/>
+                        </a:spcBef>
+                        <a:spcAft>
+                          <a:spcPts val="0"/>
+                        </a:spcAft>
+                      </a:pPr>
+                      <a:r>
+                        <a:rPr lang="en-US" sz="1800">
+                          <a:effectLst/>
+                        </a:rPr>
+                        <a:t>Proiecte diferite</a:t>
+                      </a:r>
+                      <a:endParaRPr lang="en-US" sz="1800">
+                        <a:effectLst/>
+                        <a:latin typeface="Times New Roman"/>
+                        <a:ea typeface="Times New Roman"/>
+                      </a:endParaRPr>
+                    </a:p>
+                  </a:txBody>
+                  <a:tcPr marL="68580" marR="68580" marT="0" marB="0"/>
+                </a:tc>
+                <a:tc>
+                  <a:txBody>
+                    <a:bodyPr/>
+                    <a:lstStyle/>
+                    <a:p>
+                      <a:pPr marL="0" marR="0" algn="ctr">
+                        <a:spcBef>
+                          <a:spcPts val="0"/>
+                        </a:spcBef>
+                        <a:spcAft>
+                          <a:spcPts val="0"/>
+                        </a:spcAft>
+                      </a:pPr>
+                      <a:r>
+                        <a:rPr lang="en-US" sz="1800">
+                          <a:effectLst/>
+                        </a:rPr>
+                        <a:t>Neraportată</a:t>
+                      </a:r>
+                      <a:endParaRPr lang="en-US" sz="1800">
+                        <a:effectLst/>
+                        <a:latin typeface="Times New Roman"/>
+                        <a:ea typeface="Times New Roman"/>
+                      </a:endParaRPr>
+                    </a:p>
+                  </a:txBody>
+                  <a:tcPr marL="68580" marR="68580" marT="0" marB="0"/>
+                </a:tc>
+                <a:tc>
+                  <a:txBody>
+                    <a:bodyPr/>
+                    <a:lstStyle/>
+                    <a:p>
+                      <a:pPr marL="0" marR="0">
+                        <a:spcBef>
+                          <a:spcPts val="0"/>
+                        </a:spcBef>
+                        <a:spcAft>
+                          <a:spcPts val="0"/>
+                        </a:spcAft>
+                      </a:pPr>
+                      <a:r>
+                        <a:rPr lang="en-US" sz="1800">
+                          <a:effectLst/>
+                        </a:rPr>
+                        <a:t>Neraportată</a:t>
+                      </a:r>
+                      <a:endParaRPr lang="en-US" sz="1800">
+                        <a:effectLst/>
+                        <a:latin typeface="Times New Roman"/>
+                        <a:ea typeface="Times New Roman"/>
+                      </a:endParaRPr>
+                    </a:p>
+                  </a:txBody>
+                  <a:tcPr marL="68580" marR="68580" marT="0" marB="0"/>
+                </a:tc>
+              </a:tr>
+              <a:tr h="1247238">
+                <a:tc>
+                  <a:txBody>
+                    <a:bodyPr/>
+                    <a:lstStyle/>
+                    <a:p>
+                      <a:pPr marL="0" marR="0">
+                        <a:spcBef>
+                          <a:spcPts val="0"/>
+                        </a:spcBef>
+                        <a:spcAft>
+                          <a:spcPts val="0"/>
+                        </a:spcAft>
+                      </a:pPr>
+                      <a:r>
+                        <a:rPr lang="en-US" sz="1800">
+                          <a:effectLst/>
+                        </a:rPr>
+                        <a:t>Proiecte mari diferiţe</a:t>
+                      </a:r>
+                      <a:endParaRPr lang="en-US" sz="1800">
+                        <a:effectLst/>
+                        <a:latin typeface="Times New Roman"/>
+                        <a:ea typeface="Times New Roman"/>
+                      </a:endParaRPr>
+                    </a:p>
+                  </a:txBody>
+                  <a:tcPr marL="68580" marR="68580" marT="0" marB="0"/>
+                </a:tc>
+                <a:tc>
+                  <a:txBody>
+                    <a:bodyPr/>
+                    <a:lstStyle/>
+                    <a:p>
+                      <a:pPr marL="0" marR="0" algn="ctr">
+                        <a:spcBef>
+                          <a:spcPts val="0"/>
+                        </a:spcBef>
+                        <a:spcAft>
+                          <a:spcPts val="0"/>
+                        </a:spcAft>
+                      </a:pPr>
+                      <a:r>
+                        <a:rPr lang="en-US" sz="1800">
+                          <a:effectLst/>
+                        </a:rPr>
+                        <a:t>Neraportată + timp mare de executie</a:t>
+                      </a:r>
+                      <a:endParaRPr lang="en-US" sz="1800">
+                        <a:effectLst/>
+                        <a:latin typeface="Times New Roman"/>
+                        <a:ea typeface="Times New Roman"/>
+                      </a:endParaRPr>
+                    </a:p>
+                  </a:txBody>
+                  <a:tcPr marL="68580" marR="68580" marT="0" marB="0"/>
+                </a:tc>
+                <a:tc>
+                  <a:txBody>
+                    <a:bodyPr/>
+                    <a:lstStyle/>
+                    <a:p>
+                      <a:pPr marL="0" marR="0">
+                        <a:spcBef>
+                          <a:spcPts val="0"/>
+                        </a:spcBef>
+                        <a:spcAft>
+                          <a:spcPts val="0"/>
+                        </a:spcAft>
+                      </a:pPr>
+                      <a:r>
+                        <a:rPr lang="en-US" sz="1800" dirty="0" err="1">
+                          <a:effectLst/>
+                        </a:rPr>
+                        <a:t>Neraportată</a:t>
+                      </a:r>
+                      <a:endParaRPr lang="en-US" sz="1800" dirty="0">
+                        <a:effectLst/>
+                        <a:latin typeface="Times New Roman"/>
+                        <a:ea typeface="Times New Roman"/>
+                      </a:endParaRPr>
+                    </a:p>
+                  </a:txBody>
+                  <a:tcPr marL="68580" marR="68580" marT="0" marB="0"/>
+                </a:tc>
+              </a:tr>
+            </a:tbl>
+          </a:graphicData>
+        </a:graphic>
+      </p:graphicFrame>
     </p:spTree>
     <p:extLst>
       <p:ext uri="{BB962C8B-B14F-4D97-AF65-F5344CB8AC3E}">
-        <p14:creationId xmlns:p14="http://schemas.microsoft.com/office/powerpoint/2010/main" val="3766395362"/>
+        <p14:creationId xmlns:p14="http://schemas.microsoft.com/office/powerpoint/2010/main" val="3267582253"/>
       </p:ext>
     </p:extLst>
   </p:cSld>

</xml_diff>

<commit_message>
Prezentare licenta.pptx varianta de la conferinta
</commit_message>
<xml_diff>
--- a/doc/Prezentare licenta.pptx
+++ b/doc/Prezentare licenta.pptx
@@ -5,22 +5,27 @@
     <p:sldMasterId id="2147484824" r:id="rId1"/>
   </p:sldMasterIdLst>
   <p:notesMasterIdLst>
-    <p:notesMasterId r:id="rId15"/>
+    <p:notesMasterId r:id="rId20"/>
   </p:notesMasterIdLst>
   <p:sldIdLst>
     <p:sldId id="256" r:id="rId2"/>
     <p:sldId id="257" r:id="rId3"/>
     <p:sldId id="259" r:id="rId4"/>
-    <p:sldId id="258" r:id="rId5"/>
+    <p:sldId id="270" r:id="rId5"/>
     <p:sldId id="260" r:id="rId6"/>
     <p:sldId id="261" r:id="rId7"/>
-    <p:sldId id="269" r:id="rId8"/>
-    <p:sldId id="262" r:id="rId9"/>
-    <p:sldId id="266" r:id="rId10"/>
-    <p:sldId id="267" r:id="rId11"/>
-    <p:sldId id="264" r:id="rId12"/>
-    <p:sldId id="268" r:id="rId13"/>
-    <p:sldId id="265" r:id="rId14"/>
+    <p:sldId id="258" r:id="rId8"/>
+    <p:sldId id="269" r:id="rId9"/>
+    <p:sldId id="262" r:id="rId10"/>
+    <p:sldId id="271" r:id="rId11"/>
+    <p:sldId id="272" r:id="rId12"/>
+    <p:sldId id="273" r:id="rId13"/>
+    <p:sldId id="266" r:id="rId14"/>
+    <p:sldId id="267" r:id="rId15"/>
+    <p:sldId id="264" r:id="rId16"/>
+    <p:sldId id="268" r:id="rId17"/>
+    <p:sldId id="265" r:id="rId18"/>
+    <p:sldId id="274" r:id="rId19"/>
   </p:sldIdLst>
   <p:sldSz cx="10160000" cy="7620000"/>
   <p:notesSz cx="6858000" cy="9144000"/>
@@ -157,16 +162,21 @@
             <p14:sldId id="256"/>
             <p14:sldId id="257"/>
             <p14:sldId id="259"/>
-            <p14:sldId id="258"/>
+            <p14:sldId id="270"/>
             <p14:sldId id="260"/>
             <p14:sldId id="261"/>
+            <p14:sldId id="258"/>
             <p14:sldId id="269"/>
             <p14:sldId id="262"/>
+            <p14:sldId id="271"/>
+            <p14:sldId id="272"/>
+            <p14:sldId id="273"/>
             <p14:sldId id="266"/>
             <p14:sldId id="267"/>
             <p14:sldId id="264"/>
             <p14:sldId id="268"/>
             <p14:sldId id="265"/>
+            <p14:sldId id="274"/>
           </p14:sldIdLst>
         </p14:section>
       </p14:sectionLst>
@@ -1158,7 +1168,7 @@
             <a:fld id="{54CEF8BC-56BE-4682-9BB0-C3BFCD6709AE}" type="slidenum">
               <a:rPr lang="en-US" smtClean="0"/>
               <a:pPr/>
-              <a:t>4</a:t>
+              <a:t>5</a:t>
             </a:fld>
             <a:endParaRPr lang="en-US"/>
           </a:p>
@@ -1167,7 +1177,7 @@
     </p:spTree>
     <p:extLst>
       <p:ext uri="{BB962C8B-B14F-4D97-AF65-F5344CB8AC3E}">
-        <p14:creationId xmlns:p14="http://schemas.microsoft.com/office/powerpoint/2010/main" val="2341919135"/>
+        <p14:creationId xmlns:p14="http://schemas.microsoft.com/office/powerpoint/2010/main" val="3837304984"/>
       </p:ext>
     </p:extLst>
   </p:cSld>
@@ -1243,7 +1253,7 @@
             <a:fld id="{54CEF8BC-56BE-4682-9BB0-C3BFCD6709AE}" type="slidenum">
               <a:rPr lang="en-US" smtClean="0"/>
               <a:pPr/>
-              <a:t>5</a:t>
+              <a:t>7</a:t>
             </a:fld>
             <a:endParaRPr lang="en-US"/>
           </a:p>
@@ -1252,7 +1262,92 @@
     </p:spTree>
     <p:extLst>
       <p:ext uri="{BB962C8B-B14F-4D97-AF65-F5344CB8AC3E}">
-        <p14:creationId xmlns:p14="http://schemas.microsoft.com/office/powerpoint/2010/main" val="3837304984"/>
+        <p14:creationId xmlns:p14="http://schemas.microsoft.com/office/powerpoint/2010/main" val="2341919135"/>
+      </p:ext>
+    </p:extLst>
+  </p:cSld>
+  <p:clrMapOvr>
+    <a:masterClrMapping/>
+  </p:clrMapOvr>
+</p:notes>
+</file>
+
+<file path=ppt/notesSlides/notesSlide4.xml><?xml version="1.0" encoding="utf-8"?>
+<p:notes xmlns:a="http://schemas.openxmlformats.org/drawingml/2006/main" xmlns:r="http://schemas.openxmlformats.org/officeDocument/2006/relationships" xmlns:p="http://schemas.openxmlformats.org/presentationml/2006/main">
+  <p:cSld>
+    <p:spTree>
+      <p:nvGrpSpPr>
+        <p:cNvPr id="1" name=""/>
+        <p:cNvGrpSpPr/>
+        <p:nvPr/>
+      </p:nvGrpSpPr>
+      <p:grpSpPr>
+        <a:xfrm>
+          <a:off x="0" y="0"/>
+          <a:ext cx="0" cy="0"/>
+          <a:chOff x="0" y="0"/>
+          <a:chExt cx="0" cy="0"/>
+        </a:xfrm>
+      </p:grpSpPr>
+      <p:sp>
+        <p:nvSpPr>
+          <p:cNvPr id="2" name="Slide Image Placeholder 1"/>
+          <p:cNvSpPr>
+            <a:spLocks noGrp="1" noRot="1" noChangeAspect="1"/>
+          </p:cNvSpPr>
+          <p:nvPr>
+            <p:ph type="sldImg"/>
+          </p:nvPr>
+        </p:nvSpPr>
+        <p:spPr/>
+      </p:sp>
+      <p:sp>
+        <p:nvSpPr>
+          <p:cNvPr id="3" name="Notes Placeholder 2"/>
+          <p:cNvSpPr>
+            <a:spLocks noGrp="1"/>
+          </p:cNvSpPr>
+          <p:nvPr>
+            <p:ph type="body" idx="1"/>
+          </p:nvPr>
+        </p:nvSpPr>
+        <p:spPr/>
+        <p:txBody>
+          <a:bodyPr/>
+          <a:lstStyle/>
+          <a:p>
+            <a:endParaRPr lang="en-US" dirty="0"/>
+          </a:p>
+        </p:txBody>
+      </p:sp>
+      <p:sp>
+        <p:nvSpPr>
+          <p:cNvPr id="4" name="Slide Number Placeholder 3"/>
+          <p:cNvSpPr>
+            <a:spLocks noGrp="1"/>
+          </p:cNvSpPr>
+          <p:nvPr>
+            <p:ph type="sldNum" sz="quarter" idx="10"/>
+          </p:nvPr>
+        </p:nvSpPr>
+        <p:spPr/>
+        <p:txBody>
+          <a:bodyPr/>
+          <a:lstStyle/>
+          <a:p>
+            <a:fld id="{54CEF8BC-56BE-4682-9BB0-C3BFCD6709AE}" type="slidenum">
+              <a:rPr lang="en-US" smtClean="0"/>
+              <a:pPr/>
+              <a:t>10</a:t>
+            </a:fld>
+            <a:endParaRPr lang="en-US"/>
+          </a:p>
+        </p:txBody>
+      </p:sp>
+    </p:spTree>
+    <p:extLst>
+      <p:ext uri="{BB962C8B-B14F-4D97-AF65-F5344CB8AC3E}">
+        <p14:creationId xmlns:p14="http://schemas.microsoft.com/office/powerpoint/2010/main" val="3280759753"/>
       </p:ext>
     </p:extLst>
   </p:cSld>
@@ -16539,188 +16634,7 @@
       </p:grpSpPr>
       <p:sp>
         <p:nvSpPr>
-          <p:cNvPr id="2" name="Content Placeholder 1"/>
-          <p:cNvSpPr>
-            <a:spLocks noGrp="1"/>
-          </p:cNvSpPr>
-          <p:nvPr>
-            <p:ph idx="1"/>
-          </p:nvPr>
-        </p:nvSpPr>
-        <p:spPr>
-          <a:xfrm>
-            <a:off x="431800" y="2972741"/>
-            <a:ext cx="9067800" cy="2970859"/>
-          </a:xfrm>
-        </p:spPr>
-        <p:txBody>
-          <a:bodyPr>
-            <a:normAutofit fontScale="92500" lnSpcReduction="20000"/>
-          </a:bodyPr>
-          <a:lstStyle/>
-          <a:p>
-            <a:pPr>
-              <a:lnSpc>
-                <a:spcPct val="150000"/>
-              </a:lnSpc>
-            </a:pPr>
-            <a:r>
-              <a:rPr lang="en-US" sz="2800" dirty="0" err="1" smtClean="0"/>
-              <a:t>Analizarea</a:t>
-            </a:r>
-            <a:r>
-              <a:rPr lang="en-US" sz="2800" dirty="0" smtClean="0"/>
-              <a:t> </a:t>
-            </a:r>
-            <a:r>
-              <a:rPr lang="en-US" sz="2800" dirty="0" err="1" smtClean="0"/>
-              <a:t>unui</a:t>
-            </a:r>
-            <a:r>
-              <a:rPr lang="en-US" sz="2800" dirty="0" smtClean="0"/>
-              <a:t> set de </a:t>
-            </a:r>
-            <a:r>
-              <a:rPr lang="en-US" sz="2800" dirty="0" err="1" smtClean="0"/>
-              <a:t>teme</a:t>
-            </a:r>
-            <a:r>
-              <a:rPr lang="en-US" sz="2800" dirty="0" smtClean="0"/>
-              <a:t> de la </a:t>
-            </a:r>
-            <a:r>
-              <a:rPr lang="en-US" sz="2800" dirty="0" err="1" smtClean="0"/>
-              <a:t>laboratorul</a:t>
-            </a:r>
-            <a:r>
-              <a:rPr lang="en-US" sz="2800" dirty="0" smtClean="0"/>
-              <a:t> de </a:t>
-            </a:r>
-            <a:r>
-              <a:rPr lang="en-US" sz="2800" dirty="0" err="1" smtClean="0"/>
-              <a:t>PASSC</a:t>
-            </a:r>
-            <a:r>
-              <a:rPr lang="en-US" sz="2800" dirty="0"/>
-              <a:t>:</a:t>
-            </a:r>
-            <a:endParaRPr lang="en-US" sz="2800" dirty="0" smtClean="0"/>
-          </a:p>
-          <a:p>
-            <a:pPr lvl="1">
-              <a:lnSpc>
-                <a:spcPct val="150000"/>
-              </a:lnSpc>
-              <a:buFont typeface="Wingdings" pitchFamily="2" charset="2"/>
-              <a:buChar char="§"/>
-            </a:pPr>
-            <a:r>
-              <a:rPr lang="en-US" sz="2800" dirty="0" smtClean="0"/>
-              <a:t>16 </a:t>
-            </a:r>
-            <a:r>
-              <a:rPr lang="en-US" sz="2800" dirty="0" err="1" smtClean="0"/>
-              <a:t>proiecte</a:t>
-            </a:r>
-            <a:r>
-              <a:rPr lang="en-US" sz="2800" dirty="0" smtClean="0"/>
-              <a:t> </a:t>
-            </a:r>
-            <a:r>
-              <a:rPr lang="en-US" sz="2800" dirty="0" err="1" smtClean="0"/>
-              <a:t>comparate</a:t>
-            </a:r>
-            <a:endParaRPr lang="en-US" sz="2800" dirty="0" smtClean="0"/>
-          </a:p>
-          <a:p>
-            <a:pPr lvl="1">
-              <a:lnSpc>
-                <a:spcPct val="150000"/>
-              </a:lnSpc>
-              <a:buFont typeface="Wingdings" pitchFamily="2" charset="2"/>
-              <a:buChar char="§"/>
-            </a:pPr>
-            <a:r>
-              <a:rPr lang="en-US" sz="2800" dirty="0"/>
-              <a:t>120 de </a:t>
-            </a:r>
-            <a:r>
-              <a:rPr lang="en-US" sz="2800" dirty="0" err="1" smtClean="0"/>
-              <a:t>parechi</a:t>
-            </a:r>
-            <a:r>
-              <a:rPr lang="en-US" sz="2800" dirty="0" smtClean="0"/>
-              <a:t> de </a:t>
-            </a:r>
-            <a:r>
-              <a:rPr lang="en-US" sz="2800" dirty="0" err="1" smtClean="0"/>
-              <a:t>cate</a:t>
-            </a:r>
-            <a:r>
-              <a:rPr lang="en-US" sz="2800" dirty="0" smtClean="0"/>
-              <a:t> 2 </a:t>
-            </a:r>
-            <a:r>
-              <a:rPr lang="en-US" sz="2800" dirty="0" err="1" smtClean="0"/>
-              <a:t>proiecte</a:t>
-            </a:r>
-            <a:r>
-              <a:rPr lang="en-US" sz="2800" dirty="0" smtClean="0"/>
-              <a:t> </a:t>
-            </a:r>
-            <a:r>
-              <a:rPr lang="en-US" sz="2800" dirty="0" err="1" smtClean="0"/>
-              <a:t>analizate</a:t>
-            </a:r>
-            <a:r>
-              <a:rPr lang="en-US" sz="2800" dirty="0" smtClean="0"/>
-              <a:t> in 21  de </a:t>
-            </a:r>
-            <a:r>
-              <a:rPr lang="en-US" sz="2800" dirty="0" err="1" smtClean="0"/>
-              <a:t>secunde</a:t>
-            </a:r>
-            <a:endParaRPr lang="en-US" sz="2800" dirty="0"/>
-          </a:p>
-          <a:p>
-            <a:pPr lvl="1">
-              <a:lnSpc>
-                <a:spcPct val="150000"/>
-              </a:lnSpc>
-              <a:buFont typeface="Wingdings" pitchFamily="2" charset="2"/>
-              <a:buChar char="§"/>
-            </a:pPr>
-            <a:r>
-              <a:rPr lang="en-US" sz="2800" dirty="0" err="1"/>
-              <a:t>d</a:t>
-            </a:r>
-            <a:r>
-              <a:rPr lang="en-US" sz="2800" dirty="0" err="1" smtClean="0"/>
-              <a:t>epistate</a:t>
-            </a:r>
-            <a:r>
-              <a:rPr lang="en-US" sz="2800" dirty="0" smtClean="0"/>
-              <a:t> 2 </a:t>
-            </a:r>
-            <a:r>
-              <a:rPr lang="en-US" sz="2800" dirty="0" err="1" smtClean="0"/>
-              <a:t>proiecte</a:t>
-            </a:r>
-            <a:r>
-              <a:rPr lang="en-US" sz="2800" dirty="0" smtClean="0"/>
-              <a:t> </a:t>
-            </a:r>
-            <a:r>
-              <a:rPr lang="en-US" sz="2800" dirty="0" err="1" smtClean="0"/>
-              <a:t>copiate</a:t>
-            </a:r>
-            <a:endParaRPr lang="en-US" sz="2800" dirty="0" smtClean="0"/>
-          </a:p>
-        </p:txBody>
-      </p:sp>
-      <p:sp>
-        <p:nvSpPr>
-          <p:cNvPr id="3" name="Title 2"/>
+          <p:cNvPr id="2" name="Title 1"/>
           <p:cNvSpPr>
             <a:spLocks noGrp="1"/>
           </p:cNvSpPr>
@@ -16735,16 +16649,442 @@
           <a:p>
             <a:r>
               <a:rPr lang="en-US" dirty="0" err="1" smtClean="0"/>
-              <a:t>Rezultate</a:t>
+              <a:t>Analiza</a:t>
+            </a:r>
+            <a:r>
+              <a:rPr lang="en-US" dirty="0" smtClean="0"/>
+              <a:t> </a:t>
+            </a:r>
+            <a:r>
+              <a:rPr lang="en-US" dirty="0" err="1" smtClean="0"/>
+              <a:t>grafurilor</a:t>
+            </a:r>
+            <a:r>
+              <a:rPr lang="en-US" dirty="0" smtClean="0"/>
+              <a:t> de </a:t>
+            </a:r>
+            <a:r>
+              <a:rPr lang="en-US" dirty="0" err="1" smtClean="0"/>
+              <a:t>apeluri</a:t>
             </a:r>
             <a:endParaRPr lang="en-US" dirty="0"/>
           </a:p>
         </p:txBody>
       </p:sp>
+      <p:sp>
+        <p:nvSpPr>
+          <p:cNvPr id="6" name="Text Placeholder 4"/>
+          <p:cNvSpPr txBox="1">
+            <a:spLocks/>
+          </p:cNvSpPr>
+          <p:nvPr/>
+        </p:nvSpPr>
+        <p:spPr>
+          <a:xfrm>
+            <a:off x="508000" y="1600200"/>
+            <a:ext cx="6248400" cy="5715000"/>
+          </a:xfrm>
+          <a:prstGeom prst="rect">
+            <a:avLst/>
+          </a:prstGeom>
+        </p:spPr>
+        <p:txBody>
+          <a:bodyPr anchor="ctr">
+            <a:normAutofit/>
+          </a:bodyPr>
+          <a:lstStyle>
+            <a:lvl1pPr marL="304797" indent="-304797" algn="l" defTabSz="1015990" rtl="0" eaLnBrk="1" latinLnBrk="0" hangingPunct="1">
+              <a:spcBef>
+                <a:spcPct val="20000"/>
+              </a:spcBef>
+              <a:buClr>
+                <a:schemeClr val="accent1"/>
+              </a:buClr>
+              <a:buSzPct val="100000"/>
+              <a:buFont typeface="Symbol" pitchFamily="18" charset="2"/>
+              <a:buChar char=""/>
+              <a:defRPr sz="2700" kern="1200">
+                <a:solidFill>
+                  <a:schemeClr val="tx2"/>
+                </a:solidFill>
+                <a:latin typeface="+mn-lt"/>
+                <a:ea typeface="+mn-ea"/>
+                <a:cs typeface="+mn-cs"/>
+              </a:defRPr>
+            </a:lvl1pPr>
+            <a:lvl2pPr marL="640286" indent="-304797" algn="l" defTabSz="1015990" rtl="0" eaLnBrk="1" latinLnBrk="0" hangingPunct="1">
+              <a:spcBef>
+                <a:spcPct val="20000"/>
+              </a:spcBef>
+              <a:buClr>
+                <a:schemeClr val="accent1"/>
+              </a:buClr>
+              <a:buSzPct val="100000"/>
+              <a:buFont typeface="Symbol" pitchFamily="18" charset="2"/>
+              <a:buChar char=""/>
+              <a:defRPr sz="2400" kern="1200">
+                <a:solidFill>
+                  <a:schemeClr val="tx2"/>
+                </a:solidFill>
+                <a:latin typeface="+mn-lt"/>
+                <a:ea typeface="+mn-ea"/>
+                <a:cs typeface="+mn-cs"/>
+              </a:defRPr>
+            </a:lvl2pPr>
+            <a:lvl3pPr marL="950727" indent="-253997" algn="l" defTabSz="1015990" rtl="0" eaLnBrk="1" latinLnBrk="0" hangingPunct="1">
+              <a:spcBef>
+                <a:spcPct val="20000"/>
+              </a:spcBef>
+              <a:buClr>
+                <a:schemeClr val="accent1"/>
+              </a:buClr>
+              <a:buSzPct val="100000"/>
+              <a:buFont typeface="Symbol" pitchFamily="18" charset="2"/>
+              <a:buChar char=""/>
+              <a:defRPr sz="2200" kern="1200">
+                <a:solidFill>
+                  <a:schemeClr val="tx2"/>
+                </a:solidFill>
+                <a:latin typeface="+mn-lt"/>
+                <a:ea typeface="+mn-ea"/>
+                <a:cs typeface="+mn-cs"/>
+              </a:defRPr>
+            </a:lvl3pPr>
+            <a:lvl4pPr marL="1269987" indent="-253997" algn="l" defTabSz="1015990" rtl="0" eaLnBrk="1" latinLnBrk="0" hangingPunct="1">
+              <a:spcBef>
+                <a:spcPct val="20000"/>
+              </a:spcBef>
+              <a:buClr>
+                <a:schemeClr val="accent1"/>
+              </a:buClr>
+              <a:buSzPct val="100000"/>
+              <a:buFont typeface="Symbol" pitchFamily="18" charset="2"/>
+              <a:buChar char=""/>
+              <a:defRPr sz="2000" kern="1200">
+                <a:solidFill>
+                  <a:schemeClr val="tx2"/>
+                </a:solidFill>
+                <a:latin typeface="+mn-lt"/>
+                <a:ea typeface="+mn-ea"/>
+                <a:cs typeface="+mn-cs"/>
+              </a:defRPr>
+            </a:lvl4pPr>
+            <a:lvl5pPr marL="1625584" indent="-253997" algn="l" defTabSz="1015990" rtl="0" eaLnBrk="1" latinLnBrk="0" hangingPunct="1">
+              <a:spcBef>
+                <a:spcPct val="20000"/>
+              </a:spcBef>
+              <a:buClr>
+                <a:schemeClr val="accent1"/>
+              </a:buClr>
+              <a:buSzPct val="100000"/>
+              <a:buFont typeface="Symbol" pitchFamily="18" charset="2"/>
+              <a:buChar char=""/>
+              <a:defRPr sz="1800" kern="1200">
+                <a:solidFill>
+                  <a:schemeClr val="tx2"/>
+                </a:solidFill>
+                <a:latin typeface="+mn-lt"/>
+                <a:ea typeface="+mn-ea"/>
+                <a:cs typeface="+mn-cs"/>
+              </a:defRPr>
+            </a:lvl5pPr>
+            <a:lvl6pPr marL="1981180" indent="-253997" algn="l" defTabSz="1015990" rtl="0" eaLnBrk="1" latinLnBrk="0" hangingPunct="1">
+              <a:spcBef>
+                <a:spcPts val="427"/>
+              </a:spcBef>
+              <a:buClr>
+                <a:schemeClr val="accent1"/>
+              </a:buClr>
+              <a:buFont typeface="Symbol" pitchFamily="18" charset="2"/>
+              <a:buChar char="*"/>
+              <a:defRPr sz="1600" kern="1200">
+                <a:solidFill>
+                  <a:schemeClr val="tx2"/>
+                </a:solidFill>
+                <a:latin typeface="+mn-lt"/>
+                <a:ea typeface="+mn-ea"/>
+                <a:cs typeface="+mn-cs"/>
+              </a:defRPr>
+            </a:lvl6pPr>
+            <a:lvl7pPr marL="2336777" indent="-253997" algn="l" defTabSz="1015990" rtl="0" eaLnBrk="1" latinLnBrk="0" hangingPunct="1">
+              <a:spcBef>
+                <a:spcPts val="427"/>
+              </a:spcBef>
+              <a:buClr>
+                <a:schemeClr val="accent1"/>
+              </a:buClr>
+              <a:buFont typeface="Symbol" pitchFamily="18" charset="2"/>
+              <a:buChar char="*"/>
+              <a:defRPr sz="1600" kern="1200">
+                <a:solidFill>
+                  <a:schemeClr val="tx2"/>
+                </a:solidFill>
+                <a:latin typeface="+mn-lt"/>
+                <a:ea typeface="+mn-ea"/>
+                <a:cs typeface="+mn-cs"/>
+              </a:defRPr>
+            </a:lvl7pPr>
+            <a:lvl8pPr marL="2692373" indent="-253997" algn="l" defTabSz="1015990" rtl="0" eaLnBrk="1" latinLnBrk="0" hangingPunct="1">
+              <a:spcBef>
+                <a:spcPts val="427"/>
+              </a:spcBef>
+              <a:buClr>
+                <a:schemeClr val="accent1"/>
+              </a:buClr>
+              <a:buFont typeface="Symbol" pitchFamily="18" charset="2"/>
+              <a:buChar char="*"/>
+              <a:defRPr sz="1600" kern="1200">
+                <a:solidFill>
+                  <a:schemeClr val="tx2"/>
+                </a:solidFill>
+                <a:latin typeface="+mn-lt"/>
+                <a:ea typeface="+mn-ea"/>
+                <a:cs typeface="+mn-cs"/>
+              </a:defRPr>
+            </a:lvl8pPr>
+            <a:lvl9pPr marL="3047970" indent="-253997" algn="l" defTabSz="1015990" rtl="0" eaLnBrk="1" latinLnBrk="0" hangingPunct="1">
+              <a:spcBef>
+                <a:spcPts val="427"/>
+              </a:spcBef>
+              <a:buClr>
+                <a:schemeClr val="accent1"/>
+              </a:buClr>
+              <a:buFont typeface="Symbol" pitchFamily="18" charset="2"/>
+              <a:buChar char="*"/>
+              <a:defRPr sz="1600" kern="1200">
+                <a:solidFill>
+                  <a:schemeClr val="tx2"/>
+                </a:solidFill>
+                <a:latin typeface="+mn-lt"/>
+                <a:ea typeface="+mn-ea"/>
+                <a:cs typeface="+mn-cs"/>
+              </a:defRPr>
+            </a:lvl9pPr>
+          </a:lstStyle>
+          <a:p>
+            <a:pPr>
+              <a:lnSpc>
+                <a:spcPct val="150000"/>
+              </a:lnSpc>
+            </a:pPr>
+            <a:r>
+              <a:rPr lang="en-US" sz="2800" dirty="0" smtClean="0"/>
+              <a:t>Se </a:t>
+            </a:r>
+            <a:r>
+              <a:rPr lang="en-US" sz="2800" dirty="0" err="1" smtClean="0"/>
+              <a:t>aplica</a:t>
+            </a:r>
+            <a:r>
+              <a:rPr lang="en-US" sz="2800" dirty="0" smtClean="0"/>
+              <a:t> la </a:t>
+            </a:r>
+            <a:r>
+              <a:rPr lang="en-US" sz="3200" b="1" dirty="0" err="1" smtClean="0"/>
+              <a:t>nivelul</a:t>
+            </a:r>
+            <a:r>
+              <a:rPr lang="en-US" sz="3200" b="1" dirty="0" smtClean="0"/>
+              <a:t> </a:t>
+            </a:r>
+            <a:r>
+              <a:rPr lang="en-US" sz="3200" b="1" dirty="0" err="1" smtClean="0"/>
+              <a:t>tuturor</a:t>
+            </a:r>
+            <a:r>
+              <a:rPr lang="en-US" sz="3200" b="1" dirty="0" smtClean="0"/>
+              <a:t> </a:t>
+            </a:r>
+            <a:r>
+              <a:rPr lang="en-US" sz="3200" b="1" dirty="0" err="1" smtClean="0"/>
+              <a:t>metodelor</a:t>
+            </a:r>
+            <a:r>
+              <a:rPr lang="en-US" sz="3200" b="1" dirty="0" smtClean="0"/>
+              <a:t> </a:t>
+            </a:r>
+            <a:r>
+              <a:rPr lang="en-US" sz="2800" dirty="0" err="1" smtClean="0"/>
+              <a:t>unei</a:t>
+            </a:r>
+            <a:r>
+              <a:rPr lang="en-US" sz="2800" dirty="0" smtClean="0"/>
+              <a:t> </a:t>
+            </a:r>
+            <a:r>
+              <a:rPr lang="en-US" sz="2800" dirty="0" err="1" smtClean="0"/>
+              <a:t>clase</a:t>
+            </a:r>
+            <a:r>
+              <a:rPr lang="en-US" sz="2800" dirty="0" smtClean="0"/>
+              <a:t>.</a:t>
+            </a:r>
+          </a:p>
+          <a:p>
+            <a:pPr>
+              <a:lnSpc>
+                <a:spcPct val="150000"/>
+              </a:lnSpc>
+            </a:pPr>
+            <a:r>
+              <a:rPr lang="en-US" sz="2800" dirty="0" smtClean="0"/>
+              <a:t>In </a:t>
+            </a:r>
+            <a:r>
+              <a:rPr lang="en-US" sz="2800" dirty="0" err="1" smtClean="0"/>
+              <a:t>fiecare</a:t>
+            </a:r>
+            <a:r>
+              <a:rPr lang="en-US" sz="2800" dirty="0" smtClean="0"/>
+              <a:t> </a:t>
+            </a:r>
+            <a:r>
+              <a:rPr lang="en-US" sz="2800" dirty="0" err="1" smtClean="0"/>
+              <a:t>metoda</a:t>
+            </a:r>
+            <a:r>
+              <a:rPr lang="en-US" sz="2800" dirty="0" smtClean="0"/>
+              <a:t> </a:t>
+            </a:r>
+            <a:r>
+              <a:rPr lang="en-US" sz="2800" dirty="0" err="1" smtClean="0"/>
+              <a:t>gaseste</a:t>
+            </a:r>
+            <a:r>
+              <a:rPr lang="en-US" sz="2800" dirty="0" smtClean="0"/>
+              <a:t> </a:t>
+            </a:r>
+            <a:r>
+              <a:rPr lang="en-US" sz="2800" dirty="0" err="1" smtClean="0"/>
+              <a:t>apeluri</a:t>
+            </a:r>
+            <a:r>
+              <a:rPr lang="en-US" sz="2800" dirty="0" smtClean="0"/>
+              <a:t> </a:t>
+            </a:r>
+            <a:r>
+              <a:rPr lang="en-US" sz="2800" dirty="0" err="1" smtClean="0"/>
+              <a:t>catre</a:t>
+            </a:r>
+            <a:r>
+              <a:rPr lang="en-US" sz="2800" dirty="0" smtClean="0"/>
+              <a:t> </a:t>
+            </a:r>
+            <a:r>
+              <a:rPr lang="en-US" sz="2800" dirty="0" err="1" smtClean="0"/>
+              <a:t>alte</a:t>
+            </a:r>
+            <a:r>
+              <a:rPr lang="en-US" sz="2800" dirty="0" smtClean="0"/>
+              <a:t> </a:t>
+            </a:r>
+            <a:r>
+              <a:rPr lang="en-US" sz="2800" dirty="0" err="1" smtClean="0"/>
+              <a:t>metode</a:t>
+            </a:r>
+            <a:r>
+              <a:rPr lang="en-US" sz="2800" dirty="0" smtClean="0"/>
+              <a:t>.</a:t>
+            </a:r>
+          </a:p>
+          <a:p>
+            <a:pPr>
+              <a:lnSpc>
+                <a:spcPct val="150000"/>
+              </a:lnSpc>
+            </a:pPr>
+            <a:r>
+              <a:rPr lang="en-US" sz="2800" dirty="0" err="1" smtClean="0"/>
+              <a:t>Compara</a:t>
+            </a:r>
+            <a:r>
+              <a:rPr lang="en-US" sz="2800" dirty="0" smtClean="0"/>
+              <a:t> </a:t>
+            </a:r>
+            <a:r>
+              <a:rPr lang="en-US" sz="2800" dirty="0" err="1" smtClean="0"/>
+              <a:t>metodele</a:t>
+            </a:r>
+            <a:r>
+              <a:rPr lang="en-US" sz="2800" dirty="0" smtClean="0"/>
+              <a:t> </a:t>
+            </a:r>
+            <a:r>
+              <a:rPr lang="en-US" sz="2800" dirty="0" err="1" smtClean="0"/>
+              <a:t>apelate</a:t>
+            </a:r>
+            <a:r>
+              <a:rPr lang="en-US" sz="2800" dirty="0" smtClean="0"/>
+              <a:t>.</a:t>
+            </a:r>
+          </a:p>
+          <a:p>
+            <a:pPr>
+              <a:lnSpc>
+                <a:spcPct val="150000"/>
+              </a:lnSpc>
+            </a:pPr>
+            <a:r>
+              <a:rPr lang="en-US" sz="2800" dirty="0" err="1" smtClean="0"/>
+              <a:t>Compara</a:t>
+            </a:r>
+            <a:r>
+              <a:rPr lang="en-US" sz="2800" dirty="0" smtClean="0"/>
+              <a:t> </a:t>
+            </a:r>
+            <a:r>
+              <a:rPr lang="en-US" sz="2800" dirty="0" err="1" smtClean="0"/>
+              <a:t>clasele</a:t>
+            </a:r>
+            <a:r>
+              <a:rPr lang="en-US" sz="2800" dirty="0" smtClean="0"/>
+              <a:t> din care </a:t>
+            </a:r>
+            <a:r>
+              <a:rPr lang="en-US" sz="2800" dirty="0" err="1" smtClean="0"/>
+              <a:t>fac</a:t>
+            </a:r>
+            <a:r>
+              <a:rPr lang="en-US" sz="2800" dirty="0" smtClean="0"/>
+              <a:t> parte.</a:t>
+            </a:r>
+          </a:p>
+        </p:txBody>
+      </p:sp>
+      <p:pic>
+        <p:nvPicPr>
+          <p:cNvPr id="4" name="Picture 3"/>
+          <p:cNvPicPr>
+            <a:picLocks noChangeAspect="1"/>
+          </p:cNvPicPr>
+          <p:nvPr/>
+        </p:nvPicPr>
+        <p:blipFill>
+          <a:blip r:embed="rId3">
+            <a:extLst>
+              <a:ext uri="{28A0092B-C50C-407E-A947-70E740481C1C}">
+                <a14:useLocalDpi xmlns:a14="http://schemas.microsoft.com/office/drawing/2010/main" val="0"/>
+              </a:ext>
+            </a:extLst>
+          </a:blip>
+          <a:stretch>
+            <a:fillRect/>
+          </a:stretch>
+        </p:blipFill>
+        <p:spPr>
+          <a:xfrm>
+            <a:off x="6060440" y="2895600"/>
+            <a:ext cx="3988904" cy="4572000"/>
+          </a:xfrm>
+          <a:prstGeom prst="rect">
+            <a:avLst/>
+          </a:prstGeom>
+        </p:spPr>
+      </p:pic>
     </p:spTree>
     <p:extLst>
       <p:ext uri="{BB962C8B-B14F-4D97-AF65-F5344CB8AC3E}">
-        <p14:creationId xmlns:p14="http://schemas.microsoft.com/office/powerpoint/2010/main" val="1527581008"/>
+        <p14:creationId xmlns:p14="http://schemas.microsoft.com/office/powerpoint/2010/main" val="2733110150"/>
       </p:ext>
     </p:extLst>
   </p:cSld>
@@ -16780,6 +17120,1462 @@
       </p:grpSpPr>
       <p:sp>
         <p:nvSpPr>
+          <p:cNvPr id="2" name="Title 1"/>
+          <p:cNvSpPr>
+            <a:spLocks noGrp="1"/>
+          </p:cNvSpPr>
+          <p:nvPr>
+            <p:ph type="title"/>
+          </p:nvPr>
+        </p:nvSpPr>
+        <p:spPr/>
+        <p:txBody>
+          <a:bodyPr/>
+          <a:lstStyle/>
+          <a:p>
+            <a:r>
+              <a:rPr lang="en-US" dirty="0" err="1" smtClean="0"/>
+              <a:t>Nivele</a:t>
+            </a:r>
+            <a:r>
+              <a:rPr lang="en-US" dirty="0" smtClean="0"/>
+              <a:t> de </a:t>
+            </a:r>
+            <a:r>
+              <a:rPr lang="en-US" dirty="0" err="1" smtClean="0"/>
+              <a:t>suspiciune</a:t>
+            </a:r>
+            <a:endParaRPr lang="en-US" dirty="0"/>
+          </a:p>
+        </p:txBody>
+      </p:sp>
+      <p:sp>
+        <p:nvSpPr>
+          <p:cNvPr id="3" name="Content Placeholder 2"/>
+          <p:cNvSpPr>
+            <a:spLocks noGrp="1"/>
+          </p:cNvSpPr>
+          <p:nvPr>
+            <p:ph sz="quarter" idx="13"/>
+          </p:nvPr>
+        </p:nvSpPr>
+        <p:spPr>
+          <a:xfrm>
+            <a:off x="355600" y="2976880"/>
+            <a:ext cx="4643119" cy="3804920"/>
+          </a:xfrm>
+        </p:spPr>
+        <p:txBody>
+          <a:bodyPr/>
+          <a:lstStyle/>
+          <a:p>
+            <a:pPr marL="0" indent="0" algn="ctr">
+              <a:buNone/>
+            </a:pPr>
+            <a:r>
+              <a:rPr lang="en-US" b="1" dirty="0" smtClean="0">
+                <a:solidFill>
+                  <a:srgbClr val="FF0000"/>
+                </a:solidFill>
+              </a:rPr>
+              <a:t>La </a:t>
+            </a:r>
+            <a:r>
+              <a:rPr lang="en-US" b="1" dirty="0" err="1" smtClean="0">
+                <a:solidFill>
+                  <a:srgbClr val="FF0000"/>
+                </a:solidFill>
+              </a:rPr>
+              <a:t>Nivel</a:t>
+            </a:r>
+            <a:r>
+              <a:rPr lang="en-US" b="1" dirty="0" smtClean="0">
+                <a:solidFill>
+                  <a:srgbClr val="FF0000"/>
+                </a:solidFill>
+              </a:rPr>
+              <a:t> de </a:t>
+            </a:r>
+            <a:r>
+              <a:rPr lang="en-US" b="1" dirty="0" err="1" smtClean="0">
+                <a:solidFill>
+                  <a:srgbClr val="FF0000"/>
+                </a:solidFill>
+              </a:rPr>
+              <a:t>Metode</a:t>
+            </a:r>
+            <a:r>
+              <a:rPr lang="en-US" b="1" dirty="0" smtClean="0">
+                <a:solidFill>
+                  <a:srgbClr val="FF0000"/>
+                </a:solidFill>
+              </a:rPr>
+              <a:t> </a:t>
+            </a:r>
+          </a:p>
+          <a:p>
+            <a:pPr lvl="1"/>
+            <a:r>
+              <a:rPr lang="en-US" b="1" dirty="0" smtClean="0"/>
+              <a:t>HIGH</a:t>
+            </a:r>
+            <a:r>
+              <a:rPr lang="en-US" dirty="0" smtClean="0"/>
+              <a:t> match</a:t>
+            </a:r>
+          </a:p>
+          <a:p>
+            <a:pPr lvl="1">
+              <a:buFont typeface="Wingdings" pitchFamily="2" charset="2"/>
+              <a:buChar char="§"/>
+            </a:pPr>
+            <a:r>
+              <a:rPr lang="en-US" dirty="0" err="1" smtClean="0"/>
+              <a:t>satisfac</a:t>
+            </a:r>
+            <a:r>
+              <a:rPr lang="en-US" dirty="0" smtClean="0"/>
+              <a:t> </a:t>
+            </a:r>
+            <a:r>
+              <a:rPr lang="en-US" dirty="0" err="1" smtClean="0"/>
+              <a:t>filtrele</a:t>
+            </a:r>
+            <a:r>
+              <a:rPr lang="en-US" dirty="0" smtClean="0"/>
+              <a:t> </a:t>
+            </a:r>
+            <a:r>
+              <a:rPr lang="en-US" dirty="0" err="1" smtClean="0"/>
+              <a:t>bazate</a:t>
+            </a:r>
+            <a:r>
+              <a:rPr lang="en-US" dirty="0" smtClean="0"/>
+              <a:t> </a:t>
+            </a:r>
+            <a:r>
+              <a:rPr lang="en-US" dirty="0" err="1" smtClean="0"/>
+              <a:t>pe</a:t>
+            </a:r>
+            <a:r>
+              <a:rPr lang="en-US" dirty="0" smtClean="0"/>
+              <a:t> :</a:t>
+            </a:r>
+          </a:p>
+          <a:p>
+            <a:pPr lvl="2">
+              <a:buFontTx/>
+              <a:buChar char="-"/>
+            </a:pPr>
+            <a:r>
+              <a:rPr lang="en-US" dirty="0" err="1" smtClean="0"/>
+              <a:t>Metrici</a:t>
+            </a:r>
+            <a:r>
+              <a:rPr lang="en-US" dirty="0" smtClean="0"/>
+              <a:t> de </a:t>
+            </a:r>
+            <a:r>
+              <a:rPr lang="en-US" dirty="0" err="1" smtClean="0"/>
+              <a:t>metoda</a:t>
+            </a:r>
+            <a:r>
+              <a:rPr lang="en-US" dirty="0" smtClean="0"/>
+              <a:t> </a:t>
+            </a:r>
+          </a:p>
+          <a:p>
+            <a:pPr lvl="2">
+              <a:buFontTx/>
+              <a:buChar char="-"/>
+            </a:pPr>
+            <a:r>
+              <a:rPr lang="en-US" dirty="0" smtClean="0"/>
+              <a:t>Graf de </a:t>
+            </a:r>
+            <a:r>
+              <a:rPr lang="en-US" dirty="0" err="1" smtClean="0"/>
+              <a:t>apeluri</a:t>
+            </a:r>
+            <a:endParaRPr lang="en-US" dirty="0" smtClean="0"/>
+          </a:p>
+          <a:p>
+            <a:pPr lvl="1"/>
+            <a:r>
+              <a:rPr lang="en-US" b="1" dirty="0" smtClean="0"/>
+              <a:t>LOW</a:t>
+            </a:r>
+            <a:r>
+              <a:rPr lang="en-US" dirty="0" smtClean="0"/>
+              <a:t> match</a:t>
+            </a:r>
+          </a:p>
+          <a:p>
+            <a:pPr lvl="1">
+              <a:buFont typeface="Wingdings" pitchFamily="2" charset="2"/>
+              <a:buChar char="§"/>
+            </a:pPr>
+            <a:r>
+              <a:rPr lang="en-US" dirty="0" err="1"/>
+              <a:t>satisfac</a:t>
+            </a:r>
+            <a:r>
+              <a:rPr lang="en-US" dirty="0"/>
+              <a:t> </a:t>
+            </a:r>
+            <a:r>
+              <a:rPr lang="en-US" dirty="0" err="1"/>
+              <a:t>filtrele</a:t>
+            </a:r>
+            <a:r>
+              <a:rPr lang="en-US" dirty="0"/>
+              <a:t> </a:t>
+            </a:r>
+            <a:r>
+              <a:rPr lang="en-US" dirty="0" err="1"/>
+              <a:t>bazate</a:t>
+            </a:r>
+            <a:r>
+              <a:rPr lang="en-US" dirty="0"/>
+              <a:t> </a:t>
+            </a:r>
+            <a:r>
+              <a:rPr lang="en-US" dirty="0" err="1"/>
+              <a:t>pe</a:t>
+            </a:r>
+            <a:r>
+              <a:rPr lang="en-US" dirty="0"/>
+              <a:t> :</a:t>
+            </a:r>
+          </a:p>
+          <a:p>
+            <a:pPr lvl="2">
+              <a:buFontTx/>
+              <a:buChar char="-"/>
+            </a:pPr>
+            <a:r>
+              <a:rPr lang="en-US" dirty="0" err="1"/>
+              <a:t>Metrici</a:t>
+            </a:r>
+            <a:r>
+              <a:rPr lang="en-US" dirty="0"/>
+              <a:t> de </a:t>
+            </a:r>
+            <a:r>
+              <a:rPr lang="en-US" dirty="0" err="1"/>
+              <a:t>metoda</a:t>
+            </a:r>
+            <a:endParaRPr lang="en-US" dirty="0"/>
+          </a:p>
+          <a:p>
+            <a:pPr lvl="1"/>
+            <a:endParaRPr lang="en-US" dirty="0"/>
+          </a:p>
+        </p:txBody>
+      </p:sp>
+      <p:sp>
+        <p:nvSpPr>
+          <p:cNvPr id="4" name="Content Placeholder 3"/>
+          <p:cNvSpPr>
+            <a:spLocks noGrp="1"/>
+          </p:cNvSpPr>
+          <p:nvPr>
+            <p:ph sz="quarter" idx="14"/>
+          </p:nvPr>
+        </p:nvSpPr>
+        <p:spPr>
+          <a:xfrm>
+            <a:off x="4851400" y="2976880"/>
+            <a:ext cx="5308600" cy="4490720"/>
+          </a:xfrm>
+        </p:spPr>
+        <p:txBody>
+          <a:bodyPr>
+            <a:normAutofit fontScale="92500" lnSpcReduction="10000"/>
+          </a:bodyPr>
+          <a:lstStyle/>
+          <a:p>
+            <a:pPr marL="0" indent="0" algn="ctr">
+              <a:buNone/>
+            </a:pPr>
+            <a:r>
+              <a:rPr lang="en-US" sz="3200" b="1" dirty="0" smtClean="0">
+                <a:solidFill>
+                  <a:srgbClr val="FF0000"/>
+                </a:solidFill>
+              </a:rPr>
+              <a:t>La </a:t>
+            </a:r>
+            <a:r>
+              <a:rPr lang="en-US" sz="3200" b="1" dirty="0" err="1" smtClean="0">
+                <a:solidFill>
+                  <a:srgbClr val="FF0000"/>
+                </a:solidFill>
+              </a:rPr>
+              <a:t>nivel</a:t>
+            </a:r>
+            <a:r>
+              <a:rPr lang="en-US" sz="3200" b="1" dirty="0" smtClean="0">
+                <a:solidFill>
+                  <a:srgbClr val="FF0000"/>
+                </a:solidFill>
+              </a:rPr>
+              <a:t> de </a:t>
+            </a:r>
+            <a:r>
+              <a:rPr lang="en-US" sz="3200" b="1" dirty="0" err="1" smtClean="0">
+                <a:solidFill>
+                  <a:srgbClr val="FF0000"/>
+                </a:solidFill>
+              </a:rPr>
+              <a:t>Clase</a:t>
+            </a:r>
+            <a:endParaRPr lang="en-US" sz="3200" b="1" dirty="0" smtClean="0">
+              <a:solidFill>
+                <a:srgbClr val="FF0000"/>
+              </a:solidFill>
+            </a:endParaRPr>
+          </a:p>
+          <a:p>
+            <a:r>
+              <a:rPr lang="en-US" b="1" dirty="0" smtClean="0"/>
+              <a:t>LOW</a:t>
+            </a:r>
+          </a:p>
+          <a:p>
+            <a:pPr lvl="1"/>
+            <a:r>
+              <a:rPr lang="en-US" sz="2200" dirty="0" err="1" smtClean="0"/>
+              <a:t>Metrici</a:t>
+            </a:r>
+            <a:r>
+              <a:rPr lang="en-US" sz="2200" dirty="0" smtClean="0"/>
+              <a:t> de </a:t>
+            </a:r>
+            <a:r>
+              <a:rPr lang="en-US" sz="2200" dirty="0" err="1" smtClean="0"/>
+              <a:t>clase</a:t>
+            </a:r>
+            <a:endParaRPr lang="en-US" sz="2200" dirty="0" smtClean="0"/>
+          </a:p>
+          <a:p>
+            <a:r>
+              <a:rPr lang="en-US" b="1" dirty="0" smtClean="0"/>
+              <a:t>MEDIUM</a:t>
+            </a:r>
+            <a:endParaRPr lang="en-US" dirty="0" smtClean="0"/>
+          </a:p>
+          <a:p>
+            <a:pPr lvl="1"/>
+            <a:r>
+              <a:rPr lang="en-US" sz="2200" dirty="0" smtClean="0"/>
+              <a:t>LOW + </a:t>
+            </a:r>
+            <a:r>
+              <a:rPr lang="en-US" sz="2200" dirty="0" err="1" smtClean="0"/>
+              <a:t>metode</a:t>
+            </a:r>
+            <a:r>
+              <a:rPr lang="en-US" sz="2200" dirty="0" smtClean="0"/>
+              <a:t> </a:t>
+            </a:r>
+            <a:r>
+              <a:rPr lang="en-US" sz="2200" dirty="0" err="1" smtClean="0"/>
+              <a:t>similare</a:t>
+            </a:r>
+            <a:r>
+              <a:rPr lang="en-US" sz="2200" dirty="0" smtClean="0"/>
+              <a:t> &lt; </a:t>
+            </a:r>
+            <a:r>
+              <a:rPr lang="en-US" sz="2200" dirty="0" err="1" smtClean="0"/>
+              <a:t>PragHigh</a:t>
+            </a:r>
+            <a:endParaRPr lang="en-US" sz="2200" dirty="0"/>
+          </a:p>
+          <a:p>
+            <a:r>
+              <a:rPr lang="en-US" b="1" dirty="0" smtClean="0"/>
+              <a:t>HIGH</a:t>
+            </a:r>
+          </a:p>
+          <a:p>
+            <a:pPr lvl="1"/>
+            <a:r>
+              <a:rPr lang="en-US" sz="2200" dirty="0" smtClean="0"/>
+              <a:t>LOW+ </a:t>
+            </a:r>
+            <a:r>
+              <a:rPr lang="en-US" sz="2200" dirty="0" err="1" smtClean="0"/>
+              <a:t>metode</a:t>
+            </a:r>
+            <a:r>
+              <a:rPr lang="en-US" sz="2200" dirty="0" smtClean="0"/>
+              <a:t> </a:t>
+            </a:r>
+            <a:r>
+              <a:rPr lang="en-US" sz="2200" dirty="0" err="1" smtClean="0"/>
+              <a:t>similare</a:t>
+            </a:r>
+            <a:r>
+              <a:rPr lang="en-US" sz="2200" dirty="0" smtClean="0"/>
+              <a:t> &gt; </a:t>
+            </a:r>
+            <a:r>
+              <a:rPr lang="en-US" sz="2200" dirty="0" err="1" smtClean="0"/>
+              <a:t>PragHigh</a:t>
+            </a:r>
+            <a:endParaRPr lang="en-US" sz="2200" dirty="0"/>
+          </a:p>
+          <a:p>
+            <a:pPr marL="335489" lvl="1" indent="0">
+              <a:buNone/>
+            </a:pPr>
+            <a:r>
+              <a:rPr lang="en-US" sz="2200" i="1" dirty="0" err="1" smtClean="0"/>
+              <a:t>Exemplu</a:t>
+            </a:r>
+            <a:r>
+              <a:rPr lang="en-US" sz="2200" i="1" dirty="0" smtClean="0"/>
+              <a:t>:</a:t>
+            </a:r>
+          </a:p>
+          <a:p>
+            <a:pPr marL="335489" lvl="1" indent="0">
+              <a:buNone/>
+            </a:pPr>
+            <a:r>
+              <a:rPr lang="en-US" sz="2200" u="sng" dirty="0" err="1" smtClean="0"/>
+              <a:t>PragHigh</a:t>
+            </a:r>
+            <a:r>
+              <a:rPr lang="en-US" sz="2200" u="sng" dirty="0" smtClean="0"/>
+              <a:t> :</a:t>
+            </a:r>
+            <a:r>
+              <a:rPr lang="en-US" sz="2200" dirty="0" smtClean="0"/>
+              <a:t> </a:t>
+            </a:r>
+          </a:p>
+          <a:p>
+            <a:pPr marL="335489" lvl="1" indent="0">
+              <a:buNone/>
+            </a:pPr>
+            <a:r>
+              <a:rPr lang="en-US" sz="2200" dirty="0" smtClean="0"/>
+              <a:t> - 60% </a:t>
+            </a:r>
+            <a:r>
+              <a:rPr lang="en-US" sz="2200" dirty="0" err="1" smtClean="0"/>
+              <a:t>metode</a:t>
+            </a:r>
+            <a:r>
+              <a:rPr lang="en-US" sz="2200" dirty="0" smtClean="0"/>
+              <a:t> </a:t>
+            </a:r>
+            <a:r>
+              <a:rPr lang="en-US" sz="2200" dirty="0" err="1" smtClean="0"/>
+              <a:t>sa</a:t>
+            </a:r>
+            <a:r>
+              <a:rPr lang="en-US" sz="2200" dirty="0" smtClean="0"/>
+              <a:t> fie HIGH match</a:t>
+            </a:r>
+          </a:p>
+          <a:p>
+            <a:pPr marL="335489" lvl="1" indent="0">
+              <a:buNone/>
+            </a:pPr>
+            <a:r>
+              <a:rPr lang="en-US" sz="2200" dirty="0"/>
+              <a:t>	</a:t>
+            </a:r>
+            <a:r>
+              <a:rPr lang="en-US" sz="2200" dirty="0" smtClean="0"/>
+              <a:t>	</a:t>
+            </a:r>
+            <a:r>
+              <a:rPr lang="en-US" sz="2200" b="1" dirty="0" err="1" smtClean="0"/>
+              <a:t>si</a:t>
+            </a:r>
+            <a:endParaRPr lang="en-US" sz="2200" b="1" dirty="0" smtClean="0"/>
+          </a:p>
+          <a:p>
+            <a:pPr marL="335489" lvl="1" indent="0">
+              <a:buNone/>
+            </a:pPr>
+            <a:r>
+              <a:rPr lang="en-US" sz="2200" dirty="0"/>
+              <a:t> </a:t>
+            </a:r>
+            <a:r>
+              <a:rPr lang="en-US" sz="2200" dirty="0" smtClean="0"/>
+              <a:t>- nr. de maxim </a:t>
+            </a:r>
+            <a:r>
+              <a:rPr lang="en-US" sz="2200" dirty="0" err="1" smtClean="0"/>
+              <a:t>metode</a:t>
+            </a:r>
+            <a:r>
+              <a:rPr lang="en-US" sz="2200" dirty="0" smtClean="0"/>
+              <a:t> </a:t>
+            </a:r>
+            <a:r>
+              <a:rPr lang="en-US" sz="2200" dirty="0" err="1" smtClean="0"/>
+              <a:t>nesimilare</a:t>
+            </a:r>
+            <a:r>
+              <a:rPr lang="en-US" sz="2200" dirty="0" smtClean="0"/>
+              <a:t> 3</a:t>
+            </a:r>
+          </a:p>
+        </p:txBody>
+      </p:sp>
+    </p:spTree>
+    <p:extLst>
+      <p:ext uri="{BB962C8B-B14F-4D97-AF65-F5344CB8AC3E}">
+        <p14:creationId xmlns:p14="http://schemas.microsoft.com/office/powerpoint/2010/main" val="1050927626"/>
+      </p:ext>
+    </p:extLst>
+  </p:cSld>
+  <p:clrMapOvr>
+    <a:masterClrMapping/>
+  </p:clrMapOvr>
+  <p:timing>
+    <p:tnLst>
+      <p:par>
+        <p:cTn id="1" dur="indefinite" restart="never" nodeType="tmRoot"/>
+      </p:par>
+    </p:tnLst>
+  </p:timing>
+</p:sld>
+</file>
+
+<file path=ppt/slides/slide12.xml><?xml version="1.0" encoding="utf-8"?>
+<p:sld xmlns:a="http://schemas.openxmlformats.org/drawingml/2006/main" xmlns:r="http://schemas.openxmlformats.org/officeDocument/2006/relationships" xmlns:p="http://schemas.openxmlformats.org/presentationml/2006/main">
+  <p:cSld>
+    <p:spTree>
+      <p:nvGrpSpPr>
+        <p:cNvPr id="1" name=""/>
+        <p:cNvGrpSpPr/>
+        <p:nvPr/>
+      </p:nvGrpSpPr>
+      <p:grpSpPr>
+        <a:xfrm>
+          <a:off x="0" y="0"/>
+          <a:ext cx="0" cy="0"/>
+          <a:chOff x="0" y="0"/>
+          <a:chExt cx="0" cy="0"/>
+        </a:xfrm>
+      </p:grpSpPr>
+      <p:pic>
+        <p:nvPicPr>
+          <p:cNvPr id="10" name="Picture 9"/>
+          <p:cNvPicPr>
+            <a:picLocks noChangeAspect="1"/>
+          </p:cNvPicPr>
+          <p:nvPr/>
+        </p:nvPicPr>
+        <p:blipFill>
+          <a:blip r:embed="rId2">
+            <a:extLst>
+              <a:ext uri="{28A0092B-C50C-407E-A947-70E740481C1C}">
+                <a14:useLocalDpi xmlns:a14="http://schemas.microsoft.com/office/drawing/2010/main" val="0"/>
+              </a:ext>
+            </a:extLst>
+          </a:blip>
+          <a:stretch>
+            <a:fillRect/>
+          </a:stretch>
+        </p:blipFill>
+        <p:spPr>
+          <a:xfrm>
+            <a:off x="431800" y="2286000"/>
+            <a:ext cx="9296400" cy="4315812"/>
+          </a:xfrm>
+          <a:prstGeom prst="rect">
+            <a:avLst/>
+          </a:prstGeom>
+        </p:spPr>
+      </p:pic>
+      <p:sp>
+        <p:nvSpPr>
+          <p:cNvPr id="13" name="Title 1"/>
+          <p:cNvSpPr>
+            <a:spLocks noGrp="1"/>
+          </p:cNvSpPr>
+          <p:nvPr>
+            <p:ph type="title"/>
+          </p:nvPr>
+        </p:nvSpPr>
+        <p:spPr/>
+        <p:txBody>
+          <a:bodyPr anchor="ctr">
+            <a:normAutofit/>
+          </a:bodyPr>
+          <a:lstStyle/>
+          <a:p>
+            <a:pPr algn="ctr"/>
+            <a:r>
+              <a:rPr lang="en-US" sz="4900" dirty="0" err="1" smtClean="0"/>
+              <a:t>Vizualizarea</a:t>
+            </a:r>
+            <a:r>
+              <a:rPr lang="en-US" sz="4900" dirty="0" smtClean="0"/>
+              <a:t> </a:t>
+            </a:r>
+            <a:r>
+              <a:rPr lang="en-US" sz="4900" dirty="0" err="1" smtClean="0"/>
+              <a:t>Rezultate</a:t>
+            </a:r>
+            <a:endParaRPr lang="en-US" sz="4900" dirty="0"/>
+          </a:p>
+        </p:txBody>
+      </p:sp>
+    </p:spTree>
+    <p:extLst>
+      <p:ext uri="{BB962C8B-B14F-4D97-AF65-F5344CB8AC3E}">
+        <p14:creationId xmlns:p14="http://schemas.microsoft.com/office/powerpoint/2010/main" val="1720929078"/>
+      </p:ext>
+    </p:extLst>
+  </p:cSld>
+  <p:clrMapOvr>
+    <a:masterClrMapping/>
+  </p:clrMapOvr>
+</p:sld>
+</file>
+
+<file path=ppt/slides/slide13.xml><?xml version="1.0" encoding="utf-8"?>
+<p:sld xmlns:a="http://schemas.openxmlformats.org/drawingml/2006/main" xmlns:r="http://schemas.openxmlformats.org/officeDocument/2006/relationships" xmlns:p="http://schemas.openxmlformats.org/presentationml/2006/main">
+  <p:cSld>
+    <p:spTree>
+      <p:nvGrpSpPr>
+        <p:cNvPr id="1" name=""/>
+        <p:cNvGrpSpPr/>
+        <p:nvPr/>
+      </p:nvGrpSpPr>
+      <p:grpSpPr>
+        <a:xfrm>
+          <a:off x="0" y="0"/>
+          <a:ext cx="0" cy="0"/>
+          <a:chOff x="0" y="0"/>
+          <a:chExt cx="0" cy="0"/>
+        </a:xfrm>
+      </p:grpSpPr>
+      <p:sp>
+        <p:nvSpPr>
+          <p:cNvPr id="3" name="Title 2"/>
+          <p:cNvSpPr>
+            <a:spLocks noGrp="1"/>
+          </p:cNvSpPr>
+          <p:nvPr>
+            <p:ph type="title"/>
+          </p:nvPr>
+        </p:nvSpPr>
+        <p:spPr>
+          <a:xfrm>
+            <a:off x="6299200" y="1524000"/>
+            <a:ext cx="3245672" cy="2747903"/>
+          </a:xfrm>
+        </p:spPr>
+        <p:txBody>
+          <a:bodyPr anchor="ctr">
+            <a:normAutofit/>
+          </a:bodyPr>
+          <a:lstStyle/>
+          <a:p>
+            <a:r>
+              <a:rPr lang="en-US" sz="4800" dirty="0" err="1" smtClean="0"/>
+              <a:t>Rezultate</a:t>
+            </a:r>
+            <a:endParaRPr lang="en-US" sz="4800" dirty="0"/>
+          </a:p>
+        </p:txBody>
+      </p:sp>
+      <p:graphicFrame>
+        <p:nvGraphicFramePr>
+          <p:cNvPr id="4" name="Table 3"/>
+          <p:cNvGraphicFramePr>
+            <a:graphicFrameLocks noGrp="1"/>
+          </p:cNvGraphicFramePr>
+          <p:nvPr>
+            <p:extLst>
+              <p:ext uri="{D42A27DB-BD31-4B8C-83A1-F6EECF244321}">
+                <p14:modId xmlns:p14="http://schemas.microsoft.com/office/powerpoint/2010/main" val="785940782"/>
+              </p:ext>
+            </p:extLst>
+          </p:nvPr>
+        </p:nvGraphicFramePr>
+        <p:xfrm>
+          <a:off x="279400" y="304801"/>
+          <a:ext cx="5638799" cy="6553199"/>
+        </p:xfrm>
+        <a:graphic>
+          <a:graphicData uri="http://schemas.openxmlformats.org/drawingml/2006/table">
+            <a:tbl>
+              <a:tblPr firstRow="1" firstCol="1" bandRow="1">
+                <a:tableStyleId>{5C22544A-7EE6-4342-B048-85BDC9FD1C3A}</a:tableStyleId>
+              </a:tblPr>
+              <a:tblGrid>
+                <a:gridCol w="2214685"/>
+                <a:gridCol w="1998237"/>
+                <a:gridCol w="1425877"/>
+              </a:tblGrid>
+              <a:tr h="746610">
+                <a:tc>
+                  <a:txBody>
+                    <a:bodyPr/>
+                    <a:lstStyle/>
+                    <a:p>
+                      <a:pPr marL="0" marR="0" algn="ctr">
+                        <a:spcBef>
+                          <a:spcPts val="0"/>
+                        </a:spcBef>
+                        <a:spcAft>
+                          <a:spcPts val="0"/>
+                        </a:spcAft>
+                      </a:pPr>
+                      <a:r>
+                        <a:rPr lang="en-US" sz="2000" dirty="0" err="1">
+                          <a:effectLst/>
+                        </a:rPr>
+                        <a:t>Caz</a:t>
+                      </a:r>
+                      <a:r>
+                        <a:rPr lang="en-US" sz="2000" dirty="0">
+                          <a:effectLst/>
+                        </a:rPr>
+                        <a:t> de test</a:t>
+                      </a:r>
+                      <a:endParaRPr lang="en-US" sz="2000" dirty="0">
+                        <a:effectLst/>
+                        <a:latin typeface="Times New Roman"/>
+                        <a:ea typeface="Times New Roman"/>
+                      </a:endParaRPr>
+                    </a:p>
+                  </a:txBody>
+                  <a:tcPr marL="68580" marR="68580" marT="0" marB="0"/>
+                </a:tc>
+                <a:tc>
+                  <a:txBody>
+                    <a:bodyPr/>
+                    <a:lstStyle/>
+                    <a:p>
+                      <a:pPr marL="0" marR="0" algn="ctr">
+                        <a:spcBef>
+                          <a:spcPts val="0"/>
+                        </a:spcBef>
+                        <a:spcAft>
+                          <a:spcPts val="0"/>
+                        </a:spcAft>
+                      </a:pPr>
+                      <a:r>
+                        <a:rPr lang="en-US" sz="2000" dirty="0" err="1">
+                          <a:effectLst/>
+                        </a:rPr>
+                        <a:t>CloneDetector</a:t>
+                      </a:r>
+                      <a:endParaRPr lang="en-US" sz="2000" dirty="0">
+                        <a:effectLst/>
+                        <a:latin typeface="Times New Roman"/>
+                        <a:ea typeface="Times New Roman"/>
+                      </a:endParaRPr>
+                    </a:p>
+                  </a:txBody>
+                  <a:tcPr marL="68580" marR="68580" marT="0" marB="0"/>
+                </a:tc>
+                <a:tc>
+                  <a:txBody>
+                    <a:bodyPr/>
+                    <a:lstStyle/>
+                    <a:p>
+                      <a:pPr marL="0" marR="0" algn="ctr">
+                        <a:spcBef>
+                          <a:spcPts val="0"/>
+                        </a:spcBef>
+                        <a:spcAft>
+                          <a:spcPts val="0"/>
+                        </a:spcAft>
+                      </a:pPr>
+                      <a:r>
+                        <a:rPr lang="en-US" sz="2000" dirty="0">
+                          <a:effectLst/>
+                        </a:rPr>
+                        <a:t>Dude</a:t>
+                      </a:r>
+                      <a:endParaRPr lang="en-US" sz="2000" dirty="0">
+                        <a:effectLst/>
+                        <a:latin typeface="Times New Roman"/>
+                        <a:ea typeface="Times New Roman"/>
+                      </a:endParaRPr>
+                    </a:p>
+                  </a:txBody>
+                  <a:tcPr marL="68580" marR="68580" marT="0" marB="0"/>
+                </a:tc>
+              </a:tr>
+              <a:tr h="526612">
+                <a:tc>
+                  <a:txBody>
+                    <a:bodyPr/>
+                    <a:lstStyle/>
+                    <a:p>
+                      <a:pPr marL="0" marR="0">
+                        <a:spcBef>
+                          <a:spcPts val="0"/>
+                        </a:spcBef>
+                        <a:spcAft>
+                          <a:spcPts val="0"/>
+                        </a:spcAft>
+                      </a:pPr>
+                      <a:r>
+                        <a:rPr lang="en-US" sz="1800" dirty="0" err="1">
+                          <a:effectLst/>
+                        </a:rPr>
+                        <a:t>Clona</a:t>
+                      </a:r>
+                      <a:r>
+                        <a:rPr lang="en-US" sz="1800" dirty="0">
+                          <a:effectLst/>
+                        </a:rPr>
+                        <a:t> </a:t>
+                      </a:r>
+                      <a:r>
+                        <a:rPr lang="en-US" sz="1800" dirty="0" err="1">
+                          <a:effectLst/>
+                        </a:rPr>
+                        <a:t>tipul</a:t>
+                      </a:r>
+                      <a:r>
+                        <a:rPr lang="en-US" sz="1800" dirty="0">
+                          <a:effectLst/>
+                        </a:rPr>
+                        <a:t> 1</a:t>
+                      </a:r>
+                      <a:endParaRPr lang="en-US" sz="1800" dirty="0">
+                        <a:effectLst/>
+                        <a:latin typeface="Times New Roman"/>
+                        <a:ea typeface="Times New Roman"/>
+                      </a:endParaRPr>
+                    </a:p>
+                  </a:txBody>
+                  <a:tcPr marL="68580" marR="68580" marT="0" marB="0"/>
+                </a:tc>
+                <a:tc>
+                  <a:txBody>
+                    <a:bodyPr/>
+                    <a:lstStyle/>
+                    <a:p>
+                      <a:pPr marL="0" marR="0" algn="ctr">
+                        <a:spcBef>
+                          <a:spcPts val="0"/>
+                        </a:spcBef>
+                        <a:spcAft>
+                          <a:spcPts val="0"/>
+                        </a:spcAft>
+                      </a:pPr>
+                      <a:r>
+                        <a:rPr lang="en-US" sz="1800" dirty="0" err="1">
+                          <a:effectLst/>
+                        </a:rPr>
+                        <a:t>Detectată</a:t>
+                      </a:r>
+                      <a:endParaRPr lang="en-US" sz="1800" dirty="0">
+                        <a:effectLst/>
+                        <a:latin typeface="Times New Roman"/>
+                        <a:ea typeface="Times New Roman"/>
+                      </a:endParaRPr>
+                    </a:p>
+                  </a:txBody>
+                  <a:tcPr marL="68580" marR="68580" marT="0" marB="0"/>
+                </a:tc>
+                <a:tc>
+                  <a:txBody>
+                    <a:bodyPr/>
+                    <a:lstStyle/>
+                    <a:p>
+                      <a:pPr marL="0" marR="0">
+                        <a:spcBef>
+                          <a:spcPts val="0"/>
+                        </a:spcBef>
+                        <a:spcAft>
+                          <a:spcPts val="0"/>
+                        </a:spcAft>
+                      </a:pPr>
+                      <a:r>
+                        <a:rPr lang="en-US" sz="1800">
+                          <a:effectLst/>
+                        </a:rPr>
+                        <a:t>Detectată</a:t>
+                      </a:r>
+                      <a:endParaRPr lang="en-US" sz="1800">
+                        <a:effectLst/>
+                        <a:latin typeface="Times New Roman"/>
+                        <a:ea typeface="Times New Roman"/>
+                      </a:endParaRPr>
+                    </a:p>
+                  </a:txBody>
+                  <a:tcPr marL="68580" marR="68580" marT="0" marB="0"/>
+                </a:tc>
+              </a:tr>
+              <a:tr h="922956">
+                <a:tc>
+                  <a:txBody>
+                    <a:bodyPr/>
+                    <a:lstStyle/>
+                    <a:p>
+                      <a:pPr marL="0" marR="0">
+                        <a:spcBef>
+                          <a:spcPts val="0"/>
+                        </a:spcBef>
+                        <a:spcAft>
+                          <a:spcPts val="0"/>
+                        </a:spcAft>
+                      </a:pPr>
+                      <a:r>
+                        <a:rPr lang="en-US" sz="1800">
+                          <a:effectLst/>
+                        </a:rPr>
+                        <a:t>Clona tipul 2 cu porţiuni redenumite</a:t>
+                      </a:r>
+                      <a:endParaRPr lang="en-US" sz="1800">
+                        <a:effectLst/>
+                        <a:latin typeface="Times New Roman"/>
+                        <a:ea typeface="Times New Roman"/>
+                      </a:endParaRPr>
+                    </a:p>
+                  </a:txBody>
+                  <a:tcPr marL="68580" marR="68580" marT="0" marB="0"/>
+                </a:tc>
+                <a:tc>
+                  <a:txBody>
+                    <a:bodyPr/>
+                    <a:lstStyle/>
+                    <a:p>
+                      <a:pPr marL="0" marR="0" algn="ctr">
+                        <a:spcBef>
+                          <a:spcPts val="0"/>
+                        </a:spcBef>
+                        <a:spcAft>
+                          <a:spcPts val="0"/>
+                        </a:spcAft>
+                      </a:pPr>
+                      <a:r>
+                        <a:rPr lang="en-US" sz="1800" dirty="0" err="1">
+                          <a:effectLst/>
+                        </a:rPr>
+                        <a:t>Detectată</a:t>
+                      </a:r>
+                      <a:endParaRPr lang="en-US" sz="1800" dirty="0">
+                        <a:effectLst/>
+                        <a:latin typeface="Times New Roman"/>
+                        <a:ea typeface="Times New Roman"/>
+                      </a:endParaRPr>
+                    </a:p>
+                  </a:txBody>
+                  <a:tcPr marL="68580" marR="68580" marT="0" marB="0"/>
+                </a:tc>
+                <a:tc>
+                  <a:txBody>
+                    <a:bodyPr/>
+                    <a:lstStyle/>
+                    <a:p>
+                      <a:pPr marL="0" marR="0">
+                        <a:spcBef>
+                          <a:spcPts val="0"/>
+                        </a:spcBef>
+                        <a:spcAft>
+                          <a:spcPts val="0"/>
+                        </a:spcAft>
+                      </a:pPr>
+                      <a:r>
+                        <a:rPr lang="en-US" sz="1800" dirty="0" err="1">
+                          <a:effectLst/>
+                        </a:rPr>
+                        <a:t>Detectată</a:t>
+                      </a:r>
+                      <a:endParaRPr lang="en-US" sz="1800" dirty="0">
+                        <a:effectLst/>
+                        <a:latin typeface="Times New Roman"/>
+                        <a:ea typeface="Times New Roman"/>
+                      </a:endParaRPr>
+                    </a:p>
+                  </a:txBody>
+                  <a:tcPr marL="68580" marR="68580" marT="0" marB="0"/>
+                </a:tc>
+              </a:tr>
+              <a:tr h="831493">
+                <a:tc>
+                  <a:txBody>
+                    <a:bodyPr/>
+                    <a:lstStyle/>
+                    <a:p>
+                      <a:pPr marL="0" marR="0">
+                        <a:spcBef>
+                          <a:spcPts val="0"/>
+                        </a:spcBef>
+                        <a:spcAft>
+                          <a:spcPts val="0"/>
+                        </a:spcAft>
+                      </a:pPr>
+                      <a:r>
+                        <a:rPr lang="en-US" sz="1800">
+                          <a:effectLst/>
+                        </a:rPr>
+                        <a:t>Clona tipul 2 total redenumită</a:t>
+                      </a:r>
+                      <a:endParaRPr lang="en-US" sz="1800">
+                        <a:effectLst/>
+                        <a:latin typeface="Times New Roman"/>
+                        <a:ea typeface="Times New Roman"/>
+                      </a:endParaRPr>
+                    </a:p>
+                  </a:txBody>
+                  <a:tcPr marL="68580" marR="68580" marT="0" marB="0"/>
+                </a:tc>
+                <a:tc>
+                  <a:txBody>
+                    <a:bodyPr/>
+                    <a:lstStyle/>
+                    <a:p>
+                      <a:pPr marL="0" marR="0" algn="ctr">
+                        <a:spcBef>
+                          <a:spcPts val="0"/>
+                        </a:spcBef>
+                        <a:spcAft>
+                          <a:spcPts val="0"/>
+                        </a:spcAft>
+                      </a:pPr>
+                      <a:r>
+                        <a:rPr lang="en-US" sz="1800" dirty="0" err="1">
+                          <a:effectLst/>
+                        </a:rPr>
+                        <a:t>Detectată</a:t>
+                      </a:r>
+                      <a:endParaRPr lang="en-US" sz="1800" dirty="0">
+                        <a:effectLst/>
+                        <a:latin typeface="Times New Roman"/>
+                        <a:ea typeface="Times New Roman"/>
+                      </a:endParaRPr>
+                    </a:p>
+                  </a:txBody>
+                  <a:tcPr marL="68580" marR="68580" marT="0" marB="0"/>
+                </a:tc>
+                <a:tc>
+                  <a:txBody>
+                    <a:bodyPr/>
+                    <a:lstStyle/>
+                    <a:p>
+                      <a:pPr marL="0" marR="0">
+                        <a:spcBef>
+                          <a:spcPts val="0"/>
+                        </a:spcBef>
+                        <a:spcAft>
+                          <a:spcPts val="0"/>
+                        </a:spcAft>
+                      </a:pPr>
+                      <a:r>
+                        <a:rPr lang="en-US" sz="1800" dirty="0" err="1">
+                          <a:effectLst/>
+                        </a:rPr>
+                        <a:t>Nedetectată</a:t>
+                      </a:r>
+                      <a:endParaRPr lang="en-US" sz="1800" dirty="0">
+                        <a:effectLst/>
+                        <a:latin typeface="Times New Roman"/>
+                        <a:ea typeface="Times New Roman"/>
+                      </a:endParaRPr>
+                    </a:p>
+                  </a:txBody>
+                  <a:tcPr marL="68580" marR="68580" marT="0" marB="0"/>
+                </a:tc>
+              </a:tr>
+              <a:tr h="831493">
+                <a:tc>
+                  <a:txBody>
+                    <a:bodyPr/>
+                    <a:lstStyle/>
+                    <a:p>
+                      <a:pPr marL="0" marR="0">
+                        <a:spcBef>
+                          <a:spcPts val="0"/>
+                        </a:spcBef>
+                        <a:spcAft>
+                          <a:spcPts val="0"/>
+                        </a:spcAft>
+                      </a:pPr>
+                      <a:r>
+                        <a:rPr lang="en-US" sz="1800">
+                          <a:effectLst/>
+                        </a:rPr>
+                        <a:t>Clona tipul 3 partial redenumită</a:t>
+                      </a:r>
+                      <a:endParaRPr lang="en-US" sz="1800">
+                        <a:effectLst/>
+                        <a:latin typeface="Times New Roman"/>
+                        <a:ea typeface="Times New Roman"/>
+                      </a:endParaRPr>
+                    </a:p>
+                  </a:txBody>
+                  <a:tcPr marL="68580" marR="68580" marT="0" marB="0"/>
+                </a:tc>
+                <a:tc>
+                  <a:txBody>
+                    <a:bodyPr/>
+                    <a:lstStyle/>
+                    <a:p>
+                      <a:pPr marL="0" marR="0" algn="ctr">
+                        <a:spcBef>
+                          <a:spcPts val="0"/>
+                        </a:spcBef>
+                        <a:spcAft>
+                          <a:spcPts val="0"/>
+                        </a:spcAft>
+                      </a:pPr>
+                      <a:r>
+                        <a:rPr lang="en-US" sz="1800" dirty="0" err="1">
+                          <a:effectLst/>
+                        </a:rPr>
+                        <a:t>Detectată</a:t>
+                      </a:r>
+                      <a:endParaRPr lang="en-US" sz="1800" dirty="0">
+                        <a:effectLst/>
+                        <a:latin typeface="Times New Roman"/>
+                        <a:ea typeface="Times New Roman"/>
+                      </a:endParaRPr>
+                    </a:p>
+                  </a:txBody>
+                  <a:tcPr marL="68580" marR="68580" marT="0" marB="0"/>
+                </a:tc>
+                <a:tc>
+                  <a:txBody>
+                    <a:bodyPr/>
+                    <a:lstStyle/>
+                    <a:p>
+                      <a:pPr marL="0" marR="0">
+                        <a:spcBef>
+                          <a:spcPts val="0"/>
+                        </a:spcBef>
+                        <a:spcAft>
+                          <a:spcPts val="0"/>
+                        </a:spcAft>
+                      </a:pPr>
+                      <a:r>
+                        <a:rPr lang="en-US" sz="1800">
+                          <a:effectLst/>
+                        </a:rPr>
+                        <a:t>Detectată</a:t>
+                      </a:r>
+                      <a:endParaRPr lang="en-US" sz="1800">
+                        <a:effectLst/>
+                        <a:latin typeface="Times New Roman"/>
+                        <a:ea typeface="Times New Roman"/>
+                      </a:endParaRPr>
+                    </a:p>
+                  </a:txBody>
+                  <a:tcPr marL="68580" marR="68580" marT="0" marB="0"/>
+                </a:tc>
+              </a:tr>
+              <a:tr h="831493">
+                <a:tc>
+                  <a:txBody>
+                    <a:bodyPr/>
+                    <a:lstStyle/>
+                    <a:p>
+                      <a:pPr marL="0" marR="0">
+                        <a:spcBef>
+                          <a:spcPts val="0"/>
+                        </a:spcBef>
+                        <a:spcAft>
+                          <a:spcPts val="0"/>
+                        </a:spcAft>
+                      </a:pPr>
+                      <a:r>
+                        <a:rPr lang="en-US" sz="1800">
+                          <a:effectLst/>
+                        </a:rPr>
+                        <a:t>Clona tipul 3 total redenumită</a:t>
+                      </a:r>
+                      <a:endParaRPr lang="en-US" sz="1800">
+                        <a:effectLst/>
+                        <a:latin typeface="Times New Roman"/>
+                        <a:ea typeface="Times New Roman"/>
+                      </a:endParaRPr>
+                    </a:p>
+                  </a:txBody>
+                  <a:tcPr marL="68580" marR="68580" marT="0" marB="0"/>
+                </a:tc>
+                <a:tc>
+                  <a:txBody>
+                    <a:bodyPr/>
+                    <a:lstStyle/>
+                    <a:p>
+                      <a:pPr marL="0" marR="0" algn="ctr">
+                        <a:spcBef>
+                          <a:spcPts val="0"/>
+                        </a:spcBef>
+                        <a:spcAft>
+                          <a:spcPts val="0"/>
+                        </a:spcAft>
+                      </a:pPr>
+                      <a:r>
+                        <a:rPr lang="en-US" sz="1800">
+                          <a:effectLst/>
+                        </a:rPr>
+                        <a:t>Detectată</a:t>
+                      </a:r>
+                      <a:endParaRPr lang="en-US" sz="1800">
+                        <a:effectLst/>
+                        <a:latin typeface="Times New Roman"/>
+                        <a:ea typeface="Times New Roman"/>
+                      </a:endParaRPr>
+                    </a:p>
+                  </a:txBody>
+                  <a:tcPr marL="68580" marR="68580" marT="0" marB="0"/>
+                </a:tc>
+                <a:tc>
+                  <a:txBody>
+                    <a:bodyPr/>
+                    <a:lstStyle/>
+                    <a:p>
+                      <a:pPr marL="0" marR="0">
+                        <a:spcBef>
+                          <a:spcPts val="0"/>
+                        </a:spcBef>
+                        <a:spcAft>
+                          <a:spcPts val="0"/>
+                        </a:spcAft>
+                      </a:pPr>
+                      <a:r>
+                        <a:rPr lang="en-US" sz="1800" dirty="0" err="1">
+                          <a:effectLst/>
+                        </a:rPr>
+                        <a:t>Neraportată</a:t>
+                      </a:r>
+                      <a:endParaRPr lang="en-US" sz="1800" dirty="0">
+                        <a:effectLst/>
+                        <a:latin typeface="Times New Roman"/>
+                        <a:ea typeface="Times New Roman"/>
+                      </a:endParaRPr>
+                    </a:p>
+                  </a:txBody>
+                  <a:tcPr marL="68580" marR="68580" marT="0" marB="0"/>
+                </a:tc>
+              </a:tr>
+              <a:tr h="615304">
+                <a:tc>
+                  <a:txBody>
+                    <a:bodyPr/>
+                    <a:lstStyle/>
+                    <a:p>
+                      <a:pPr marL="0" marR="0">
+                        <a:spcBef>
+                          <a:spcPts val="0"/>
+                        </a:spcBef>
+                        <a:spcAft>
+                          <a:spcPts val="0"/>
+                        </a:spcAft>
+                      </a:pPr>
+                      <a:r>
+                        <a:rPr lang="en-US" sz="1800">
+                          <a:effectLst/>
+                        </a:rPr>
+                        <a:t>Proiecte diferite</a:t>
+                      </a:r>
+                      <a:endParaRPr lang="en-US" sz="1800">
+                        <a:effectLst/>
+                        <a:latin typeface="Times New Roman"/>
+                        <a:ea typeface="Times New Roman"/>
+                      </a:endParaRPr>
+                    </a:p>
+                  </a:txBody>
+                  <a:tcPr marL="68580" marR="68580" marT="0" marB="0"/>
+                </a:tc>
+                <a:tc>
+                  <a:txBody>
+                    <a:bodyPr/>
+                    <a:lstStyle/>
+                    <a:p>
+                      <a:pPr marL="0" marR="0" algn="ctr">
+                        <a:spcBef>
+                          <a:spcPts val="0"/>
+                        </a:spcBef>
+                        <a:spcAft>
+                          <a:spcPts val="0"/>
+                        </a:spcAft>
+                      </a:pPr>
+                      <a:r>
+                        <a:rPr lang="en-US" sz="1800" dirty="0" err="1">
+                          <a:effectLst/>
+                        </a:rPr>
+                        <a:t>Neraportată</a:t>
+                      </a:r>
+                      <a:endParaRPr lang="en-US" sz="1800" dirty="0">
+                        <a:effectLst/>
+                        <a:latin typeface="Times New Roman"/>
+                        <a:ea typeface="Times New Roman"/>
+                      </a:endParaRPr>
+                    </a:p>
+                  </a:txBody>
+                  <a:tcPr marL="68580" marR="68580" marT="0" marB="0"/>
+                </a:tc>
+                <a:tc>
+                  <a:txBody>
+                    <a:bodyPr/>
+                    <a:lstStyle/>
+                    <a:p>
+                      <a:pPr marL="0" marR="0">
+                        <a:spcBef>
+                          <a:spcPts val="0"/>
+                        </a:spcBef>
+                        <a:spcAft>
+                          <a:spcPts val="0"/>
+                        </a:spcAft>
+                      </a:pPr>
+                      <a:r>
+                        <a:rPr lang="en-US" sz="1800">
+                          <a:effectLst/>
+                        </a:rPr>
+                        <a:t>Neraportată</a:t>
+                      </a:r>
+                      <a:endParaRPr lang="en-US" sz="1800">
+                        <a:effectLst/>
+                        <a:latin typeface="Times New Roman"/>
+                        <a:ea typeface="Times New Roman"/>
+                      </a:endParaRPr>
+                    </a:p>
+                  </a:txBody>
+                  <a:tcPr marL="68580" marR="68580" marT="0" marB="0"/>
+                </a:tc>
+              </a:tr>
+              <a:tr h="1247238">
+                <a:tc>
+                  <a:txBody>
+                    <a:bodyPr/>
+                    <a:lstStyle/>
+                    <a:p>
+                      <a:pPr marL="0" marR="0">
+                        <a:spcBef>
+                          <a:spcPts val="0"/>
+                        </a:spcBef>
+                        <a:spcAft>
+                          <a:spcPts val="0"/>
+                        </a:spcAft>
+                      </a:pPr>
+                      <a:r>
+                        <a:rPr lang="en-US" sz="1800">
+                          <a:effectLst/>
+                        </a:rPr>
+                        <a:t>Proiecte mari diferiţe</a:t>
+                      </a:r>
+                      <a:endParaRPr lang="en-US" sz="1800">
+                        <a:effectLst/>
+                        <a:latin typeface="Times New Roman"/>
+                        <a:ea typeface="Times New Roman"/>
+                      </a:endParaRPr>
+                    </a:p>
+                  </a:txBody>
+                  <a:tcPr marL="68580" marR="68580" marT="0" marB="0"/>
+                </a:tc>
+                <a:tc>
+                  <a:txBody>
+                    <a:bodyPr/>
+                    <a:lstStyle/>
+                    <a:p>
+                      <a:pPr marL="0" marR="0" algn="ctr">
+                        <a:spcBef>
+                          <a:spcPts val="0"/>
+                        </a:spcBef>
+                        <a:spcAft>
+                          <a:spcPts val="0"/>
+                        </a:spcAft>
+                      </a:pPr>
+                      <a:r>
+                        <a:rPr lang="en-US" sz="1800">
+                          <a:effectLst/>
+                        </a:rPr>
+                        <a:t>Neraportată + timp mare de executie</a:t>
+                      </a:r>
+                      <a:endParaRPr lang="en-US" sz="1800">
+                        <a:effectLst/>
+                        <a:latin typeface="Times New Roman"/>
+                        <a:ea typeface="Times New Roman"/>
+                      </a:endParaRPr>
+                    </a:p>
+                  </a:txBody>
+                  <a:tcPr marL="68580" marR="68580" marT="0" marB="0"/>
+                </a:tc>
+                <a:tc>
+                  <a:txBody>
+                    <a:bodyPr/>
+                    <a:lstStyle/>
+                    <a:p>
+                      <a:pPr marL="0" marR="0">
+                        <a:spcBef>
+                          <a:spcPts val="0"/>
+                        </a:spcBef>
+                        <a:spcAft>
+                          <a:spcPts val="0"/>
+                        </a:spcAft>
+                      </a:pPr>
+                      <a:r>
+                        <a:rPr lang="en-US" sz="1800" dirty="0" err="1">
+                          <a:effectLst/>
+                        </a:rPr>
+                        <a:t>Neraportată</a:t>
+                      </a:r>
+                      <a:endParaRPr lang="en-US" sz="1800" dirty="0">
+                        <a:effectLst/>
+                        <a:latin typeface="Times New Roman"/>
+                        <a:ea typeface="Times New Roman"/>
+                      </a:endParaRPr>
+                    </a:p>
+                  </a:txBody>
+                  <a:tcPr marL="68580" marR="68580" marT="0" marB="0"/>
+                </a:tc>
+              </a:tr>
+            </a:tbl>
+          </a:graphicData>
+        </a:graphic>
+      </p:graphicFrame>
+    </p:spTree>
+    <p:extLst>
+      <p:ext uri="{BB962C8B-B14F-4D97-AF65-F5344CB8AC3E}">
+        <p14:creationId xmlns:p14="http://schemas.microsoft.com/office/powerpoint/2010/main" val="3267582253"/>
+      </p:ext>
+    </p:extLst>
+  </p:cSld>
+  <p:clrMapOvr>
+    <a:masterClrMapping/>
+  </p:clrMapOvr>
+  <p:timing>
+    <p:tnLst>
+      <p:par>
+        <p:cTn id="1" dur="indefinite" restart="never" nodeType="tmRoot"/>
+      </p:par>
+    </p:tnLst>
+  </p:timing>
+</p:sld>
+</file>
+
+<file path=ppt/slides/slide14.xml><?xml version="1.0" encoding="utf-8"?>
+<p:sld xmlns:a="http://schemas.openxmlformats.org/drawingml/2006/main" xmlns:r="http://schemas.openxmlformats.org/officeDocument/2006/relationships" xmlns:p="http://schemas.openxmlformats.org/presentationml/2006/main">
+  <p:cSld>
+    <p:spTree>
+      <p:nvGrpSpPr>
+        <p:cNvPr id="1" name=""/>
+        <p:cNvGrpSpPr/>
+        <p:nvPr/>
+      </p:nvGrpSpPr>
+      <p:grpSpPr>
+        <a:xfrm>
+          <a:off x="0" y="0"/>
+          <a:ext cx="0" cy="0"/>
+          <a:chOff x="0" y="0"/>
+          <a:chExt cx="0" cy="0"/>
+        </a:xfrm>
+      </p:grpSpPr>
+      <p:sp>
+        <p:nvSpPr>
           <p:cNvPr id="2" name="Content Placeholder 1"/>
           <p:cNvSpPr>
             <a:spLocks noGrp="1"/>
@@ -16788,9 +18584,16 @@
             <p:ph idx="1"/>
           </p:nvPr>
         </p:nvSpPr>
-        <p:spPr/>
+        <p:spPr>
+          <a:xfrm>
+            <a:off x="431800" y="2972741"/>
+            <a:ext cx="9067800" cy="2970859"/>
+          </a:xfrm>
+        </p:spPr>
         <p:txBody>
-          <a:bodyPr/>
+          <a:bodyPr>
+            <a:normAutofit fontScale="92500" lnSpcReduction="20000"/>
+          </a:bodyPr>
           <a:lstStyle/>
           <a:p>
             <a:pPr>
@@ -16799,145 +18602,156 @@
               </a:lnSpc>
             </a:pPr>
             <a:r>
-              <a:rPr lang="en-US" dirty="0" smtClean="0"/>
-              <a:t>Rapid  : </a:t>
-            </a:r>
-            <a:r>
-              <a:rPr lang="en-US" dirty="0" err="1" smtClean="0"/>
-              <a:t>SWI</a:t>
-            </a:r>
-            <a:r>
-              <a:rPr lang="en-US" dirty="0" smtClean="0"/>
-              <a:t>-Prolog </a:t>
-            </a:r>
-            <a:r>
-              <a:rPr lang="en-US" dirty="0"/>
-              <a:t>e </a:t>
-            </a:r>
-            <a:r>
-              <a:rPr lang="en-US" dirty="0" smtClean="0"/>
-              <a:t>multi-threading</a:t>
-            </a:r>
-          </a:p>
-          <a:p>
-            <a:pPr>
+              <a:rPr lang="en-US" sz="2800" dirty="0" err="1" smtClean="0"/>
+              <a:t>Analizarea</a:t>
+            </a:r>
+            <a:r>
+              <a:rPr lang="en-US" sz="2800" dirty="0" smtClean="0"/>
+              <a:t> </a:t>
+            </a:r>
+            <a:r>
+              <a:rPr lang="en-US" sz="2800" dirty="0" err="1" smtClean="0"/>
+              <a:t>unui</a:t>
+            </a:r>
+            <a:r>
+              <a:rPr lang="en-US" sz="2800" dirty="0" smtClean="0"/>
+              <a:t> set de </a:t>
+            </a:r>
+            <a:r>
+              <a:rPr lang="en-US" sz="2800" dirty="0" err="1" smtClean="0"/>
+              <a:t>teme</a:t>
+            </a:r>
+            <a:r>
+              <a:rPr lang="en-US" sz="2800" dirty="0" smtClean="0"/>
+              <a:t> de la </a:t>
+            </a:r>
+            <a:r>
+              <a:rPr lang="en-US" sz="2800" dirty="0" err="1" smtClean="0"/>
+              <a:t>laboratorul</a:t>
+            </a:r>
+            <a:r>
+              <a:rPr lang="en-US" sz="2800" dirty="0" smtClean="0"/>
+              <a:t> de </a:t>
+            </a:r>
+            <a:r>
+              <a:rPr lang="en-US" sz="2800" dirty="0" err="1" smtClean="0"/>
+              <a:t>PASSC</a:t>
+            </a:r>
+            <a:r>
+              <a:rPr lang="en-US" sz="2800" dirty="0"/>
+              <a:t>:</a:t>
+            </a:r>
+            <a:endParaRPr lang="en-US" sz="2800" dirty="0" smtClean="0"/>
+          </a:p>
+          <a:p>
+            <a:pPr lvl="1">
               <a:lnSpc>
                 <a:spcPct val="150000"/>
               </a:lnSpc>
+              <a:buFont typeface="Wingdings" pitchFamily="2" charset="2"/>
+              <a:buChar char="§"/>
             </a:pPr>
             <a:r>
-              <a:rPr lang="en-US" dirty="0" smtClean="0"/>
-              <a:t>Se pot exclude </a:t>
-            </a:r>
-            <a:r>
-              <a:rPr lang="en-US" dirty="0" err="1" smtClean="0"/>
-              <a:t>clase</a:t>
-            </a:r>
-            <a:r>
-              <a:rPr lang="en-US" dirty="0" smtClean="0"/>
-              <a:t> din </a:t>
-            </a:r>
-            <a:r>
-              <a:rPr lang="en-US" dirty="0" err="1" smtClean="0"/>
-              <a:t>analiza</a:t>
-            </a:r>
-            <a:endParaRPr lang="en-US" dirty="0" smtClean="0"/>
-          </a:p>
-          <a:p>
-            <a:pPr>
+              <a:rPr lang="en-US" sz="2800" dirty="0" smtClean="0"/>
+              <a:t>16 </a:t>
+            </a:r>
+            <a:r>
+              <a:rPr lang="en-US" sz="2800" dirty="0" err="1" smtClean="0"/>
+              <a:t>proiecte</a:t>
+            </a:r>
+            <a:r>
+              <a:rPr lang="en-US" sz="2800" dirty="0" smtClean="0"/>
+              <a:t> </a:t>
+            </a:r>
+            <a:r>
+              <a:rPr lang="en-US" sz="2800" dirty="0" err="1" smtClean="0"/>
+              <a:t>comparate</a:t>
+            </a:r>
+            <a:endParaRPr lang="en-US" sz="2800" dirty="0" smtClean="0"/>
+          </a:p>
+          <a:p>
+            <a:pPr lvl="1">
               <a:lnSpc>
                 <a:spcPct val="150000"/>
               </a:lnSpc>
+              <a:buFont typeface="Wingdings" pitchFamily="2" charset="2"/>
+              <a:buChar char="§"/>
             </a:pPr>
             <a:r>
-              <a:rPr lang="en-US" dirty="0" err="1"/>
-              <a:t>Flexibilitate</a:t>
-            </a:r>
-            <a:r>
-              <a:rPr lang="en-US" dirty="0"/>
-              <a:t> – </a:t>
-            </a:r>
-            <a:r>
-              <a:rPr lang="en-US" dirty="0" err="1"/>
-              <a:t>prin</a:t>
-            </a:r>
-            <a:r>
-              <a:rPr lang="en-US" dirty="0"/>
+              <a:rPr lang="en-US" sz="2800" dirty="0"/>
+              <a:t>120 de </a:t>
+            </a:r>
+            <a:r>
+              <a:rPr lang="en-US" sz="2800" dirty="0" err="1" smtClean="0"/>
+              <a:t>parechi</a:t>
+            </a:r>
+            <a:r>
+              <a:rPr lang="en-US" sz="2800" dirty="0" smtClean="0"/>
+              <a:t> de </a:t>
+            </a:r>
+            <a:r>
+              <a:rPr lang="en-US" sz="2800" dirty="0" err="1" smtClean="0"/>
+              <a:t>cate</a:t>
+            </a:r>
+            <a:r>
+              <a:rPr lang="en-US" sz="2800" dirty="0" smtClean="0"/>
+              <a:t> 2 </a:t>
+            </a:r>
+            <a:r>
+              <a:rPr lang="en-US" sz="2800" dirty="0" err="1" smtClean="0"/>
+              <a:t>proiecte</a:t>
+            </a:r>
+            <a:r>
+              <a:rPr lang="en-US" sz="2800" dirty="0" smtClean="0"/>
               <a:t> </a:t>
             </a:r>
             <a:r>
-              <a:rPr lang="en-US" dirty="0" err="1"/>
-              <a:t>alegerea</a:t>
-            </a:r>
-            <a:r>
-              <a:rPr lang="en-US" dirty="0"/>
-              <a:t>/</a:t>
-            </a:r>
-            <a:r>
-              <a:rPr lang="en-US" dirty="0" err="1"/>
-              <a:t>crearea</a:t>
-            </a:r>
-            <a:r>
-              <a:rPr lang="en-US" dirty="0"/>
-              <a:t> </a:t>
-            </a:r>
-            <a:r>
-              <a:rPr lang="en-US" dirty="0" err="1"/>
-              <a:t>profilelor</a:t>
-            </a:r>
-            <a:endParaRPr lang="en-US" dirty="0"/>
-          </a:p>
-          <a:p>
-            <a:pPr>
+              <a:rPr lang="en-US" sz="2800" dirty="0" err="1" smtClean="0"/>
+              <a:t>analizate</a:t>
+            </a:r>
+            <a:r>
+              <a:rPr lang="en-US" sz="2800" dirty="0" smtClean="0"/>
+              <a:t> in 21  de </a:t>
+            </a:r>
+            <a:r>
+              <a:rPr lang="en-US" sz="2800" dirty="0" err="1" smtClean="0"/>
+              <a:t>secunde</a:t>
+            </a:r>
+            <a:endParaRPr lang="en-US" sz="2800" dirty="0"/>
+          </a:p>
+          <a:p>
+            <a:pPr lvl="1">
               <a:lnSpc>
                 <a:spcPct val="150000"/>
               </a:lnSpc>
+              <a:buFont typeface="Wingdings" pitchFamily="2" charset="2"/>
+              <a:buChar char="§"/>
             </a:pPr>
             <a:r>
-              <a:rPr lang="en-US" dirty="0" err="1" smtClean="0"/>
-              <a:t>Usor</a:t>
-            </a:r>
-            <a:r>
-              <a:rPr lang="en-US" dirty="0" smtClean="0"/>
-              <a:t> de </a:t>
-            </a:r>
-            <a:r>
-              <a:rPr lang="en-US" dirty="0" err="1" smtClean="0"/>
-              <a:t>adaugat</a:t>
-            </a:r>
-            <a:r>
-              <a:rPr lang="en-US" dirty="0" smtClean="0"/>
+              <a:rPr lang="en-US" sz="2800" dirty="0" err="1"/>
+              <a:t>d</a:t>
+            </a:r>
+            <a:r>
+              <a:rPr lang="en-US" sz="2800" dirty="0" err="1" smtClean="0"/>
+              <a:t>epistate</a:t>
+            </a:r>
+            <a:r>
+              <a:rPr lang="en-US" sz="2800" dirty="0" smtClean="0"/>
+              <a:t> 2 </a:t>
+            </a:r>
+            <a:r>
+              <a:rPr lang="en-US" sz="2800" dirty="0" err="1" smtClean="0"/>
+              <a:t>proiecte</a:t>
+            </a:r>
+            <a:r>
+              <a:rPr lang="en-US" sz="2800" dirty="0" smtClean="0"/>
               <a:t> </a:t>
             </a:r>
             <a:r>
-              <a:rPr lang="en-US" dirty="0" err="1" smtClean="0"/>
-              <a:t>noi</a:t>
-            </a:r>
-            <a:r>
-              <a:rPr lang="en-US" dirty="0" smtClean="0"/>
-              <a:t> </a:t>
-            </a:r>
-            <a:r>
-              <a:rPr lang="en-US" dirty="0" err="1" smtClean="0"/>
-              <a:t>filtre</a:t>
-            </a:r>
-            <a:endParaRPr lang="en-US" dirty="0" smtClean="0"/>
-          </a:p>
-          <a:p>
-            <a:pPr>
-              <a:lnSpc>
-                <a:spcPct val="150000"/>
-              </a:lnSpc>
-            </a:pPr>
-            <a:endParaRPr lang="en-US" dirty="0" smtClean="0"/>
-          </a:p>
-          <a:p>
-            <a:pPr>
-              <a:lnSpc>
-                <a:spcPct val="150000"/>
-              </a:lnSpc>
-            </a:pPr>
-            <a:endParaRPr lang="en-US" dirty="0" smtClean="0"/>
+              <a:rPr lang="en-US" sz="2800" dirty="0" err="1" smtClean="0"/>
+              <a:t>copiate</a:t>
+            </a:r>
+            <a:endParaRPr lang="en-US" sz="2800" dirty="0" smtClean="0"/>
           </a:p>
         </p:txBody>
       </p:sp>
@@ -16958,11 +18772,274 @@
           <a:p>
             <a:r>
               <a:rPr lang="en-US" dirty="0" err="1" smtClean="0"/>
-              <a:t>Avantaje</a:t>
+              <a:t>Rezultate</a:t>
+            </a:r>
+            <a:endParaRPr lang="en-US" dirty="0"/>
+          </a:p>
+        </p:txBody>
+      </p:sp>
+    </p:spTree>
+    <p:extLst>
+      <p:ext uri="{BB962C8B-B14F-4D97-AF65-F5344CB8AC3E}">
+        <p14:creationId xmlns:p14="http://schemas.microsoft.com/office/powerpoint/2010/main" val="1527581008"/>
+      </p:ext>
+    </p:extLst>
+  </p:cSld>
+  <p:clrMapOvr>
+    <a:masterClrMapping/>
+  </p:clrMapOvr>
+  <p:timing>
+    <p:tnLst>
+      <p:par>
+        <p:cTn id="1" dur="indefinite" restart="never" nodeType="tmRoot"/>
+      </p:par>
+    </p:tnLst>
+  </p:timing>
+</p:sld>
+</file>
+
+<file path=ppt/slides/slide15.xml><?xml version="1.0" encoding="utf-8"?>
+<p:sld xmlns:a="http://schemas.openxmlformats.org/drawingml/2006/main" xmlns:r="http://schemas.openxmlformats.org/officeDocument/2006/relationships" xmlns:p="http://schemas.openxmlformats.org/presentationml/2006/main">
+  <p:cSld>
+    <p:spTree>
+      <p:nvGrpSpPr>
+        <p:cNvPr id="1" name=""/>
+        <p:cNvGrpSpPr/>
+        <p:nvPr/>
+      </p:nvGrpSpPr>
+      <p:grpSpPr>
+        <a:xfrm>
+          <a:off x="0" y="0"/>
+          <a:ext cx="0" cy="0"/>
+          <a:chOff x="0" y="0"/>
+          <a:chExt cx="0" cy="0"/>
+        </a:xfrm>
+      </p:grpSpPr>
+      <p:sp>
+        <p:nvSpPr>
+          <p:cNvPr id="2" name="Content Placeholder 1"/>
+          <p:cNvSpPr>
+            <a:spLocks noGrp="1"/>
+          </p:cNvSpPr>
+          <p:nvPr>
+            <p:ph idx="1"/>
+          </p:nvPr>
+        </p:nvSpPr>
+        <p:spPr/>
+        <p:txBody>
+          <a:bodyPr/>
+          <a:lstStyle/>
+          <a:p>
+            <a:pPr>
+              <a:lnSpc>
+                <a:spcPct val="150000"/>
+              </a:lnSpc>
+            </a:pPr>
+            <a:r>
+              <a:rPr lang="en-US" dirty="0" err="1" smtClean="0"/>
+              <a:t>Algoritm</a:t>
             </a:r>
             <a:r>
               <a:rPr lang="en-US" dirty="0" smtClean="0"/>
               <a:t> </a:t>
+            </a:r>
+            <a:r>
+              <a:rPr lang="en-US" dirty="0" err="1" smtClean="0"/>
+              <a:t>imun</a:t>
+            </a:r>
+            <a:r>
+              <a:rPr lang="en-US" dirty="0" smtClean="0"/>
+              <a:t> la </a:t>
+            </a:r>
+            <a:r>
+              <a:rPr lang="en-US" dirty="0" err="1" smtClean="0"/>
+              <a:t>redenumiri</a:t>
+            </a:r>
+            <a:endParaRPr lang="en-US" dirty="0" smtClean="0"/>
+          </a:p>
+          <a:p>
+            <a:pPr>
+              <a:lnSpc>
+                <a:spcPct val="150000"/>
+              </a:lnSpc>
+            </a:pPr>
+            <a:r>
+              <a:rPr lang="en-US" dirty="0" smtClean="0"/>
+              <a:t>Rapid  : </a:t>
+            </a:r>
+            <a:r>
+              <a:rPr lang="en-US" dirty="0" err="1" smtClean="0"/>
+              <a:t>SWI</a:t>
+            </a:r>
+            <a:r>
+              <a:rPr lang="en-US" dirty="0" smtClean="0"/>
+              <a:t>-Prolog </a:t>
+            </a:r>
+            <a:r>
+              <a:rPr lang="en-US" dirty="0"/>
+              <a:t>e </a:t>
+            </a:r>
+            <a:r>
+              <a:rPr lang="en-US" dirty="0" smtClean="0"/>
+              <a:t>multi-threading</a:t>
+            </a:r>
+          </a:p>
+          <a:p>
+            <a:pPr>
+              <a:lnSpc>
+                <a:spcPct val="150000"/>
+              </a:lnSpc>
+            </a:pPr>
+            <a:r>
+              <a:rPr lang="en-US" dirty="0" smtClean="0"/>
+              <a:t>Se pot exclude </a:t>
+            </a:r>
+            <a:r>
+              <a:rPr lang="en-US" dirty="0" err="1" smtClean="0"/>
+              <a:t>clase</a:t>
+            </a:r>
+            <a:r>
+              <a:rPr lang="en-US" dirty="0" smtClean="0"/>
+              <a:t> din </a:t>
+            </a:r>
+            <a:r>
+              <a:rPr lang="en-US" dirty="0" err="1" smtClean="0"/>
+              <a:t>analiza</a:t>
+            </a:r>
+            <a:endParaRPr lang="en-US" dirty="0" smtClean="0"/>
+          </a:p>
+          <a:p>
+            <a:pPr>
+              <a:lnSpc>
+                <a:spcPct val="150000"/>
+              </a:lnSpc>
+            </a:pPr>
+            <a:r>
+              <a:rPr lang="en-US" dirty="0" err="1"/>
+              <a:t>Flexibilitate</a:t>
+            </a:r>
+            <a:r>
+              <a:rPr lang="en-US" dirty="0"/>
+              <a:t> – </a:t>
+            </a:r>
+            <a:r>
+              <a:rPr lang="en-US" dirty="0" err="1"/>
+              <a:t>prin</a:t>
+            </a:r>
+            <a:r>
+              <a:rPr lang="en-US" dirty="0"/>
+              <a:t> </a:t>
+            </a:r>
+            <a:r>
+              <a:rPr lang="en-US" dirty="0" err="1"/>
+              <a:t>alegerea</a:t>
+            </a:r>
+            <a:r>
+              <a:rPr lang="en-US" dirty="0"/>
+              <a:t>/</a:t>
+            </a:r>
+            <a:r>
+              <a:rPr lang="en-US" dirty="0" err="1"/>
+              <a:t>crearea</a:t>
+            </a:r>
+            <a:r>
+              <a:rPr lang="en-US" dirty="0"/>
+              <a:t> </a:t>
+            </a:r>
+            <a:r>
+              <a:rPr lang="en-US" dirty="0" err="1"/>
+              <a:t>profilelor</a:t>
+            </a:r>
+            <a:endParaRPr lang="en-US" dirty="0"/>
+          </a:p>
+          <a:p>
+            <a:pPr>
+              <a:lnSpc>
+                <a:spcPct val="150000"/>
+              </a:lnSpc>
+            </a:pPr>
+            <a:r>
+              <a:rPr lang="en-US" dirty="0" err="1" smtClean="0"/>
+              <a:t>Usor</a:t>
+            </a:r>
+            <a:r>
+              <a:rPr lang="en-US" dirty="0" smtClean="0"/>
+              <a:t> de </a:t>
+            </a:r>
+            <a:r>
+              <a:rPr lang="en-US" dirty="0" err="1" smtClean="0"/>
+              <a:t>adaugat</a:t>
+            </a:r>
+            <a:r>
+              <a:rPr lang="en-US" dirty="0" smtClean="0"/>
+              <a:t> </a:t>
+            </a:r>
+            <a:r>
+              <a:rPr lang="en-US" dirty="0" err="1" smtClean="0"/>
+              <a:t>noi</a:t>
+            </a:r>
+            <a:r>
+              <a:rPr lang="en-US" dirty="0" smtClean="0"/>
+              <a:t> </a:t>
+            </a:r>
+            <a:r>
+              <a:rPr lang="en-US" dirty="0" err="1" smtClean="0"/>
+              <a:t>filtre</a:t>
+            </a:r>
+            <a:endParaRPr lang="en-US" dirty="0" smtClean="0"/>
+          </a:p>
+          <a:p>
+            <a:pPr>
+              <a:lnSpc>
+                <a:spcPct val="150000"/>
+              </a:lnSpc>
+            </a:pPr>
+            <a:endParaRPr lang="en-US" dirty="0" smtClean="0"/>
+          </a:p>
+          <a:p>
+            <a:pPr>
+              <a:lnSpc>
+                <a:spcPct val="150000"/>
+              </a:lnSpc>
+            </a:pPr>
+            <a:endParaRPr lang="en-US" dirty="0" smtClean="0"/>
+          </a:p>
+        </p:txBody>
+      </p:sp>
+      <p:sp>
+        <p:nvSpPr>
+          <p:cNvPr id="3" name="Title 2"/>
+          <p:cNvSpPr>
+            <a:spLocks noGrp="1"/>
+          </p:cNvSpPr>
+          <p:nvPr>
+            <p:ph type="title"/>
+          </p:nvPr>
+        </p:nvSpPr>
+        <p:spPr/>
+        <p:txBody>
+          <a:bodyPr/>
+          <a:lstStyle/>
+          <a:p>
+            <a:r>
+              <a:rPr lang="en-US" dirty="0" err="1" smtClean="0"/>
+              <a:t>Avantaje</a:t>
+            </a:r>
+            <a:r>
+              <a:rPr lang="en-US" dirty="0" smtClean="0"/>
+              <a:t> </a:t>
+            </a:r>
+            <a:r>
+              <a:rPr lang="en-US" dirty="0" err="1" smtClean="0"/>
+              <a:t>si</a:t>
+            </a:r>
+            <a:r>
+              <a:rPr lang="en-US" dirty="0" smtClean="0"/>
+              <a:t> </a:t>
+            </a:r>
+            <a:r>
+              <a:rPr lang="en-US" dirty="0" err="1" smtClean="0"/>
+              <a:t>facilitati</a:t>
             </a:r>
             <a:endParaRPr lang="en-US" dirty="0"/>
           </a:p>
@@ -16988,7 +19065,7 @@
 </p:sld>
 </file>
 
-<file path=ppt/slides/slide12.xml><?xml version="1.0" encoding="utf-8"?>
+<file path=ppt/slides/slide16.xml><?xml version="1.0" encoding="utf-8"?>
 <p:sld xmlns:a="http://schemas.openxmlformats.org/drawingml/2006/main" xmlns:r="http://schemas.openxmlformats.org/officeDocument/2006/relationships" xmlns:p="http://schemas.openxmlformats.org/presentationml/2006/main">
   <p:cSld>
     <p:spTree>
@@ -17193,7 +19270,7 @@
 </p:sld>
 </file>
 
-<file path=ppt/slides/slide13.xml><?xml version="1.0" encoding="utf-8"?>
+<file path=ppt/slides/slide17.xml><?xml version="1.0" encoding="utf-8"?>
 <p:sld xmlns:a="http://schemas.openxmlformats.org/drawingml/2006/main" xmlns:r="http://schemas.openxmlformats.org/officeDocument/2006/relationships" xmlns:p="http://schemas.openxmlformats.org/presentationml/2006/main">
   <p:cSld>
     <p:spTree>
@@ -17253,7 +19330,7 @@
           <a:p>
             <a:pPr>
               <a:lnSpc>
-                <a:spcPct val="150000"/>
+                <a:spcPct val="200000"/>
               </a:lnSpc>
             </a:pPr>
             <a:r>
@@ -17334,6 +19411,75 @@
       </p:par>
     </p:tnLst>
   </p:timing>
+</p:sld>
+</file>
+
+<file path=ppt/slides/slide18.xml><?xml version="1.0" encoding="utf-8"?>
+<p:sld xmlns:a="http://schemas.openxmlformats.org/drawingml/2006/main" xmlns:r="http://schemas.openxmlformats.org/officeDocument/2006/relationships" xmlns:p="http://schemas.openxmlformats.org/presentationml/2006/main">
+  <p:cSld>
+    <p:spTree>
+      <p:nvGrpSpPr>
+        <p:cNvPr id="1" name=""/>
+        <p:cNvGrpSpPr/>
+        <p:nvPr/>
+      </p:nvGrpSpPr>
+      <p:grpSpPr>
+        <a:xfrm>
+          <a:off x="0" y="0"/>
+          <a:ext cx="0" cy="0"/>
+          <a:chOff x="0" y="0"/>
+          <a:chExt cx="0" cy="0"/>
+        </a:xfrm>
+      </p:grpSpPr>
+      <p:sp>
+        <p:nvSpPr>
+          <p:cNvPr id="4" name="Title 3"/>
+          <p:cNvSpPr>
+            <a:spLocks noGrp="1"/>
+          </p:cNvSpPr>
+          <p:nvPr>
+            <p:ph type="ctrTitle"/>
+          </p:nvPr>
+        </p:nvSpPr>
+        <p:spPr/>
+        <p:txBody>
+          <a:bodyPr/>
+          <a:lstStyle/>
+          <a:p>
+            <a:r>
+              <a:rPr lang="en-US" dirty="0" err="1" smtClean="0"/>
+              <a:t>Va</a:t>
+            </a:r>
+            <a:r>
+              <a:rPr lang="en-US" dirty="0" smtClean="0"/>
+              <a:t> </a:t>
+            </a:r>
+            <a:r>
+              <a:rPr lang="en-US" dirty="0" err="1" smtClean="0"/>
+              <a:t>multumesc</a:t>
+            </a:r>
+            <a:r>
+              <a:rPr lang="en-US" dirty="0"/>
+              <a:t> </a:t>
+            </a:r>
+            <a:r>
+              <a:rPr lang="en-US" dirty="0" smtClean="0"/>
+              <a:t>!</a:t>
+            </a:r>
+            <a:endParaRPr lang="en-US" dirty="0"/>
+          </a:p>
+        </p:txBody>
+      </p:sp>
+    </p:spTree>
+    <p:extLst>
+      <p:ext uri="{BB962C8B-B14F-4D97-AF65-F5344CB8AC3E}">
+        <p14:creationId xmlns:p14="http://schemas.microsoft.com/office/powerpoint/2010/main" val="3410838923"/>
+      </p:ext>
+    </p:extLst>
+  </p:cSld>
+  <p:clrMapOvr>
+    <a:masterClrMapping/>
+  </p:clrMapOvr>
 </p:sld>
 </file>
 
@@ -17611,6 +19757,725 @@
 </file>
 
 <file path=ppt/slides/slide4.xml><?xml version="1.0" encoding="utf-8"?>
+<p:sld xmlns:a="http://schemas.openxmlformats.org/drawingml/2006/main" xmlns:r="http://schemas.openxmlformats.org/officeDocument/2006/relationships" xmlns:p="http://schemas.openxmlformats.org/presentationml/2006/main">
+  <p:cSld>
+    <p:spTree>
+      <p:nvGrpSpPr>
+        <p:cNvPr id="1" name=""/>
+        <p:cNvGrpSpPr/>
+        <p:nvPr/>
+      </p:nvGrpSpPr>
+      <p:grpSpPr>
+        <a:xfrm>
+          <a:off x="0" y="0"/>
+          <a:ext cx="0" cy="0"/>
+          <a:chOff x="0" y="0"/>
+          <a:chExt cx="0" cy="0"/>
+        </a:xfrm>
+      </p:grpSpPr>
+      <p:sp>
+        <p:nvSpPr>
+          <p:cNvPr id="4" name="Title 3"/>
+          <p:cNvSpPr>
+            <a:spLocks noGrp="1"/>
+          </p:cNvSpPr>
+          <p:nvPr>
+            <p:ph type="ctrTitle"/>
+          </p:nvPr>
+        </p:nvSpPr>
+        <p:spPr>
+          <a:xfrm>
+            <a:off x="660400" y="457200"/>
+            <a:ext cx="8636000" cy="1241298"/>
+          </a:xfrm>
+        </p:spPr>
+        <p:txBody>
+          <a:bodyPr/>
+          <a:lstStyle/>
+          <a:p>
+            <a:r>
+              <a:rPr lang="en-US" dirty="0" err="1" smtClean="0"/>
+              <a:t>CloneDetector</a:t>
+            </a:r>
+            <a:endParaRPr lang="en-US" dirty="0"/>
+          </a:p>
+        </p:txBody>
+      </p:sp>
+      <p:sp>
+        <p:nvSpPr>
+          <p:cNvPr id="5" name="Text Placeholder 4"/>
+          <p:cNvSpPr>
+            <a:spLocks noGrp="1"/>
+          </p:cNvSpPr>
+          <p:nvPr>
+            <p:ph type="subTitle" idx="1"/>
+          </p:nvPr>
+        </p:nvSpPr>
+        <p:spPr>
+          <a:xfrm>
+            <a:off x="660400" y="2438400"/>
+            <a:ext cx="8839200" cy="2819400"/>
+          </a:xfrm>
+        </p:spPr>
+        <p:txBody>
+          <a:bodyPr anchor="t">
+            <a:normAutofit/>
+          </a:bodyPr>
+          <a:lstStyle/>
+          <a:p>
+            <a:pPr marL="457200" indent="-457200" algn="l">
+              <a:buFont typeface="Wingdings" pitchFamily="2" charset="2"/>
+              <a:buChar char="v"/>
+            </a:pPr>
+            <a:r>
+              <a:rPr lang="en-US" sz="2600" b="1" dirty="0" err="1" smtClean="0"/>
+              <a:t>Depisteaza</a:t>
+            </a:r>
+            <a:r>
+              <a:rPr lang="en-US" sz="2600" b="1" dirty="0" smtClean="0"/>
+              <a:t> </a:t>
+            </a:r>
+            <a:r>
+              <a:rPr lang="en-US" sz="2600" b="1" u="sng" dirty="0" err="1" smtClean="0"/>
+              <a:t>toate</a:t>
+            </a:r>
+            <a:r>
+              <a:rPr lang="en-US" sz="2600" b="1" u="sng" dirty="0" smtClean="0"/>
+              <a:t> </a:t>
+            </a:r>
+            <a:r>
+              <a:rPr lang="en-US" sz="2600" b="1" dirty="0" err="1" smtClean="0"/>
+              <a:t>tipurile</a:t>
+            </a:r>
+            <a:r>
+              <a:rPr lang="en-US" sz="2600" b="1" dirty="0" smtClean="0"/>
+              <a:t> de clone.</a:t>
+            </a:r>
+          </a:p>
+          <a:p>
+            <a:pPr marL="457200" indent="-457200" algn="l">
+              <a:buFont typeface="Wingdings" pitchFamily="2" charset="2"/>
+              <a:buChar char="v"/>
+            </a:pPr>
+            <a:r>
+              <a:rPr lang="en-US" sz="2600" b="1" dirty="0" err="1" smtClean="0"/>
+              <a:t>Algoritm</a:t>
+            </a:r>
+            <a:r>
+              <a:rPr lang="en-US" sz="2600" b="1" dirty="0" smtClean="0"/>
+              <a:t> </a:t>
+            </a:r>
+            <a:r>
+              <a:rPr lang="en-US" sz="2600" b="1" u="sng" dirty="0" err="1" smtClean="0"/>
+              <a:t>imun</a:t>
+            </a:r>
+            <a:r>
+              <a:rPr lang="en-US" sz="2600" b="1" u="sng" dirty="0" smtClean="0"/>
+              <a:t> </a:t>
+            </a:r>
+            <a:r>
+              <a:rPr lang="en-US" sz="2600" b="1" u="sng" dirty="0" err="1" smtClean="0"/>
+              <a:t>redenumirilor</a:t>
+            </a:r>
+            <a:r>
+              <a:rPr lang="en-US" sz="2600" b="1" u="sng" dirty="0" smtClean="0"/>
+              <a:t> </a:t>
+            </a:r>
+            <a:r>
+              <a:rPr lang="en-US" sz="2600" b="1" dirty="0" smtClean="0"/>
+              <a:t>– </a:t>
+            </a:r>
+            <a:r>
+              <a:rPr lang="en-US" sz="2600" b="1" dirty="0" err="1" smtClean="0"/>
+              <a:t>cele</a:t>
+            </a:r>
+            <a:r>
+              <a:rPr lang="en-US" sz="2600" b="1" dirty="0" smtClean="0"/>
+              <a:t> </a:t>
+            </a:r>
+            <a:r>
+              <a:rPr lang="en-US" sz="2600" b="1" dirty="0" err="1" smtClean="0"/>
+              <a:t>mai</a:t>
+            </a:r>
+            <a:r>
+              <a:rPr lang="en-US" sz="2600" b="1" dirty="0" smtClean="0"/>
+              <a:t> </a:t>
+            </a:r>
+            <a:r>
+              <a:rPr lang="en-US" sz="2600" b="1" dirty="0" err="1" smtClean="0"/>
+              <a:t>intanite</a:t>
+            </a:r>
+            <a:r>
+              <a:rPr lang="en-US" sz="2600" b="1" dirty="0" smtClean="0"/>
+              <a:t> </a:t>
+            </a:r>
+            <a:r>
+              <a:rPr lang="en-US" sz="2600" b="1" dirty="0" err="1" smtClean="0"/>
+              <a:t>schimbari</a:t>
+            </a:r>
+            <a:endParaRPr lang="en-US" sz="2600" b="1" dirty="0" smtClean="0"/>
+          </a:p>
+          <a:p>
+            <a:pPr marL="457200" indent="-457200" algn="l">
+              <a:buFont typeface="Wingdings" pitchFamily="2" charset="2"/>
+              <a:buChar char="v"/>
+            </a:pPr>
+            <a:r>
+              <a:rPr lang="en-US" sz="2600" b="1" dirty="0" err="1" smtClean="0"/>
+              <a:t>Combina</a:t>
+            </a:r>
+            <a:r>
+              <a:rPr lang="en-US" sz="2600" b="1" dirty="0" smtClean="0"/>
+              <a:t> </a:t>
+            </a:r>
+            <a:r>
+              <a:rPr lang="en-US" sz="2600" b="1" dirty="0" err="1" smtClean="0"/>
+              <a:t>metode</a:t>
+            </a:r>
+            <a:r>
+              <a:rPr lang="en-US" sz="2600" b="1" dirty="0" smtClean="0"/>
+              <a:t> de </a:t>
+            </a:r>
+            <a:r>
+              <a:rPr lang="en-US" sz="2600" b="1" dirty="0" err="1" smtClean="0"/>
+              <a:t>depistarea</a:t>
+            </a:r>
+            <a:r>
+              <a:rPr lang="en-US" sz="2600" b="1" dirty="0" smtClean="0"/>
+              <a:t> </a:t>
+            </a:r>
+            <a:r>
+              <a:rPr lang="en-US" sz="2600" b="1" dirty="0" err="1" smtClean="0"/>
+              <a:t>bazate</a:t>
+            </a:r>
+            <a:r>
+              <a:rPr lang="en-US" sz="2600" b="1" dirty="0" smtClean="0"/>
+              <a:t> </a:t>
+            </a:r>
+            <a:r>
+              <a:rPr lang="en-US" sz="2600" b="1" dirty="0" err="1" smtClean="0"/>
+              <a:t>pe</a:t>
+            </a:r>
+            <a:r>
+              <a:rPr lang="en-US" sz="2600" b="1" dirty="0" smtClean="0"/>
+              <a:t> </a:t>
+            </a:r>
+          </a:p>
+          <a:p>
+            <a:pPr marL="965195" lvl="1" indent="-457200" algn="l">
+              <a:buFont typeface="Wingdings" pitchFamily="2" charset="2"/>
+              <a:buChar char="v"/>
+            </a:pPr>
+            <a:r>
+              <a:rPr lang="en-US" sz="2600" b="1" dirty="0" err="1" smtClean="0"/>
+              <a:t>metrici</a:t>
+            </a:r>
+            <a:r>
+              <a:rPr lang="en-US" sz="2600" b="1" smtClean="0"/>
+              <a:t> </a:t>
+            </a:r>
+            <a:endParaRPr lang="en-US" sz="2600" b="1" dirty="0" smtClean="0"/>
+          </a:p>
+          <a:p>
+            <a:pPr marL="965195" lvl="1" indent="-457200" algn="l">
+              <a:buFont typeface="Wingdings" pitchFamily="2" charset="2"/>
+              <a:buChar char="v"/>
+            </a:pPr>
+            <a:r>
+              <a:rPr lang="en-US" sz="2600" b="1" dirty="0" smtClean="0"/>
+              <a:t>	</a:t>
+            </a:r>
+            <a:r>
+              <a:rPr lang="en-US" sz="2600" b="1" dirty="0" err="1" smtClean="0"/>
+              <a:t>grafuri</a:t>
+            </a:r>
+            <a:r>
+              <a:rPr lang="en-US" sz="2600" b="1" dirty="0" smtClean="0"/>
+              <a:t> de </a:t>
+            </a:r>
+            <a:r>
+              <a:rPr lang="en-US" sz="2600" b="1" dirty="0" err="1" smtClean="0"/>
+              <a:t>apeluri</a:t>
+            </a:r>
+            <a:r>
+              <a:rPr lang="en-US" sz="2600" b="1" dirty="0" smtClean="0"/>
+              <a:t> (call graph) </a:t>
+            </a:r>
+            <a:endParaRPr lang="en-US" sz="2600" b="1" dirty="0"/>
+          </a:p>
+        </p:txBody>
+      </p:sp>
+    </p:spTree>
+    <p:extLst>
+      <p:ext uri="{BB962C8B-B14F-4D97-AF65-F5344CB8AC3E}">
+        <p14:creationId xmlns:p14="http://schemas.microsoft.com/office/powerpoint/2010/main" val="2405983772"/>
+      </p:ext>
+    </p:extLst>
+  </p:cSld>
+  <p:clrMapOvr>
+    <a:masterClrMapping/>
+  </p:clrMapOvr>
+  <p:timing>
+    <p:tnLst>
+      <p:par>
+        <p:cTn id="1" dur="indefinite" restart="never" nodeType="tmRoot"/>
+      </p:par>
+    </p:tnLst>
+  </p:timing>
+</p:sld>
+</file>
+
+<file path=ppt/slides/slide5.xml><?xml version="1.0" encoding="utf-8"?>
+<p:sld xmlns:a="http://schemas.openxmlformats.org/drawingml/2006/main" xmlns:r="http://schemas.openxmlformats.org/officeDocument/2006/relationships" xmlns:p="http://schemas.openxmlformats.org/presentationml/2006/main">
+  <p:cSld>
+    <p:spTree>
+      <p:nvGrpSpPr>
+        <p:cNvPr id="1" name=""/>
+        <p:cNvGrpSpPr/>
+        <p:nvPr/>
+      </p:nvGrpSpPr>
+      <p:grpSpPr>
+        <a:xfrm>
+          <a:off x="0" y="0"/>
+          <a:ext cx="0" cy="0"/>
+          <a:chOff x="0" y="0"/>
+          <a:chExt cx="0" cy="0"/>
+        </a:xfrm>
+      </p:grpSpPr>
+      <p:sp>
+        <p:nvSpPr>
+          <p:cNvPr id="13" name="Title 12"/>
+          <p:cNvSpPr>
+            <a:spLocks noGrp="1"/>
+          </p:cNvSpPr>
+          <p:nvPr>
+            <p:ph type="title"/>
+          </p:nvPr>
+        </p:nvSpPr>
+        <p:spPr>
+          <a:xfrm>
+            <a:off x="4241800" y="838200"/>
+            <a:ext cx="5638800" cy="1905000"/>
+          </a:xfrm>
+        </p:spPr>
+        <p:txBody>
+          <a:bodyPr anchor="ctr">
+            <a:normAutofit/>
+          </a:bodyPr>
+          <a:lstStyle/>
+          <a:p>
+            <a:r>
+              <a:rPr lang="en-US" sz="4000" dirty="0" err="1" smtClean="0"/>
+              <a:t>Urmatoarele</a:t>
+            </a:r>
+            <a:r>
+              <a:rPr lang="en-US" sz="4000" dirty="0" smtClean="0"/>
+              <a:t> </a:t>
+            </a:r>
+            <a:r>
+              <a:rPr lang="en-US" sz="4000" dirty="0" err="1" smtClean="0"/>
+              <a:t>Subiecte</a:t>
+            </a:r>
+            <a:r>
+              <a:rPr lang="en-US" sz="4000" dirty="0" smtClean="0"/>
+              <a:t> :</a:t>
+            </a:r>
+            <a:endParaRPr lang="en-US" sz="4000" dirty="0"/>
+          </a:p>
+        </p:txBody>
+      </p:sp>
+      <p:sp>
+        <p:nvSpPr>
+          <p:cNvPr id="15" name="Text Placeholder 14"/>
+          <p:cNvSpPr>
+            <a:spLocks noGrp="1"/>
+          </p:cNvSpPr>
+          <p:nvPr>
+            <p:ph type="body" sz="half" idx="2"/>
+          </p:nvPr>
+        </p:nvSpPr>
+        <p:spPr>
+          <a:xfrm>
+            <a:off x="3937000" y="3048000"/>
+            <a:ext cx="5791200" cy="2590800"/>
+          </a:xfrm>
+        </p:spPr>
+        <p:txBody>
+          <a:bodyPr>
+            <a:normAutofit/>
+          </a:bodyPr>
+          <a:lstStyle/>
+          <a:p>
+            <a:pPr marL="514350" indent="-514350">
+              <a:buClr>
+                <a:schemeClr val="bg1"/>
+              </a:buClr>
+              <a:buFont typeface="+mj-lt"/>
+              <a:buAutoNum type="arabicPeriod"/>
+            </a:pPr>
+            <a:r>
+              <a:rPr lang="en-US" sz="3200" b="1" dirty="0" err="1"/>
+              <a:t>Infrastructura</a:t>
+            </a:r>
+            <a:r>
+              <a:rPr lang="en-US" sz="3200" b="1" dirty="0"/>
+              <a:t> </a:t>
+            </a:r>
+            <a:r>
+              <a:rPr lang="en-US" sz="3200" b="1" dirty="0" err="1"/>
+              <a:t>folosita</a:t>
+            </a:r>
+            <a:endParaRPr lang="en-US" sz="3200" b="1" dirty="0"/>
+          </a:p>
+          <a:p>
+            <a:pPr marL="514350" indent="-514350">
+              <a:buClr>
+                <a:schemeClr val="bg1"/>
+              </a:buClr>
+              <a:buFont typeface="+mj-lt"/>
+              <a:buAutoNum type="arabicPeriod"/>
+            </a:pPr>
+            <a:r>
+              <a:rPr lang="en-US" sz="3200" b="1" dirty="0" err="1"/>
+              <a:t>Implementarea</a:t>
+            </a:r>
+            <a:r>
+              <a:rPr lang="en-US" sz="3200" b="1" dirty="0"/>
+              <a:t> </a:t>
+            </a:r>
+            <a:r>
+              <a:rPr lang="en-US" sz="3200" b="1" dirty="0" err="1"/>
+              <a:t>algoritmului</a:t>
+            </a:r>
+            <a:endParaRPr lang="en-US" sz="3200" b="1" dirty="0"/>
+          </a:p>
+          <a:p>
+            <a:pPr marL="514350" indent="-514350">
+              <a:buClr>
+                <a:schemeClr val="bg1"/>
+              </a:buClr>
+              <a:buFont typeface="+mj-lt"/>
+              <a:buAutoNum type="arabicPeriod"/>
+            </a:pPr>
+            <a:r>
+              <a:rPr lang="en-US" sz="3200" b="1" dirty="0" err="1"/>
+              <a:t>Resultatele</a:t>
+            </a:r>
+            <a:r>
+              <a:rPr lang="en-US" sz="3200" b="1" dirty="0"/>
+              <a:t> </a:t>
+            </a:r>
+            <a:r>
+              <a:rPr lang="en-US" sz="3200" b="1" dirty="0" err="1"/>
+              <a:t>obtinute</a:t>
+            </a:r>
+            <a:endParaRPr lang="en-US" sz="3200" b="1" dirty="0"/>
+          </a:p>
+        </p:txBody>
+      </p:sp>
+      <p:pic>
+        <p:nvPicPr>
+          <p:cNvPr id="16" name="Picture Placeholder 15"/>
+          <p:cNvPicPr>
+            <a:picLocks noGrp="1" noChangeAspect="1"/>
+          </p:cNvPicPr>
+          <p:nvPr>
+            <p:ph type="pic" idx="1"/>
+          </p:nvPr>
+        </p:nvPicPr>
+        <p:blipFill>
+          <a:blip r:embed="rId3">
+            <a:extLst>
+              <a:ext uri="{28A0092B-C50C-407E-A947-70E740481C1C}">
+                <a14:useLocalDpi xmlns:a14="http://schemas.microsoft.com/office/drawing/2010/main" val="0"/>
+              </a:ext>
+            </a:extLst>
+          </a:blip>
+          <a:srcRect t="8974" b="8974"/>
+          <a:stretch>
+            <a:fillRect/>
+          </a:stretch>
+        </p:blipFill>
+        <p:spPr>
+          <a:xfrm>
+            <a:off x="431800" y="1363785"/>
+            <a:ext cx="3352800" cy="2751015"/>
+          </a:xfrm>
+        </p:spPr>
+      </p:pic>
+    </p:spTree>
+    <p:extLst>
+      <p:ext uri="{BB962C8B-B14F-4D97-AF65-F5344CB8AC3E}">
+        <p14:creationId xmlns:p14="http://schemas.microsoft.com/office/powerpoint/2010/main" val="2066542854"/>
+      </p:ext>
+    </p:extLst>
+  </p:cSld>
+  <p:clrMapOvr>
+    <a:masterClrMapping/>
+  </p:clrMapOvr>
+  <p:timing>
+    <p:tnLst>
+      <p:par>
+        <p:cTn id="1" dur="indefinite" restart="never" nodeType="tmRoot"/>
+      </p:par>
+    </p:tnLst>
+  </p:timing>
+</p:sld>
+</file>
+
+<file path=ppt/slides/slide6.xml><?xml version="1.0" encoding="utf-8"?>
+<p:sld xmlns:a="http://schemas.openxmlformats.org/drawingml/2006/main" xmlns:r="http://schemas.openxmlformats.org/officeDocument/2006/relationships" xmlns:p="http://schemas.openxmlformats.org/presentationml/2006/main">
+  <p:cSld>
+    <p:spTree>
+      <p:nvGrpSpPr>
+        <p:cNvPr id="1" name=""/>
+        <p:cNvGrpSpPr/>
+        <p:nvPr/>
+      </p:nvGrpSpPr>
+      <p:grpSpPr>
+        <a:xfrm>
+          <a:off x="0" y="0"/>
+          <a:ext cx="0" cy="0"/>
+          <a:chOff x="0" y="0"/>
+          <a:chExt cx="0" cy="0"/>
+        </a:xfrm>
+      </p:grpSpPr>
+      <p:sp>
+        <p:nvSpPr>
+          <p:cNvPr id="5" name="Title 4"/>
+          <p:cNvSpPr>
+            <a:spLocks noGrp="1"/>
+          </p:cNvSpPr>
+          <p:nvPr>
+            <p:ph type="ctrTitle"/>
+          </p:nvPr>
+        </p:nvSpPr>
+        <p:spPr>
+          <a:xfrm>
+            <a:off x="736600" y="152400"/>
+            <a:ext cx="8636000" cy="1977898"/>
+          </a:xfrm>
+        </p:spPr>
+        <p:txBody>
+          <a:bodyPr>
+            <a:normAutofit/>
+          </a:bodyPr>
+          <a:lstStyle/>
+          <a:p>
+            <a:r>
+              <a:rPr lang="en-US" sz="5400" b="1" dirty="0" err="1"/>
+              <a:t>Infrastructura</a:t>
+            </a:r>
+            <a:r>
+              <a:rPr lang="en-US" sz="5400" b="1" dirty="0"/>
+              <a:t> </a:t>
+            </a:r>
+            <a:r>
+              <a:rPr lang="en-US" sz="5400" b="1" dirty="0" err="1" smtClean="0"/>
+              <a:t>folosita</a:t>
+            </a:r>
+            <a:r>
+              <a:rPr lang="en-US" sz="5400" b="1" dirty="0" smtClean="0"/>
+              <a:t/>
+            </a:r>
+            <a:br>
+              <a:rPr lang="en-US" sz="5400" b="1" dirty="0" smtClean="0"/>
+            </a:br>
+            <a:endParaRPr lang="en-US" dirty="0"/>
+          </a:p>
+        </p:txBody>
+      </p:sp>
+      <p:sp>
+        <p:nvSpPr>
+          <p:cNvPr id="2" name="Subtitle 1"/>
+          <p:cNvSpPr>
+            <a:spLocks noGrp="1"/>
+          </p:cNvSpPr>
+          <p:nvPr>
+            <p:ph type="subTitle" idx="1"/>
+          </p:nvPr>
+        </p:nvSpPr>
+        <p:spPr>
+          <a:xfrm>
+            <a:off x="508000" y="1905000"/>
+            <a:ext cx="9067800" cy="1828800"/>
+          </a:xfrm>
+        </p:spPr>
+        <p:txBody>
+          <a:bodyPr>
+            <a:normAutofit/>
+          </a:bodyPr>
+          <a:lstStyle/>
+          <a:p>
+            <a:r>
+              <a:rPr lang="en-US" sz="3200" b="1" dirty="0" err="1"/>
+              <a:t>JTransformer</a:t>
+            </a:r>
+            <a:r>
+              <a:rPr lang="en-US" sz="2400" b="1" dirty="0"/>
+              <a:t> </a:t>
+            </a:r>
+            <a:r>
+              <a:rPr lang="en-US" sz="2400" b="1" dirty="0" smtClean="0"/>
+              <a:t>: plugin eclipse care </a:t>
+            </a:r>
+            <a:r>
+              <a:rPr lang="en-US" sz="2400" b="1" dirty="0" err="1" smtClean="0"/>
+              <a:t>transforma</a:t>
+            </a:r>
+            <a:r>
+              <a:rPr lang="en-US" sz="2400" b="1" dirty="0" smtClean="0"/>
+              <a:t> </a:t>
+            </a:r>
+            <a:r>
+              <a:rPr lang="en-US" sz="2400" b="1" dirty="0" err="1"/>
+              <a:t>codul</a:t>
+            </a:r>
+            <a:r>
+              <a:rPr lang="en-US" sz="2400" b="1" dirty="0"/>
+              <a:t> </a:t>
+            </a:r>
+            <a:r>
+              <a:rPr lang="en-US" sz="2400" b="1" dirty="0" err="1"/>
+              <a:t>sursa</a:t>
+            </a:r>
+            <a:r>
+              <a:rPr lang="en-US" sz="2400" b="1" dirty="0"/>
+              <a:t> </a:t>
+            </a:r>
+            <a:r>
+              <a:rPr lang="en-US" sz="2400" b="1" dirty="0" smtClean="0"/>
+              <a:t>Java </a:t>
+            </a:r>
+            <a:r>
+              <a:rPr lang="en-US" sz="2400" b="1" dirty="0" err="1" smtClean="0"/>
+              <a:t>intr</a:t>
+            </a:r>
+            <a:r>
+              <a:rPr lang="en-US" sz="2400" b="1" dirty="0" smtClean="0"/>
+              <a:t>-un arbore </a:t>
+            </a:r>
+            <a:r>
+              <a:rPr lang="en-US" sz="2400" b="1" dirty="0" err="1" smtClean="0"/>
+              <a:t>sintactic</a:t>
+            </a:r>
+            <a:r>
+              <a:rPr lang="en-US" sz="2400" b="1" dirty="0" smtClean="0"/>
+              <a:t> abstract(AST) </a:t>
+            </a:r>
+            <a:r>
+              <a:rPr lang="en-US" sz="2400" b="1" dirty="0" err="1" smtClean="0"/>
+              <a:t>memorat</a:t>
+            </a:r>
+            <a:r>
+              <a:rPr lang="en-US" sz="2400" b="1" dirty="0" smtClean="0"/>
+              <a:t> sub forma de  </a:t>
+            </a:r>
+            <a:r>
+              <a:rPr lang="en-US" sz="2400" b="1" dirty="0" err="1"/>
+              <a:t>clauze</a:t>
+            </a:r>
+            <a:r>
+              <a:rPr lang="en-US" sz="2400" b="1" dirty="0"/>
+              <a:t> Prolog. </a:t>
+            </a:r>
+            <a:br>
+              <a:rPr lang="en-US" sz="2400" b="1" dirty="0"/>
+            </a:br>
+            <a:endParaRPr lang="en-US" sz="2400" b="1" dirty="0"/>
+          </a:p>
+          <a:p>
+            <a:endParaRPr lang="en-US" dirty="0"/>
+          </a:p>
+        </p:txBody>
+      </p:sp>
+      <p:pic>
+        <p:nvPicPr>
+          <p:cNvPr id="2050" name="Picture 2"/>
+          <p:cNvPicPr>
+            <a:picLocks noGrp="1" noChangeAspect="1" noChangeArrowheads="1"/>
+          </p:cNvPicPr>
+          <p:nvPr>
+            <p:ph idx="4294967295"/>
+          </p:nvPr>
+        </p:nvPicPr>
+        <p:blipFill>
+          <a:blip r:embed="rId2">
+            <a:extLst>
+              <a:ext uri="{28A0092B-C50C-407E-A947-70E740481C1C}">
+                <a14:useLocalDpi xmlns:a14="http://schemas.microsoft.com/office/drawing/2010/main" val="0"/>
+              </a:ext>
+            </a:extLst>
+          </a:blip>
+          <a:srcRect/>
+          <a:stretch>
+            <a:fillRect/>
+          </a:stretch>
+        </p:blipFill>
+        <p:spPr bwMode="auto">
+          <a:xfrm>
+            <a:off x="507999" y="3429000"/>
+            <a:ext cx="9220201" cy="3733800"/>
+          </a:xfrm>
+          <a:prstGeom prst="rect">
+            <a:avLst/>
+          </a:prstGeom>
+          <a:noFill/>
+          <a:ln>
+            <a:noFill/>
+          </a:ln>
+          <a:effectLst/>
+          <a:extLst>
+            <a:ext uri="{909E8E84-426E-40DD-AFC4-6F175D3DCCD1}">
+              <a14:hiddenFill xmlns:a14="http://schemas.microsoft.com/office/drawing/2010/main">
+                <a:solidFill>
+                  <a:schemeClr val="accent1"/>
+                </a:solidFill>
+              </a14:hiddenFill>
+            </a:ext>
+            <a:ext uri="{91240B29-F687-4F45-9708-019B960494DF}">
+              <a14:hiddenLine xmlns:a14="http://schemas.microsoft.com/office/drawing/2010/main" w="9525">
+                <a:solidFill>
+                  <a:schemeClr val="tx1"/>
+                </a:solidFill>
+                <a:miter lim="800000"/>
+                <a:headEnd/>
+                <a:tailEnd/>
+              </a14:hiddenLine>
+            </a:ext>
+            <a:ext uri="{AF507438-7753-43E0-B8FC-AC1667EBCBE1}">
+              <a14:hiddenEffects xmlns:a14="http://schemas.microsoft.com/office/drawing/2010/main">
+                <a:effectLst>
+                  <a:outerShdw dist="35921" dir="2700000" algn="ctr" rotWithShape="0">
+                    <a:schemeClr val="bg2"/>
+                  </a:outerShdw>
+                </a:effectLst>
+              </a14:hiddenEffects>
+            </a:ext>
+          </a:extLst>
+        </p:spPr>
+      </p:pic>
+    </p:spTree>
+    <p:extLst>
+      <p:ext uri="{BB962C8B-B14F-4D97-AF65-F5344CB8AC3E}">
+        <p14:creationId xmlns:p14="http://schemas.microsoft.com/office/powerpoint/2010/main" val="2222133860"/>
+      </p:ext>
+    </p:extLst>
+  </p:cSld>
+  <p:clrMapOvr>
+    <a:masterClrMapping/>
+  </p:clrMapOvr>
+  <p:timing>
+    <p:tnLst>
+      <p:par>
+        <p:cTn id="1" dur="indefinite" restart="never" nodeType="tmRoot"/>
+      </p:par>
+    </p:tnLst>
+  </p:timing>
+</p:sld>
+</file>
+
+<file path=ppt/slides/slide7.xml><?xml version="1.0" encoding="utf-8"?>
 <p:sld xmlns:a="http://schemas.openxmlformats.org/drawingml/2006/main" xmlns:r="http://schemas.openxmlformats.org/officeDocument/2006/relationships" xmlns:p="http://schemas.openxmlformats.org/presentationml/2006/main">
   <p:cSld>
     <p:spTree>
@@ -19384,457 +22249,7 @@
 </p:sld>
 </file>
 
-<file path=ppt/slides/slide5.xml><?xml version="1.0" encoding="utf-8"?>
-<p:sld xmlns:a="http://schemas.openxmlformats.org/drawingml/2006/main" xmlns:r="http://schemas.openxmlformats.org/officeDocument/2006/relationships" xmlns:p="http://schemas.openxmlformats.org/presentationml/2006/main">
-  <p:cSld>
-    <p:spTree>
-      <p:nvGrpSpPr>
-        <p:cNvPr id="1" name=""/>
-        <p:cNvGrpSpPr/>
-        <p:nvPr/>
-      </p:nvGrpSpPr>
-      <p:grpSpPr>
-        <a:xfrm>
-          <a:off x="0" y="0"/>
-          <a:ext cx="0" cy="0"/>
-          <a:chOff x="0" y="0"/>
-          <a:chExt cx="0" cy="0"/>
-        </a:xfrm>
-      </p:grpSpPr>
-      <p:sp>
-        <p:nvSpPr>
-          <p:cNvPr id="13" name="Title 12"/>
-          <p:cNvSpPr>
-            <a:spLocks noGrp="1"/>
-          </p:cNvSpPr>
-          <p:nvPr>
-            <p:ph type="title"/>
-          </p:nvPr>
-        </p:nvSpPr>
-        <p:spPr>
-          <a:xfrm>
-            <a:off x="4241800" y="838200"/>
-            <a:ext cx="5638800" cy="1905000"/>
-          </a:xfrm>
-        </p:spPr>
-        <p:txBody>
-          <a:bodyPr anchor="ctr">
-            <a:normAutofit/>
-          </a:bodyPr>
-          <a:lstStyle/>
-          <a:p>
-            <a:r>
-              <a:rPr lang="en-US" sz="4000" dirty="0" err="1" smtClean="0"/>
-              <a:t>Urmatoarele</a:t>
-            </a:r>
-            <a:r>
-              <a:rPr lang="en-US" sz="4000" dirty="0" smtClean="0"/>
-              <a:t> </a:t>
-            </a:r>
-            <a:r>
-              <a:rPr lang="en-US" sz="4000" dirty="0" err="1" smtClean="0"/>
-              <a:t>Subiecte</a:t>
-            </a:r>
-            <a:r>
-              <a:rPr lang="en-US" sz="4000" dirty="0" smtClean="0"/>
-              <a:t> :</a:t>
-            </a:r>
-            <a:endParaRPr lang="en-US" sz="4000" dirty="0"/>
-          </a:p>
-        </p:txBody>
-      </p:sp>
-      <p:sp>
-        <p:nvSpPr>
-          <p:cNvPr id="15" name="Text Placeholder 14"/>
-          <p:cNvSpPr>
-            <a:spLocks noGrp="1"/>
-          </p:cNvSpPr>
-          <p:nvPr>
-            <p:ph type="body" sz="half" idx="2"/>
-          </p:nvPr>
-        </p:nvSpPr>
-        <p:spPr>
-          <a:xfrm>
-            <a:off x="3937000" y="3048000"/>
-            <a:ext cx="5791200" cy="2590800"/>
-          </a:xfrm>
-        </p:spPr>
-        <p:txBody>
-          <a:bodyPr>
-            <a:normAutofit/>
-          </a:bodyPr>
-          <a:lstStyle/>
-          <a:p>
-            <a:pPr marL="514350" indent="-514350">
-              <a:buClr>
-                <a:schemeClr val="bg1"/>
-              </a:buClr>
-              <a:buFont typeface="+mj-lt"/>
-              <a:buAutoNum type="arabicPeriod"/>
-            </a:pPr>
-            <a:r>
-              <a:rPr lang="en-US" sz="3200" b="1" dirty="0" err="1"/>
-              <a:t>Infrastructura</a:t>
-            </a:r>
-            <a:r>
-              <a:rPr lang="en-US" sz="3200" b="1" dirty="0"/>
-              <a:t> </a:t>
-            </a:r>
-            <a:r>
-              <a:rPr lang="en-US" sz="3200" b="1" dirty="0" err="1"/>
-              <a:t>folosita</a:t>
-            </a:r>
-            <a:endParaRPr lang="en-US" sz="3200" b="1" dirty="0"/>
-          </a:p>
-          <a:p>
-            <a:pPr marL="514350" indent="-514350">
-              <a:buClr>
-                <a:schemeClr val="bg1"/>
-              </a:buClr>
-              <a:buFont typeface="+mj-lt"/>
-              <a:buAutoNum type="arabicPeriod"/>
-            </a:pPr>
-            <a:r>
-              <a:rPr lang="en-US" sz="3200" b="1" dirty="0" err="1"/>
-              <a:t>Implementarea</a:t>
-            </a:r>
-            <a:r>
-              <a:rPr lang="en-US" sz="3200" b="1" dirty="0"/>
-              <a:t> </a:t>
-            </a:r>
-            <a:r>
-              <a:rPr lang="en-US" sz="3200" b="1" dirty="0" err="1"/>
-              <a:t>algoritmului</a:t>
-            </a:r>
-            <a:endParaRPr lang="en-US" sz="3200" b="1" dirty="0"/>
-          </a:p>
-          <a:p>
-            <a:pPr marL="514350" indent="-514350">
-              <a:buClr>
-                <a:schemeClr val="bg1"/>
-              </a:buClr>
-              <a:buFont typeface="+mj-lt"/>
-              <a:buAutoNum type="arabicPeriod"/>
-            </a:pPr>
-            <a:r>
-              <a:rPr lang="en-US" sz="3200" b="1" dirty="0" err="1"/>
-              <a:t>Resultatele</a:t>
-            </a:r>
-            <a:r>
-              <a:rPr lang="en-US" sz="3200" b="1" dirty="0"/>
-              <a:t> </a:t>
-            </a:r>
-            <a:r>
-              <a:rPr lang="en-US" sz="3200" b="1" dirty="0" err="1"/>
-              <a:t>obtinute</a:t>
-            </a:r>
-            <a:endParaRPr lang="en-US" sz="3200" b="1" dirty="0"/>
-          </a:p>
-        </p:txBody>
-      </p:sp>
-      <p:pic>
-        <p:nvPicPr>
-          <p:cNvPr id="16" name="Picture Placeholder 15"/>
-          <p:cNvPicPr>
-            <a:picLocks noGrp="1" noChangeAspect="1"/>
-          </p:cNvPicPr>
-          <p:nvPr>
-            <p:ph type="pic" idx="1"/>
-          </p:nvPr>
-        </p:nvPicPr>
-        <p:blipFill>
-          <a:blip r:embed="rId3">
-            <a:extLst>
-              <a:ext uri="{28A0092B-C50C-407E-A947-70E740481C1C}">
-                <a14:useLocalDpi xmlns:a14="http://schemas.microsoft.com/office/drawing/2010/main" val="0"/>
-              </a:ext>
-            </a:extLst>
-          </a:blip>
-          <a:srcRect t="8974" b="8974"/>
-          <a:stretch>
-            <a:fillRect/>
-          </a:stretch>
-        </p:blipFill>
-        <p:spPr>
-          <a:xfrm>
-            <a:off x="431800" y="1363785"/>
-            <a:ext cx="3352800" cy="2751015"/>
-          </a:xfrm>
-        </p:spPr>
-      </p:pic>
-    </p:spTree>
-    <p:extLst>
-      <p:ext uri="{BB962C8B-B14F-4D97-AF65-F5344CB8AC3E}">
-        <p14:creationId xmlns:p14="http://schemas.microsoft.com/office/powerpoint/2010/main" val="2066542854"/>
-      </p:ext>
-    </p:extLst>
-  </p:cSld>
-  <p:clrMapOvr>
-    <a:masterClrMapping/>
-  </p:clrMapOvr>
-  <p:timing>
-    <p:tnLst>
-      <p:par>
-        <p:cTn id="1" dur="indefinite" restart="never" nodeType="tmRoot"/>
-      </p:par>
-    </p:tnLst>
-  </p:timing>
-</p:sld>
-</file>
-
-<file path=ppt/slides/slide6.xml><?xml version="1.0" encoding="utf-8"?>
-<p:sld xmlns:a="http://schemas.openxmlformats.org/drawingml/2006/main" xmlns:r="http://schemas.openxmlformats.org/officeDocument/2006/relationships" xmlns:p="http://schemas.openxmlformats.org/presentationml/2006/main">
-  <p:cSld>
-    <p:spTree>
-      <p:nvGrpSpPr>
-        <p:cNvPr id="1" name=""/>
-        <p:cNvGrpSpPr/>
-        <p:nvPr/>
-      </p:nvGrpSpPr>
-      <p:grpSpPr>
-        <a:xfrm>
-          <a:off x="0" y="0"/>
-          <a:ext cx="0" cy="0"/>
-          <a:chOff x="0" y="0"/>
-          <a:chExt cx="0" cy="0"/>
-        </a:xfrm>
-      </p:grpSpPr>
-      <p:sp>
-        <p:nvSpPr>
-          <p:cNvPr id="5" name="Title 4"/>
-          <p:cNvSpPr>
-            <a:spLocks noGrp="1"/>
-          </p:cNvSpPr>
-          <p:nvPr>
-            <p:ph type="ctrTitle"/>
-          </p:nvPr>
-        </p:nvSpPr>
-        <p:spPr>
-          <a:xfrm>
-            <a:off x="736600" y="152400"/>
-            <a:ext cx="8636000" cy="1977898"/>
-          </a:xfrm>
-        </p:spPr>
-        <p:txBody>
-          <a:bodyPr>
-            <a:normAutofit/>
-          </a:bodyPr>
-          <a:lstStyle/>
-          <a:p>
-            <a:r>
-              <a:rPr lang="en-US" sz="5400" b="1" dirty="0" err="1"/>
-              <a:t>Infrastructura</a:t>
-            </a:r>
-            <a:r>
-              <a:rPr lang="en-US" sz="5400" b="1" dirty="0"/>
-              <a:t> </a:t>
-            </a:r>
-            <a:r>
-              <a:rPr lang="en-US" sz="5400" b="1" dirty="0" err="1" smtClean="0"/>
-              <a:t>folosita</a:t>
-            </a:r>
-            <a:r>
-              <a:rPr lang="en-US" sz="5400" b="1" dirty="0" smtClean="0"/>
-              <a:t/>
-            </a:r>
-            <a:br>
-              <a:rPr lang="en-US" sz="5400" b="1" dirty="0" smtClean="0"/>
-            </a:br>
-            <a:endParaRPr lang="en-US" dirty="0"/>
-          </a:p>
-        </p:txBody>
-      </p:sp>
-      <p:sp>
-        <p:nvSpPr>
-          <p:cNvPr id="2" name="Subtitle 1"/>
-          <p:cNvSpPr>
-            <a:spLocks noGrp="1"/>
-          </p:cNvSpPr>
-          <p:nvPr>
-            <p:ph type="subTitle" idx="1"/>
-          </p:nvPr>
-        </p:nvSpPr>
-        <p:spPr>
-          <a:xfrm>
-            <a:off x="508000" y="1905000"/>
-            <a:ext cx="9067800" cy="1828800"/>
-          </a:xfrm>
-        </p:spPr>
-        <p:txBody>
-          <a:bodyPr>
-            <a:normAutofit/>
-          </a:bodyPr>
-          <a:lstStyle/>
-          <a:p>
-            <a:r>
-              <a:rPr lang="en-US" sz="3200" b="1" dirty="0" err="1"/>
-              <a:t>JTransformer</a:t>
-            </a:r>
-            <a:r>
-              <a:rPr lang="en-US" sz="2400" b="1" dirty="0"/>
-              <a:t> </a:t>
-            </a:r>
-            <a:r>
-              <a:rPr lang="en-US" sz="2400" b="1" dirty="0" smtClean="0"/>
-              <a:t>: plugin eclipse care </a:t>
-            </a:r>
-            <a:r>
-              <a:rPr lang="en-US" sz="2400" b="1" dirty="0" err="1" smtClean="0"/>
-              <a:t>transforma</a:t>
-            </a:r>
-            <a:r>
-              <a:rPr lang="en-US" sz="2400" b="1" dirty="0" smtClean="0"/>
-              <a:t> </a:t>
-            </a:r>
-            <a:r>
-              <a:rPr lang="en-US" sz="2400" b="1" dirty="0" err="1"/>
-              <a:t>codul</a:t>
-            </a:r>
-            <a:r>
-              <a:rPr lang="en-US" sz="2400" b="1" dirty="0"/>
-              <a:t> </a:t>
-            </a:r>
-            <a:r>
-              <a:rPr lang="en-US" sz="2400" b="1" dirty="0" err="1"/>
-              <a:t>sursa</a:t>
-            </a:r>
-            <a:r>
-              <a:rPr lang="en-US" sz="2400" b="1" dirty="0"/>
-              <a:t> </a:t>
-            </a:r>
-            <a:r>
-              <a:rPr lang="en-US" sz="2400" b="1" dirty="0" smtClean="0"/>
-              <a:t>Java </a:t>
-            </a:r>
-            <a:r>
-              <a:rPr lang="en-US" sz="2400" b="1" dirty="0" err="1" smtClean="0"/>
-              <a:t>intr</a:t>
-            </a:r>
-            <a:r>
-              <a:rPr lang="en-US" sz="2400" b="1" dirty="0" smtClean="0"/>
-              <a:t>-un arbore </a:t>
-            </a:r>
-            <a:r>
-              <a:rPr lang="en-US" sz="2400" b="1" dirty="0" err="1" smtClean="0"/>
-              <a:t>sintactic</a:t>
-            </a:r>
-            <a:r>
-              <a:rPr lang="en-US" sz="2400" b="1" dirty="0" smtClean="0"/>
-              <a:t> abstract(AST) </a:t>
-            </a:r>
-            <a:r>
-              <a:rPr lang="en-US" sz="2400" b="1" dirty="0" err="1" smtClean="0"/>
-              <a:t>memorat</a:t>
-            </a:r>
-            <a:r>
-              <a:rPr lang="en-US" sz="2400" b="1" dirty="0" smtClean="0"/>
-              <a:t> sub forma de  </a:t>
-            </a:r>
-            <a:r>
-              <a:rPr lang="en-US" sz="2400" b="1" dirty="0" err="1"/>
-              <a:t>clauze</a:t>
-            </a:r>
-            <a:r>
-              <a:rPr lang="en-US" sz="2400" b="1" dirty="0"/>
-              <a:t> Prolog. </a:t>
-            </a:r>
-            <a:br>
-              <a:rPr lang="en-US" sz="2400" b="1" dirty="0"/>
-            </a:br>
-            <a:endParaRPr lang="en-US" sz="2400" b="1" dirty="0"/>
-          </a:p>
-          <a:p>
-            <a:endParaRPr lang="en-US" dirty="0"/>
-          </a:p>
-        </p:txBody>
-      </p:sp>
-      <p:pic>
-        <p:nvPicPr>
-          <p:cNvPr id="2050" name="Picture 2"/>
-          <p:cNvPicPr>
-            <a:picLocks noGrp="1" noChangeAspect="1" noChangeArrowheads="1"/>
-          </p:cNvPicPr>
-          <p:nvPr>
-            <p:ph idx="4294967295"/>
-          </p:nvPr>
-        </p:nvPicPr>
-        <p:blipFill>
-          <a:blip r:embed="rId2">
-            <a:extLst>
-              <a:ext uri="{28A0092B-C50C-407E-A947-70E740481C1C}">
-                <a14:useLocalDpi xmlns:a14="http://schemas.microsoft.com/office/drawing/2010/main" val="0"/>
-              </a:ext>
-            </a:extLst>
-          </a:blip>
-          <a:srcRect/>
-          <a:stretch>
-            <a:fillRect/>
-          </a:stretch>
-        </p:blipFill>
-        <p:spPr bwMode="auto">
-          <a:xfrm>
-            <a:off x="507999" y="3429000"/>
-            <a:ext cx="9220201" cy="3733800"/>
-          </a:xfrm>
-          <a:prstGeom prst="rect">
-            <a:avLst/>
-          </a:prstGeom>
-          <a:noFill/>
-          <a:ln>
-            <a:noFill/>
-          </a:ln>
-          <a:effectLst/>
-          <a:extLst>
-            <a:ext uri="{909E8E84-426E-40DD-AFC4-6F175D3DCCD1}">
-              <a14:hiddenFill xmlns:a14="http://schemas.microsoft.com/office/drawing/2010/main">
-                <a:solidFill>
-                  <a:schemeClr val="accent1"/>
-                </a:solidFill>
-              </a14:hiddenFill>
-            </a:ext>
-            <a:ext uri="{91240B29-F687-4F45-9708-019B960494DF}">
-              <a14:hiddenLine xmlns:a14="http://schemas.microsoft.com/office/drawing/2010/main" w="9525">
-                <a:solidFill>
-                  <a:schemeClr val="tx1"/>
-                </a:solidFill>
-                <a:miter lim="800000"/>
-                <a:headEnd/>
-                <a:tailEnd/>
-              </a14:hiddenLine>
-            </a:ext>
-            <a:ext uri="{AF507438-7753-43E0-B8FC-AC1667EBCBE1}">
-              <a14:hiddenEffects xmlns:a14="http://schemas.microsoft.com/office/drawing/2010/main">
-                <a:effectLst>
-                  <a:outerShdw dist="35921" dir="2700000" algn="ctr" rotWithShape="0">
-                    <a:schemeClr val="bg2"/>
-                  </a:outerShdw>
-                </a:effectLst>
-              </a14:hiddenEffects>
-            </a:ext>
-          </a:extLst>
-        </p:spPr>
-      </p:pic>
-    </p:spTree>
-    <p:extLst>
-      <p:ext uri="{BB962C8B-B14F-4D97-AF65-F5344CB8AC3E}">
-        <p14:creationId xmlns:p14="http://schemas.microsoft.com/office/powerpoint/2010/main" val="2222133860"/>
-      </p:ext>
-    </p:extLst>
-  </p:cSld>
-  <p:clrMapOvr>
-    <a:masterClrMapping/>
-  </p:clrMapOvr>
-  <p:timing>
-    <p:tnLst>
-      <p:par>
-        <p:cTn id="1" dur="indefinite" restart="never" nodeType="tmRoot"/>
-      </p:par>
-    </p:tnLst>
-  </p:timing>
-</p:sld>
-</file>
-
-<file path=ppt/slides/slide7.xml><?xml version="1.0" encoding="utf-8"?>
+<file path=ppt/slides/slide8.xml><?xml version="1.0" encoding="utf-8"?>
 <p:sld xmlns:a="http://schemas.openxmlformats.org/drawingml/2006/main" xmlns:r="http://schemas.openxmlformats.org/officeDocument/2006/relationships" xmlns:p="http://schemas.openxmlformats.org/presentationml/2006/main">
   <p:cSld>
     <p:spTree>
@@ -19945,7 +22360,7 @@
 </p:sld>
 </file>
 
-<file path=ppt/slides/slide8.xml><?xml version="1.0" encoding="utf-8"?>
+<file path=ppt/slides/slide9.xml><?xml version="1.0" encoding="utf-8"?>
 <p:sld xmlns:a="http://schemas.openxmlformats.org/drawingml/2006/main" xmlns:r="http://schemas.openxmlformats.org/officeDocument/2006/relationships" xmlns:p="http://schemas.openxmlformats.org/presentationml/2006/main">
   <p:cSld>
     <p:spTree>
@@ -20250,818 +22665,6 @@
     <p:extLst>
       <p:ext uri="{BB962C8B-B14F-4D97-AF65-F5344CB8AC3E}">
         <p14:creationId xmlns:p14="http://schemas.microsoft.com/office/powerpoint/2010/main" val="4042004580"/>
-      </p:ext>
-    </p:extLst>
-  </p:cSld>
-  <p:clrMapOvr>
-    <a:masterClrMapping/>
-  </p:clrMapOvr>
-  <p:timing>
-    <p:tnLst>
-      <p:par>
-        <p:cTn id="1" dur="indefinite" restart="never" nodeType="tmRoot"/>
-      </p:par>
-    </p:tnLst>
-  </p:timing>
-</p:sld>
-</file>
-
-<file path=ppt/slides/slide9.xml><?xml version="1.0" encoding="utf-8"?>
-<p:sld xmlns:a="http://schemas.openxmlformats.org/drawingml/2006/main" xmlns:r="http://schemas.openxmlformats.org/officeDocument/2006/relationships" xmlns:p="http://schemas.openxmlformats.org/presentationml/2006/main">
-  <p:cSld>
-    <p:spTree>
-      <p:nvGrpSpPr>
-        <p:cNvPr id="1" name=""/>
-        <p:cNvGrpSpPr/>
-        <p:nvPr/>
-      </p:nvGrpSpPr>
-      <p:grpSpPr>
-        <a:xfrm>
-          <a:off x="0" y="0"/>
-          <a:ext cx="0" cy="0"/>
-          <a:chOff x="0" y="0"/>
-          <a:chExt cx="0" cy="0"/>
-        </a:xfrm>
-      </p:grpSpPr>
-      <p:sp>
-        <p:nvSpPr>
-          <p:cNvPr id="3" name="Title 2"/>
-          <p:cNvSpPr>
-            <a:spLocks noGrp="1"/>
-          </p:cNvSpPr>
-          <p:nvPr>
-            <p:ph type="title"/>
-          </p:nvPr>
-        </p:nvSpPr>
-        <p:spPr>
-          <a:xfrm>
-            <a:off x="6299200" y="1524000"/>
-            <a:ext cx="3245672" cy="2747903"/>
-          </a:xfrm>
-        </p:spPr>
-        <p:txBody>
-          <a:bodyPr anchor="ctr">
-            <a:normAutofit/>
-          </a:bodyPr>
-          <a:lstStyle/>
-          <a:p>
-            <a:r>
-              <a:rPr lang="en-US" sz="4800" dirty="0" err="1" smtClean="0"/>
-              <a:t>Rezultate</a:t>
-            </a:r>
-            <a:endParaRPr lang="en-US" sz="4800" dirty="0"/>
-          </a:p>
-        </p:txBody>
-      </p:sp>
-      <p:graphicFrame>
-        <p:nvGraphicFramePr>
-          <p:cNvPr id="4" name="Table 3"/>
-          <p:cNvGraphicFramePr>
-            <a:graphicFrameLocks noGrp="1"/>
-          </p:cNvGraphicFramePr>
-          <p:nvPr>
-            <p:extLst>
-              <p:ext uri="{D42A27DB-BD31-4B8C-83A1-F6EECF244321}">
-                <p14:modId xmlns:p14="http://schemas.microsoft.com/office/powerpoint/2010/main" val="785940782"/>
-              </p:ext>
-            </p:extLst>
-          </p:nvPr>
-        </p:nvGraphicFramePr>
-        <p:xfrm>
-          <a:off x="279400" y="304801"/>
-          <a:ext cx="5638799" cy="6553199"/>
-        </p:xfrm>
-        <a:graphic>
-          <a:graphicData uri="http://schemas.openxmlformats.org/drawingml/2006/table">
-            <a:tbl>
-              <a:tblPr firstRow="1" firstCol="1" bandRow="1">
-                <a:tableStyleId>{5C22544A-7EE6-4342-B048-85BDC9FD1C3A}</a:tableStyleId>
-              </a:tblPr>
-              <a:tblGrid>
-                <a:gridCol w="2214685"/>
-                <a:gridCol w="1998237"/>
-                <a:gridCol w="1425877"/>
-              </a:tblGrid>
-              <a:tr h="746610">
-                <a:tc>
-                  <a:txBody>
-                    <a:bodyPr/>
-                    <a:lstStyle/>
-                    <a:p>
-                      <a:pPr marL="0" marR="0" algn="ctr">
-                        <a:spcBef>
-                          <a:spcPts val="0"/>
-                        </a:spcBef>
-                        <a:spcAft>
-                          <a:spcPts val="0"/>
-                        </a:spcAft>
-                      </a:pPr>
-                      <a:r>
-                        <a:rPr lang="en-US" sz="2000" dirty="0" err="1">
-                          <a:effectLst/>
-                        </a:rPr>
-                        <a:t>Caz</a:t>
-                      </a:r>
-                      <a:r>
-                        <a:rPr lang="en-US" sz="2000" dirty="0">
-                          <a:effectLst/>
-                        </a:rPr>
-                        <a:t> de test</a:t>
-                      </a:r>
-                      <a:endParaRPr lang="en-US" sz="2000" dirty="0">
-                        <a:effectLst/>
-                        <a:latin typeface="Times New Roman"/>
-                        <a:ea typeface="Times New Roman"/>
-                      </a:endParaRPr>
-                    </a:p>
-                  </a:txBody>
-                  <a:tcPr marL="68580" marR="68580" marT="0" marB="0"/>
-                </a:tc>
-                <a:tc>
-                  <a:txBody>
-                    <a:bodyPr/>
-                    <a:lstStyle/>
-                    <a:p>
-                      <a:pPr marL="0" marR="0" algn="ctr">
-                        <a:spcBef>
-                          <a:spcPts val="0"/>
-                        </a:spcBef>
-                        <a:spcAft>
-                          <a:spcPts val="0"/>
-                        </a:spcAft>
-                      </a:pPr>
-                      <a:r>
-                        <a:rPr lang="en-US" sz="2000" dirty="0" err="1">
-                          <a:effectLst/>
-                        </a:rPr>
-                        <a:t>CloneDetector</a:t>
-                      </a:r>
-                      <a:endParaRPr lang="en-US" sz="2000" dirty="0">
-                        <a:effectLst/>
-                        <a:latin typeface="Times New Roman"/>
-                        <a:ea typeface="Times New Roman"/>
-                      </a:endParaRPr>
-                    </a:p>
-                  </a:txBody>
-                  <a:tcPr marL="68580" marR="68580" marT="0" marB="0"/>
-                </a:tc>
-                <a:tc>
-                  <a:txBody>
-                    <a:bodyPr/>
-                    <a:lstStyle/>
-                    <a:p>
-                      <a:pPr marL="0" marR="0" algn="ctr">
-                        <a:spcBef>
-                          <a:spcPts val="0"/>
-                        </a:spcBef>
-                        <a:spcAft>
-                          <a:spcPts val="0"/>
-                        </a:spcAft>
-                      </a:pPr>
-                      <a:r>
-                        <a:rPr lang="en-US" sz="2000" dirty="0">
-                          <a:effectLst/>
-                        </a:rPr>
-                        <a:t>Dude</a:t>
-                      </a:r>
-                      <a:endParaRPr lang="en-US" sz="2000" dirty="0">
-                        <a:effectLst/>
-                        <a:latin typeface="Times New Roman"/>
-                        <a:ea typeface="Times New Roman"/>
-                      </a:endParaRPr>
-                    </a:p>
-                  </a:txBody>
-                  <a:tcPr marL="68580" marR="68580" marT="0" marB="0"/>
-                </a:tc>
-              </a:tr>
-              <a:tr h="526612">
-                <a:tc>
-                  <a:txBody>
-                    <a:bodyPr/>
-                    <a:lstStyle/>
-                    <a:p>
-                      <a:pPr marL="0" marR="0">
-                        <a:spcBef>
-                          <a:spcPts val="0"/>
-                        </a:spcBef>
-                        <a:spcAft>
-                          <a:spcPts val="0"/>
-                        </a:spcAft>
-                      </a:pPr>
-                      <a:r>
-                        <a:rPr lang="en-US" sz="1800" dirty="0" err="1">
-                          <a:effectLst/>
-                        </a:rPr>
-                        <a:t>Clona</a:t>
-                      </a:r>
-                      <a:r>
-                        <a:rPr lang="en-US" sz="1800" dirty="0">
-                          <a:effectLst/>
-                        </a:rPr>
-                        <a:t> </a:t>
-                      </a:r>
-                      <a:r>
-                        <a:rPr lang="en-US" sz="1800" dirty="0" err="1">
-                          <a:effectLst/>
-                        </a:rPr>
-                        <a:t>tipul</a:t>
-                      </a:r>
-                      <a:r>
-                        <a:rPr lang="en-US" sz="1800" dirty="0">
-                          <a:effectLst/>
-                        </a:rPr>
-                        <a:t> 1</a:t>
-                      </a:r>
-                      <a:endParaRPr lang="en-US" sz="1800" dirty="0">
-                        <a:effectLst/>
-                        <a:latin typeface="Times New Roman"/>
-                        <a:ea typeface="Times New Roman"/>
-                      </a:endParaRPr>
-                    </a:p>
-                  </a:txBody>
-                  <a:tcPr marL="68580" marR="68580" marT="0" marB="0"/>
-                </a:tc>
-                <a:tc>
-                  <a:txBody>
-                    <a:bodyPr/>
-                    <a:lstStyle/>
-                    <a:p>
-                      <a:pPr marL="0" marR="0" algn="ctr">
-                        <a:spcBef>
-                          <a:spcPts val="0"/>
-                        </a:spcBef>
-                        <a:spcAft>
-                          <a:spcPts val="0"/>
-                        </a:spcAft>
-                      </a:pPr>
-                      <a:r>
-                        <a:rPr lang="en-US" sz="1800" dirty="0" err="1">
-                          <a:effectLst/>
-                        </a:rPr>
-                        <a:t>Detectată</a:t>
-                      </a:r>
-                      <a:endParaRPr lang="en-US" sz="1800" dirty="0">
-                        <a:effectLst/>
-                        <a:latin typeface="Times New Roman"/>
-                        <a:ea typeface="Times New Roman"/>
-                      </a:endParaRPr>
-                    </a:p>
-                  </a:txBody>
-                  <a:tcPr marL="68580" marR="68580" marT="0" marB="0"/>
-                </a:tc>
-                <a:tc>
-                  <a:txBody>
-                    <a:bodyPr/>
-                    <a:lstStyle/>
-                    <a:p>
-                      <a:pPr marL="0" marR="0">
-                        <a:spcBef>
-                          <a:spcPts val="0"/>
-                        </a:spcBef>
-                        <a:spcAft>
-                          <a:spcPts val="0"/>
-                        </a:spcAft>
-                      </a:pPr>
-                      <a:r>
-                        <a:rPr lang="en-US" sz="1800">
-                          <a:effectLst/>
-                        </a:rPr>
-                        <a:t>Detectată</a:t>
-                      </a:r>
-                      <a:endParaRPr lang="en-US" sz="1800">
-                        <a:effectLst/>
-                        <a:latin typeface="Times New Roman"/>
-                        <a:ea typeface="Times New Roman"/>
-                      </a:endParaRPr>
-                    </a:p>
-                  </a:txBody>
-                  <a:tcPr marL="68580" marR="68580" marT="0" marB="0"/>
-                </a:tc>
-              </a:tr>
-              <a:tr h="922956">
-                <a:tc>
-                  <a:txBody>
-                    <a:bodyPr/>
-                    <a:lstStyle/>
-                    <a:p>
-                      <a:pPr marL="0" marR="0">
-                        <a:spcBef>
-                          <a:spcPts val="0"/>
-                        </a:spcBef>
-                        <a:spcAft>
-                          <a:spcPts val="0"/>
-                        </a:spcAft>
-                      </a:pPr>
-                      <a:r>
-                        <a:rPr lang="en-US" sz="1800">
-                          <a:effectLst/>
-                        </a:rPr>
-                        <a:t>Clona tipul 2 cu porţiuni redenumite</a:t>
-                      </a:r>
-                      <a:endParaRPr lang="en-US" sz="1800">
-                        <a:effectLst/>
-                        <a:latin typeface="Times New Roman"/>
-                        <a:ea typeface="Times New Roman"/>
-                      </a:endParaRPr>
-                    </a:p>
-                  </a:txBody>
-                  <a:tcPr marL="68580" marR="68580" marT="0" marB="0"/>
-                </a:tc>
-                <a:tc>
-                  <a:txBody>
-                    <a:bodyPr/>
-                    <a:lstStyle/>
-                    <a:p>
-                      <a:pPr marL="0" marR="0" algn="ctr">
-                        <a:spcBef>
-                          <a:spcPts val="0"/>
-                        </a:spcBef>
-                        <a:spcAft>
-                          <a:spcPts val="0"/>
-                        </a:spcAft>
-                      </a:pPr>
-                      <a:r>
-                        <a:rPr lang="en-US" sz="1800" dirty="0" err="1">
-                          <a:effectLst/>
-                        </a:rPr>
-                        <a:t>Detectată</a:t>
-                      </a:r>
-                      <a:endParaRPr lang="en-US" sz="1800" dirty="0">
-                        <a:effectLst/>
-                        <a:latin typeface="Times New Roman"/>
-                        <a:ea typeface="Times New Roman"/>
-                      </a:endParaRPr>
-                    </a:p>
-                  </a:txBody>
-                  <a:tcPr marL="68580" marR="68580" marT="0" marB="0"/>
-                </a:tc>
-                <a:tc>
-                  <a:txBody>
-                    <a:bodyPr/>
-                    <a:lstStyle/>
-                    <a:p>
-                      <a:pPr marL="0" marR="0">
-                        <a:spcBef>
-                          <a:spcPts val="0"/>
-                        </a:spcBef>
-                        <a:spcAft>
-                          <a:spcPts val="0"/>
-                        </a:spcAft>
-                      </a:pPr>
-                      <a:r>
-                        <a:rPr lang="en-US" sz="1800" dirty="0" err="1">
-                          <a:effectLst/>
-                        </a:rPr>
-                        <a:t>Detectată</a:t>
-                      </a:r>
-                      <a:endParaRPr lang="en-US" sz="1800" dirty="0">
-                        <a:effectLst/>
-                        <a:latin typeface="Times New Roman"/>
-                        <a:ea typeface="Times New Roman"/>
-                      </a:endParaRPr>
-                    </a:p>
-                  </a:txBody>
-                  <a:tcPr marL="68580" marR="68580" marT="0" marB="0"/>
-                </a:tc>
-              </a:tr>
-              <a:tr h="831493">
-                <a:tc>
-                  <a:txBody>
-                    <a:bodyPr/>
-                    <a:lstStyle/>
-                    <a:p>
-                      <a:pPr marL="0" marR="0">
-                        <a:spcBef>
-                          <a:spcPts val="0"/>
-                        </a:spcBef>
-                        <a:spcAft>
-                          <a:spcPts val="0"/>
-                        </a:spcAft>
-                      </a:pPr>
-                      <a:r>
-                        <a:rPr lang="en-US" sz="1800">
-                          <a:effectLst/>
-                        </a:rPr>
-                        <a:t>Clona tipul 2 total redenumită</a:t>
-                      </a:r>
-                      <a:endParaRPr lang="en-US" sz="1800">
-                        <a:effectLst/>
-                        <a:latin typeface="Times New Roman"/>
-                        <a:ea typeface="Times New Roman"/>
-                      </a:endParaRPr>
-                    </a:p>
-                  </a:txBody>
-                  <a:tcPr marL="68580" marR="68580" marT="0" marB="0"/>
-                </a:tc>
-                <a:tc>
-                  <a:txBody>
-                    <a:bodyPr/>
-                    <a:lstStyle/>
-                    <a:p>
-                      <a:pPr marL="0" marR="0" algn="ctr">
-                        <a:spcBef>
-                          <a:spcPts val="0"/>
-                        </a:spcBef>
-                        <a:spcAft>
-                          <a:spcPts val="0"/>
-                        </a:spcAft>
-                      </a:pPr>
-                      <a:r>
-                        <a:rPr lang="en-US" sz="1800" dirty="0" err="1">
-                          <a:effectLst/>
-                        </a:rPr>
-                        <a:t>Detectată</a:t>
-                      </a:r>
-                      <a:endParaRPr lang="en-US" sz="1800" dirty="0">
-                        <a:effectLst/>
-                        <a:latin typeface="Times New Roman"/>
-                        <a:ea typeface="Times New Roman"/>
-                      </a:endParaRPr>
-                    </a:p>
-                  </a:txBody>
-                  <a:tcPr marL="68580" marR="68580" marT="0" marB="0"/>
-                </a:tc>
-                <a:tc>
-                  <a:txBody>
-                    <a:bodyPr/>
-                    <a:lstStyle/>
-                    <a:p>
-                      <a:pPr marL="0" marR="0">
-                        <a:spcBef>
-                          <a:spcPts val="0"/>
-                        </a:spcBef>
-                        <a:spcAft>
-                          <a:spcPts val="0"/>
-                        </a:spcAft>
-                      </a:pPr>
-                      <a:r>
-                        <a:rPr lang="en-US" sz="1800" dirty="0" err="1">
-                          <a:effectLst/>
-                        </a:rPr>
-                        <a:t>Nedetectată</a:t>
-                      </a:r>
-                      <a:endParaRPr lang="en-US" sz="1800" dirty="0">
-                        <a:effectLst/>
-                        <a:latin typeface="Times New Roman"/>
-                        <a:ea typeface="Times New Roman"/>
-                      </a:endParaRPr>
-                    </a:p>
-                  </a:txBody>
-                  <a:tcPr marL="68580" marR="68580" marT="0" marB="0"/>
-                </a:tc>
-              </a:tr>
-              <a:tr h="831493">
-                <a:tc>
-                  <a:txBody>
-                    <a:bodyPr/>
-                    <a:lstStyle/>
-                    <a:p>
-                      <a:pPr marL="0" marR="0">
-                        <a:spcBef>
-                          <a:spcPts val="0"/>
-                        </a:spcBef>
-                        <a:spcAft>
-                          <a:spcPts val="0"/>
-                        </a:spcAft>
-                      </a:pPr>
-                      <a:r>
-                        <a:rPr lang="en-US" sz="1800">
-                          <a:effectLst/>
-                        </a:rPr>
-                        <a:t>Clona tipul 3 partial redenumită</a:t>
-                      </a:r>
-                      <a:endParaRPr lang="en-US" sz="1800">
-                        <a:effectLst/>
-                        <a:latin typeface="Times New Roman"/>
-                        <a:ea typeface="Times New Roman"/>
-                      </a:endParaRPr>
-                    </a:p>
-                  </a:txBody>
-                  <a:tcPr marL="68580" marR="68580" marT="0" marB="0"/>
-                </a:tc>
-                <a:tc>
-                  <a:txBody>
-                    <a:bodyPr/>
-                    <a:lstStyle/>
-                    <a:p>
-                      <a:pPr marL="0" marR="0" algn="ctr">
-                        <a:spcBef>
-                          <a:spcPts val="0"/>
-                        </a:spcBef>
-                        <a:spcAft>
-                          <a:spcPts val="0"/>
-                        </a:spcAft>
-                      </a:pPr>
-                      <a:r>
-                        <a:rPr lang="en-US" sz="1800" dirty="0" err="1">
-                          <a:effectLst/>
-                        </a:rPr>
-                        <a:t>Detectată</a:t>
-                      </a:r>
-                      <a:endParaRPr lang="en-US" sz="1800" dirty="0">
-                        <a:effectLst/>
-                        <a:latin typeface="Times New Roman"/>
-                        <a:ea typeface="Times New Roman"/>
-                      </a:endParaRPr>
-                    </a:p>
-                  </a:txBody>
-                  <a:tcPr marL="68580" marR="68580" marT="0" marB="0"/>
-                </a:tc>
-                <a:tc>
-                  <a:txBody>
-                    <a:bodyPr/>
-                    <a:lstStyle/>
-                    <a:p>
-                      <a:pPr marL="0" marR="0">
-                        <a:spcBef>
-                          <a:spcPts val="0"/>
-                        </a:spcBef>
-                        <a:spcAft>
-                          <a:spcPts val="0"/>
-                        </a:spcAft>
-                      </a:pPr>
-                      <a:r>
-                        <a:rPr lang="en-US" sz="1800">
-                          <a:effectLst/>
-                        </a:rPr>
-                        <a:t>Detectată</a:t>
-                      </a:r>
-                      <a:endParaRPr lang="en-US" sz="1800">
-                        <a:effectLst/>
-                        <a:latin typeface="Times New Roman"/>
-                        <a:ea typeface="Times New Roman"/>
-                      </a:endParaRPr>
-                    </a:p>
-                  </a:txBody>
-                  <a:tcPr marL="68580" marR="68580" marT="0" marB="0"/>
-                </a:tc>
-              </a:tr>
-              <a:tr h="831493">
-                <a:tc>
-                  <a:txBody>
-                    <a:bodyPr/>
-                    <a:lstStyle/>
-                    <a:p>
-                      <a:pPr marL="0" marR="0">
-                        <a:spcBef>
-                          <a:spcPts val="0"/>
-                        </a:spcBef>
-                        <a:spcAft>
-                          <a:spcPts val="0"/>
-                        </a:spcAft>
-                      </a:pPr>
-                      <a:r>
-                        <a:rPr lang="en-US" sz="1800">
-                          <a:effectLst/>
-                        </a:rPr>
-                        <a:t>Clona tipul 3 total redenumită</a:t>
-                      </a:r>
-                      <a:endParaRPr lang="en-US" sz="1800">
-                        <a:effectLst/>
-                        <a:latin typeface="Times New Roman"/>
-                        <a:ea typeface="Times New Roman"/>
-                      </a:endParaRPr>
-                    </a:p>
-                  </a:txBody>
-                  <a:tcPr marL="68580" marR="68580" marT="0" marB="0"/>
-                </a:tc>
-                <a:tc>
-                  <a:txBody>
-                    <a:bodyPr/>
-                    <a:lstStyle/>
-                    <a:p>
-                      <a:pPr marL="0" marR="0" algn="ctr">
-                        <a:spcBef>
-                          <a:spcPts val="0"/>
-                        </a:spcBef>
-                        <a:spcAft>
-                          <a:spcPts val="0"/>
-                        </a:spcAft>
-                      </a:pPr>
-                      <a:r>
-                        <a:rPr lang="en-US" sz="1800">
-                          <a:effectLst/>
-                        </a:rPr>
-                        <a:t>Detectată</a:t>
-                      </a:r>
-                      <a:endParaRPr lang="en-US" sz="1800">
-                        <a:effectLst/>
-                        <a:latin typeface="Times New Roman"/>
-                        <a:ea typeface="Times New Roman"/>
-                      </a:endParaRPr>
-                    </a:p>
-                  </a:txBody>
-                  <a:tcPr marL="68580" marR="68580" marT="0" marB="0"/>
-                </a:tc>
-                <a:tc>
-                  <a:txBody>
-                    <a:bodyPr/>
-                    <a:lstStyle/>
-                    <a:p>
-                      <a:pPr marL="0" marR="0">
-                        <a:spcBef>
-                          <a:spcPts val="0"/>
-                        </a:spcBef>
-                        <a:spcAft>
-                          <a:spcPts val="0"/>
-                        </a:spcAft>
-                      </a:pPr>
-                      <a:r>
-                        <a:rPr lang="en-US" sz="1800" dirty="0" err="1">
-                          <a:effectLst/>
-                        </a:rPr>
-                        <a:t>Neraportată</a:t>
-                      </a:r>
-                      <a:endParaRPr lang="en-US" sz="1800" dirty="0">
-                        <a:effectLst/>
-                        <a:latin typeface="Times New Roman"/>
-                        <a:ea typeface="Times New Roman"/>
-                      </a:endParaRPr>
-                    </a:p>
-                  </a:txBody>
-                  <a:tcPr marL="68580" marR="68580" marT="0" marB="0"/>
-                </a:tc>
-              </a:tr>
-              <a:tr h="615304">
-                <a:tc>
-                  <a:txBody>
-                    <a:bodyPr/>
-                    <a:lstStyle/>
-                    <a:p>
-                      <a:pPr marL="0" marR="0">
-                        <a:spcBef>
-                          <a:spcPts val="0"/>
-                        </a:spcBef>
-                        <a:spcAft>
-                          <a:spcPts val="0"/>
-                        </a:spcAft>
-                      </a:pPr>
-                      <a:r>
-                        <a:rPr lang="en-US" sz="1800">
-                          <a:effectLst/>
-                        </a:rPr>
-                        <a:t>Proiecte diferite</a:t>
-                      </a:r>
-                      <a:endParaRPr lang="en-US" sz="1800">
-                        <a:effectLst/>
-                        <a:latin typeface="Times New Roman"/>
-                        <a:ea typeface="Times New Roman"/>
-                      </a:endParaRPr>
-                    </a:p>
-                  </a:txBody>
-                  <a:tcPr marL="68580" marR="68580" marT="0" marB="0"/>
-                </a:tc>
-                <a:tc>
-                  <a:txBody>
-                    <a:bodyPr/>
-                    <a:lstStyle/>
-                    <a:p>
-                      <a:pPr marL="0" marR="0" algn="ctr">
-                        <a:spcBef>
-                          <a:spcPts val="0"/>
-                        </a:spcBef>
-                        <a:spcAft>
-                          <a:spcPts val="0"/>
-                        </a:spcAft>
-                      </a:pPr>
-                      <a:r>
-                        <a:rPr lang="en-US" sz="1800">
-                          <a:effectLst/>
-                        </a:rPr>
-                        <a:t>Neraportată</a:t>
-                      </a:r>
-                      <a:endParaRPr lang="en-US" sz="1800">
-                        <a:effectLst/>
-                        <a:latin typeface="Times New Roman"/>
-                        <a:ea typeface="Times New Roman"/>
-                      </a:endParaRPr>
-                    </a:p>
-                  </a:txBody>
-                  <a:tcPr marL="68580" marR="68580" marT="0" marB="0"/>
-                </a:tc>
-                <a:tc>
-                  <a:txBody>
-                    <a:bodyPr/>
-                    <a:lstStyle/>
-                    <a:p>
-                      <a:pPr marL="0" marR="0">
-                        <a:spcBef>
-                          <a:spcPts val="0"/>
-                        </a:spcBef>
-                        <a:spcAft>
-                          <a:spcPts val="0"/>
-                        </a:spcAft>
-                      </a:pPr>
-                      <a:r>
-                        <a:rPr lang="en-US" sz="1800">
-                          <a:effectLst/>
-                        </a:rPr>
-                        <a:t>Neraportată</a:t>
-                      </a:r>
-                      <a:endParaRPr lang="en-US" sz="1800">
-                        <a:effectLst/>
-                        <a:latin typeface="Times New Roman"/>
-                        <a:ea typeface="Times New Roman"/>
-                      </a:endParaRPr>
-                    </a:p>
-                  </a:txBody>
-                  <a:tcPr marL="68580" marR="68580" marT="0" marB="0"/>
-                </a:tc>
-              </a:tr>
-              <a:tr h="1247238">
-                <a:tc>
-                  <a:txBody>
-                    <a:bodyPr/>
-                    <a:lstStyle/>
-                    <a:p>
-                      <a:pPr marL="0" marR="0">
-                        <a:spcBef>
-                          <a:spcPts val="0"/>
-                        </a:spcBef>
-                        <a:spcAft>
-                          <a:spcPts val="0"/>
-                        </a:spcAft>
-                      </a:pPr>
-                      <a:r>
-                        <a:rPr lang="en-US" sz="1800">
-                          <a:effectLst/>
-                        </a:rPr>
-                        <a:t>Proiecte mari diferiţe</a:t>
-                      </a:r>
-                      <a:endParaRPr lang="en-US" sz="1800">
-                        <a:effectLst/>
-                        <a:latin typeface="Times New Roman"/>
-                        <a:ea typeface="Times New Roman"/>
-                      </a:endParaRPr>
-                    </a:p>
-                  </a:txBody>
-                  <a:tcPr marL="68580" marR="68580" marT="0" marB="0"/>
-                </a:tc>
-                <a:tc>
-                  <a:txBody>
-                    <a:bodyPr/>
-                    <a:lstStyle/>
-                    <a:p>
-                      <a:pPr marL="0" marR="0" algn="ctr">
-                        <a:spcBef>
-                          <a:spcPts val="0"/>
-                        </a:spcBef>
-                        <a:spcAft>
-                          <a:spcPts val="0"/>
-                        </a:spcAft>
-                      </a:pPr>
-                      <a:r>
-                        <a:rPr lang="en-US" sz="1800">
-                          <a:effectLst/>
-                        </a:rPr>
-                        <a:t>Neraportată + timp mare de executie</a:t>
-                      </a:r>
-                      <a:endParaRPr lang="en-US" sz="1800">
-                        <a:effectLst/>
-                        <a:latin typeface="Times New Roman"/>
-                        <a:ea typeface="Times New Roman"/>
-                      </a:endParaRPr>
-                    </a:p>
-                  </a:txBody>
-                  <a:tcPr marL="68580" marR="68580" marT="0" marB="0"/>
-                </a:tc>
-                <a:tc>
-                  <a:txBody>
-                    <a:bodyPr/>
-                    <a:lstStyle/>
-                    <a:p>
-                      <a:pPr marL="0" marR="0">
-                        <a:spcBef>
-                          <a:spcPts val="0"/>
-                        </a:spcBef>
-                        <a:spcAft>
-                          <a:spcPts val="0"/>
-                        </a:spcAft>
-                      </a:pPr>
-                      <a:r>
-                        <a:rPr lang="en-US" sz="1800" dirty="0" err="1">
-                          <a:effectLst/>
-                        </a:rPr>
-                        <a:t>Neraportată</a:t>
-                      </a:r>
-                      <a:endParaRPr lang="en-US" sz="1800" dirty="0">
-                        <a:effectLst/>
-                        <a:latin typeface="Times New Roman"/>
-                        <a:ea typeface="Times New Roman"/>
-                      </a:endParaRPr>
-                    </a:p>
-                  </a:txBody>
-                  <a:tcPr marL="68580" marR="68580" marT="0" marB="0"/>
-                </a:tc>
-              </a:tr>
-            </a:tbl>
-          </a:graphicData>
-        </a:graphic>
-      </p:graphicFrame>
-    </p:spTree>
-    <p:extLst>
-      <p:ext uri="{BB962C8B-B14F-4D97-AF65-F5344CB8AC3E}">
-        <p14:creationId xmlns:p14="http://schemas.microsoft.com/office/powerpoint/2010/main" val="3267582253"/>
       </p:ext>
     </p:extLst>
   </p:cSld>

</xml_diff>